<commit_message>
improvements to tech review
</commit_message>
<xml_diff>
--- a/doc/design/TechnologyReview.pptx
+++ b/doc/design/TechnologyReview.pptx
@@ -3570,6 +3570,12 @@
               <a:t>Novice with web service technology</a:t>
             </a:r>
           </a:p>
+          <a:p>
+            <a:r>
+              <a:rPr lang="en-US" dirty="0"/>
+              <a:t>OS agnostic</a:t>
+            </a:r>
+          </a:p>
         </p:txBody>
       </p:sp>
     </p:spTree>
@@ -3679,6 +3685,18 @@
               <a:rPr lang="en-US" dirty="0"/>
               <a:t>Minimal install requirements</a:t>
             </a:r>
+          </a:p>
+          <a:p>
+            <a:pPr lvl="1"/>
+            <a:r>
+              <a:rPr lang="en-US" dirty="0"/>
+              <a:t>Available on </a:t>
+            </a:r>
+            <a:r>
+              <a:rPr lang="en-US"/>
+              <a:t>all major OSes</a:t>
+            </a:r>
+            <a:endParaRPr lang="en-US" dirty="0"/>
           </a:p>
           <a:p>
             <a:pPr lvl="1"/>

</xml_diff>

<commit_message>
updates to grab_noaa module
</commit_message>
<xml_diff>
--- a/doc/design/TechnologyReview.pptx
+++ b/doc/design/TechnologyReview.pptx
@@ -3690,13 +3690,8 @@
             <a:pPr lvl="1"/>
             <a:r>
               <a:rPr lang="en-US" dirty="0"/>
-              <a:t>Available on </a:t>
-            </a:r>
-            <a:r>
-              <a:rPr lang="en-US"/>
-              <a:t>all major OSes</a:t>
-            </a:r>
-            <a:endParaRPr lang="en-US" dirty="0"/>
+              <a:t>Available on all major OSes</a:t>
+            </a:r>
           </a:p>
           <a:p>
             <a:pPr lvl="1"/>

</xml_diff>

<commit_message>
draft of powerpoint tech review done
</commit_message>
<xml_diff>
--- a/doc/design/TechnologyReview.pptx
+++ b/doc/design/TechnologyReview.pptx
@@ -9,12 +9,10 @@
     <p:sldId id="489" r:id="rId3"/>
     <p:sldId id="491" r:id="rId4"/>
     <p:sldId id="494" r:id="rId5"/>
-    <p:sldId id="492" r:id="rId6"/>
-    <p:sldId id="493" r:id="rId7"/>
-    <p:sldId id="490" r:id="rId8"/>
-    <p:sldId id="467" r:id="rId9"/>
-    <p:sldId id="473" r:id="rId10"/>
-    <p:sldId id="474" r:id="rId11"/>
+    <p:sldId id="493" r:id="rId6"/>
+    <p:sldId id="495" r:id="rId7"/>
+    <p:sldId id="492" r:id="rId8"/>
+    <p:sldId id="496" r:id="rId9"/>
   </p:sldIdLst>
   <p:sldSz cx="12192000" cy="6858000"/>
   <p:notesSz cx="6858000" cy="9144000"/>
@@ -3482,211 +3480,6 @@
 </p:sld>
 </file>
 
-<file path=ppt/slides/slide10.xml><?xml version="1.0" encoding="utf-8"?>
-<p:sld xmlns:a="http://schemas.openxmlformats.org/drawingml/2006/main" xmlns:r="http://schemas.openxmlformats.org/officeDocument/2006/relationships" xmlns:p="http://schemas.openxmlformats.org/presentationml/2006/main">
-  <p:cSld>
-    <p:spTree>
-      <p:nvGrpSpPr>
-        <p:cNvPr id="1" name=""/>
-        <p:cNvGrpSpPr/>
-        <p:nvPr/>
-      </p:nvGrpSpPr>
-      <p:grpSpPr>
-        <a:xfrm>
-          <a:off x="0" y="0"/>
-          <a:ext cx="0" cy="0"/>
-          <a:chOff x="0" y="0"/>
-          <a:chExt cx="0" cy="0"/>
-        </a:xfrm>
-      </p:grpSpPr>
-      <p:sp>
-        <p:nvSpPr>
-          <p:cNvPr id="38913" name="Title 1">
-            <a:extLst>
-              <a:ext uri="{FF2B5EF4-FFF2-40B4-BE49-F238E27FC236}">
-                <a16:creationId xmlns:a16="http://schemas.microsoft.com/office/drawing/2014/main" id="{BEA04ED2-A6D2-41F6-BB08-193FAEA6D6BC}"/>
-              </a:ext>
-            </a:extLst>
-          </p:cNvPr>
-          <p:cNvSpPr>
-            <a:spLocks noGrp="1"/>
-          </p:cNvSpPr>
-          <p:nvPr>
-            <p:ph type="title"/>
-          </p:nvPr>
-        </p:nvSpPr>
-        <p:spPr bwMode="auto">
-          <a:noFill/>
-          <a:extLst>
-            <a:ext uri="{909E8E84-426E-40DD-AFC4-6F175D3DCCD1}">
-              <a14:hiddenFill xmlns:a14="http://schemas.microsoft.com/office/drawing/2010/main">
-                <a:solidFill>
-                  <a:srgbClr val="FFFFFF"/>
-                </a:solidFill>
-              </a14:hiddenFill>
-            </a:ext>
-            <a:ext uri="{91240B29-F687-4F45-9708-019B960494DF}">
-              <a14:hiddenLine xmlns:a14="http://schemas.microsoft.com/office/drawing/2010/main" w="9525">
-                <a:solidFill>
-                  <a:srgbClr val="000000"/>
-                </a:solidFill>
-                <a:miter lim="800000"/>
-                <a:headEnd/>
-                <a:tailEnd/>
-              </a14:hiddenLine>
-            </a:ext>
-          </a:extLst>
-        </p:spPr>
-        <p:txBody>
-          <a:bodyPr vert="horz" wrap="square" lIns="91440" tIns="45720" rIns="91440" bIns="45720" numCol="1" rtlCol="0" anchor="t" anchorCtr="0" compatLnSpc="1">
-            <a:prstTxWarp prst="textNoShape">
-              <a:avLst/>
-            </a:prstTxWarp>
-            <a:normAutofit/>
-          </a:bodyPr>
-          <a:lstStyle/>
-          <a:p>
-            <a:r>
-              <a:rPr lang="en-US" altLang="en-US">
-                <a:ea typeface="ＭＳ Ｐゴシック" panose="020B0600070205080204" pitchFamily="34" charset="-128"/>
-              </a:rPr>
-              <a:t>Assessment of Antimony</a:t>
-            </a:r>
-          </a:p>
-        </p:txBody>
-      </p:sp>
-      <p:sp>
-        <p:nvSpPr>
-          <p:cNvPr id="4" name="Content Placeholder 3">
-            <a:extLst>
-              <a:ext uri="{FF2B5EF4-FFF2-40B4-BE49-F238E27FC236}">
-                <a16:creationId xmlns:a16="http://schemas.microsoft.com/office/drawing/2014/main" id="{5AD6DF91-8DD6-4577-84A4-1A7258DB5132}"/>
-              </a:ext>
-            </a:extLst>
-          </p:cNvPr>
-          <p:cNvSpPr>
-            <a:spLocks noGrp="1"/>
-          </p:cNvSpPr>
-          <p:nvPr>
-            <p:ph idx="1"/>
-          </p:nvPr>
-        </p:nvSpPr>
-        <p:spPr bwMode="auto">
-          <a:xfrm>
-            <a:off x="1981200" y="1371600"/>
-            <a:ext cx="8229600" cy="4572000"/>
-          </a:xfrm>
-          <a:noFill/>
-          <a:extLst>
-            <a:ext uri="{909E8E84-426E-40DD-AFC4-6F175D3DCCD1}">
-              <a14:hiddenFill xmlns:a14="http://schemas.microsoft.com/office/drawing/2010/main">
-                <a:solidFill>
-                  <a:srgbClr val="FFFFFF"/>
-                </a:solidFill>
-              </a14:hiddenFill>
-            </a:ext>
-            <a:ext uri="{91240B29-F687-4F45-9708-019B960494DF}">
-              <a14:hiddenLine xmlns:a14="http://schemas.microsoft.com/office/drawing/2010/main" w="9525">
-                <a:solidFill>
-                  <a:srgbClr val="000000"/>
-                </a:solidFill>
-                <a:miter lim="800000"/>
-                <a:headEnd/>
-                <a:tailEnd/>
-              </a14:hiddenLine>
-            </a:ext>
-          </a:extLst>
-        </p:spPr>
-        <p:txBody>
-          <a:bodyPr vert="horz" wrap="square" lIns="91440" tIns="45720" rIns="91440" bIns="45720" numCol="1" rtlCol="0" anchor="t" anchorCtr="0" compatLnSpc="1">
-            <a:prstTxWarp prst="textNoShape">
-              <a:avLst/>
-            </a:prstTxWarp>
-            <a:normAutofit/>
-          </a:bodyPr>
-          <a:lstStyle/>
-          <a:p>
-            <a:r>
-              <a:rPr lang="en-US" altLang="en-US">
-                <a:ea typeface="ＭＳ Ｐゴシック" panose="020B0600070205080204" pitchFamily="34" charset="-128"/>
-              </a:rPr>
-              <a:t>Appeal</a:t>
-            </a:r>
-          </a:p>
-          <a:p>
-            <a:pPr lvl="1"/>
-            <a:r>
-              <a:rPr lang="en-US" altLang="en-US">
-                <a:ea typeface="ＭＳ Ｐゴシック" panose="020B0600070205080204" pitchFamily="34" charset="-128"/>
-              </a:rPr>
-              <a:t>Readable kinetics models</a:t>
-            </a:r>
-          </a:p>
-          <a:p>
-            <a:pPr lvl="1"/>
-            <a:r>
-              <a:rPr lang="en-US" altLang="en-US">
-                <a:ea typeface="ＭＳ Ｐゴシック" panose="020B0600070205080204" pitchFamily="34" charset="-128"/>
-              </a:rPr>
-              <a:t>Can use python with Antimony</a:t>
-            </a:r>
-          </a:p>
-          <a:p>
-            <a:pPr lvl="1"/>
-            <a:r>
-              <a:rPr lang="en-US" altLang="en-US">
-                <a:ea typeface="ＭＳ Ｐゴシック" panose="020B0600070205080204" pitchFamily="34" charset="-128"/>
-              </a:rPr>
-              <a:t>Exports to and imports from SBML (systems biology modeling language)</a:t>
-            </a:r>
-          </a:p>
-          <a:p>
-            <a:r>
-              <a:rPr lang="en-US" altLang="en-US">
-                <a:ea typeface="ＭＳ Ｐゴシック" panose="020B0600070205080204" pitchFamily="34" charset="-128"/>
-              </a:rPr>
-              <a:t>Drawbacks</a:t>
-            </a:r>
-          </a:p>
-          <a:p>
-            <a:pPr lvl="1"/>
-            <a:r>
-              <a:rPr lang="en-US" altLang="en-US">
-                <a:ea typeface="ＭＳ Ｐゴシック" panose="020B0600070205080204" pitchFamily="34" charset="-128"/>
-              </a:rPr>
-              <a:t>Poor support for the package</a:t>
-            </a:r>
-          </a:p>
-          <a:p>
-            <a:pPr lvl="1"/>
-            <a:r>
-              <a:rPr lang="en-US" altLang="en-US">
-                <a:ea typeface="ＭＳ Ｐゴシック" panose="020B0600070205080204" pitchFamily="34" charset="-128"/>
-              </a:rPr>
-              <a:t>Scaling may be a problem</a:t>
-            </a:r>
-          </a:p>
-          <a:p>
-            <a:pPr lvl="1"/>
-            <a:endParaRPr lang="en-US" altLang="en-US">
-              <a:ea typeface="ＭＳ Ｐゴシック" panose="020B0600070205080204" pitchFamily="34" charset="-128"/>
-            </a:endParaRPr>
-          </a:p>
-        </p:txBody>
-      </p:sp>
-    </p:spTree>
-    <p:extLst>
-      <p:ext uri="{BB962C8B-B14F-4D97-AF65-F5344CB8AC3E}">
-        <p14:creationId xmlns:p14="http://schemas.microsoft.com/office/powerpoint/2010/main" val="3526316774"/>
-      </p:ext>
-    </p:extLst>
-  </p:cSld>
-  <p:clrMapOvr>
-    <a:masterClrMapping/>
-  </p:clrMapOvr>
-</p:sld>
-</file>
-
 <file path=ppt/slides/slide2.xml><?xml version="1.0" encoding="utf-8"?>
 <p:sld xmlns:a="http://schemas.openxmlformats.org/drawingml/2006/main" xmlns:r="http://schemas.openxmlformats.org/officeDocument/2006/relationships" xmlns:p="http://schemas.openxmlformats.org/presentationml/2006/main">
   <p:cSld>
@@ -4135,7 +3928,7 @@
           <a:p>
             <a:r>
               <a:rPr lang="en-US" dirty="0"/>
-              <a:t>Requests Python Package</a:t>
+              <a:t>Pandas Python Package</a:t>
             </a:r>
           </a:p>
         </p:txBody>
@@ -4184,14 +3977,33 @@
             <a:pPr lvl="1"/>
             <a:r>
               <a:rPr lang="en-US" dirty="0"/>
-              <a:t>Allows for username and passwords or tokens</a:t>
+              <a:t>Can read CSV or JSON formatted data</a:t>
             </a:r>
           </a:p>
           <a:p>
             <a:pPr lvl="1"/>
             <a:r>
               <a:rPr lang="en-US" dirty="0"/>
-              <a:t> Designed for simple data retrieval</a:t>
+              <a:t>Can read straight from URL</a:t>
+            </a:r>
+          </a:p>
+          <a:p>
+            <a:pPr lvl="1"/>
+            <a:r>
+              <a:rPr lang="en-US" dirty="0"/>
+              <a:t> Returns Pandas </a:t>
+            </a:r>
+            <a:r>
+              <a:rPr lang="en-US" dirty="0" err="1"/>
+              <a:t>DataFrame</a:t>
+            </a:r>
+            <a:endParaRPr lang="en-US" dirty="0"/>
+          </a:p>
+          <a:p>
+            <a:pPr lvl="1"/>
+            <a:r>
+              <a:rPr lang="en-US" dirty="0"/>
+              <a:t>Option to easily skip header lines in the file</a:t>
             </a:r>
           </a:p>
           <a:p>
@@ -4204,28 +4016,15 @@
             <a:pPr lvl="1"/>
             <a:r>
               <a:rPr lang="en-US" dirty="0"/>
-              <a:t>Doesn't return a </a:t>
-            </a:r>
-            <a:r>
-              <a:rPr lang="en-US" dirty="0" err="1"/>
-              <a:t>DataFrame</a:t>
-            </a:r>
-            <a:endParaRPr lang="en-US" dirty="0"/>
+              <a:t>Doesn't allow metadata in the header for URL calls</a:t>
+            </a:r>
           </a:p>
           <a:p>
             <a:pPr lvl="1"/>
             <a:r>
               <a:rPr lang="en-US" dirty="0"/>
-              <a:t>Better suited for JSON formatted </a:t>
-            </a:r>
-            <a:r>
-              <a:rPr lang="en-US" dirty="0" err="1"/>
-              <a:t>urls</a:t>
-            </a:r>
-            <a:endParaRPr lang="en-US" dirty="0"/>
-          </a:p>
-          <a:p>
-            <a:endParaRPr lang="en-US" dirty="0"/>
+              <a:t>Not viable for retrieving data deep inside an HTML DOM tree</a:t>
+            </a:r>
           </a:p>
         </p:txBody>
       </p:sp>
@@ -4262,13 +4061,13 @@
               <a:rPr lang="en-US" sz="2800" dirty="0">
                 <a:latin typeface="Lucida Console" panose="020B0609040504020204" pitchFamily="49" charset="0"/>
               </a:rPr>
-              <a:t>r = </a:t>
+              <a:t>df = </a:t>
             </a:r>
             <a:r>
               <a:rPr lang="en-US" sz="2800" dirty="0" err="1">
                 <a:latin typeface="Lucida Console" panose="020B0609040504020204" pitchFamily="49" charset="0"/>
               </a:rPr>
-              <a:t>requests.get</a:t>
+              <a:t>pandas.read_csv</a:t>
             </a:r>
             <a:r>
               <a:rPr lang="en-US" sz="2800" dirty="0">
@@ -4286,19 +4085,31 @@
               <a:rPr lang="en-US" sz="2800" dirty="0">
                 <a:latin typeface="Lucida Console" panose="020B0609040504020204" pitchFamily="49" charset="0"/>
               </a:rPr>
-              <a:t>, headers={'token’: </a:t>
+              <a:t>, </a:t>
             </a:r>
             <a:r>
               <a:rPr lang="en-US" sz="2800" dirty="0" err="1">
                 <a:latin typeface="Lucida Console" panose="020B0609040504020204" pitchFamily="49" charset="0"/>
               </a:rPr>
-              <a:t>api_key</a:t>
+              <a:t>skiprows</a:t>
             </a:r>
             <a:r>
               <a:rPr lang="en-US" sz="2800" dirty="0">
                 <a:latin typeface="Lucida Console" panose="020B0609040504020204" pitchFamily="49" charset="0"/>
               </a:rPr>
-              <a:t>})</a:t>
+              <a:t>=</a:t>
+            </a:r>
+            <a:r>
+              <a:rPr lang="en-US" sz="2800" dirty="0" err="1">
+                <a:latin typeface="Lucida Console" panose="020B0609040504020204" pitchFamily="49" charset="0"/>
+              </a:rPr>
+              <a:t>header_skip</a:t>
+            </a:r>
+            <a:r>
+              <a:rPr lang="en-US" sz="2800" dirty="0">
+                <a:latin typeface="Lucida Console" panose="020B0609040504020204" pitchFamily="49" charset="0"/>
+              </a:rPr>
+              <a:t>)</a:t>
             </a:r>
           </a:p>
         </p:txBody>
@@ -4306,7 +4117,7 @@
     </p:spTree>
     <p:extLst>
       <p:ext uri="{BB962C8B-B14F-4D97-AF65-F5344CB8AC3E}">
-        <p14:creationId xmlns:p14="http://schemas.microsoft.com/office/powerpoint/2010/main" val="964416389"/>
+        <p14:creationId xmlns:p14="http://schemas.microsoft.com/office/powerpoint/2010/main" val="1597963714"/>
       </p:ext>
     </p:extLst>
   </p:cSld>
@@ -4338,7 +4149,7 @@
           <p:cNvPr id="2" name="Title 1">
             <a:extLst>
               <a:ext uri="{FF2B5EF4-FFF2-40B4-BE49-F238E27FC236}">
-                <a16:creationId xmlns:a16="http://schemas.microsoft.com/office/drawing/2014/main" id="{68DCDD46-C769-4F86-9CD3-E15B0F2C1F87}"/>
+                <a16:creationId xmlns:a16="http://schemas.microsoft.com/office/drawing/2014/main" id="{8DDD8859-4345-4FA3-950E-121451DC6904}"/>
               </a:ext>
             </a:extLst>
           </p:cNvPr>
@@ -4361,191 +4172,70 @@
           </a:p>
         </p:txBody>
       </p:sp>
-      <p:sp>
-        <p:nvSpPr>
-          <p:cNvPr id="3" name="Content Placeholder 2">
-            <a:extLst>
-              <a:ext uri="{FF2B5EF4-FFF2-40B4-BE49-F238E27FC236}">
-                <a16:creationId xmlns:a16="http://schemas.microsoft.com/office/drawing/2014/main" id="{B8A5C19E-6E87-4B0E-862A-C77659B25197}"/>
-              </a:ext>
-            </a:extLst>
-          </p:cNvPr>
-          <p:cNvSpPr>
-            <a:spLocks noGrp="1"/>
-          </p:cNvSpPr>
-          <p:nvPr>
-            <p:ph idx="1"/>
-          </p:nvPr>
-        </p:nvSpPr>
+      <p:pic>
+        <p:nvPicPr>
+          <p:cNvPr id="4" name="Picture 3">
+            <a:hlinkClick r:id="rId2"/>
+            <a:extLst>
+              <a:ext uri="{FF2B5EF4-FFF2-40B4-BE49-F238E27FC236}">
+                <a16:creationId xmlns:a16="http://schemas.microsoft.com/office/drawing/2014/main" id="{5D6162A3-7152-4302-A40B-32A9B1ED7189}"/>
+              </a:ext>
+            </a:extLst>
+          </p:cNvPr>
+          <p:cNvPicPr>
+            <a:picLocks noChangeAspect="1"/>
+          </p:cNvPicPr>
+          <p:nvPr/>
+        </p:nvPicPr>
+        <p:blipFill>
+          <a:blip r:embed="rId3"/>
+          <a:stretch>
+            <a:fillRect/>
+          </a:stretch>
+        </p:blipFill>
         <p:spPr>
           <a:xfrm>
-            <a:off x="838200" y="2528047"/>
-            <a:ext cx="10515600" cy="3964828"/>
-          </a:xfrm>
-        </p:spPr>
-        <p:txBody>
-          <a:bodyPr>
-            <a:normAutofit/>
-          </a:bodyPr>
-          <a:lstStyle/>
-          <a:p>
-            <a:r>
-              <a:rPr lang="en-US" dirty="0"/>
-              <a:t>Pros</a:t>
-            </a:r>
-          </a:p>
-          <a:p>
-            <a:pPr lvl="1"/>
-            <a:r>
-              <a:rPr lang="en-US" dirty="0"/>
-              <a:t>Included in Anaconda Python distribution</a:t>
-            </a:r>
-          </a:p>
-          <a:p>
-            <a:pPr lvl="1"/>
-            <a:r>
-              <a:rPr lang="en-US" dirty="0"/>
-              <a:t>Can read CSV or JSON formatted data</a:t>
-            </a:r>
-          </a:p>
-          <a:p>
-            <a:pPr lvl="1"/>
-            <a:r>
-              <a:rPr lang="en-US" dirty="0"/>
-              <a:t>Can read straight from URL</a:t>
-            </a:r>
-          </a:p>
-          <a:p>
-            <a:pPr lvl="1"/>
-            <a:r>
-              <a:rPr lang="en-US" dirty="0"/>
-              <a:t> Returns Pandas </a:t>
-            </a:r>
-            <a:r>
-              <a:rPr lang="en-US" dirty="0" err="1"/>
-              <a:t>DataFrame</a:t>
-            </a:r>
-            <a:endParaRPr lang="en-US" dirty="0"/>
-          </a:p>
-          <a:p>
-            <a:pPr lvl="1"/>
-            <a:r>
-              <a:rPr lang="en-US" dirty="0"/>
-              <a:t>Option to easily skip header lines in the file</a:t>
-            </a:r>
-          </a:p>
-          <a:p>
-            <a:r>
-              <a:rPr lang="en-US" dirty="0"/>
-              <a:t>Cons</a:t>
-            </a:r>
-          </a:p>
-          <a:p>
-            <a:pPr lvl="1"/>
-            <a:r>
-              <a:rPr lang="en-US" dirty="0"/>
-              <a:t>Doesn't allow metadata in the header for URL calls</a:t>
-            </a:r>
-          </a:p>
-          <a:p>
-            <a:pPr lvl="1"/>
-            <a:r>
-              <a:rPr lang="en-US" dirty="0"/>
-              <a:t>Not viable for retrieving data deep inside an HTML DOM tree</a:t>
-            </a:r>
-          </a:p>
-        </p:txBody>
-      </p:sp>
-      <p:sp>
-        <p:nvSpPr>
-          <p:cNvPr id="4" name="TextBox 3">
-            <a:extLst>
-              <a:ext uri="{FF2B5EF4-FFF2-40B4-BE49-F238E27FC236}">
-                <a16:creationId xmlns:a16="http://schemas.microsoft.com/office/drawing/2014/main" id="{5DC67676-611A-4DE3-9F32-66D6A9E1C21F}"/>
-              </a:ext>
-            </a:extLst>
-          </p:cNvPr>
-          <p:cNvSpPr txBox="1"/>
-          <p:nvPr/>
-        </p:nvSpPr>
-        <p:spPr>
-          <a:xfrm>
-            <a:off x="0" y="1690688"/>
-            <a:ext cx="12192000" cy="523220"/>
+            <a:off x="591778" y="1778648"/>
+            <a:ext cx="7414985" cy="4398315"/>
           </a:xfrm>
           <a:prstGeom prst="rect">
             <a:avLst/>
           </a:prstGeom>
-          <a:noFill/>
         </p:spPr>
-        <p:txBody>
-          <a:bodyPr wrap="square" rtlCol="0">
-            <a:spAutoFit/>
-          </a:bodyPr>
-          <a:lstStyle/>
-          <a:p>
-            <a:pPr algn="ctr"/>
-            <a:r>
-              <a:rPr lang="en-US" sz="2800" dirty="0">
-                <a:latin typeface="Lucida Console" panose="020B0609040504020204" pitchFamily="49" charset="0"/>
-              </a:rPr>
-              <a:t>df = </a:t>
-            </a:r>
-            <a:r>
-              <a:rPr lang="en-US" sz="2800" dirty="0" err="1">
-                <a:latin typeface="Lucida Console" panose="020B0609040504020204" pitchFamily="49" charset="0"/>
-              </a:rPr>
-              <a:t>pandas.read_csv</a:t>
-            </a:r>
-            <a:r>
-              <a:rPr lang="en-US" sz="2800" dirty="0">
-                <a:latin typeface="Lucida Console" panose="020B0609040504020204" pitchFamily="49" charset="0"/>
-              </a:rPr>
-              <a:t>(</a:t>
-            </a:r>
-            <a:r>
-              <a:rPr lang="en-US" sz="2800" dirty="0" err="1">
-                <a:latin typeface="Lucida Console" panose="020B0609040504020204" pitchFamily="49" charset="0"/>
-              </a:rPr>
-              <a:t>data_url</a:t>
-            </a:r>
-            <a:r>
-              <a:rPr lang="en-US" sz="2800" dirty="0">
-                <a:latin typeface="Lucida Console" panose="020B0609040504020204" pitchFamily="49" charset="0"/>
-              </a:rPr>
-              <a:t>, </a:t>
-            </a:r>
-            <a:r>
-              <a:rPr lang="en-US" sz="2800" dirty="0" err="1">
-                <a:latin typeface="Lucida Console" panose="020B0609040504020204" pitchFamily="49" charset="0"/>
-              </a:rPr>
-              <a:t>skiprows</a:t>
-            </a:r>
-            <a:r>
-              <a:rPr lang="en-US" sz="2800" dirty="0">
-                <a:latin typeface="Lucida Console" panose="020B0609040504020204" pitchFamily="49" charset="0"/>
-              </a:rPr>
-              <a:t>=</a:t>
-            </a:r>
-            <a:r>
-              <a:rPr lang="en-US" sz="2800" dirty="0" err="1">
-                <a:latin typeface="Lucida Console" panose="020B0609040504020204" pitchFamily="49" charset="0"/>
-              </a:rPr>
-              <a:t>header_skip</a:t>
-            </a:r>
-            <a:r>
-              <a:rPr lang="en-US" sz="2800" dirty="0">
-                <a:latin typeface="Lucida Console" panose="020B0609040504020204" pitchFamily="49" charset="0"/>
-              </a:rPr>
-              <a:t>)</a:t>
-            </a:r>
-          </a:p>
-        </p:txBody>
-      </p:sp>
+      </p:pic>
+      <p:pic>
+        <p:nvPicPr>
+          <p:cNvPr id="5" name="Picture 4">
+            <a:extLst>
+              <a:ext uri="{FF2B5EF4-FFF2-40B4-BE49-F238E27FC236}">
+                <a16:creationId xmlns:a16="http://schemas.microsoft.com/office/drawing/2014/main" id="{05D7F514-6688-4C77-A6F7-4A6208A5D6E5}"/>
+              </a:ext>
+            </a:extLst>
+          </p:cNvPr>
+          <p:cNvPicPr>
+            <a:picLocks noChangeAspect="1"/>
+          </p:cNvPicPr>
+          <p:nvPr/>
+        </p:nvPicPr>
+        <p:blipFill rotWithShape="1">
+          <a:blip r:embed="rId4"/>
+          <a:srcRect b="9678"/>
+          <a:stretch/>
+        </p:blipFill>
+        <p:spPr>
+          <a:xfrm>
+            <a:off x="6409106" y="2248852"/>
+            <a:ext cx="5337113" cy="4244023"/>
+          </a:xfrm>
+          <a:prstGeom prst="rect">
+            <a:avLst/>
+          </a:prstGeom>
+        </p:spPr>
+      </p:pic>
     </p:spTree>
     <p:extLst>
       <p:ext uri="{BB962C8B-B14F-4D97-AF65-F5344CB8AC3E}">
-        <p14:creationId xmlns:p14="http://schemas.microsoft.com/office/powerpoint/2010/main" val="1597963714"/>
+        <p14:creationId xmlns:p14="http://schemas.microsoft.com/office/powerpoint/2010/main" val="1099840047"/>
       </p:ext>
     </p:extLst>
   </p:cSld>
@@ -4574,10 +4264,10 @@
       </p:grpSpPr>
       <p:sp>
         <p:nvSpPr>
-          <p:cNvPr id="35841" name="Title 1">
-            <a:extLst>
-              <a:ext uri="{FF2B5EF4-FFF2-40B4-BE49-F238E27FC236}">
-                <a16:creationId xmlns:a16="http://schemas.microsoft.com/office/drawing/2014/main" id="{6EBAB5C5-DC26-413A-84E5-DBC854FA3203}"/>
+          <p:cNvPr id="2" name="Title 1">
+            <a:extLst>
+              <a:ext uri="{FF2B5EF4-FFF2-40B4-BE49-F238E27FC236}">
+                <a16:creationId xmlns:a16="http://schemas.microsoft.com/office/drawing/2014/main" id="{68DCDD46-C769-4F86-9CD3-E15B0F2C1F87}"/>
               </a:ext>
             </a:extLst>
           </p:cNvPr>
@@ -4588,349 +4278,177 @@
             <p:ph type="title"/>
           </p:nvPr>
         </p:nvSpPr>
-        <p:spPr bwMode="auto">
-          <a:noFill/>
-          <a:extLst>
-            <a:ext uri="{909E8E84-426E-40DD-AFC4-6F175D3DCCD1}">
-              <a14:hiddenFill xmlns:a14="http://schemas.microsoft.com/office/drawing/2010/main">
-                <a:solidFill>
-                  <a:srgbClr val="FFFFFF"/>
-                </a:solidFill>
-              </a14:hiddenFill>
-            </a:ext>
-            <a:ext uri="{91240B29-F687-4F45-9708-019B960494DF}">
-              <a14:hiddenLine xmlns:a14="http://schemas.microsoft.com/office/drawing/2010/main" w="9525">
-                <a:solidFill>
-                  <a:srgbClr val="000000"/>
-                </a:solidFill>
-                <a:miter lim="800000"/>
-                <a:headEnd/>
-                <a:tailEnd/>
-              </a14:hiddenLine>
-            </a:ext>
-          </a:extLst>
+        <p:spPr/>
+        <p:txBody>
+          <a:bodyPr/>
+          <a:lstStyle/>
+          <a:p>
+            <a:r>
+              <a:rPr lang="en-US" dirty="0"/>
+              <a:t>Requests Python Package</a:t>
+            </a:r>
+          </a:p>
+        </p:txBody>
+      </p:sp>
+      <p:sp>
+        <p:nvSpPr>
+          <p:cNvPr id="3" name="Content Placeholder 2">
+            <a:extLst>
+              <a:ext uri="{FF2B5EF4-FFF2-40B4-BE49-F238E27FC236}">
+                <a16:creationId xmlns:a16="http://schemas.microsoft.com/office/drawing/2014/main" id="{B8A5C19E-6E87-4B0E-862A-C77659B25197}"/>
+              </a:ext>
+            </a:extLst>
+          </p:cNvPr>
+          <p:cNvSpPr>
+            <a:spLocks noGrp="1"/>
+          </p:cNvSpPr>
+          <p:nvPr>
+            <p:ph idx="1"/>
+          </p:nvPr>
+        </p:nvSpPr>
+        <p:spPr>
+          <a:xfrm>
+            <a:off x="838200" y="2528047"/>
+            <a:ext cx="10515600" cy="3964828"/>
+          </a:xfrm>
         </p:spPr>
         <p:txBody>
-          <a:bodyPr vert="horz" wrap="square" lIns="91440" tIns="45720" rIns="91440" bIns="45720" numCol="1" rtlCol="0" anchor="t" anchorCtr="0" compatLnSpc="1">
-            <a:prstTxWarp prst="textNoShape">
-              <a:avLst/>
-            </a:prstTxWarp>
+          <a:bodyPr>
             <a:normAutofit/>
           </a:bodyPr>
           <a:lstStyle/>
           <a:p>
             <a:r>
-              <a:rPr lang="en-US" altLang="en-US" dirty="0">
-                <a:ea typeface="ＭＳ Ｐゴシック" panose="020B0600070205080204" pitchFamily="34" charset="-128"/>
-              </a:rPr>
-              <a:t>Technology Review Template</a:t>
-            </a:r>
-          </a:p>
-        </p:txBody>
-      </p:sp>
-      <p:sp>
-        <p:nvSpPr>
-          <p:cNvPr id="35842" name="Content Placeholder 2">
-            <a:extLst>
-              <a:ext uri="{FF2B5EF4-FFF2-40B4-BE49-F238E27FC236}">
-                <a16:creationId xmlns:a16="http://schemas.microsoft.com/office/drawing/2014/main" id="{4B13C7E9-59F9-4CE3-A6AA-A318C134F794}"/>
-              </a:ext>
-            </a:extLst>
-          </p:cNvPr>
-          <p:cNvSpPr>
-            <a:spLocks noGrp="1"/>
-          </p:cNvSpPr>
-          <p:nvPr>
-            <p:ph idx="1"/>
-          </p:nvPr>
-        </p:nvSpPr>
-        <p:spPr bwMode="auto">
-          <a:xfrm>
-            <a:off x="1981200" y="1143000"/>
-            <a:ext cx="8229600" cy="1066800"/>
-          </a:xfrm>
-          <a:noFill/>
-          <a:extLst>
-            <a:ext uri="{909E8E84-426E-40DD-AFC4-6F175D3DCCD1}">
-              <a14:hiddenFill xmlns:a14="http://schemas.microsoft.com/office/drawing/2010/main">
-                <a:solidFill>
-                  <a:srgbClr val="FFFFFF"/>
-                </a:solidFill>
-              </a14:hiddenFill>
-            </a:ext>
-            <a:ext uri="{91240B29-F687-4F45-9708-019B960494DF}">
-              <a14:hiddenLine xmlns:a14="http://schemas.microsoft.com/office/drawing/2010/main" w="9525">
-                <a:solidFill>
-                  <a:srgbClr val="000000"/>
-                </a:solidFill>
-                <a:miter lim="800000"/>
-                <a:headEnd/>
-                <a:tailEnd/>
-              </a14:hiddenLine>
-            </a:ext>
-          </a:extLst>
-        </p:spPr>
-        <p:txBody>
-          <a:bodyPr vert="horz" wrap="square" lIns="91440" tIns="45720" rIns="91440" bIns="45720" numCol="1" rtlCol="0" anchor="t" anchorCtr="0" compatLnSpc="1">
-            <a:prstTxWarp prst="textNoShape">
-              <a:avLst/>
-            </a:prstTxWarp>
-            <a:normAutofit/>
-          </a:bodyPr>
-          <a:lstStyle/>
-          <a:p>
-            <a:r>
-              <a:rPr lang="en-US" altLang="en-US">
-                <a:ea typeface="ＭＳ Ｐゴシック" panose="020B0600070205080204" pitchFamily="34" charset="-128"/>
-              </a:rPr>
-              <a:t>Why technology reviews?</a:t>
+              <a:rPr lang="en-US" dirty="0"/>
+              <a:t>Pros</a:t>
             </a:r>
           </a:p>
           <a:p>
             <a:pPr lvl="1"/>
             <a:r>
-              <a:rPr lang="en-US" altLang="en-US">
-                <a:ea typeface="ＭＳ Ｐゴシック" panose="020B0600070205080204" pitchFamily="34" charset="-128"/>
-              </a:rPr>
-              <a:t>Determine if use a package</a:t>
-            </a:r>
-          </a:p>
-        </p:txBody>
-      </p:sp>
-      <p:sp>
-        <p:nvSpPr>
-          <p:cNvPr id="5" name="Content Placeholder 2">
-            <a:extLst>
-              <a:ext uri="{FF2B5EF4-FFF2-40B4-BE49-F238E27FC236}">
-                <a16:creationId xmlns:a16="http://schemas.microsoft.com/office/drawing/2014/main" id="{BF490B9D-85D1-4F66-BD8C-EA0C553D8244}"/>
-              </a:ext>
-            </a:extLst>
-          </p:cNvPr>
-          <p:cNvSpPr txBox="1">
-            <a:spLocks/>
-          </p:cNvSpPr>
+              <a:rPr lang="en-US" dirty="0"/>
+              <a:t>Included in Anaconda Python distribution</a:t>
+            </a:r>
+          </a:p>
+          <a:p>
+            <a:pPr lvl="1"/>
+            <a:r>
+              <a:rPr lang="en-US" dirty="0"/>
+              <a:t>Allows for username and passwords or tokens</a:t>
+            </a:r>
+          </a:p>
+          <a:p>
+            <a:pPr lvl="1"/>
+            <a:r>
+              <a:rPr lang="en-US" dirty="0"/>
+              <a:t> Designed for simple data retrieval</a:t>
+            </a:r>
+          </a:p>
+          <a:p>
+            <a:r>
+              <a:rPr lang="en-US" dirty="0"/>
+              <a:t>Cons</a:t>
+            </a:r>
+          </a:p>
+          <a:p>
+            <a:pPr lvl="1"/>
+            <a:r>
+              <a:rPr lang="en-US" dirty="0"/>
+              <a:t>Doesn't return a </a:t>
+            </a:r>
+            <a:r>
+              <a:rPr lang="en-US" dirty="0" err="1"/>
+              <a:t>DataFrame</a:t>
+            </a:r>
+            <a:endParaRPr lang="en-US" dirty="0"/>
+          </a:p>
+          <a:p>
+            <a:pPr lvl="1"/>
+            <a:r>
+              <a:rPr lang="en-US" dirty="0"/>
+              <a:t>Better suited for JSON formatted </a:t>
+            </a:r>
+            <a:r>
+              <a:rPr lang="en-US" dirty="0" err="1"/>
+              <a:t>urls</a:t>
+            </a:r>
+            <a:endParaRPr lang="en-US" dirty="0"/>
+          </a:p>
+          <a:p>
+            <a:endParaRPr lang="en-US" dirty="0"/>
+          </a:p>
+        </p:txBody>
+      </p:sp>
+      <p:sp>
+        <p:nvSpPr>
+          <p:cNvPr id="4" name="TextBox 3">
+            <a:extLst>
+              <a:ext uri="{FF2B5EF4-FFF2-40B4-BE49-F238E27FC236}">
+                <a16:creationId xmlns:a16="http://schemas.microsoft.com/office/drawing/2014/main" id="{5DC67676-611A-4DE3-9F32-66D6A9E1C21F}"/>
+              </a:ext>
+            </a:extLst>
+          </p:cNvPr>
+          <p:cNvSpPr txBox="1"/>
           <p:nvPr/>
         </p:nvSpPr>
         <p:spPr>
           <a:xfrm>
-            <a:off x="1981200" y="2514600"/>
-            <a:ext cx="8229600" cy="3200400"/>
+            <a:off x="0" y="1690688"/>
+            <a:ext cx="12192000" cy="523220"/>
           </a:xfrm>
           <a:prstGeom prst="rect">
             <a:avLst/>
           </a:prstGeom>
-          <a:solidFill>
-            <a:schemeClr val="bg1">
-              <a:lumMod val="85000"/>
-            </a:schemeClr>
-          </a:solidFill>
+          <a:noFill/>
         </p:spPr>
         <p:txBody>
-          <a:bodyPr/>
-          <a:lstStyle>
-            <a:lvl1pPr marL="342900" indent="-342900" algn="l" defTabSz="457200" rtl="0" eaLnBrk="0" fontAlgn="base" hangingPunct="0">
-              <a:spcBef>
-                <a:spcPct val="20000"/>
-              </a:spcBef>
-              <a:spcAft>
-                <a:spcPct val="0"/>
-              </a:spcAft>
-              <a:buFont typeface="Arial" charset="0"/>
-              <a:buChar char="•"/>
-              <a:defRPr sz="3200" kern="1200">
-                <a:solidFill>
-                  <a:schemeClr val="tx1"/>
-                </a:solidFill>
-                <a:latin typeface="+mn-lt"/>
-                <a:ea typeface="ＭＳ Ｐゴシック" pitchFamily="-112" charset="-128"/>
-                <a:cs typeface="ＭＳ Ｐゴシック" pitchFamily="-112" charset="-128"/>
-              </a:defRPr>
-            </a:lvl1pPr>
-            <a:lvl2pPr marL="742950" indent="-285750" algn="l" defTabSz="457200" rtl="0" eaLnBrk="0" fontAlgn="base" hangingPunct="0">
-              <a:spcBef>
-                <a:spcPct val="20000"/>
-              </a:spcBef>
-              <a:spcAft>
-                <a:spcPct val="0"/>
-              </a:spcAft>
-              <a:buFont typeface="Arial" charset="0"/>
-              <a:buChar char="–"/>
-              <a:defRPr sz="2800" kern="1200">
-                <a:solidFill>
-                  <a:schemeClr val="tx1"/>
-                </a:solidFill>
-                <a:latin typeface="+mn-lt"/>
-                <a:ea typeface="ＭＳ Ｐゴシック" pitchFamily="-112" charset="-128"/>
-                <a:cs typeface="+mn-cs"/>
-              </a:defRPr>
-            </a:lvl2pPr>
-            <a:lvl3pPr marL="1143000" indent="-228600" algn="l" defTabSz="457200" rtl="0" eaLnBrk="0" fontAlgn="base" hangingPunct="0">
-              <a:spcBef>
-                <a:spcPct val="20000"/>
-              </a:spcBef>
-              <a:spcAft>
-                <a:spcPct val="0"/>
-              </a:spcAft>
-              <a:buFont typeface="Arial" charset="0"/>
-              <a:buChar char="•"/>
-              <a:defRPr sz="2400" kern="1200">
-                <a:solidFill>
-                  <a:schemeClr val="tx1"/>
-                </a:solidFill>
-                <a:latin typeface="+mn-lt"/>
-                <a:ea typeface="ＭＳ Ｐゴシック" pitchFamily="-112" charset="-128"/>
-                <a:cs typeface="+mn-cs"/>
-              </a:defRPr>
-            </a:lvl3pPr>
-            <a:lvl4pPr marL="1600200" indent="-228600" algn="l" defTabSz="457200" rtl="0" eaLnBrk="0" fontAlgn="base" hangingPunct="0">
-              <a:spcBef>
-                <a:spcPct val="20000"/>
-              </a:spcBef>
-              <a:spcAft>
-                <a:spcPct val="0"/>
-              </a:spcAft>
-              <a:buFont typeface="Arial" charset="0"/>
-              <a:buChar char="–"/>
-              <a:defRPr sz="2000" kern="1200">
-                <a:solidFill>
-                  <a:schemeClr val="tx1"/>
-                </a:solidFill>
-                <a:latin typeface="+mn-lt"/>
-                <a:ea typeface="ＭＳ Ｐゴシック" pitchFamily="-112" charset="-128"/>
-                <a:cs typeface="+mn-cs"/>
-              </a:defRPr>
-            </a:lvl4pPr>
-            <a:lvl5pPr marL="2057400" indent="-228600" algn="l" defTabSz="457200" rtl="0" eaLnBrk="0" fontAlgn="base" hangingPunct="0">
-              <a:spcBef>
-                <a:spcPct val="20000"/>
-              </a:spcBef>
-              <a:spcAft>
-                <a:spcPct val="0"/>
-              </a:spcAft>
-              <a:buFont typeface="Arial" charset="0"/>
-              <a:buChar char="»"/>
-              <a:defRPr sz="2000" kern="1200">
-                <a:solidFill>
-                  <a:schemeClr val="tx1"/>
-                </a:solidFill>
-                <a:latin typeface="+mn-lt"/>
-                <a:ea typeface="ＭＳ Ｐゴシック" pitchFamily="-112" charset="-128"/>
-                <a:cs typeface="+mn-cs"/>
-              </a:defRPr>
-            </a:lvl5pPr>
-            <a:lvl6pPr marL="2514600" indent="-228600" algn="l" defTabSz="457200" rtl="0" eaLnBrk="1" latinLnBrk="0" hangingPunct="1">
-              <a:spcBef>
-                <a:spcPct val="20000"/>
-              </a:spcBef>
-              <a:buFont typeface="Arial"/>
-              <a:buChar char="•"/>
-              <a:defRPr sz="2000" kern="1200">
-                <a:solidFill>
-                  <a:schemeClr val="tx1"/>
-                </a:solidFill>
-                <a:latin typeface="+mn-lt"/>
-                <a:ea typeface="+mn-ea"/>
-                <a:cs typeface="+mn-cs"/>
-              </a:defRPr>
-            </a:lvl6pPr>
-            <a:lvl7pPr marL="2971800" indent="-228600" algn="l" defTabSz="457200" rtl="0" eaLnBrk="1" latinLnBrk="0" hangingPunct="1">
-              <a:spcBef>
-                <a:spcPct val="20000"/>
-              </a:spcBef>
-              <a:buFont typeface="Arial"/>
-              <a:buChar char="•"/>
-              <a:defRPr sz="2000" kern="1200">
-                <a:solidFill>
-                  <a:schemeClr val="tx1"/>
-                </a:solidFill>
-                <a:latin typeface="+mn-lt"/>
-                <a:ea typeface="+mn-ea"/>
-                <a:cs typeface="+mn-cs"/>
-              </a:defRPr>
-            </a:lvl7pPr>
-            <a:lvl8pPr marL="3429000" indent="-228600" algn="l" defTabSz="457200" rtl="0" eaLnBrk="1" latinLnBrk="0" hangingPunct="1">
-              <a:spcBef>
-                <a:spcPct val="20000"/>
-              </a:spcBef>
-              <a:buFont typeface="Arial"/>
-              <a:buChar char="•"/>
-              <a:defRPr sz="2000" kern="1200">
-                <a:solidFill>
-                  <a:schemeClr val="tx1"/>
-                </a:solidFill>
-                <a:latin typeface="+mn-lt"/>
-                <a:ea typeface="+mn-ea"/>
-                <a:cs typeface="+mn-cs"/>
-              </a:defRPr>
-            </a:lvl8pPr>
-            <a:lvl9pPr marL="3886200" indent="-228600" algn="l" defTabSz="457200" rtl="0" eaLnBrk="1" latinLnBrk="0" hangingPunct="1">
-              <a:spcBef>
-                <a:spcPct val="20000"/>
-              </a:spcBef>
-              <a:buFont typeface="Arial"/>
-              <a:buChar char="•"/>
-              <a:defRPr sz="2000" kern="1200">
-                <a:solidFill>
-                  <a:schemeClr val="tx1"/>
-                </a:solidFill>
-                <a:latin typeface="+mn-lt"/>
-                <a:ea typeface="+mn-ea"/>
-                <a:cs typeface="+mn-cs"/>
-              </a:defRPr>
-            </a:lvl9pPr>
-          </a:lstStyle>
-          <a:p>
-            <a:pPr>
-              <a:defRPr/>
-            </a:pPr>
-            <a:r>
-              <a:rPr lang="en-US" sz="2800" dirty="0"/>
-              <a:t>Background</a:t>
-            </a:r>
-          </a:p>
-          <a:p>
-            <a:pPr lvl="1">
-              <a:defRPr/>
-            </a:pPr>
-            <a:r>
-              <a:rPr lang="en-US" sz="2400" dirty="0"/>
-              <a:t>Requirements that indicate a need for the proposed package</a:t>
-            </a:r>
-          </a:p>
-          <a:p>
-            <a:pPr>
-              <a:defRPr/>
-            </a:pPr>
-            <a:r>
-              <a:rPr lang="en-US" sz="2800" dirty="0"/>
-              <a:t>Discuss</a:t>
-            </a:r>
-          </a:p>
-          <a:p>
-            <a:pPr lvl="1">
-              <a:defRPr/>
-            </a:pPr>
-            <a:r>
-              <a:rPr lang="en-US" sz="2400" dirty="0"/>
-              <a:t>How the package works</a:t>
-            </a:r>
-          </a:p>
-          <a:p>
-            <a:pPr lvl="1">
-              <a:defRPr/>
-            </a:pPr>
-            <a:r>
-              <a:rPr lang="en-US" sz="2400" dirty="0"/>
-              <a:t>Appeal of using the package</a:t>
-            </a:r>
-          </a:p>
-          <a:p>
-            <a:pPr lvl="1">
-              <a:defRPr/>
-            </a:pPr>
-            <a:r>
-              <a:rPr lang="en-US" sz="2400" dirty="0"/>
-              <a:t>Drawbacks of using the package</a:t>
+          <a:bodyPr wrap="square" rtlCol="0">
+            <a:spAutoFit/>
+          </a:bodyPr>
+          <a:lstStyle/>
+          <a:p>
+            <a:pPr algn="ctr"/>
+            <a:r>
+              <a:rPr lang="en-US" sz="2800" dirty="0">
+                <a:latin typeface="Lucida Console" panose="020B0609040504020204" pitchFamily="49" charset="0"/>
+              </a:rPr>
+              <a:t>r = </a:t>
+            </a:r>
+            <a:r>
+              <a:rPr lang="en-US" sz="2800" dirty="0" err="1">
+                <a:latin typeface="Lucida Console" panose="020B0609040504020204" pitchFamily="49" charset="0"/>
+              </a:rPr>
+              <a:t>requests.get</a:t>
+            </a:r>
+            <a:r>
+              <a:rPr lang="en-US" sz="2800" dirty="0">
+                <a:latin typeface="Lucida Console" panose="020B0609040504020204" pitchFamily="49" charset="0"/>
+              </a:rPr>
+              <a:t>(</a:t>
+            </a:r>
+            <a:r>
+              <a:rPr lang="en-US" sz="2800" dirty="0" err="1">
+                <a:latin typeface="Lucida Console" panose="020B0609040504020204" pitchFamily="49" charset="0"/>
+              </a:rPr>
+              <a:t>data_url</a:t>
+            </a:r>
+            <a:r>
+              <a:rPr lang="en-US" sz="2800" dirty="0">
+                <a:latin typeface="Lucida Console" panose="020B0609040504020204" pitchFamily="49" charset="0"/>
+              </a:rPr>
+              <a:t>, headers={'token’: </a:t>
+            </a:r>
+            <a:r>
+              <a:rPr lang="en-US" sz="2800" dirty="0" err="1">
+                <a:latin typeface="Lucida Console" panose="020B0609040504020204" pitchFamily="49" charset="0"/>
+              </a:rPr>
+              <a:t>api_key</a:t>
+            </a:r>
+            <a:r>
+              <a:rPr lang="en-US" sz="2800" dirty="0">
+                <a:latin typeface="Lucida Console" panose="020B0609040504020204" pitchFamily="49" charset="0"/>
+              </a:rPr>
+              <a:t>})</a:t>
             </a:r>
           </a:p>
         </p:txBody>
@@ -4938,7 +4456,7 @@
     </p:spTree>
     <p:extLst>
       <p:ext uri="{BB962C8B-B14F-4D97-AF65-F5344CB8AC3E}">
-        <p14:creationId xmlns:p14="http://schemas.microsoft.com/office/powerpoint/2010/main" val="2148682504"/>
+        <p14:creationId xmlns:p14="http://schemas.microsoft.com/office/powerpoint/2010/main" val="964416389"/>
       </p:ext>
     </p:extLst>
   </p:cSld>
@@ -4967,10 +4485,10 @@
       </p:grpSpPr>
       <p:sp>
         <p:nvSpPr>
-          <p:cNvPr id="36865" name="Title 1">
-            <a:extLst>
-              <a:ext uri="{FF2B5EF4-FFF2-40B4-BE49-F238E27FC236}">
-                <a16:creationId xmlns:a16="http://schemas.microsoft.com/office/drawing/2014/main" id="{95B1074E-CDF6-4C7B-B5ED-04AC31B6CDEE}"/>
+          <p:cNvPr id="2" name="Title 1">
+            <a:extLst>
+              <a:ext uri="{FF2B5EF4-FFF2-40B4-BE49-F238E27FC236}">
+                <a16:creationId xmlns:a16="http://schemas.microsoft.com/office/drawing/2014/main" id="{68DCDD46-C769-4F86-9CD3-E15B0F2C1F87}"/>
               </a:ext>
             </a:extLst>
           </p:cNvPr>
@@ -4981,229 +4499,24 @@
             <p:ph type="title"/>
           </p:nvPr>
         </p:nvSpPr>
-        <p:spPr bwMode="auto">
-          <a:xfrm>
-            <a:off x="1828800" y="381000"/>
-            <a:ext cx="8382000" cy="838200"/>
-          </a:xfrm>
-          <a:noFill/>
-          <a:extLst>
-            <a:ext uri="{909E8E84-426E-40DD-AFC4-6F175D3DCCD1}">
-              <a14:hiddenFill xmlns:a14="http://schemas.microsoft.com/office/drawing/2010/main">
-                <a:solidFill>
-                  <a:srgbClr val="FFFFFF"/>
-                </a:solidFill>
-              </a14:hiddenFill>
-            </a:ext>
-            <a:ext uri="{91240B29-F687-4F45-9708-019B960494DF}">
-              <a14:hiddenLine xmlns:a14="http://schemas.microsoft.com/office/drawing/2010/main" w="9525">
-                <a:solidFill>
-                  <a:srgbClr val="000000"/>
-                </a:solidFill>
-                <a:miter lim="800000"/>
-                <a:headEnd/>
-                <a:tailEnd/>
-              </a14:hiddenLine>
-            </a:ext>
-          </a:extLst>
-        </p:spPr>
-        <p:txBody>
-          <a:bodyPr vert="horz" wrap="square" lIns="91440" tIns="45720" rIns="91440" bIns="45720" numCol="1" rtlCol="0" anchor="t" anchorCtr="0" compatLnSpc="1">
-            <a:prstTxWarp prst="textNoShape">
-              <a:avLst/>
-            </a:prstTxWarp>
-            <a:normAutofit fontScale="90000"/>
-          </a:bodyPr>
-          <a:lstStyle/>
-          <a:p>
-            <a:r>
-              <a:rPr lang="en-US" altLang="en-US">
-                <a:ea typeface="ＭＳ Ｐゴシック" panose="020B0600070205080204" pitchFamily="34" charset="-128"/>
-              </a:rPr>
-              <a:t>Example of A Technology Review</a:t>
-            </a:r>
-            <a:br>
-              <a:rPr lang="en-US" altLang="en-US">
-                <a:ea typeface="ＭＳ Ｐゴシック" panose="020B0600070205080204" pitchFamily="34" charset="-128"/>
-              </a:rPr>
-            </a:br>
-            <a:r>
-              <a:rPr lang="en-US" altLang="en-US" i="1">
-                <a:ea typeface="ＭＳ Ｐゴシック" panose="020B0600070205080204" pitchFamily="34" charset="-128"/>
-                <a:hlinkClick r:id="rId2"/>
-              </a:rPr>
-              <a:t>Antimony </a:t>
-            </a:r>
-            <a:r>
-              <a:rPr lang="en-US" altLang="en-US" i="1">
-                <a:ea typeface="ＭＳ Ｐゴシック" panose="020B0600070205080204" pitchFamily="34" charset="-128"/>
-              </a:rPr>
-              <a:t>Package for Kinetics Modeling</a:t>
-            </a:r>
-          </a:p>
-        </p:txBody>
-      </p:sp>
-      <p:sp>
-        <p:nvSpPr>
-          <p:cNvPr id="36866" name="Content Placeholder 2">
-            <a:extLst>
-              <a:ext uri="{FF2B5EF4-FFF2-40B4-BE49-F238E27FC236}">
-                <a16:creationId xmlns:a16="http://schemas.microsoft.com/office/drawing/2014/main" id="{84E56CA2-9F92-4ECB-810F-EC00A101EACC}"/>
-              </a:ext>
-            </a:extLst>
-          </p:cNvPr>
-          <p:cNvSpPr>
-            <a:spLocks noGrp="1"/>
-          </p:cNvSpPr>
-          <p:nvPr>
-            <p:ph idx="1"/>
-          </p:nvPr>
-        </p:nvSpPr>
-        <p:spPr bwMode="auto">
-          <a:xfrm>
-            <a:off x="1981200" y="1600200"/>
-            <a:ext cx="8229600" cy="4572000"/>
-          </a:xfrm>
-          <a:noFill/>
-          <a:extLst>
-            <a:ext uri="{909E8E84-426E-40DD-AFC4-6F175D3DCCD1}">
-              <a14:hiddenFill xmlns:a14="http://schemas.microsoft.com/office/drawing/2010/main">
-                <a:solidFill>
-                  <a:srgbClr val="FFFFFF"/>
-                </a:solidFill>
-              </a14:hiddenFill>
-            </a:ext>
-            <a:ext uri="{91240B29-F687-4F45-9708-019B960494DF}">
-              <a14:hiddenLine xmlns:a14="http://schemas.microsoft.com/office/drawing/2010/main" w="9525">
-                <a:solidFill>
-                  <a:srgbClr val="000000"/>
-                </a:solidFill>
-                <a:miter lim="800000"/>
-                <a:headEnd/>
-                <a:tailEnd/>
-              </a14:hiddenLine>
-            </a:ext>
-          </a:extLst>
-        </p:spPr>
-        <p:txBody>
-          <a:bodyPr vert="horz" wrap="square" lIns="91440" tIns="45720" rIns="91440" bIns="45720" numCol="1" rtlCol="0" anchor="t" anchorCtr="0" compatLnSpc="1">
-            <a:prstTxWarp prst="textNoShape">
-              <a:avLst/>
-            </a:prstTxWarp>
-            <a:normAutofit/>
-          </a:bodyPr>
-          <a:lstStyle/>
-          <a:p>
-            <a:r>
-              <a:rPr lang="en-US" altLang="en-US">
-                <a:ea typeface="ＭＳ Ｐゴシック" panose="020B0600070205080204" pitchFamily="34" charset="-128"/>
-              </a:rPr>
-              <a:t>Background</a:t>
-            </a:r>
-          </a:p>
-          <a:p>
-            <a:pPr lvl="1"/>
-            <a:r>
-              <a:rPr lang="en-US" altLang="en-US">
-                <a:ea typeface="ＭＳ Ｐゴシック" panose="020B0600070205080204" pitchFamily="34" charset="-128"/>
-              </a:rPr>
-              <a:t>Need kinetics models to explore certain what-if questions in chemical systems.</a:t>
-            </a:r>
-          </a:p>
-        </p:txBody>
-      </p:sp>
-    </p:spTree>
-    <p:extLst>
-      <p:ext uri="{BB962C8B-B14F-4D97-AF65-F5344CB8AC3E}">
-        <p14:creationId xmlns:p14="http://schemas.microsoft.com/office/powerpoint/2010/main" val="33760154"/>
-      </p:ext>
-    </p:extLst>
-  </p:cSld>
-  <p:clrMapOvr>
-    <a:masterClrMapping/>
-  </p:clrMapOvr>
-</p:sld>
-</file>
-
-<file path=ppt/slides/slide9.xml><?xml version="1.0" encoding="utf-8"?>
-<p:sld xmlns:a="http://schemas.openxmlformats.org/drawingml/2006/main" xmlns:r="http://schemas.openxmlformats.org/officeDocument/2006/relationships" xmlns:p="http://schemas.openxmlformats.org/presentationml/2006/main">
-  <p:cSld>
-    <p:spTree>
-      <p:nvGrpSpPr>
-        <p:cNvPr id="1" name=""/>
-        <p:cNvGrpSpPr/>
-        <p:nvPr/>
-      </p:nvGrpSpPr>
-      <p:grpSpPr>
-        <a:xfrm>
-          <a:off x="0" y="0"/>
-          <a:ext cx="0" cy="0"/>
-          <a:chOff x="0" y="0"/>
-          <a:chExt cx="0" cy="0"/>
-        </a:xfrm>
-      </p:grpSpPr>
-      <p:sp>
-        <p:nvSpPr>
-          <p:cNvPr id="37889" name="Title 1">
-            <a:extLst>
-              <a:ext uri="{FF2B5EF4-FFF2-40B4-BE49-F238E27FC236}">
-                <a16:creationId xmlns:a16="http://schemas.microsoft.com/office/drawing/2014/main" id="{AFC336D3-EC20-42BA-8F57-F0B2F34D7B81}"/>
-              </a:ext>
-            </a:extLst>
-          </p:cNvPr>
-          <p:cNvSpPr>
-            <a:spLocks noGrp="1"/>
-          </p:cNvSpPr>
-          <p:nvPr>
-            <p:ph type="title"/>
-          </p:nvPr>
-        </p:nvSpPr>
-        <p:spPr bwMode="auto">
-          <a:noFill/>
-          <a:extLst>
-            <a:ext uri="{909E8E84-426E-40DD-AFC4-6F175D3DCCD1}">
-              <a14:hiddenFill xmlns:a14="http://schemas.microsoft.com/office/drawing/2010/main">
-                <a:solidFill>
-                  <a:srgbClr val="FFFFFF"/>
-                </a:solidFill>
-              </a14:hiddenFill>
-            </a:ext>
-            <a:ext uri="{91240B29-F687-4F45-9708-019B960494DF}">
-              <a14:hiddenLine xmlns:a14="http://schemas.microsoft.com/office/drawing/2010/main" w="9525">
-                <a:solidFill>
-                  <a:srgbClr val="000000"/>
-                </a:solidFill>
-                <a:miter lim="800000"/>
-                <a:headEnd/>
-                <a:tailEnd/>
-              </a14:hiddenLine>
-            </a:ext>
-          </a:extLst>
-        </p:spPr>
-        <p:txBody>
-          <a:bodyPr vert="horz" wrap="square" lIns="91440" tIns="45720" rIns="91440" bIns="45720" numCol="1" rtlCol="0" anchor="t" anchorCtr="0" compatLnSpc="1">
-            <a:prstTxWarp prst="textNoShape">
-              <a:avLst/>
-            </a:prstTxWarp>
-            <a:normAutofit/>
-          </a:bodyPr>
-          <a:lstStyle/>
-          <a:p>
-            <a:r>
-              <a:rPr lang="en-US" altLang="en-US">
-                <a:ea typeface="ＭＳ Ｐゴシック" panose="020B0600070205080204" pitchFamily="34" charset="-128"/>
-              </a:rPr>
-              <a:t>Using Antimony</a:t>
+        <p:spPr/>
+        <p:txBody>
+          <a:bodyPr/>
+          <a:lstStyle/>
+          <a:p>
+            <a:r>
+              <a:rPr lang="en-US" dirty="0"/>
+              <a:t>Requests Python Package</a:t>
             </a:r>
           </a:p>
         </p:txBody>
       </p:sp>
       <p:pic>
         <p:nvPicPr>
-          <p:cNvPr id="37891" name="Picture 5" descr="Screen Shot 2016-02-15 at 3.38.31 PM.png">
-            <a:extLst>
-              <a:ext uri="{FF2B5EF4-FFF2-40B4-BE49-F238E27FC236}">
-                <a16:creationId xmlns:a16="http://schemas.microsoft.com/office/drawing/2014/main" id="{F0961F2C-BC57-4796-BF73-3FB50BC93CC2}"/>
+          <p:cNvPr id="9" name="Picture 8">
+            <a:extLst>
+              <a:ext uri="{FF2B5EF4-FFF2-40B4-BE49-F238E27FC236}">
+                <a16:creationId xmlns:a16="http://schemas.microsoft.com/office/drawing/2014/main" id="{49FFA1EA-10A1-4A02-9BAE-EEBA7D497541}"/>
               </a:ext>
             </a:extLst>
           </p:cNvPr>
@@ -5213,223 +4526,27 @@
           <p:nvPr/>
         </p:nvPicPr>
         <p:blipFill>
-          <a:blip r:embed="rId2">
-            <a:extLst>
-              <a:ext uri="{28A0092B-C50C-407E-A947-70E740481C1C}">
-                <a14:useLocalDpi xmlns:a14="http://schemas.microsoft.com/office/drawing/2010/main" val="0"/>
-              </a:ext>
-            </a:extLst>
-          </a:blip>
-          <a:srcRect/>
+          <a:blip r:embed="rId2"/>
           <a:stretch>
             <a:fillRect/>
           </a:stretch>
         </p:blipFill>
-        <p:spPr bwMode="auto">
+        <p:spPr>
           <a:xfrm>
-            <a:off x="1905000" y="1066800"/>
-            <a:ext cx="4584700" cy="3568700"/>
+            <a:off x="620767" y="1475389"/>
+            <a:ext cx="10172700" cy="2057400"/>
           </a:xfrm>
           <a:prstGeom prst="rect">
             <a:avLst/>
           </a:prstGeom>
-          <a:noFill/>
-          <a:ln>
-            <a:noFill/>
-          </a:ln>
-          <a:extLst>
-            <a:ext uri="{909E8E84-426E-40DD-AFC4-6F175D3DCCD1}">
-              <a14:hiddenFill xmlns:a14="http://schemas.microsoft.com/office/drawing/2010/main">
-                <a:solidFill>
-                  <a:srgbClr val="FFFFFF"/>
-                </a:solidFill>
-              </a14:hiddenFill>
-            </a:ext>
-            <a:ext uri="{91240B29-F687-4F45-9708-019B960494DF}">
-              <a14:hiddenLine xmlns:a14="http://schemas.microsoft.com/office/drawing/2010/main" w="9525">
-                <a:solidFill>
-                  <a:srgbClr val="000000"/>
-                </a:solidFill>
-                <a:miter lim="800000"/>
-                <a:headEnd/>
-                <a:tailEnd/>
-              </a14:hiddenLine>
-            </a:ext>
-          </a:extLst>
         </p:spPr>
       </p:pic>
-      <p:sp>
-        <p:nvSpPr>
-          <p:cNvPr id="7" name="TextBox 6">
-            <a:extLst>
-              <a:ext uri="{FF2B5EF4-FFF2-40B4-BE49-F238E27FC236}">
-                <a16:creationId xmlns:a16="http://schemas.microsoft.com/office/drawing/2014/main" id="{24912B82-8F7D-4776-94F9-9B391B89A2AF}"/>
-              </a:ext>
-            </a:extLst>
-          </p:cNvPr>
-          <p:cNvSpPr txBox="1">
-            <a:spLocks noChangeArrowheads="1"/>
-          </p:cNvSpPr>
-          <p:nvPr/>
-        </p:nvSpPr>
-        <p:spPr bwMode="auto">
-          <a:xfrm>
-            <a:off x="6629400" y="2198688"/>
-            <a:ext cx="3352800" cy="1077912"/>
-          </a:xfrm>
-          <a:prstGeom prst="rect">
-            <a:avLst/>
-          </a:prstGeom>
-          <a:noFill/>
-          <a:ln>
-            <a:noFill/>
-          </a:ln>
-          <a:extLst>
-            <a:ext uri="{909E8E84-426E-40DD-AFC4-6F175D3DCCD1}">
-              <a14:hiddenFill xmlns:a14="http://schemas.microsoft.com/office/drawing/2010/main">
-                <a:solidFill>
-                  <a:srgbClr val="FFFFFF"/>
-                </a:solidFill>
-              </a14:hiddenFill>
-            </a:ext>
-            <a:ext uri="{91240B29-F687-4F45-9708-019B960494DF}">
-              <a14:hiddenLine xmlns:a14="http://schemas.microsoft.com/office/drawing/2010/main" w="9525">
-                <a:solidFill>
-                  <a:srgbClr val="000000"/>
-                </a:solidFill>
-                <a:miter lim="800000"/>
-                <a:headEnd/>
-                <a:tailEnd/>
-              </a14:hiddenLine>
-            </a:ext>
-          </a:extLst>
-        </p:spPr>
-        <p:txBody>
-          <a:bodyPr>
-            <a:spAutoFit/>
-          </a:bodyPr>
-          <a:lstStyle>
-            <a:lvl1pPr>
-              <a:defRPr>
-                <a:solidFill>
-                  <a:schemeClr val="tx1"/>
-                </a:solidFill>
-                <a:latin typeface="Arial" panose="020B0604020202020204" pitchFamily="34" charset="0"/>
-                <a:ea typeface="ＭＳ Ｐゴシック" panose="020B0600070205080204" pitchFamily="34" charset="-128"/>
-              </a:defRPr>
-            </a:lvl1pPr>
-            <a:lvl2pPr marL="742950" indent="-285750">
-              <a:defRPr>
-                <a:solidFill>
-                  <a:schemeClr val="tx1"/>
-                </a:solidFill>
-                <a:latin typeface="Arial" panose="020B0604020202020204" pitchFamily="34" charset="0"/>
-                <a:ea typeface="ＭＳ Ｐゴシック" panose="020B0600070205080204" pitchFamily="34" charset="-128"/>
-              </a:defRPr>
-            </a:lvl2pPr>
-            <a:lvl3pPr marL="1143000" indent="-228600">
-              <a:defRPr>
-                <a:solidFill>
-                  <a:schemeClr val="tx1"/>
-                </a:solidFill>
-                <a:latin typeface="Arial" panose="020B0604020202020204" pitchFamily="34" charset="0"/>
-                <a:ea typeface="ＭＳ Ｐゴシック" panose="020B0600070205080204" pitchFamily="34" charset="-128"/>
-              </a:defRPr>
-            </a:lvl3pPr>
-            <a:lvl4pPr marL="1600200" indent="-228600">
-              <a:defRPr>
-                <a:solidFill>
-                  <a:schemeClr val="tx1"/>
-                </a:solidFill>
-                <a:latin typeface="Arial" panose="020B0604020202020204" pitchFamily="34" charset="0"/>
-                <a:ea typeface="ＭＳ Ｐゴシック" panose="020B0600070205080204" pitchFamily="34" charset="-128"/>
-              </a:defRPr>
-            </a:lvl4pPr>
-            <a:lvl5pPr marL="2057400" indent="-228600">
-              <a:defRPr>
-                <a:solidFill>
-                  <a:schemeClr val="tx1"/>
-                </a:solidFill>
-                <a:latin typeface="Arial" panose="020B0604020202020204" pitchFamily="34" charset="0"/>
-                <a:ea typeface="ＭＳ Ｐゴシック" panose="020B0600070205080204" pitchFamily="34" charset="-128"/>
-              </a:defRPr>
-            </a:lvl5pPr>
-            <a:lvl6pPr marL="2514600" indent="-228600" defTabSz="457200" eaLnBrk="0" fontAlgn="base" hangingPunct="0">
-              <a:spcBef>
-                <a:spcPct val="0"/>
-              </a:spcBef>
-              <a:spcAft>
-                <a:spcPct val="0"/>
-              </a:spcAft>
-              <a:defRPr>
-                <a:solidFill>
-                  <a:schemeClr val="tx1"/>
-                </a:solidFill>
-                <a:latin typeface="Arial" panose="020B0604020202020204" pitchFamily="34" charset="0"/>
-                <a:ea typeface="ＭＳ Ｐゴシック" panose="020B0600070205080204" pitchFamily="34" charset="-128"/>
-              </a:defRPr>
-            </a:lvl6pPr>
-            <a:lvl7pPr marL="2971800" indent="-228600" defTabSz="457200" eaLnBrk="0" fontAlgn="base" hangingPunct="0">
-              <a:spcBef>
-                <a:spcPct val="0"/>
-              </a:spcBef>
-              <a:spcAft>
-                <a:spcPct val="0"/>
-              </a:spcAft>
-              <a:defRPr>
-                <a:solidFill>
-                  <a:schemeClr val="tx1"/>
-                </a:solidFill>
-                <a:latin typeface="Arial" panose="020B0604020202020204" pitchFamily="34" charset="0"/>
-                <a:ea typeface="ＭＳ Ｐゴシック" panose="020B0600070205080204" pitchFamily="34" charset="-128"/>
-              </a:defRPr>
-            </a:lvl7pPr>
-            <a:lvl8pPr marL="3429000" indent="-228600" defTabSz="457200" eaLnBrk="0" fontAlgn="base" hangingPunct="0">
-              <a:spcBef>
-                <a:spcPct val="0"/>
-              </a:spcBef>
-              <a:spcAft>
-                <a:spcPct val="0"/>
-              </a:spcAft>
-              <a:defRPr>
-                <a:solidFill>
-                  <a:schemeClr val="tx1"/>
-                </a:solidFill>
-                <a:latin typeface="Arial" panose="020B0604020202020204" pitchFamily="34" charset="0"/>
-                <a:ea typeface="ＭＳ Ｐゴシック" panose="020B0600070205080204" pitchFamily="34" charset="-128"/>
-              </a:defRPr>
-            </a:lvl8pPr>
-            <a:lvl9pPr marL="3886200" indent="-228600" defTabSz="457200" eaLnBrk="0" fontAlgn="base" hangingPunct="0">
-              <a:spcBef>
-                <a:spcPct val="0"/>
-              </a:spcBef>
-              <a:spcAft>
-                <a:spcPct val="0"/>
-              </a:spcAft>
-              <a:defRPr>
-                <a:solidFill>
-                  <a:schemeClr val="tx1"/>
-                </a:solidFill>
-                <a:latin typeface="Arial" panose="020B0604020202020204" pitchFamily="34" charset="0"/>
-                <a:ea typeface="ＭＳ Ｐゴシック" panose="020B0600070205080204" pitchFamily="34" charset="-128"/>
-              </a:defRPr>
-            </a:lvl9pPr>
-          </a:lstStyle>
-          <a:p>
-            <a:pPr algn="ctr" eaLnBrk="1" hangingPunct="1"/>
-            <a:r>
-              <a:rPr lang="en-US" altLang="en-US" sz="3200"/>
-              <a:t>Kinetics model is a python string</a:t>
-            </a:r>
-          </a:p>
-        </p:txBody>
-      </p:sp>
       <p:pic>
         <p:nvPicPr>
-          <p:cNvPr id="9" name="Picture 8" descr="Screen Shot 2016-02-15 at 3.43.30 PM.png">
-            <a:extLst>
-              <a:ext uri="{FF2B5EF4-FFF2-40B4-BE49-F238E27FC236}">
-                <a16:creationId xmlns:a16="http://schemas.microsoft.com/office/drawing/2014/main" id="{690F099B-EA2C-4EE8-8195-BEB0186AF296}"/>
+          <p:cNvPr id="10" name="Picture 9">
+            <a:extLst>
+              <a:ext uri="{FF2B5EF4-FFF2-40B4-BE49-F238E27FC236}">
+                <a16:creationId xmlns:a16="http://schemas.microsoft.com/office/drawing/2014/main" id="{9B505260-7143-4F16-A396-7A6131CECDB4}"/>
               </a:ext>
             </a:extLst>
           </p:cNvPr>
@@ -5439,225 +4556,25 @@
           <p:nvPr/>
         </p:nvPicPr>
         <p:blipFill>
-          <a:blip r:embed="rId3">
-            <a:extLst>
-              <a:ext uri="{28A0092B-C50C-407E-A947-70E740481C1C}">
-                <a14:useLocalDpi xmlns:a14="http://schemas.microsoft.com/office/drawing/2010/main" val="0"/>
-              </a:ext>
-            </a:extLst>
-          </a:blip>
-          <a:srcRect/>
+          <a:blip r:embed="rId3"/>
           <a:stretch>
             <a:fillRect/>
           </a:stretch>
         </p:blipFill>
-        <p:spPr bwMode="auto">
+        <p:spPr>
           <a:xfrm>
-            <a:off x="6015038" y="3532188"/>
-            <a:ext cx="4348162" cy="3021012"/>
+            <a:off x="4783192" y="2632787"/>
+            <a:ext cx="6010275" cy="3486150"/>
           </a:xfrm>
           <a:prstGeom prst="rect">
             <a:avLst/>
           </a:prstGeom>
-          <a:noFill/>
-          <a:ln>
-            <a:noFill/>
-          </a:ln>
-          <a:extLst>
-            <a:ext uri="{909E8E84-426E-40DD-AFC4-6F175D3DCCD1}">
-              <a14:hiddenFill xmlns:a14="http://schemas.microsoft.com/office/drawing/2010/main">
-                <a:solidFill>
-                  <a:srgbClr val="FFFFFF"/>
-                </a:solidFill>
-              </a14:hiddenFill>
-            </a:ext>
-            <a:ext uri="{91240B29-F687-4F45-9708-019B960494DF}">
-              <a14:hiddenLine xmlns:a14="http://schemas.microsoft.com/office/drawing/2010/main" w="9525">
-                <a:solidFill>
-                  <a:srgbClr val="000000"/>
-                </a:solidFill>
-                <a:miter lim="800000"/>
-                <a:headEnd/>
-                <a:tailEnd/>
-              </a14:hiddenLine>
-            </a:ext>
-          </a:extLst>
         </p:spPr>
       </p:pic>
-      <p:sp>
-        <p:nvSpPr>
-          <p:cNvPr id="10" name="TextBox 9">
-            <a:extLst>
-              <a:ext uri="{FF2B5EF4-FFF2-40B4-BE49-F238E27FC236}">
-                <a16:creationId xmlns:a16="http://schemas.microsoft.com/office/drawing/2014/main" id="{651430F0-24FA-4BD6-8907-AA565A0E77ED}"/>
-              </a:ext>
-            </a:extLst>
-          </p:cNvPr>
-          <p:cNvSpPr txBox="1">
-            <a:spLocks noChangeArrowheads="1"/>
-          </p:cNvSpPr>
-          <p:nvPr/>
-        </p:nvSpPr>
-        <p:spPr bwMode="auto">
-          <a:xfrm>
-            <a:off x="2133600" y="5283200"/>
-            <a:ext cx="3886200" cy="584200"/>
-          </a:xfrm>
-          <a:prstGeom prst="rect">
-            <a:avLst/>
-          </a:prstGeom>
-          <a:noFill/>
-          <a:ln>
-            <a:noFill/>
-          </a:ln>
-          <a:extLst>
-            <a:ext uri="{909E8E84-426E-40DD-AFC4-6F175D3DCCD1}">
-              <a14:hiddenFill xmlns:a14="http://schemas.microsoft.com/office/drawing/2010/main">
-                <a:solidFill>
-                  <a:srgbClr val="FFFFFF"/>
-                </a:solidFill>
-              </a14:hiddenFill>
-            </a:ext>
-            <a:ext uri="{91240B29-F687-4F45-9708-019B960494DF}">
-              <a14:hiddenLine xmlns:a14="http://schemas.microsoft.com/office/drawing/2010/main" w="9525">
-                <a:solidFill>
-                  <a:srgbClr val="000000"/>
-                </a:solidFill>
-                <a:miter lim="800000"/>
-                <a:headEnd/>
-                <a:tailEnd/>
-              </a14:hiddenLine>
-            </a:ext>
-          </a:extLst>
-        </p:spPr>
-        <p:txBody>
-          <a:bodyPr>
-            <a:spAutoFit/>
-          </a:bodyPr>
-          <a:lstStyle>
-            <a:lvl1pPr>
-              <a:defRPr>
-                <a:solidFill>
-                  <a:schemeClr val="tx1"/>
-                </a:solidFill>
-                <a:latin typeface="Arial" panose="020B0604020202020204" pitchFamily="34" charset="0"/>
-                <a:ea typeface="ＭＳ Ｐゴシック" panose="020B0600070205080204" pitchFamily="34" charset="-128"/>
-              </a:defRPr>
-            </a:lvl1pPr>
-            <a:lvl2pPr marL="742950" indent="-285750">
-              <a:defRPr>
-                <a:solidFill>
-                  <a:schemeClr val="tx1"/>
-                </a:solidFill>
-                <a:latin typeface="Arial" panose="020B0604020202020204" pitchFamily="34" charset="0"/>
-                <a:ea typeface="ＭＳ Ｐゴシック" panose="020B0600070205080204" pitchFamily="34" charset="-128"/>
-              </a:defRPr>
-            </a:lvl2pPr>
-            <a:lvl3pPr marL="1143000" indent="-228600">
-              <a:defRPr>
-                <a:solidFill>
-                  <a:schemeClr val="tx1"/>
-                </a:solidFill>
-                <a:latin typeface="Arial" panose="020B0604020202020204" pitchFamily="34" charset="0"/>
-                <a:ea typeface="ＭＳ Ｐゴシック" panose="020B0600070205080204" pitchFamily="34" charset="-128"/>
-              </a:defRPr>
-            </a:lvl3pPr>
-            <a:lvl4pPr marL="1600200" indent="-228600">
-              <a:defRPr>
-                <a:solidFill>
-                  <a:schemeClr val="tx1"/>
-                </a:solidFill>
-                <a:latin typeface="Arial" panose="020B0604020202020204" pitchFamily="34" charset="0"/>
-                <a:ea typeface="ＭＳ Ｐゴシック" panose="020B0600070205080204" pitchFamily="34" charset="-128"/>
-              </a:defRPr>
-            </a:lvl4pPr>
-            <a:lvl5pPr marL="2057400" indent="-228600">
-              <a:defRPr>
-                <a:solidFill>
-                  <a:schemeClr val="tx1"/>
-                </a:solidFill>
-                <a:latin typeface="Arial" panose="020B0604020202020204" pitchFamily="34" charset="0"/>
-                <a:ea typeface="ＭＳ Ｐゴシック" panose="020B0600070205080204" pitchFamily="34" charset="-128"/>
-              </a:defRPr>
-            </a:lvl5pPr>
-            <a:lvl6pPr marL="2514600" indent="-228600" defTabSz="457200" eaLnBrk="0" fontAlgn="base" hangingPunct="0">
-              <a:spcBef>
-                <a:spcPct val="0"/>
-              </a:spcBef>
-              <a:spcAft>
-                <a:spcPct val="0"/>
-              </a:spcAft>
-              <a:defRPr>
-                <a:solidFill>
-                  <a:schemeClr val="tx1"/>
-                </a:solidFill>
-                <a:latin typeface="Arial" panose="020B0604020202020204" pitchFamily="34" charset="0"/>
-                <a:ea typeface="ＭＳ Ｐゴシック" panose="020B0600070205080204" pitchFamily="34" charset="-128"/>
-              </a:defRPr>
-            </a:lvl6pPr>
-            <a:lvl7pPr marL="2971800" indent="-228600" defTabSz="457200" eaLnBrk="0" fontAlgn="base" hangingPunct="0">
-              <a:spcBef>
-                <a:spcPct val="0"/>
-              </a:spcBef>
-              <a:spcAft>
-                <a:spcPct val="0"/>
-              </a:spcAft>
-              <a:defRPr>
-                <a:solidFill>
-                  <a:schemeClr val="tx1"/>
-                </a:solidFill>
-                <a:latin typeface="Arial" panose="020B0604020202020204" pitchFamily="34" charset="0"/>
-                <a:ea typeface="ＭＳ Ｐゴシック" panose="020B0600070205080204" pitchFamily="34" charset="-128"/>
-              </a:defRPr>
-            </a:lvl7pPr>
-            <a:lvl8pPr marL="3429000" indent="-228600" defTabSz="457200" eaLnBrk="0" fontAlgn="base" hangingPunct="0">
-              <a:spcBef>
-                <a:spcPct val="0"/>
-              </a:spcBef>
-              <a:spcAft>
-                <a:spcPct val="0"/>
-              </a:spcAft>
-              <a:defRPr>
-                <a:solidFill>
-                  <a:schemeClr val="tx1"/>
-                </a:solidFill>
-                <a:latin typeface="Arial" panose="020B0604020202020204" pitchFamily="34" charset="0"/>
-                <a:ea typeface="ＭＳ Ｐゴシック" panose="020B0600070205080204" pitchFamily="34" charset="-128"/>
-              </a:defRPr>
-            </a:lvl8pPr>
-            <a:lvl9pPr marL="3886200" indent="-228600" defTabSz="457200" eaLnBrk="0" fontAlgn="base" hangingPunct="0">
-              <a:spcBef>
-                <a:spcPct val="0"/>
-              </a:spcBef>
-              <a:spcAft>
-                <a:spcPct val="0"/>
-              </a:spcAft>
-              <a:defRPr>
-                <a:solidFill>
-                  <a:schemeClr val="tx1"/>
-                </a:solidFill>
-                <a:latin typeface="Arial" panose="020B0604020202020204" pitchFamily="34" charset="0"/>
-                <a:ea typeface="ＭＳ Ｐゴシック" panose="020B0600070205080204" pitchFamily="34" charset="-128"/>
-              </a:defRPr>
-            </a:lvl9pPr>
-          </a:lstStyle>
-          <a:p>
-            <a:pPr algn="ctr" eaLnBrk="1" hangingPunct="1"/>
-            <a:r>
-              <a:rPr lang="en-US" altLang="en-US" sz="3200"/>
-              <a:t>Perturbation of </a:t>
-            </a:r>
-            <a:r>
-              <a:rPr lang="en-US" altLang="en-US" sz="3200" i="1"/>
-              <a:t>S1</a:t>
-            </a:r>
-          </a:p>
-        </p:txBody>
-      </p:sp>
     </p:spTree>
     <p:extLst>
       <p:ext uri="{BB962C8B-B14F-4D97-AF65-F5344CB8AC3E}">
-        <p14:creationId xmlns:p14="http://schemas.microsoft.com/office/powerpoint/2010/main" val="2685295071"/>
+        <p14:creationId xmlns:p14="http://schemas.microsoft.com/office/powerpoint/2010/main" val="4253956594"/>
       </p:ext>
     </p:extLst>
   </p:cSld>

</xml_diff>

<commit_message>
renamed file to TechnologyReview.pptx
</commit_message>
<xml_diff>
--- a/doc/design/TechnologyReview.pptx
+++ b/doc/design/TechnologyReview.pptx
@@ -11,8 +11,16 @@
     <p:sldId id="494" r:id="rId5"/>
     <p:sldId id="493" r:id="rId6"/>
     <p:sldId id="495" r:id="rId7"/>
-    <p:sldId id="492" r:id="rId8"/>
-    <p:sldId id="496" r:id="rId9"/>
+    <p:sldId id="497" r:id="rId8"/>
+    <p:sldId id="498" r:id="rId9"/>
+    <p:sldId id="499" r:id="rId10"/>
+    <p:sldId id="501" r:id="rId11"/>
+    <p:sldId id="503" r:id="rId12"/>
+    <p:sldId id="504" r:id="rId13"/>
+    <p:sldId id="500" r:id="rId14"/>
+    <p:sldId id="505" r:id="rId15"/>
+    <p:sldId id="492" r:id="rId16"/>
+    <p:sldId id="496" r:id="rId17"/>
   </p:sldIdLst>
   <p:sldSz cx="12192000" cy="6858000"/>
   <p:notesSz cx="6858000" cy="9144000"/>
@@ -130,6 +138,253 @@
 </p:presentation>
 </file>
 
+<file path=ppt/changesInfos/changesInfo1.xml><?xml version="1.0" encoding="utf-8"?>
+<pc:chgInfo xmlns:a="http://schemas.openxmlformats.org/drawingml/2006/main" xmlns:r="http://schemas.openxmlformats.org/officeDocument/2006/relationships" xmlns:ac="http://schemas.microsoft.com/office/drawing/2013/main/command" xmlns:pc="http://schemas.microsoft.com/office/powerpoint/2013/main/command">
+  <pc:docChgLst>
+    <pc:chgData name="rahul birmiwal" userId="330dd7170b4e395d" providerId="Windows Live" clId="Web-{62AA0489-86CB-4FB1-9030-22EA6906D837}"/>
+    <pc:docChg chg="addSld delSld modSld sldOrd">
+      <pc:chgData name="rahul birmiwal" userId="330dd7170b4e395d" providerId="Windows Live" clId="Web-{62AA0489-86CB-4FB1-9030-22EA6906D837}" dt="2018-05-06T23:37:03.634" v="309"/>
+      <pc:docMkLst>
+        <pc:docMk/>
+      </pc:docMkLst>
+      <pc:sldChg chg="ord">
+        <pc:chgData name="rahul birmiwal" userId="330dd7170b4e395d" providerId="Windows Live" clId="Web-{62AA0489-86CB-4FB1-9030-22EA6906D837}" dt="2018-05-06T23:34:13.554" v="188"/>
+        <pc:sldMkLst>
+          <pc:docMk/>
+          <pc:sldMk cId="1099840047" sldId="495"/>
+        </pc:sldMkLst>
+      </pc:sldChg>
+      <pc:sldChg chg="addSp modSp">
+        <pc:chgData name="rahul birmiwal" userId="330dd7170b4e395d" providerId="Windows Live" clId="Web-{62AA0489-86CB-4FB1-9030-22EA6906D837}" dt="2018-05-06T23:33:40.255" v="187"/>
+        <pc:sldMkLst>
+          <pc:docMk/>
+          <pc:sldMk cId="2278662049" sldId="500"/>
+        </pc:sldMkLst>
+        <pc:spChg chg="mod">
+          <ac:chgData name="rahul birmiwal" userId="330dd7170b4e395d" providerId="Windows Live" clId="Web-{62AA0489-86CB-4FB1-9030-22EA6906D837}" dt="2018-05-06T23:31:23.739" v="133"/>
+          <ac:spMkLst>
+            <pc:docMk/>
+            <pc:sldMk cId="2278662049" sldId="500"/>
+            <ac:spMk id="2" creationId="{EFF362B6-8BB8-4FE2-A1A8-E203F08CF15D}"/>
+          </ac:spMkLst>
+        </pc:spChg>
+        <pc:spChg chg="mod">
+          <ac:chgData name="rahul birmiwal" userId="330dd7170b4e395d" providerId="Windows Live" clId="Web-{62AA0489-86CB-4FB1-9030-22EA6906D837}" dt="2018-05-06T23:33:37.177" v="186"/>
+          <ac:spMkLst>
+            <pc:docMk/>
+            <pc:sldMk cId="2278662049" sldId="500"/>
+            <ac:spMk id="3" creationId="{5B991963-6DFE-4282-9FC4-34A112F6AADF}"/>
+          </ac:spMkLst>
+        </pc:spChg>
+        <pc:picChg chg="add mod">
+          <ac:chgData name="rahul birmiwal" userId="330dd7170b4e395d" providerId="Windows Live" clId="Web-{62AA0489-86CB-4FB1-9030-22EA6906D837}" dt="2018-05-06T23:33:40.255" v="187"/>
+          <ac:picMkLst>
+            <pc:docMk/>
+            <pc:sldMk cId="2278662049" sldId="500"/>
+            <ac:picMk id="4" creationId="{91A894D3-3164-403C-A17A-714999645715}"/>
+          </ac:picMkLst>
+        </pc:picChg>
+      </pc:sldChg>
+      <pc:sldChg chg="addSp delSp modSp">
+        <pc:chgData name="rahul birmiwal" userId="330dd7170b4e395d" providerId="Windows Live" clId="Web-{62AA0489-86CB-4FB1-9030-22EA6906D837}" dt="2018-05-06T23:27:06.612" v="50"/>
+        <pc:sldMkLst>
+          <pc:docMk/>
+          <pc:sldMk cId="353221772" sldId="501"/>
+        </pc:sldMkLst>
+        <pc:spChg chg="mod">
+          <ac:chgData name="rahul birmiwal" userId="330dd7170b4e395d" providerId="Windows Live" clId="Web-{62AA0489-86CB-4FB1-9030-22EA6906D837}" dt="2018-05-06T23:23:26.573" v="16"/>
+          <ac:spMkLst>
+            <pc:docMk/>
+            <pc:sldMk cId="353221772" sldId="501"/>
+            <ac:spMk id="3" creationId="{999871CB-E318-444F-B37F-B0091E440123}"/>
+          </ac:spMkLst>
+        </pc:spChg>
+        <pc:spChg chg="del mod">
+          <ac:chgData name="rahul birmiwal" userId="330dd7170b4e395d" providerId="Windows Live" clId="Web-{62AA0489-86CB-4FB1-9030-22EA6906D837}" dt="2018-05-06T23:25:23.534" v="30"/>
+          <ac:spMkLst>
+            <pc:docMk/>
+            <pc:sldMk cId="353221772" sldId="501"/>
+            <ac:spMk id="6" creationId="{B92215C6-DD28-4E04-BA10-5579BECE04CF}"/>
+          </ac:spMkLst>
+        </pc:spChg>
+        <pc:spChg chg="del mod">
+          <ac:chgData name="rahul birmiwal" userId="330dd7170b4e395d" providerId="Windows Live" clId="Web-{62AA0489-86CB-4FB1-9030-22EA6906D837}" dt="2018-05-06T23:25:26.189" v="32"/>
+          <ac:spMkLst>
+            <pc:docMk/>
+            <pc:sldMk cId="353221772" sldId="501"/>
+            <ac:spMk id="9" creationId="{F8494C6C-193C-4CA6-A73E-3BFBFAFB8125}"/>
+          </ac:spMkLst>
+        </pc:spChg>
+        <pc:spChg chg="add mod ord">
+          <ac:chgData name="rahul birmiwal" userId="330dd7170b4e395d" providerId="Windows Live" clId="Web-{62AA0489-86CB-4FB1-9030-22EA6906D837}" dt="2018-05-06T23:26:39.080" v="44"/>
+          <ac:spMkLst>
+            <pc:docMk/>
+            <pc:sldMk cId="353221772" sldId="501"/>
+            <ac:spMk id="10" creationId="{6A4FA7C0-EE1C-4EDF-BDDF-35AB981339F1}"/>
+          </ac:spMkLst>
+        </pc:spChg>
+        <pc:spChg chg="add del">
+          <ac:chgData name="rahul birmiwal" userId="330dd7170b4e395d" providerId="Windows Live" clId="Web-{62AA0489-86CB-4FB1-9030-22EA6906D837}" dt="2018-05-06T23:26:34.393" v="43"/>
+          <ac:spMkLst>
+            <pc:docMk/>
+            <pc:sldMk cId="353221772" sldId="501"/>
+            <ac:spMk id="11" creationId="{DC8C1C18-C817-4DD8-A67C-85C7037D8B3A}"/>
+          </ac:spMkLst>
+        </pc:spChg>
+        <pc:spChg chg="add mod">
+          <ac:chgData name="rahul birmiwal" userId="330dd7170b4e395d" providerId="Windows Live" clId="Web-{62AA0489-86CB-4FB1-9030-22EA6906D837}" dt="2018-05-06T23:27:06.612" v="50"/>
+          <ac:spMkLst>
+            <pc:docMk/>
+            <pc:sldMk cId="353221772" sldId="501"/>
+            <ac:spMk id="12" creationId="{20D29160-9D6F-489A-810A-53D886C0B2DD}"/>
+          </ac:spMkLst>
+        </pc:spChg>
+        <pc:picChg chg="del">
+          <ac:chgData name="rahul birmiwal" userId="330dd7170b4e395d" providerId="Windows Live" clId="Web-{62AA0489-86CB-4FB1-9030-22EA6906D837}" dt="2018-05-06T23:23:29.276" v="18"/>
+          <ac:picMkLst>
+            <pc:docMk/>
+            <pc:sldMk cId="353221772" sldId="501"/>
+            <ac:picMk id="4" creationId="{5E2589D3-BC46-4031-BDD8-148528E6FAD8}"/>
+          </ac:picMkLst>
+        </pc:picChg>
+        <pc:picChg chg="add mod">
+          <ac:chgData name="rahul birmiwal" userId="330dd7170b4e395d" providerId="Windows Live" clId="Web-{62AA0489-86CB-4FB1-9030-22EA6906D837}" dt="2018-05-06T23:25:29.236" v="33"/>
+          <ac:picMkLst>
+            <pc:docMk/>
+            <pc:sldMk cId="353221772" sldId="501"/>
+            <ac:picMk id="5" creationId="{AD4CFE10-5D5B-419B-99B8-F644907D0813}"/>
+          </ac:picMkLst>
+        </pc:picChg>
+        <pc:picChg chg="del mod">
+          <ac:chgData name="rahul birmiwal" userId="330dd7170b4e395d" providerId="Windows Live" clId="Web-{62AA0489-86CB-4FB1-9030-22EA6906D837}" dt="2018-05-06T23:25:24.595" v="31"/>
+          <ac:picMkLst>
+            <pc:docMk/>
+            <pc:sldMk cId="353221772" sldId="501"/>
+            <ac:picMk id="7" creationId="{D5B004D7-834B-49CD-8339-A7EE8ADCBA6B}"/>
+          </ac:picMkLst>
+        </pc:picChg>
+      </pc:sldChg>
+      <pc:sldChg chg="del">
+        <pc:chgData name="rahul birmiwal" userId="330dd7170b4e395d" providerId="Windows Live" clId="Web-{62AA0489-86CB-4FB1-9030-22EA6906D837}" dt="2018-05-06T23:29:03.910" v="71"/>
+        <pc:sldMkLst>
+          <pc:docMk/>
+          <pc:sldMk cId="1182540523" sldId="502"/>
+        </pc:sldMkLst>
+      </pc:sldChg>
+      <pc:sldChg chg="addSp delSp modSp add replId addAnim delAnim modAnim">
+        <pc:chgData name="rahul birmiwal" userId="330dd7170b4e395d" providerId="Windows Live" clId="Web-{62AA0489-86CB-4FB1-9030-22EA6906D837}" dt="2018-05-06T23:30:33.145" v="128"/>
+        <pc:sldMkLst>
+          <pc:docMk/>
+          <pc:sldMk cId="604071650" sldId="503"/>
+        </pc:sldMkLst>
+        <pc:spChg chg="mod">
+          <ac:chgData name="rahul birmiwal" userId="330dd7170b4e395d" providerId="Windows Live" clId="Web-{62AA0489-86CB-4FB1-9030-22EA6906D837}" dt="2018-05-06T23:27:34.878" v="58"/>
+          <ac:spMkLst>
+            <pc:docMk/>
+            <pc:sldMk cId="604071650" sldId="503"/>
+            <ac:spMk id="6" creationId="{B92215C6-DD28-4E04-BA10-5579BECE04CF}"/>
+          </ac:spMkLst>
+        </pc:spChg>
+        <pc:spChg chg="del mod">
+          <ac:chgData name="rahul birmiwal" userId="330dd7170b4e395d" providerId="Windows Live" clId="Web-{62AA0489-86CB-4FB1-9030-22EA6906D837}" dt="2018-05-06T23:28:18.769" v="70"/>
+          <ac:spMkLst>
+            <pc:docMk/>
+            <pc:sldMk cId="604071650" sldId="503"/>
+            <ac:spMk id="9" creationId="{F8494C6C-193C-4CA6-A73E-3BFBFAFB8125}"/>
+          </ac:spMkLst>
+        </pc:spChg>
+        <pc:spChg chg="add del mod">
+          <ac:chgData name="rahul birmiwal" userId="330dd7170b4e395d" providerId="Windows Live" clId="Web-{62AA0489-86CB-4FB1-9030-22EA6906D837}" dt="2018-05-06T23:30:33.145" v="128"/>
+          <ac:spMkLst>
+            <pc:docMk/>
+            <pc:sldMk cId="604071650" sldId="503"/>
+            <ac:spMk id="10" creationId="{8BCAEBE7-6977-43B1-8754-142F1E3832E6}"/>
+          </ac:spMkLst>
+        </pc:spChg>
+        <pc:picChg chg="add mod">
+          <ac:chgData name="rahul birmiwal" userId="330dd7170b4e395d" providerId="Windows Live" clId="Web-{62AA0489-86CB-4FB1-9030-22EA6906D837}" dt="2018-05-06T23:28:14.722" v="66"/>
+          <ac:picMkLst>
+            <pc:docMk/>
+            <pc:sldMk cId="604071650" sldId="503"/>
+            <ac:picMk id="4" creationId="{83D9E2FC-47DA-4549-BD67-154B8A87476C}"/>
+          </ac:picMkLst>
+        </pc:picChg>
+        <pc:picChg chg="del">
+          <ac:chgData name="rahul birmiwal" userId="330dd7170b4e395d" providerId="Windows Live" clId="Web-{62AA0489-86CB-4FB1-9030-22EA6906D837}" dt="2018-05-06T23:27:14.830" v="51"/>
+          <ac:picMkLst>
+            <pc:docMk/>
+            <pc:sldMk cId="604071650" sldId="503"/>
+            <ac:picMk id="5" creationId="{AD4CFE10-5D5B-419B-99B8-F644907D0813}"/>
+          </ac:picMkLst>
+        </pc:picChg>
+        <pc:picChg chg="del mod">
+          <ac:chgData name="rahul birmiwal" userId="330dd7170b4e395d" providerId="Windows Live" clId="Web-{62AA0489-86CB-4FB1-9030-22EA6906D837}" dt="2018-05-06T23:27:28.268" v="55"/>
+          <ac:picMkLst>
+            <pc:docMk/>
+            <pc:sldMk cId="604071650" sldId="503"/>
+            <ac:picMk id="7" creationId="{D5B004D7-834B-49CD-8339-A7EE8ADCBA6B}"/>
+          </ac:picMkLst>
+        </pc:picChg>
+      </pc:sldChg>
+      <pc:sldChg chg="add replId">
+        <pc:chgData name="rahul birmiwal" userId="330dd7170b4e395d" providerId="Windows Live" clId="Web-{62AA0489-86CB-4FB1-9030-22EA6906D837}" dt="2018-05-06T23:30:24.816" v="124"/>
+        <pc:sldMkLst>
+          <pc:docMk/>
+          <pc:sldMk cId="1208907245" sldId="504"/>
+        </pc:sldMkLst>
+      </pc:sldChg>
+      <pc:sldChg chg="addSp modSp new">
+        <pc:chgData name="rahul birmiwal" userId="330dd7170b4e395d" providerId="Windows Live" clId="Web-{62AA0489-86CB-4FB1-9030-22EA6906D837}" dt="2018-05-06T23:37:03.634" v="308"/>
+        <pc:sldMkLst>
+          <pc:docMk/>
+          <pc:sldMk cId="2520028208" sldId="505"/>
+        </pc:sldMkLst>
+        <pc:spChg chg="mod">
+          <ac:chgData name="rahul birmiwal" userId="330dd7170b4e395d" providerId="Windows Live" clId="Web-{62AA0489-86CB-4FB1-9030-22EA6906D837}" dt="2018-05-06T23:36:52.682" v="293"/>
+          <ac:spMkLst>
+            <pc:docMk/>
+            <pc:sldMk cId="2520028208" sldId="505"/>
+            <ac:spMk id="2" creationId="{425F10A8-F4A3-4B27-AF9B-683371A95C32}"/>
+          </ac:spMkLst>
+        </pc:spChg>
+        <pc:spChg chg="mod">
+          <ac:chgData name="rahul birmiwal" userId="330dd7170b4e395d" providerId="Windows Live" clId="Web-{62AA0489-86CB-4FB1-9030-22EA6906D837}" dt="2018-05-06T23:37:03.634" v="308"/>
+          <ac:spMkLst>
+            <pc:docMk/>
+            <pc:sldMk cId="2520028208" sldId="505"/>
+            <ac:spMk id="3" creationId="{689E6637-D705-43A0-B34B-8FF23FC1E3CC}"/>
+          </ac:spMkLst>
+        </pc:spChg>
+        <pc:spChg chg="add mod">
+          <ac:chgData name="rahul birmiwal" userId="330dd7170b4e395d" providerId="Windows Live" clId="Web-{62AA0489-86CB-4FB1-9030-22EA6906D837}" dt="2018-05-06T23:36:39.744" v="280"/>
+          <ac:spMkLst>
+            <pc:docMk/>
+            <pc:sldMk cId="2520028208" sldId="505"/>
+            <ac:spMk id="6" creationId="{BF647E89-9319-4BD3-BEC5-B86CF275FF0C}"/>
+          </ac:spMkLst>
+        </pc:spChg>
+        <pc:cxnChg chg="add mod">
+          <ac:chgData name="rahul birmiwal" userId="330dd7170b4e395d" providerId="Windows Live" clId="Web-{62AA0489-86CB-4FB1-9030-22EA6906D837}" dt="2018-05-06T23:36:05.681" v="257"/>
+          <ac:cxnSpMkLst>
+            <pc:docMk/>
+            <pc:sldMk cId="2520028208" sldId="505"/>
+            <ac:cxnSpMk id="4" creationId="{AC738B7D-1574-4285-9C47-7D02AD88EF95}"/>
+          </ac:cxnSpMkLst>
+        </pc:cxnChg>
+        <pc:cxnChg chg="add mod">
+          <ac:chgData name="rahul birmiwal" userId="330dd7170b4e395d" providerId="Windows Live" clId="Web-{62AA0489-86CB-4FB1-9030-22EA6906D837}" dt="2018-05-06T23:36:12.056" v="260"/>
+          <ac:cxnSpMkLst>
+            <pc:docMk/>
+            <pc:sldMk cId="2520028208" sldId="505"/>
+            <ac:cxnSpMk id="5" creationId="{D7E634FF-6627-4819-92AC-91195D17F09F}"/>
+          </ac:cxnSpMkLst>
+        </pc:cxnChg>
+      </pc:sldChg>
+    </pc:docChg>
+  </pc:docChgLst>
+</pc:chgInfo>
+</file>
+
 <file path=ppt/slideLayouts/slideLayout1.xml><?xml version="1.0" encoding="utf-8"?>
 <p:sldLayout xmlns:a="http://schemas.openxmlformats.org/drawingml/2006/main" xmlns:r="http://schemas.openxmlformats.org/officeDocument/2006/relationships" xmlns:p="http://schemas.openxmlformats.org/presentationml/2006/main" type="title" preserve="1">
   <p:cSld name="Title Slide">
@@ -277,7 +532,7 @@
           <a:p>
             <a:fld id="{556866E9-FFCC-4B83-8F1F-43649AB9B126}" type="datetimeFigureOut">
               <a:rPr lang="en-US" smtClean="0"/>
-              <a:t>5/3/2018</a:t>
+              <a:t>5/6/2018</a:t>
             </a:fld>
             <a:endParaRPr lang="en-US"/>
           </a:p>
@@ -475,7 +730,7 @@
           <a:p>
             <a:fld id="{556866E9-FFCC-4B83-8F1F-43649AB9B126}" type="datetimeFigureOut">
               <a:rPr lang="en-US" smtClean="0"/>
-              <a:t>5/3/2018</a:t>
+              <a:t>5/6/2018</a:t>
             </a:fld>
             <a:endParaRPr lang="en-US"/>
           </a:p>
@@ -683,7 +938,7 @@
           <a:p>
             <a:fld id="{556866E9-FFCC-4B83-8F1F-43649AB9B126}" type="datetimeFigureOut">
               <a:rPr lang="en-US" smtClean="0"/>
-              <a:t>5/3/2018</a:t>
+              <a:t>5/6/2018</a:t>
             </a:fld>
             <a:endParaRPr lang="en-US"/>
           </a:p>
@@ -881,7 +1136,7 @@
           <a:p>
             <a:fld id="{556866E9-FFCC-4B83-8F1F-43649AB9B126}" type="datetimeFigureOut">
               <a:rPr lang="en-US" smtClean="0"/>
-              <a:t>5/3/2018</a:t>
+              <a:t>5/6/2018</a:t>
             </a:fld>
             <a:endParaRPr lang="en-US"/>
           </a:p>
@@ -1156,7 +1411,7 @@
           <a:p>
             <a:fld id="{556866E9-FFCC-4B83-8F1F-43649AB9B126}" type="datetimeFigureOut">
               <a:rPr lang="en-US" smtClean="0"/>
-              <a:t>5/3/2018</a:t>
+              <a:t>5/6/2018</a:t>
             </a:fld>
             <a:endParaRPr lang="en-US"/>
           </a:p>
@@ -1421,7 +1676,7 @@
           <a:p>
             <a:fld id="{556866E9-FFCC-4B83-8F1F-43649AB9B126}" type="datetimeFigureOut">
               <a:rPr lang="en-US" smtClean="0"/>
-              <a:t>5/3/2018</a:t>
+              <a:t>5/6/2018</a:t>
             </a:fld>
             <a:endParaRPr lang="en-US"/>
           </a:p>
@@ -1833,7 +2088,7 @@
           <a:p>
             <a:fld id="{556866E9-FFCC-4B83-8F1F-43649AB9B126}" type="datetimeFigureOut">
               <a:rPr lang="en-US" smtClean="0"/>
-              <a:t>5/3/2018</a:t>
+              <a:t>5/6/2018</a:t>
             </a:fld>
             <a:endParaRPr lang="en-US"/>
           </a:p>
@@ -1974,7 +2229,7 @@
           <a:p>
             <a:fld id="{556866E9-FFCC-4B83-8F1F-43649AB9B126}" type="datetimeFigureOut">
               <a:rPr lang="en-US" smtClean="0"/>
-              <a:t>5/3/2018</a:t>
+              <a:t>5/6/2018</a:t>
             </a:fld>
             <a:endParaRPr lang="en-US"/>
           </a:p>
@@ -2087,7 +2342,7 @@
           <a:p>
             <a:fld id="{556866E9-FFCC-4B83-8F1F-43649AB9B126}" type="datetimeFigureOut">
               <a:rPr lang="en-US" smtClean="0"/>
-              <a:t>5/3/2018</a:t>
+              <a:t>5/6/2018</a:t>
             </a:fld>
             <a:endParaRPr lang="en-US"/>
           </a:p>
@@ -2398,7 +2653,7 @@
           <a:p>
             <a:fld id="{556866E9-FFCC-4B83-8F1F-43649AB9B126}" type="datetimeFigureOut">
               <a:rPr lang="en-US" smtClean="0"/>
-              <a:t>5/3/2018</a:t>
+              <a:t>5/6/2018</a:t>
             </a:fld>
             <a:endParaRPr lang="en-US"/>
           </a:p>
@@ -2686,7 +2941,7 @@
           <a:p>
             <a:fld id="{556866E9-FFCC-4B83-8F1F-43649AB9B126}" type="datetimeFigureOut">
               <a:rPr lang="en-US" smtClean="0"/>
-              <a:t>5/3/2018</a:t>
+              <a:t>5/6/2018</a:t>
             </a:fld>
             <a:endParaRPr lang="en-US"/>
           </a:p>
@@ -2927,7 +3182,7 @@
           <a:p>
             <a:fld id="{556866E9-FFCC-4B83-8F1F-43649AB9B126}" type="datetimeFigureOut">
               <a:rPr lang="en-US" smtClean="0"/>
-              <a:t>5/3/2018</a:t>
+              <a:t>5/6/2018</a:t>
             </a:fld>
             <a:endParaRPr lang="en-US"/>
           </a:p>
@@ -3480,6 +3735,1680 @@
 </p:sld>
 </file>
 
+<file path=ppt/slides/slide10.xml><?xml version="1.0" encoding="utf-8"?>
+<p:sld xmlns:a="http://schemas.openxmlformats.org/drawingml/2006/main" xmlns:r="http://schemas.openxmlformats.org/officeDocument/2006/relationships" xmlns:p="http://schemas.openxmlformats.org/presentationml/2006/main">
+  <p:cSld>
+    <p:spTree>
+      <p:nvGrpSpPr>
+        <p:cNvPr id="1" name=""/>
+        <p:cNvGrpSpPr/>
+        <p:nvPr/>
+      </p:nvGrpSpPr>
+      <p:grpSpPr>
+        <a:xfrm>
+          <a:off x="0" y="0"/>
+          <a:ext cx="0" cy="0"/>
+          <a:chOff x="0" y="0"/>
+          <a:chExt cx="0" cy="0"/>
+        </a:xfrm>
+      </p:grpSpPr>
+      <p:sp>
+        <p:nvSpPr>
+          <p:cNvPr id="10" name="Rectangle: Rounded Corners 9">
+            <a:extLst>
+              <a:ext uri="{FF2B5EF4-FFF2-40B4-BE49-F238E27FC236}">
+                <a16:creationId xmlns:a16="http://schemas.microsoft.com/office/drawing/2014/main" id="{6A4FA7C0-EE1C-4EDF-BDDF-35AB981339F1}"/>
+              </a:ext>
+            </a:extLst>
+          </p:cNvPr>
+          <p:cNvSpPr/>
+          <p:nvPr/>
+        </p:nvSpPr>
+        <p:spPr>
+          <a:xfrm>
+            <a:off x="7464723" y="1972573"/>
+            <a:ext cx="4048663" cy="4609380"/>
+          </a:xfrm>
+          <a:prstGeom prst="roundRect">
+            <a:avLst/>
+          </a:prstGeom>
+          <a:ln w="57150">
+            <a:solidFill>
+              <a:srgbClr val="FF0000"/>
+            </a:solidFill>
+          </a:ln>
+        </p:spPr>
+        <p:style>
+          <a:lnRef idx="2">
+            <a:schemeClr val="dk1"/>
+          </a:lnRef>
+          <a:fillRef idx="1">
+            <a:schemeClr val="lt1"/>
+          </a:fillRef>
+          <a:effectRef idx="0">
+            <a:schemeClr val="dk1"/>
+          </a:effectRef>
+          <a:fontRef idx="minor">
+            <a:schemeClr val="dk1"/>
+          </a:fontRef>
+        </p:style>
+        <p:txBody>
+          <a:bodyPr rtlCol="0" anchor="ctr"/>
+          <a:lstStyle/>
+          <a:p>
+            <a:pPr algn="ctr"/>
+            <a:endParaRPr lang="en-US"/>
+          </a:p>
+        </p:txBody>
+      </p:sp>
+      <p:sp>
+        <p:nvSpPr>
+          <p:cNvPr id="2" name="Title 1">
+            <a:extLst>
+              <a:ext uri="{FF2B5EF4-FFF2-40B4-BE49-F238E27FC236}">
+                <a16:creationId xmlns:a16="http://schemas.microsoft.com/office/drawing/2014/main" id="{4A11E19A-E3BB-4355-BAC0-B64507DF19AE}"/>
+              </a:ext>
+            </a:extLst>
+          </p:cNvPr>
+          <p:cNvSpPr>
+            <a:spLocks noGrp="1"/>
+          </p:cNvSpPr>
+          <p:nvPr>
+            <p:ph type="title"/>
+          </p:nvPr>
+        </p:nvSpPr>
+        <p:spPr/>
+        <p:txBody>
+          <a:bodyPr/>
+          <a:lstStyle/>
+          <a:p>
+            <a:r>
+              <a:rPr lang="en-US" dirty="0">
+                <a:cs typeface="Calibri Light"/>
+              </a:rPr>
+              <a:t>Web-Technology: Scraping 'Hard' Example</a:t>
+            </a:r>
+          </a:p>
+        </p:txBody>
+      </p:sp>
+      <p:sp>
+        <p:nvSpPr>
+          <p:cNvPr id="3" name="Content Placeholder 2">
+            <a:extLst>
+              <a:ext uri="{FF2B5EF4-FFF2-40B4-BE49-F238E27FC236}">
+                <a16:creationId xmlns:a16="http://schemas.microsoft.com/office/drawing/2014/main" id="{999871CB-E318-444F-B37F-B0091E440123}"/>
+              </a:ext>
+            </a:extLst>
+          </p:cNvPr>
+          <p:cNvSpPr>
+            <a:spLocks noGrp="1"/>
+          </p:cNvSpPr>
+          <p:nvPr>
+            <p:ph idx="1"/>
+          </p:nvPr>
+        </p:nvSpPr>
+        <p:spPr/>
+        <p:txBody>
+          <a:bodyPr vert="horz" lIns="91440" tIns="45720" rIns="91440" bIns="45720" rtlCol="0" anchor="t">
+            <a:normAutofit/>
+          </a:bodyPr>
+          <a:lstStyle/>
+          <a:p>
+            <a:r>
+              <a:rPr lang="en-US" b="1" dirty="0">
+                <a:cs typeface="Calibri"/>
+              </a:rPr>
+              <a:t>Example) </a:t>
+            </a:r>
+            <a:r>
+              <a:rPr lang="en-US" b="1" dirty="0">
+                <a:cs typeface="Calibri"/>
+                <a:hlinkClick r:id="rId2"/>
+              </a:rPr>
+              <a:t>http://www.marketwatch.com</a:t>
+            </a:r>
+          </a:p>
+          <a:p>
+            <a:endParaRPr lang="en-US" b="1" dirty="0">
+              <a:cs typeface="Calibri"/>
+            </a:endParaRPr>
+          </a:p>
+          <a:p>
+            <a:endParaRPr lang="en-US" b="1" dirty="0">
+              <a:cs typeface="Calibri"/>
+            </a:endParaRPr>
+          </a:p>
+        </p:txBody>
+      </p:sp>
+      <p:pic>
+        <p:nvPicPr>
+          <p:cNvPr id="5" name="Picture 7" descr="A screenshot of a cell phone&#10;&#10;Description generated with very high confidence">
+            <a:extLst>
+              <a:ext uri="{FF2B5EF4-FFF2-40B4-BE49-F238E27FC236}">
+                <a16:creationId xmlns:a16="http://schemas.microsoft.com/office/drawing/2014/main" id="{AD4CFE10-5D5B-419B-99B8-F644907D0813}"/>
+              </a:ext>
+            </a:extLst>
+          </p:cNvPr>
+          <p:cNvPicPr>
+            <a:picLocks noChangeAspect="1"/>
+          </p:cNvPicPr>
+          <p:nvPr/>
+        </p:nvPicPr>
+        <p:blipFill>
+          <a:blip r:embed="rId3"/>
+          <a:stretch>
+            <a:fillRect/>
+          </a:stretch>
+        </p:blipFill>
+        <p:spPr>
+          <a:xfrm>
+            <a:off x="598097" y="2557657"/>
+            <a:ext cx="10133161" cy="3568610"/>
+          </a:xfrm>
+          <a:prstGeom prst="rect">
+            <a:avLst/>
+          </a:prstGeom>
+        </p:spPr>
+      </p:pic>
+      <p:sp>
+        <p:nvSpPr>
+          <p:cNvPr id="12" name="Arrow: Right 11">
+            <a:extLst>
+              <a:ext uri="{FF2B5EF4-FFF2-40B4-BE49-F238E27FC236}">
+                <a16:creationId xmlns:a16="http://schemas.microsoft.com/office/drawing/2014/main" id="{20D29160-9D6F-489A-810A-53D886C0B2DD}"/>
+              </a:ext>
+            </a:extLst>
+          </p:cNvPr>
+          <p:cNvSpPr/>
+          <p:nvPr/>
+        </p:nvSpPr>
+        <p:spPr>
+          <a:xfrm>
+            <a:off x="4787286" y="3840853"/>
+            <a:ext cx="2286747" cy="987839"/>
+          </a:xfrm>
+          <a:prstGeom prst="rightArrow">
+            <a:avLst/>
+          </a:prstGeom>
+          <a:solidFill>
+            <a:srgbClr val="FF0000"/>
+          </a:solidFill>
+        </p:spPr>
+        <p:style>
+          <a:lnRef idx="2">
+            <a:schemeClr val="accent1">
+              <a:shade val="50000"/>
+            </a:schemeClr>
+          </a:lnRef>
+          <a:fillRef idx="1">
+            <a:schemeClr val="accent1"/>
+          </a:fillRef>
+          <a:effectRef idx="0">
+            <a:schemeClr val="accent1"/>
+          </a:effectRef>
+          <a:fontRef idx="minor">
+            <a:schemeClr val="lt1"/>
+          </a:fontRef>
+        </p:style>
+        <p:txBody>
+          <a:bodyPr rtlCol="0" anchor="ctr"/>
+          <a:lstStyle/>
+          <a:p>
+            <a:pPr algn="ctr"/>
+            <a:endParaRPr lang="en-US"/>
+          </a:p>
+        </p:txBody>
+      </p:sp>
+    </p:spTree>
+    <p:extLst>
+      <p:ext uri="{BB962C8B-B14F-4D97-AF65-F5344CB8AC3E}">
+        <p14:creationId xmlns:p14="http://schemas.microsoft.com/office/powerpoint/2010/main" val="353221772"/>
+      </p:ext>
+    </p:extLst>
+  </p:cSld>
+  <p:clrMapOvr>
+    <a:masterClrMapping/>
+  </p:clrMapOvr>
+</p:sld>
+</file>
+
+<file path=ppt/slides/slide11.xml><?xml version="1.0" encoding="utf-8"?>
+<p:sld xmlns:a="http://schemas.openxmlformats.org/drawingml/2006/main" xmlns:r="http://schemas.openxmlformats.org/officeDocument/2006/relationships" xmlns:p="http://schemas.openxmlformats.org/presentationml/2006/main">
+  <p:cSld>
+    <p:spTree>
+      <p:nvGrpSpPr>
+        <p:cNvPr id="1" name=""/>
+        <p:cNvGrpSpPr/>
+        <p:nvPr/>
+      </p:nvGrpSpPr>
+      <p:grpSpPr>
+        <a:xfrm>
+          <a:off x="0" y="0"/>
+          <a:ext cx="0" cy="0"/>
+          <a:chOff x="0" y="0"/>
+          <a:chExt cx="0" cy="0"/>
+        </a:xfrm>
+      </p:grpSpPr>
+      <p:sp>
+        <p:nvSpPr>
+          <p:cNvPr id="2" name="Title 1">
+            <a:extLst>
+              <a:ext uri="{FF2B5EF4-FFF2-40B4-BE49-F238E27FC236}">
+                <a16:creationId xmlns:a16="http://schemas.microsoft.com/office/drawing/2014/main" id="{4A11E19A-E3BB-4355-BAC0-B64507DF19AE}"/>
+              </a:ext>
+            </a:extLst>
+          </p:cNvPr>
+          <p:cNvSpPr>
+            <a:spLocks noGrp="1"/>
+          </p:cNvSpPr>
+          <p:nvPr>
+            <p:ph type="title"/>
+          </p:nvPr>
+        </p:nvSpPr>
+        <p:spPr/>
+        <p:txBody>
+          <a:bodyPr/>
+          <a:lstStyle/>
+          <a:p>
+            <a:r>
+              <a:rPr lang="en-US" dirty="0">
+                <a:cs typeface="Calibri Light"/>
+              </a:rPr>
+              <a:t>Web-Technology: Scraping 'Hard' Example</a:t>
+            </a:r>
+          </a:p>
+        </p:txBody>
+      </p:sp>
+      <p:sp>
+        <p:nvSpPr>
+          <p:cNvPr id="3" name="Content Placeholder 2">
+            <a:extLst>
+              <a:ext uri="{FF2B5EF4-FFF2-40B4-BE49-F238E27FC236}">
+                <a16:creationId xmlns:a16="http://schemas.microsoft.com/office/drawing/2014/main" id="{999871CB-E318-444F-B37F-B0091E440123}"/>
+              </a:ext>
+            </a:extLst>
+          </p:cNvPr>
+          <p:cNvSpPr>
+            <a:spLocks noGrp="1"/>
+          </p:cNvSpPr>
+          <p:nvPr>
+            <p:ph idx="1"/>
+          </p:nvPr>
+        </p:nvSpPr>
+        <p:spPr/>
+        <p:txBody>
+          <a:bodyPr vert="horz" lIns="91440" tIns="45720" rIns="91440" bIns="45720" rtlCol="0" anchor="t">
+            <a:normAutofit/>
+          </a:bodyPr>
+          <a:lstStyle/>
+          <a:p>
+            <a:r>
+              <a:rPr lang="en-US" b="1" dirty="0">
+                <a:cs typeface="Calibri"/>
+              </a:rPr>
+              <a:t>Example) </a:t>
+            </a:r>
+            <a:r>
+              <a:rPr lang="en-US" b="1" dirty="0">
+                <a:cs typeface="Calibri"/>
+                <a:hlinkClick r:id="rId2"/>
+              </a:rPr>
+              <a:t>http://www.marketwatch.com</a:t>
+            </a:r>
+          </a:p>
+          <a:p>
+            <a:endParaRPr lang="en-US" b="1" dirty="0">
+              <a:cs typeface="Calibri"/>
+            </a:endParaRPr>
+          </a:p>
+          <a:p>
+            <a:endParaRPr lang="en-US" b="1" dirty="0">
+              <a:cs typeface="Calibri"/>
+            </a:endParaRPr>
+          </a:p>
+        </p:txBody>
+      </p:sp>
+      <p:sp>
+        <p:nvSpPr>
+          <p:cNvPr id="6" name="TextBox 5">
+            <a:extLst>
+              <a:ext uri="{FF2B5EF4-FFF2-40B4-BE49-F238E27FC236}">
+                <a16:creationId xmlns:a16="http://schemas.microsoft.com/office/drawing/2014/main" id="{B92215C6-DD28-4E04-BA10-5579BECE04CF}"/>
+              </a:ext>
+            </a:extLst>
+          </p:cNvPr>
+          <p:cNvSpPr txBox="1"/>
+          <p:nvPr/>
+        </p:nvSpPr>
+        <p:spPr>
+          <a:xfrm>
+            <a:off x="842514" y="2517477"/>
+            <a:ext cx="9673085" cy="1107996"/>
+          </a:xfrm>
+          <a:prstGeom prst="rect">
+            <a:avLst/>
+          </a:prstGeom>
+        </p:spPr>
+        <p:txBody>
+          <a:bodyPr rot="0" spcFirstLastPara="0" vertOverflow="overflow" horzOverflow="overflow" vert="horz" wrap="square" lIns="91440" tIns="45720" rIns="91440" bIns="45720" numCol="1" spcCol="0" rtlCol="0" fromWordArt="0" anchor="t" anchorCtr="0" forceAA="0" compatLnSpc="1">
+            <a:prstTxWarp prst="textNoShape">
+              <a:avLst/>
+            </a:prstTxWarp>
+            <a:spAutoFit/>
+          </a:bodyPr>
+          <a:lstStyle/>
+          <a:p>
+            <a:r>
+              <a:rPr lang="en-US" sz="2400" dirty="0">
+                <a:latin typeface="Courier New"/>
+                <a:cs typeface="Courier New"/>
+              </a:rPr>
+              <a:t>&gt;&gt;&gt; </a:t>
+            </a:r>
+            <a:r>
+              <a:rPr lang="en-US" sz="2400" dirty="0" err="1">
+                <a:latin typeface="Courier New"/>
+                <a:cs typeface="Courier New"/>
+              </a:rPr>
+              <a:t>df</a:t>
+            </a:r>
+            <a:r>
+              <a:rPr lang="en-US" sz="2400" dirty="0">
+                <a:latin typeface="Courier New"/>
+                <a:cs typeface="Courier New"/>
+              </a:rPr>
+              <a:t> = </a:t>
+            </a:r>
+            <a:r>
+              <a:rPr lang="en-US" sz="2400" dirty="0" err="1">
+                <a:latin typeface="Courier New"/>
+                <a:cs typeface="Courier New"/>
+              </a:rPr>
+              <a:t>pd.read_html</a:t>
+            </a:r>
+            <a:r>
+              <a:rPr lang="en-US" sz="2400" dirty="0">
+                <a:latin typeface="Courier New"/>
+                <a:cs typeface="Courier New"/>
+              </a:rPr>
+              <a:t>('http://www.marketwatch.com')</a:t>
+            </a:r>
+            <a:endParaRPr lang="en-US" sz="2400" dirty="0">
+              <a:cs typeface="Calibri"/>
+            </a:endParaRPr>
+          </a:p>
+          <a:p>
+            <a:r>
+              <a:rPr lang="en-US" sz="2400" dirty="0">
+                <a:latin typeface="Courier New"/>
+                <a:cs typeface="Courier New"/>
+              </a:rPr>
+              <a:t>&gt;&gt;&gt; </a:t>
+            </a:r>
+            <a:r>
+              <a:rPr lang="en-US" sz="2400" dirty="0" err="1">
+                <a:latin typeface="Courier New"/>
+                <a:cs typeface="Courier New"/>
+              </a:rPr>
+              <a:t>df</a:t>
+            </a:r>
+            <a:endParaRPr lang="en-US" sz="2400" dirty="0">
+              <a:latin typeface="Courier New"/>
+              <a:cs typeface="Courier New"/>
+            </a:endParaRPr>
+          </a:p>
+          <a:p>
+            <a:endParaRPr lang="en-US" dirty="0">
+              <a:latin typeface="Courier New"/>
+              <a:cs typeface="Courier New"/>
+            </a:endParaRPr>
+          </a:p>
+        </p:txBody>
+      </p:sp>
+      <p:pic>
+        <p:nvPicPr>
+          <p:cNvPr id="4" name="Picture 7" descr="A screenshot of a cell phone&#10;&#10;Description generated with very high confidence">
+            <a:extLst>
+              <a:ext uri="{FF2B5EF4-FFF2-40B4-BE49-F238E27FC236}">
+                <a16:creationId xmlns:a16="http://schemas.microsoft.com/office/drawing/2014/main" id="{83D9E2FC-47DA-4549-BD67-154B8A87476C}"/>
+              </a:ext>
+            </a:extLst>
+          </p:cNvPr>
+          <p:cNvPicPr>
+            <a:picLocks noChangeAspect="1"/>
+          </p:cNvPicPr>
+          <p:nvPr/>
+        </p:nvPicPr>
+        <p:blipFill>
+          <a:blip r:embed="rId3"/>
+          <a:stretch>
+            <a:fillRect/>
+          </a:stretch>
+        </p:blipFill>
+        <p:spPr>
+          <a:xfrm>
+            <a:off x="2524665" y="3434702"/>
+            <a:ext cx="6596331" cy="3036597"/>
+          </a:xfrm>
+          <a:prstGeom prst="rect">
+            <a:avLst/>
+          </a:prstGeom>
+        </p:spPr>
+      </p:pic>
+    </p:spTree>
+    <p:extLst>
+      <p:ext uri="{BB962C8B-B14F-4D97-AF65-F5344CB8AC3E}">
+        <p14:creationId xmlns:p14="http://schemas.microsoft.com/office/powerpoint/2010/main" val="604071650"/>
+      </p:ext>
+    </p:extLst>
+  </p:cSld>
+  <p:clrMapOvr>
+    <a:masterClrMapping/>
+  </p:clrMapOvr>
+</p:sld>
+</file>
+
+<file path=ppt/slides/slide12.xml><?xml version="1.0" encoding="utf-8"?>
+<p:sld xmlns:a="http://schemas.openxmlformats.org/drawingml/2006/main" xmlns:r="http://schemas.openxmlformats.org/officeDocument/2006/relationships" xmlns:p="http://schemas.openxmlformats.org/presentationml/2006/main">
+  <p:cSld>
+    <p:spTree>
+      <p:nvGrpSpPr>
+        <p:cNvPr id="1" name=""/>
+        <p:cNvGrpSpPr/>
+        <p:nvPr/>
+      </p:nvGrpSpPr>
+      <p:grpSpPr>
+        <a:xfrm>
+          <a:off x="0" y="0"/>
+          <a:ext cx="0" cy="0"/>
+          <a:chOff x="0" y="0"/>
+          <a:chExt cx="0" cy="0"/>
+        </a:xfrm>
+      </p:grpSpPr>
+      <p:sp>
+        <p:nvSpPr>
+          <p:cNvPr id="2" name="Title 1">
+            <a:extLst>
+              <a:ext uri="{FF2B5EF4-FFF2-40B4-BE49-F238E27FC236}">
+                <a16:creationId xmlns:a16="http://schemas.microsoft.com/office/drawing/2014/main" id="{4A11E19A-E3BB-4355-BAC0-B64507DF19AE}"/>
+              </a:ext>
+            </a:extLst>
+          </p:cNvPr>
+          <p:cNvSpPr>
+            <a:spLocks noGrp="1"/>
+          </p:cNvSpPr>
+          <p:nvPr>
+            <p:ph type="title"/>
+          </p:nvPr>
+        </p:nvSpPr>
+        <p:spPr/>
+        <p:txBody>
+          <a:bodyPr/>
+          <a:lstStyle/>
+          <a:p>
+            <a:r>
+              <a:rPr lang="en-US" dirty="0">
+                <a:cs typeface="Calibri Light"/>
+              </a:rPr>
+              <a:t>Web-Technology: Scraping 'Hard' Example</a:t>
+            </a:r>
+          </a:p>
+        </p:txBody>
+      </p:sp>
+      <p:sp>
+        <p:nvSpPr>
+          <p:cNvPr id="3" name="Content Placeholder 2">
+            <a:extLst>
+              <a:ext uri="{FF2B5EF4-FFF2-40B4-BE49-F238E27FC236}">
+                <a16:creationId xmlns:a16="http://schemas.microsoft.com/office/drawing/2014/main" id="{999871CB-E318-444F-B37F-B0091E440123}"/>
+              </a:ext>
+            </a:extLst>
+          </p:cNvPr>
+          <p:cNvSpPr>
+            <a:spLocks noGrp="1"/>
+          </p:cNvSpPr>
+          <p:nvPr>
+            <p:ph idx="1"/>
+          </p:nvPr>
+        </p:nvSpPr>
+        <p:spPr/>
+        <p:txBody>
+          <a:bodyPr vert="horz" lIns="91440" tIns="45720" rIns="91440" bIns="45720" rtlCol="0" anchor="t">
+            <a:normAutofit/>
+          </a:bodyPr>
+          <a:lstStyle/>
+          <a:p>
+            <a:r>
+              <a:rPr lang="en-US" b="1" dirty="0">
+                <a:cs typeface="Calibri"/>
+              </a:rPr>
+              <a:t>Example) </a:t>
+            </a:r>
+            <a:r>
+              <a:rPr lang="en-US" b="1" dirty="0">
+                <a:cs typeface="Calibri"/>
+                <a:hlinkClick r:id="rId2"/>
+              </a:rPr>
+              <a:t>http://www.marketwatch.com</a:t>
+            </a:r>
+          </a:p>
+          <a:p>
+            <a:endParaRPr lang="en-US" b="1" dirty="0">
+              <a:cs typeface="Calibri"/>
+            </a:endParaRPr>
+          </a:p>
+          <a:p>
+            <a:endParaRPr lang="en-US" b="1" dirty="0">
+              <a:cs typeface="Calibri"/>
+            </a:endParaRPr>
+          </a:p>
+        </p:txBody>
+      </p:sp>
+      <p:sp>
+        <p:nvSpPr>
+          <p:cNvPr id="6" name="TextBox 5">
+            <a:extLst>
+              <a:ext uri="{FF2B5EF4-FFF2-40B4-BE49-F238E27FC236}">
+                <a16:creationId xmlns:a16="http://schemas.microsoft.com/office/drawing/2014/main" id="{B92215C6-DD28-4E04-BA10-5579BECE04CF}"/>
+              </a:ext>
+            </a:extLst>
+          </p:cNvPr>
+          <p:cNvSpPr txBox="1"/>
+          <p:nvPr/>
+        </p:nvSpPr>
+        <p:spPr>
+          <a:xfrm>
+            <a:off x="842514" y="2517477"/>
+            <a:ext cx="9673085" cy="1107996"/>
+          </a:xfrm>
+          <a:prstGeom prst="rect">
+            <a:avLst/>
+          </a:prstGeom>
+        </p:spPr>
+        <p:txBody>
+          <a:bodyPr rot="0" spcFirstLastPara="0" vertOverflow="overflow" horzOverflow="overflow" vert="horz" wrap="square" lIns="91440" tIns="45720" rIns="91440" bIns="45720" numCol="1" spcCol="0" rtlCol="0" fromWordArt="0" anchor="t" anchorCtr="0" forceAA="0" compatLnSpc="1">
+            <a:prstTxWarp prst="textNoShape">
+              <a:avLst/>
+            </a:prstTxWarp>
+            <a:spAutoFit/>
+          </a:bodyPr>
+          <a:lstStyle/>
+          <a:p>
+            <a:r>
+              <a:rPr lang="en-US" sz="2400" dirty="0">
+                <a:latin typeface="Courier New"/>
+                <a:cs typeface="Courier New"/>
+              </a:rPr>
+              <a:t>&gt;&gt;&gt; </a:t>
+            </a:r>
+            <a:r>
+              <a:rPr lang="en-US" sz="2400" dirty="0" err="1">
+                <a:latin typeface="Courier New"/>
+                <a:cs typeface="Courier New"/>
+              </a:rPr>
+              <a:t>df</a:t>
+            </a:r>
+            <a:r>
+              <a:rPr lang="en-US" sz="2400" dirty="0">
+                <a:latin typeface="Courier New"/>
+                <a:cs typeface="Courier New"/>
+              </a:rPr>
+              <a:t> = </a:t>
+            </a:r>
+            <a:r>
+              <a:rPr lang="en-US" sz="2400" dirty="0" err="1">
+                <a:latin typeface="Courier New"/>
+                <a:cs typeface="Courier New"/>
+              </a:rPr>
+              <a:t>pd.read_html</a:t>
+            </a:r>
+            <a:r>
+              <a:rPr lang="en-US" sz="2400" dirty="0">
+                <a:latin typeface="Courier New"/>
+                <a:cs typeface="Courier New"/>
+              </a:rPr>
+              <a:t>('http://www.marketwatch.com')</a:t>
+            </a:r>
+            <a:endParaRPr lang="en-US" sz="2400" dirty="0">
+              <a:cs typeface="Calibri"/>
+            </a:endParaRPr>
+          </a:p>
+          <a:p>
+            <a:r>
+              <a:rPr lang="en-US" sz="2400" dirty="0">
+                <a:latin typeface="Courier New"/>
+                <a:cs typeface="Courier New"/>
+              </a:rPr>
+              <a:t>&gt;&gt;&gt; </a:t>
+            </a:r>
+            <a:r>
+              <a:rPr lang="en-US" sz="2400" dirty="0" err="1">
+                <a:latin typeface="Courier New"/>
+                <a:cs typeface="Courier New"/>
+              </a:rPr>
+              <a:t>df</a:t>
+            </a:r>
+            <a:endParaRPr lang="en-US" sz="2400" dirty="0">
+              <a:latin typeface="Courier New"/>
+              <a:cs typeface="Courier New"/>
+            </a:endParaRPr>
+          </a:p>
+          <a:p>
+            <a:endParaRPr lang="en-US" dirty="0">
+              <a:latin typeface="Courier New"/>
+              <a:cs typeface="Courier New"/>
+            </a:endParaRPr>
+          </a:p>
+        </p:txBody>
+      </p:sp>
+      <p:pic>
+        <p:nvPicPr>
+          <p:cNvPr id="4" name="Picture 7" descr="A screenshot of a cell phone&#10;&#10;Description generated with very high confidence">
+            <a:extLst>
+              <a:ext uri="{FF2B5EF4-FFF2-40B4-BE49-F238E27FC236}">
+                <a16:creationId xmlns:a16="http://schemas.microsoft.com/office/drawing/2014/main" id="{83D9E2FC-47DA-4549-BD67-154B8A87476C}"/>
+              </a:ext>
+            </a:extLst>
+          </p:cNvPr>
+          <p:cNvPicPr>
+            <a:picLocks noChangeAspect="1"/>
+          </p:cNvPicPr>
+          <p:nvPr/>
+        </p:nvPicPr>
+        <p:blipFill>
+          <a:blip r:embed="rId3"/>
+          <a:stretch>
+            <a:fillRect/>
+          </a:stretch>
+        </p:blipFill>
+        <p:spPr>
+          <a:xfrm>
+            <a:off x="2524665" y="3434702"/>
+            <a:ext cx="6596331" cy="3036597"/>
+          </a:xfrm>
+          <a:prstGeom prst="rect">
+            <a:avLst/>
+          </a:prstGeom>
+        </p:spPr>
+      </p:pic>
+      <p:sp>
+        <p:nvSpPr>
+          <p:cNvPr id="10" name="TextBox 9">
+            <a:extLst>
+              <a:ext uri="{FF2B5EF4-FFF2-40B4-BE49-F238E27FC236}">
+                <a16:creationId xmlns:a16="http://schemas.microsoft.com/office/drawing/2014/main" id="{8BCAEBE7-6977-43B1-8754-142F1E3832E6}"/>
+              </a:ext>
+            </a:extLst>
+          </p:cNvPr>
+          <p:cNvSpPr txBox="1"/>
+          <p:nvPr/>
+        </p:nvSpPr>
+        <p:spPr>
+          <a:xfrm rot="-1560000">
+            <a:off x="5728596" y="3799065"/>
+            <a:ext cx="5819954" cy="1569660"/>
+          </a:xfrm>
+          <a:prstGeom prst="rect">
+            <a:avLst/>
+          </a:prstGeom>
+        </p:spPr>
+        <p:txBody>
+          <a:bodyPr rot="0" spcFirstLastPara="0" vertOverflow="overflow" horzOverflow="overflow" vert="horz" wrap="square" lIns="91440" tIns="45720" rIns="91440" bIns="45720" numCol="1" spcCol="0" rtlCol="0" fromWordArt="0" anchor="t" anchorCtr="0" forceAA="0" compatLnSpc="1">
+            <a:prstTxWarp prst="textNoShape">
+              <a:avLst/>
+            </a:prstTxWarp>
+            <a:spAutoFit/>
+          </a:bodyPr>
+          <a:lstStyle/>
+          <a:p>
+            <a:pPr algn="ctr"/>
+            <a:r>
+              <a:rPr lang="en-US" sz="3200" dirty="0">
+                <a:solidFill>
+                  <a:srgbClr val="FF0000"/>
+                </a:solidFill>
+              </a:rPr>
+              <a:t>Bunch of gibberish</a:t>
+            </a:r>
+            <a:r>
+              <a:rPr lang="en-US" sz="3200" dirty="0">
+                <a:solidFill>
+                  <a:srgbClr val="FF0000"/>
+                </a:solidFill>
+                <a:cs typeface="Calibri"/>
+              </a:rPr>
+              <a:t>; doesn't contain </a:t>
+            </a:r>
+            <a:r>
+              <a:rPr lang="en-US" sz="3200" b="1" dirty="0">
+                <a:solidFill>
+                  <a:srgbClr val="FF0000"/>
+                </a:solidFill>
+                <a:cs typeface="Calibri"/>
+              </a:rPr>
+              <a:t>market movers</a:t>
+            </a:r>
+            <a:r>
+              <a:rPr lang="en-US" sz="3200" dirty="0">
+                <a:solidFill>
+                  <a:srgbClr val="FF0000"/>
+                </a:solidFill>
+                <a:cs typeface="Calibri"/>
+              </a:rPr>
+              <a:t> we had wanted</a:t>
+            </a:r>
+          </a:p>
+        </p:txBody>
+      </p:sp>
+    </p:spTree>
+    <p:extLst>
+      <p:ext uri="{BB962C8B-B14F-4D97-AF65-F5344CB8AC3E}">
+        <p14:creationId xmlns:p14="http://schemas.microsoft.com/office/powerpoint/2010/main" val="1208907245"/>
+      </p:ext>
+    </p:extLst>
+  </p:cSld>
+  <p:clrMapOvr>
+    <a:masterClrMapping/>
+  </p:clrMapOvr>
+  <p:timing>
+    <p:tnLst>
+      <p:par>
+        <p:cTn id="1" dur="indefinite" restart="never" nodeType="tmRoot">
+          <p:childTnLst>
+            <p:seq concurrent="1" nextAc="seek">
+              <p:cTn id="2" dur="indefinite" nodeType="mainSeq">
+                <p:childTnLst>
+                  <p:par>
+                    <p:cTn id="3" fill="hold">
+                      <p:stCondLst>
+                        <p:cond delay="indefinite"/>
+                      </p:stCondLst>
+                      <p:childTnLst>
+                        <p:par>
+                          <p:cTn id="4" fill="hold">
+                            <p:stCondLst>
+                              <p:cond delay="0"/>
+                            </p:stCondLst>
+                            <p:childTnLst>
+                              <p:par>
+                                <p:cTn id="5" presetID="1" presetClass="entr" presetSubtype="0" fill="hold" grpId="0" nodeType="clickEffect">
+                                  <p:stCondLst>
+                                    <p:cond delay="0"/>
+                                  </p:stCondLst>
+                                  <p:childTnLst>
+                                    <p:set>
+                                      <p:cBhvr>
+                                        <p:cTn id="6" dur="1" fill="hold">
+                                          <p:stCondLst>
+                                            <p:cond delay="0"/>
+                                          </p:stCondLst>
+                                        </p:cTn>
+                                        <p:tgtEl>
+                                          <p:spTgt spid="10"/>
+                                        </p:tgtEl>
+                                        <p:attrNameLst>
+                                          <p:attrName>style.visibility</p:attrName>
+                                        </p:attrNameLst>
+                                      </p:cBhvr>
+                                      <p:to>
+                                        <p:strVal val="visible"/>
+                                      </p:to>
+                                    </p:set>
+                                  </p:childTnLst>
+                                </p:cTn>
+                              </p:par>
+                            </p:childTnLst>
+                          </p:cTn>
+                        </p:par>
+                      </p:childTnLst>
+                    </p:cTn>
+                  </p:par>
+                </p:childTnLst>
+              </p:cTn>
+              <p:prevCondLst>
+                <p:cond evt="onPrev" delay="0">
+                  <p:tgtEl>
+                    <p:sldTgt/>
+                  </p:tgtEl>
+                </p:cond>
+              </p:prevCondLst>
+              <p:nextCondLst>
+                <p:cond evt="onNext" delay="0">
+                  <p:tgtEl>
+                    <p:sldTgt/>
+                  </p:tgtEl>
+                </p:cond>
+              </p:nextCondLst>
+            </p:seq>
+          </p:childTnLst>
+        </p:cTn>
+      </p:par>
+    </p:tnLst>
+    <p:bldLst>
+      <p:bldP spid="10" grpId="0"/>
+    </p:bldLst>
+  </p:timing>
+</p:sld>
+</file>
+
+<file path=ppt/slides/slide13.xml><?xml version="1.0" encoding="utf-8"?>
+<p:sld xmlns:a="http://schemas.openxmlformats.org/drawingml/2006/main" xmlns:r="http://schemas.openxmlformats.org/officeDocument/2006/relationships" xmlns:p="http://schemas.openxmlformats.org/presentationml/2006/main">
+  <p:cSld>
+    <p:spTree>
+      <p:nvGrpSpPr>
+        <p:cNvPr id="1" name=""/>
+        <p:cNvGrpSpPr/>
+        <p:nvPr/>
+      </p:nvGrpSpPr>
+      <p:grpSpPr>
+        <a:xfrm>
+          <a:off x="0" y="0"/>
+          <a:ext cx="0" cy="0"/>
+          <a:chOff x="0" y="0"/>
+          <a:chExt cx="0" cy="0"/>
+        </a:xfrm>
+      </p:grpSpPr>
+      <p:sp>
+        <p:nvSpPr>
+          <p:cNvPr id="2" name="Title 1">
+            <a:extLst>
+              <a:ext uri="{FF2B5EF4-FFF2-40B4-BE49-F238E27FC236}">
+                <a16:creationId xmlns:a16="http://schemas.microsoft.com/office/drawing/2014/main" id="{EFF362B6-8BB8-4FE2-A1A8-E203F08CF15D}"/>
+              </a:ext>
+            </a:extLst>
+          </p:cNvPr>
+          <p:cNvSpPr>
+            <a:spLocks noGrp="1"/>
+          </p:cNvSpPr>
+          <p:nvPr>
+            <p:ph type="title"/>
+          </p:nvPr>
+        </p:nvSpPr>
+        <p:spPr/>
+        <p:txBody>
+          <a:bodyPr/>
+          <a:lstStyle/>
+          <a:p>
+            <a:r>
+              <a:rPr lang="en-US" dirty="0" err="1">
+                <a:cs typeface="Calibri Light"/>
+              </a:rPr>
+              <a:t>BeautifulSoup</a:t>
+            </a:r>
+            <a:r>
+              <a:rPr lang="en-US" dirty="0">
+                <a:cs typeface="Calibri Light"/>
+              </a:rPr>
+              <a:t> + Requests </a:t>
+            </a:r>
+            <a:endParaRPr lang="en-US" dirty="0" err="1"/>
+          </a:p>
+        </p:txBody>
+      </p:sp>
+      <p:sp>
+        <p:nvSpPr>
+          <p:cNvPr id="3" name="Content Placeholder 2">
+            <a:extLst>
+              <a:ext uri="{FF2B5EF4-FFF2-40B4-BE49-F238E27FC236}">
+                <a16:creationId xmlns:a16="http://schemas.microsoft.com/office/drawing/2014/main" id="{5B991963-6DFE-4282-9FC4-34A112F6AADF}"/>
+              </a:ext>
+            </a:extLst>
+          </p:cNvPr>
+          <p:cNvSpPr>
+            <a:spLocks noGrp="1"/>
+          </p:cNvSpPr>
+          <p:nvPr>
+            <p:ph idx="1"/>
+          </p:nvPr>
+        </p:nvSpPr>
+        <p:spPr>
+          <a:xfrm>
+            <a:off x="191219" y="1653097"/>
+            <a:ext cx="4937185" cy="3718734"/>
+          </a:xfrm>
+        </p:spPr>
+        <p:txBody>
+          <a:bodyPr vert="horz" lIns="91440" tIns="45720" rIns="91440" bIns="45720" rtlCol="0" anchor="t">
+            <a:normAutofit/>
+          </a:bodyPr>
+          <a:lstStyle/>
+          <a:p>
+            <a:r>
+              <a:rPr lang="en-US" sz="2000" dirty="0">
+                <a:cs typeface="Calibri"/>
+              </a:rPr>
+              <a:t>Way to circumvent: </a:t>
+            </a:r>
+          </a:p>
+          <a:p>
+            <a:pPr lvl="1"/>
+            <a:r>
+              <a:rPr lang="en-US" sz="2000" i="1" dirty="0" err="1">
+                <a:latin typeface="Courier New"/>
+                <a:cs typeface="Courier New"/>
+              </a:rPr>
+              <a:t>BeautifulSoup</a:t>
+            </a:r>
+            <a:r>
+              <a:rPr lang="en-US" sz="2000" i="1" dirty="0">
+                <a:latin typeface="Courier New"/>
+                <a:cs typeface="Courier New"/>
+              </a:rPr>
+              <a:t> + Requests </a:t>
+            </a:r>
+          </a:p>
+          <a:p>
+            <a:r>
+              <a:rPr lang="en-US" sz="2000" dirty="0">
+                <a:latin typeface="Calibri"/>
+                <a:cs typeface="Calibri"/>
+              </a:rPr>
+              <a:t>A happy medium between direct web-scraping tools and the ease and simplicity of </a:t>
+            </a:r>
+            <a:r>
+              <a:rPr lang="en-US" sz="2000" dirty="0">
+                <a:latin typeface="Courier New"/>
+                <a:cs typeface="Courier New"/>
+              </a:rPr>
+              <a:t>pandas</a:t>
+            </a:r>
+            <a:endParaRPr lang="en-US" sz="2000" dirty="0">
+              <a:latin typeface="Calibri"/>
+              <a:cs typeface="Calibri"/>
+            </a:endParaRPr>
+          </a:p>
+          <a:p>
+            <a:r>
+              <a:rPr lang="en-US" sz="2000" dirty="0">
+                <a:latin typeface="Calibri"/>
+                <a:cs typeface="Calibri"/>
+              </a:rPr>
+              <a:t>Can easily interface with </a:t>
+            </a:r>
+            <a:r>
+              <a:rPr lang="en-US" sz="2000" dirty="0">
+                <a:latin typeface="Courier New"/>
+                <a:cs typeface="Courier New"/>
+              </a:rPr>
+              <a:t>pandas</a:t>
+            </a:r>
+            <a:r>
+              <a:rPr lang="en-US" sz="2000" dirty="0">
+                <a:latin typeface="Calibri"/>
+                <a:cs typeface="Calibri"/>
+              </a:rPr>
+              <a:t> functions</a:t>
+            </a:r>
+            <a:endParaRPr lang="en-US" sz="2000" dirty="0">
+              <a:cs typeface="Calibri"/>
+            </a:endParaRPr>
+          </a:p>
+          <a:p>
+            <a:endParaRPr lang="en-US" sz="2000" dirty="0">
+              <a:latin typeface="Calibri"/>
+              <a:cs typeface="Calibri"/>
+            </a:endParaRPr>
+          </a:p>
+          <a:p>
+            <a:endParaRPr lang="en-US" sz="2000" dirty="0">
+              <a:latin typeface="Calibri"/>
+              <a:cs typeface="Calibri"/>
+            </a:endParaRPr>
+          </a:p>
+        </p:txBody>
+      </p:sp>
+      <p:pic>
+        <p:nvPicPr>
+          <p:cNvPr id="4" name="Picture 4" descr="A screenshot of a cell phone&#10;&#10;Description generated with very high confidence">
+            <a:extLst>
+              <a:ext uri="{FF2B5EF4-FFF2-40B4-BE49-F238E27FC236}">
+                <a16:creationId xmlns:a16="http://schemas.microsoft.com/office/drawing/2014/main" id="{91A894D3-3164-403C-A17A-714999645715}"/>
+              </a:ext>
+            </a:extLst>
+          </p:cNvPr>
+          <p:cNvPicPr>
+            <a:picLocks noChangeAspect="1"/>
+          </p:cNvPicPr>
+          <p:nvPr/>
+        </p:nvPicPr>
+        <p:blipFill>
+          <a:blip r:embed="rId2"/>
+          <a:stretch>
+            <a:fillRect/>
+          </a:stretch>
+        </p:blipFill>
+        <p:spPr>
+          <a:xfrm>
+            <a:off x="5141344" y="1571775"/>
+            <a:ext cx="6912633" cy="4807127"/>
+          </a:xfrm>
+          <a:prstGeom prst="rect">
+            <a:avLst/>
+          </a:prstGeom>
+        </p:spPr>
+      </p:pic>
+    </p:spTree>
+    <p:extLst>
+      <p:ext uri="{BB962C8B-B14F-4D97-AF65-F5344CB8AC3E}">
+        <p14:creationId xmlns:p14="http://schemas.microsoft.com/office/powerpoint/2010/main" val="2278662049"/>
+      </p:ext>
+    </p:extLst>
+  </p:cSld>
+  <p:clrMapOvr>
+    <a:masterClrMapping/>
+  </p:clrMapOvr>
+</p:sld>
+</file>
+
+<file path=ppt/slides/slide14.xml><?xml version="1.0" encoding="utf-8"?>
+<p:sld xmlns:a="http://schemas.openxmlformats.org/drawingml/2006/main" xmlns:r="http://schemas.openxmlformats.org/officeDocument/2006/relationships" xmlns:p="http://schemas.openxmlformats.org/presentationml/2006/main">
+  <p:cSld>
+    <p:spTree>
+      <p:nvGrpSpPr>
+        <p:cNvPr id="1" name=""/>
+        <p:cNvGrpSpPr/>
+        <p:nvPr/>
+      </p:nvGrpSpPr>
+      <p:grpSpPr>
+        <a:xfrm>
+          <a:off x="0" y="0"/>
+          <a:ext cx="0" cy="0"/>
+          <a:chOff x="0" y="0"/>
+          <a:chExt cx="0" cy="0"/>
+        </a:xfrm>
+      </p:grpSpPr>
+      <p:sp>
+        <p:nvSpPr>
+          <p:cNvPr id="2" name="Title 1">
+            <a:extLst>
+              <a:ext uri="{FF2B5EF4-FFF2-40B4-BE49-F238E27FC236}">
+                <a16:creationId xmlns:a16="http://schemas.microsoft.com/office/drawing/2014/main" id="{425F10A8-F4A3-4B27-AF9B-683371A95C32}"/>
+              </a:ext>
+            </a:extLst>
+          </p:cNvPr>
+          <p:cNvSpPr>
+            <a:spLocks noGrp="1"/>
+          </p:cNvSpPr>
+          <p:nvPr>
+            <p:ph type="title"/>
+          </p:nvPr>
+        </p:nvSpPr>
+        <p:spPr/>
+        <p:txBody>
+          <a:bodyPr/>
+          <a:lstStyle/>
+          <a:p>
+            <a:r>
+              <a:rPr lang="en-US" dirty="0">
+                <a:cs typeface="Calibri Light"/>
+              </a:rPr>
+              <a:t>An example workflow...</a:t>
+            </a:r>
+            <a:endParaRPr lang="en-US" dirty="0"/>
+          </a:p>
+        </p:txBody>
+      </p:sp>
+      <p:sp>
+        <p:nvSpPr>
+          <p:cNvPr id="3" name="Content Placeholder 2">
+            <a:extLst>
+              <a:ext uri="{FF2B5EF4-FFF2-40B4-BE49-F238E27FC236}">
+                <a16:creationId xmlns:a16="http://schemas.microsoft.com/office/drawing/2014/main" id="{689E6637-D705-43A0-B34B-8FF23FC1E3CC}"/>
+              </a:ext>
+            </a:extLst>
+          </p:cNvPr>
+          <p:cNvSpPr>
+            <a:spLocks noGrp="1"/>
+          </p:cNvSpPr>
+          <p:nvPr>
+            <p:ph idx="1"/>
+          </p:nvPr>
+        </p:nvSpPr>
+        <p:spPr/>
+        <p:txBody>
+          <a:bodyPr vert="horz" lIns="91440" tIns="45720" rIns="91440" bIns="45720" rtlCol="0" anchor="t">
+            <a:normAutofit lnSpcReduction="10000"/>
+          </a:bodyPr>
+          <a:lstStyle/>
+          <a:p>
+            <a:r>
+              <a:rPr lang="en-US" sz="3600" dirty="0">
+                <a:cs typeface="Calibri"/>
+              </a:rPr>
+              <a:t>Requests</a:t>
+            </a:r>
+            <a:endParaRPr lang="en-US" dirty="0"/>
+          </a:p>
+          <a:p>
+            <a:pPr lvl="1"/>
+            <a:r>
+              <a:rPr lang="en-US" dirty="0">
+                <a:cs typeface="Calibri"/>
+              </a:rPr>
+              <a:t>Interface with web</a:t>
+            </a:r>
+          </a:p>
+          <a:p>
+            <a:endParaRPr lang="en-US" dirty="0">
+              <a:cs typeface="Calibri"/>
+            </a:endParaRPr>
+          </a:p>
+          <a:p>
+            <a:endParaRPr lang="en-US" dirty="0">
+              <a:cs typeface="Calibri"/>
+            </a:endParaRPr>
+          </a:p>
+          <a:p>
+            <a:endParaRPr lang="en-US" dirty="0">
+              <a:cs typeface="Calibri"/>
+            </a:endParaRPr>
+          </a:p>
+          <a:p>
+            <a:endParaRPr lang="en-US" dirty="0">
+              <a:cs typeface="Calibri"/>
+            </a:endParaRPr>
+          </a:p>
+          <a:p>
+            <a:endParaRPr lang="en-US" dirty="0">
+              <a:cs typeface="Calibri"/>
+            </a:endParaRPr>
+          </a:p>
+          <a:p>
+            <a:r>
+              <a:rPr lang="en-US" sz="3600" dirty="0">
+                <a:cs typeface="Calibri"/>
+              </a:rPr>
+              <a:t>Beautiful Soup </a:t>
+            </a:r>
+          </a:p>
+          <a:p>
+            <a:pPr lvl="1"/>
+            <a:r>
+              <a:rPr lang="en-US" dirty="0">
+                <a:cs typeface="Calibri"/>
+              </a:rPr>
+              <a:t>Parse web page</a:t>
+            </a:r>
+          </a:p>
+        </p:txBody>
+      </p:sp>
+      <p:cxnSp>
+        <p:nvCxnSpPr>
+          <p:cNvPr id="4" name="Straight Arrow Connector 3">
+            <a:extLst>
+              <a:ext uri="{FF2B5EF4-FFF2-40B4-BE49-F238E27FC236}">
+                <a16:creationId xmlns:a16="http://schemas.microsoft.com/office/drawing/2014/main" id="{AC738B7D-1574-4285-9C47-7D02AD88EF95}"/>
+              </a:ext>
+            </a:extLst>
+          </p:cNvPr>
+          <p:cNvCxnSpPr/>
+          <p:nvPr/>
+        </p:nvCxnSpPr>
+        <p:spPr>
+          <a:xfrm>
+            <a:off x="4229817" y="2490158"/>
+            <a:ext cx="2524664" cy="1086928"/>
+          </a:xfrm>
+          <a:prstGeom prst="straightConnector1">
+            <a:avLst/>
+          </a:prstGeom>
+          <a:ln w="57150">
+            <a:tailEnd type="triangle"/>
+          </a:ln>
+        </p:spPr>
+        <p:style>
+          <a:lnRef idx="3">
+            <a:schemeClr val="dk1"/>
+          </a:lnRef>
+          <a:fillRef idx="0">
+            <a:schemeClr val="dk1"/>
+          </a:fillRef>
+          <a:effectRef idx="2">
+            <a:schemeClr val="dk1"/>
+          </a:effectRef>
+          <a:fontRef idx="minor">
+            <a:schemeClr val="tx1"/>
+          </a:fontRef>
+        </p:style>
+      </p:cxnSp>
+      <p:cxnSp>
+        <p:nvCxnSpPr>
+          <p:cNvPr id="5" name="Straight Arrow Connector 4">
+            <a:extLst>
+              <a:ext uri="{FF2B5EF4-FFF2-40B4-BE49-F238E27FC236}">
+                <a16:creationId xmlns:a16="http://schemas.microsoft.com/office/drawing/2014/main" id="{D7E634FF-6627-4819-92AC-91195D17F09F}"/>
+              </a:ext>
+            </a:extLst>
+          </p:cNvPr>
+          <p:cNvCxnSpPr>
+            <a:cxnSpLocks/>
+          </p:cNvCxnSpPr>
+          <p:nvPr/>
+        </p:nvCxnSpPr>
+        <p:spPr>
+          <a:xfrm flipV="1">
+            <a:off x="4129176" y="3821500"/>
+            <a:ext cx="2682814" cy="1270958"/>
+          </a:xfrm>
+          <a:prstGeom prst="straightConnector1">
+            <a:avLst/>
+          </a:prstGeom>
+          <a:ln w="57150">
+            <a:tailEnd type="triangle"/>
+          </a:ln>
+        </p:spPr>
+        <p:style>
+          <a:lnRef idx="3">
+            <a:schemeClr val="dk1"/>
+          </a:lnRef>
+          <a:fillRef idx="0">
+            <a:schemeClr val="dk1"/>
+          </a:fillRef>
+          <a:effectRef idx="2">
+            <a:schemeClr val="dk1"/>
+          </a:effectRef>
+          <a:fontRef idx="minor">
+            <a:schemeClr val="tx1"/>
+          </a:fontRef>
+        </p:style>
+      </p:cxnSp>
+      <p:sp>
+        <p:nvSpPr>
+          <p:cNvPr id="6" name="TextBox 5">
+            <a:extLst>
+              <a:ext uri="{FF2B5EF4-FFF2-40B4-BE49-F238E27FC236}">
+                <a16:creationId xmlns:a16="http://schemas.microsoft.com/office/drawing/2014/main" id="{BF647E89-9319-4BD3-BEC5-B86CF275FF0C}"/>
+              </a:ext>
+            </a:extLst>
+          </p:cNvPr>
+          <p:cNvSpPr txBox="1"/>
+          <p:nvPr/>
+        </p:nvSpPr>
+        <p:spPr>
+          <a:xfrm>
+            <a:off x="7059283" y="3358551"/>
+            <a:ext cx="1811549" cy="584775"/>
+          </a:xfrm>
+          <a:prstGeom prst="rect">
+            <a:avLst/>
+          </a:prstGeom>
+        </p:spPr>
+        <p:txBody>
+          <a:bodyPr rot="0" spcFirstLastPara="0" vertOverflow="overflow" horzOverflow="overflow" vert="horz" wrap="square" lIns="91440" tIns="45720" rIns="91440" bIns="45720" numCol="1" spcCol="0" rtlCol="0" fromWordArt="0" anchor="t" anchorCtr="0" forceAA="0" compatLnSpc="1">
+            <a:prstTxWarp prst="textNoShape">
+              <a:avLst/>
+            </a:prstTxWarp>
+            <a:spAutoFit/>
+          </a:bodyPr>
+          <a:lstStyle/>
+          <a:p>
+            <a:pPr>
+              <a:buChar char="•"/>
+            </a:pPr>
+            <a:r>
+              <a:rPr lang="en-US" sz="3200" dirty="0">
+                <a:cs typeface="Arial"/>
+              </a:rPr>
+              <a:t>Pandas  ​</a:t>
+            </a:r>
+            <a:endParaRPr lang="en-US" sz="3200" dirty="0">
+              <a:cs typeface="Calibri"/>
+            </a:endParaRPr>
+          </a:p>
+        </p:txBody>
+      </p:sp>
+    </p:spTree>
+    <p:extLst>
+      <p:ext uri="{BB962C8B-B14F-4D97-AF65-F5344CB8AC3E}">
+        <p14:creationId xmlns:p14="http://schemas.microsoft.com/office/powerpoint/2010/main" val="2520028208"/>
+      </p:ext>
+    </p:extLst>
+  </p:cSld>
+  <p:clrMapOvr>
+    <a:masterClrMapping/>
+  </p:clrMapOvr>
+</p:sld>
+</file>
+
+<file path=ppt/slides/slide15.xml><?xml version="1.0" encoding="utf-8"?>
+<p:sld xmlns:a="http://schemas.openxmlformats.org/drawingml/2006/main" xmlns:r="http://schemas.openxmlformats.org/officeDocument/2006/relationships" xmlns:p="http://schemas.openxmlformats.org/presentationml/2006/main">
+  <p:cSld>
+    <p:spTree>
+      <p:nvGrpSpPr>
+        <p:cNvPr id="1" name=""/>
+        <p:cNvGrpSpPr/>
+        <p:nvPr/>
+      </p:nvGrpSpPr>
+      <p:grpSpPr>
+        <a:xfrm>
+          <a:off x="0" y="0"/>
+          <a:ext cx="0" cy="0"/>
+          <a:chOff x="0" y="0"/>
+          <a:chExt cx="0" cy="0"/>
+        </a:xfrm>
+      </p:grpSpPr>
+      <p:sp>
+        <p:nvSpPr>
+          <p:cNvPr id="2" name="Title 1">
+            <a:extLst>
+              <a:ext uri="{FF2B5EF4-FFF2-40B4-BE49-F238E27FC236}">
+                <a16:creationId xmlns:a16="http://schemas.microsoft.com/office/drawing/2014/main" id="{68DCDD46-C769-4F86-9CD3-E15B0F2C1F87}"/>
+              </a:ext>
+            </a:extLst>
+          </p:cNvPr>
+          <p:cNvSpPr>
+            <a:spLocks noGrp="1"/>
+          </p:cNvSpPr>
+          <p:nvPr>
+            <p:ph type="title"/>
+          </p:nvPr>
+        </p:nvSpPr>
+        <p:spPr/>
+        <p:txBody>
+          <a:bodyPr/>
+          <a:lstStyle/>
+          <a:p>
+            <a:r>
+              <a:rPr lang="en-US" dirty="0"/>
+              <a:t>Requests Python Package</a:t>
+            </a:r>
+          </a:p>
+        </p:txBody>
+      </p:sp>
+      <p:sp>
+        <p:nvSpPr>
+          <p:cNvPr id="3" name="Content Placeholder 2">
+            <a:extLst>
+              <a:ext uri="{FF2B5EF4-FFF2-40B4-BE49-F238E27FC236}">
+                <a16:creationId xmlns:a16="http://schemas.microsoft.com/office/drawing/2014/main" id="{B8A5C19E-6E87-4B0E-862A-C77659B25197}"/>
+              </a:ext>
+            </a:extLst>
+          </p:cNvPr>
+          <p:cNvSpPr>
+            <a:spLocks noGrp="1"/>
+          </p:cNvSpPr>
+          <p:nvPr>
+            <p:ph idx="1"/>
+          </p:nvPr>
+        </p:nvSpPr>
+        <p:spPr>
+          <a:xfrm>
+            <a:off x="838200" y="2528047"/>
+            <a:ext cx="10515600" cy="3964828"/>
+          </a:xfrm>
+        </p:spPr>
+        <p:txBody>
+          <a:bodyPr>
+            <a:normAutofit/>
+          </a:bodyPr>
+          <a:lstStyle/>
+          <a:p>
+            <a:r>
+              <a:rPr lang="en-US" dirty="0"/>
+              <a:t>Pros</a:t>
+            </a:r>
+          </a:p>
+          <a:p>
+            <a:pPr lvl="1"/>
+            <a:r>
+              <a:rPr lang="en-US" dirty="0"/>
+              <a:t>Included in Anaconda Python distribution</a:t>
+            </a:r>
+          </a:p>
+          <a:p>
+            <a:pPr lvl="1"/>
+            <a:r>
+              <a:rPr lang="en-US" dirty="0"/>
+              <a:t>Allows for username and passwords or tokens</a:t>
+            </a:r>
+          </a:p>
+          <a:p>
+            <a:pPr lvl="1"/>
+            <a:r>
+              <a:rPr lang="en-US" dirty="0"/>
+              <a:t> Designed for simple data retrieval</a:t>
+            </a:r>
+          </a:p>
+          <a:p>
+            <a:r>
+              <a:rPr lang="en-US" dirty="0"/>
+              <a:t>Cons</a:t>
+            </a:r>
+          </a:p>
+          <a:p>
+            <a:pPr lvl="1"/>
+            <a:r>
+              <a:rPr lang="en-US" dirty="0"/>
+              <a:t>Doesn't return a </a:t>
+            </a:r>
+            <a:r>
+              <a:rPr lang="en-US" dirty="0" err="1"/>
+              <a:t>DataFrame</a:t>
+            </a:r>
+            <a:endParaRPr lang="en-US" dirty="0"/>
+          </a:p>
+          <a:p>
+            <a:pPr lvl="1"/>
+            <a:r>
+              <a:rPr lang="en-US" dirty="0"/>
+              <a:t>Better suited for JSON formatted </a:t>
+            </a:r>
+            <a:r>
+              <a:rPr lang="en-US" dirty="0" err="1"/>
+              <a:t>urls</a:t>
+            </a:r>
+            <a:endParaRPr lang="en-US" dirty="0"/>
+          </a:p>
+          <a:p>
+            <a:endParaRPr lang="en-US" dirty="0"/>
+          </a:p>
+        </p:txBody>
+      </p:sp>
+      <p:sp>
+        <p:nvSpPr>
+          <p:cNvPr id="4" name="TextBox 3">
+            <a:extLst>
+              <a:ext uri="{FF2B5EF4-FFF2-40B4-BE49-F238E27FC236}">
+                <a16:creationId xmlns:a16="http://schemas.microsoft.com/office/drawing/2014/main" id="{5DC67676-611A-4DE3-9F32-66D6A9E1C21F}"/>
+              </a:ext>
+            </a:extLst>
+          </p:cNvPr>
+          <p:cNvSpPr txBox="1"/>
+          <p:nvPr/>
+        </p:nvSpPr>
+        <p:spPr>
+          <a:xfrm>
+            <a:off x="0" y="1690688"/>
+            <a:ext cx="12192000" cy="523220"/>
+          </a:xfrm>
+          <a:prstGeom prst="rect">
+            <a:avLst/>
+          </a:prstGeom>
+          <a:noFill/>
+        </p:spPr>
+        <p:txBody>
+          <a:bodyPr wrap="square" rtlCol="0">
+            <a:spAutoFit/>
+          </a:bodyPr>
+          <a:lstStyle/>
+          <a:p>
+            <a:pPr algn="ctr"/>
+            <a:r>
+              <a:rPr lang="en-US" sz="2800" dirty="0">
+                <a:latin typeface="Lucida Console" panose="020B0609040504020204" pitchFamily="49" charset="0"/>
+              </a:rPr>
+              <a:t>r = </a:t>
+            </a:r>
+            <a:r>
+              <a:rPr lang="en-US" sz="2800" dirty="0" err="1">
+                <a:latin typeface="Lucida Console" panose="020B0609040504020204" pitchFamily="49" charset="0"/>
+              </a:rPr>
+              <a:t>requests.get</a:t>
+            </a:r>
+            <a:r>
+              <a:rPr lang="en-US" sz="2800" dirty="0">
+                <a:latin typeface="Lucida Console" panose="020B0609040504020204" pitchFamily="49" charset="0"/>
+              </a:rPr>
+              <a:t>(</a:t>
+            </a:r>
+            <a:r>
+              <a:rPr lang="en-US" sz="2800" dirty="0" err="1">
+                <a:latin typeface="Lucida Console" panose="020B0609040504020204" pitchFamily="49" charset="0"/>
+              </a:rPr>
+              <a:t>data_url</a:t>
+            </a:r>
+            <a:r>
+              <a:rPr lang="en-US" sz="2800" dirty="0">
+                <a:latin typeface="Lucida Console" panose="020B0609040504020204" pitchFamily="49" charset="0"/>
+              </a:rPr>
+              <a:t>, headers={'token’: </a:t>
+            </a:r>
+            <a:r>
+              <a:rPr lang="en-US" sz="2800" dirty="0" err="1">
+                <a:latin typeface="Lucida Console" panose="020B0609040504020204" pitchFamily="49" charset="0"/>
+              </a:rPr>
+              <a:t>api_key</a:t>
+            </a:r>
+            <a:r>
+              <a:rPr lang="en-US" sz="2800" dirty="0">
+                <a:latin typeface="Lucida Console" panose="020B0609040504020204" pitchFamily="49" charset="0"/>
+              </a:rPr>
+              <a:t>})</a:t>
+            </a:r>
+          </a:p>
+        </p:txBody>
+      </p:sp>
+    </p:spTree>
+    <p:extLst>
+      <p:ext uri="{BB962C8B-B14F-4D97-AF65-F5344CB8AC3E}">
+        <p14:creationId xmlns:p14="http://schemas.microsoft.com/office/powerpoint/2010/main" val="964416389"/>
+      </p:ext>
+    </p:extLst>
+  </p:cSld>
+  <p:clrMapOvr>
+    <a:masterClrMapping/>
+  </p:clrMapOvr>
+</p:sld>
+</file>
+
+<file path=ppt/slides/slide16.xml><?xml version="1.0" encoding="utf-8"?>
+<p:sld xmlns:a="http://schemas.openxmlformats.org/drawingml/2006/main" xmlns:r="http://schemas.openxmlformats.org/officeDocument/2006/relationships" xmlns:p="http://schemas.openxmlformats.org/presentationml/2006/main">
+  <p:cSld>
+    <p:spTree>
+      <p:nvGrpSpPr>
+        <p:cNvPr id="1" name=""/>
+        <p:cNvGrpSpPr/>
+        <p:nvPr/>
+      </p:nvGrpSpPr>
+      <p:grpSpPr>
+        <a:xfrm>
+          <a:off x="0" y="0"/>
+          <a:ext cx="0" cy="0"/>
+          <a:chOff x="0" y="0"/>
+          <a:chExt cx="0" cy="0"/>
+        </a:xfrm>
+      </p:grpSpPr>
+      <p:sp>
+        <p:nvSpPr>
+          <p:cNvPr id="2" name="Title 1">
+            <a:extLst>
+              <a:ext uri="{FF2B5EF4-FFF2-40B4-BE49-F238E27FC236}">
+                <a16:creationId xmlns:a16="http://schemas.microsoft.com/office/drawing/2014/main" id="{68DCDD46-C769-4F86-9CD3-E15B0F2C1F87}"/>
+              </a:ext>
+            </a:extLst>
+          </p:cNvPr>
+          <p:cNvSpPr>
+            <a:spLocks noGrp="1"/>
+          </p:cNvSpPr>
+          <p:nvPr>
+            <p:ph type="title"/>
+          </p:nvPr>
+        </p:nvSpPr>
+        <p:spPr/>
+        <p:txBody>
+          <a:bodyPr/>
+          <a:lstStyle/>
+          <a:p>
+            <a:r>
+              <a:rPr lang="en-US" dirty="0"/>
+              <a:t>Requests Python Package</a:t>
+            </a:r>
+          </a:p>
+        </p:txBody>
+      </p:sp>
+      <p:pic>
+        <p:nvPicPr>
+          <p:cNvPr id="9" name="Picture 8">
+            <a:extLst>
+              <a:ext uri="{FF2B5EF4-FFF2-40B4-BE49-F238E27FC236}">
+                <a16:creationId xmlns:a16="http://schemas.microsoft.com/office/drawing/2014/main" id="{49FFA1EA-10A1-4A02-9BAE-EEBA7D497541}"/>
+              </a:ext>
+            </a:extLst>
+          </p:cNvPr>
+          <p:cNvPicPr>
+            <a:picLocks noChangeAspect="1"/>
+          </p:cNvPicPr>
+          <p:nvPr/>
+        </p:nvPicPr>
+        <p:blipFill>
+          <a:blip r:embed="rId2"/>
+          <a:stretch>
+            <a:fillRect/>
+          </a:stretch>
+        </p:blipFill>
+        <p:spPr>
+          <a:xfrm>
+            <a:off x="620767" y="1475389"/>
+            <a:ext cx="10172700" cy="2057400"/>
+          </a:xfrm>
+          <a:prstGeom prst="rect">
+            <a:avLst/>
+          </a:prstGeom>
+        </p:spPr>
+      </p:pic>
+      <p:pic>
+        <p:nvPicPr>
+          <p:cNvPr id="10" name="Picture 9">
+            <a:extLst>
+              <a:ext uri="{FF2B5EF4-FFF2-40B4-BE49-F238E27FC236}">
+                <a16:creationId xmlns:a16="http://schemas.microsoft.com/office/drawing/2014/main" id="{9B505260-7143-4F16-A396-7A6131CECDB4}"/>
+              </a:ext>
+            </a:extLst>
+          </p:cNvPr>
+          <p:cNvPicPr>
+            <a:picLocks noChangeAspect="1"/>
+          </p:cNvPicPr>
+          <p:nvPr/>
+        </p:nvPicPr>
+        <p:blipFill>
+          <a:blip r:embed="rId3"/>
+          <a:stretch>
+            <a:fillRect/>
+          </a:stretch>
+        </p:blipFill>
+        <p:spPr>
+          <a:xfrm>
+            <a:off x="4783192" y="2632787"/>
+            <a:ext cx="6010275" cy="3486150"/>
+          </a:xfrm>
+          <a:prstGeom prst="rect">
+            <a:avLst/>
+          </a:prstGeom>
+        </p:spPr>
+      </p:pic>
+    </p:spTree>
+    <p:extLst>
+      <p:ext uri="{BB962C8B-B14F-4D97-AF65-F5344CB8AC3E}">
+        <p14:creationId xmlns:p14="http://schemas.microsoft.com/office/powerpoint/2010/main" val="4253956594"/>
+      </p:ext>
+    </p:extLst>
+  </p:cSld>
+  <p:clrMapOvr>
+    <a:masterClrMapping/>
+  </p:clrMapOvr>
+</p:sld>
+</file>
+
 <file path=ppt/slides/slide2.xml><?xml version="1.0" encoding="utf-8"?>
 <p:sld xmlns:a="http://schemas.openxmlformats.org/drawingml/2006/main" xmlns:r="http://schemas.openxmlformats.org/officeDocument/2006/relationships" xmlns:p="http://schemas.openxmlformats.org/presentationml/2006/main">
   <p:cSld>
@@ -4267,7 +6196,7 @@
           <p:cNvPr id="2" name="Title 1">
             <a:extLst>
               <a:ext uri="{FF2B5EF4-FFF2-40B4-BE49-F238E27FC236}">
-                <a16:creationId xmlns:a16="http://schemas.microsoft.com/office/drawing/2014/main" id="{68DCDD46-C769-4F86-9CD3-E15B0F2C1F87}"/>
+                <a16:creationId xmlns:a16="http://schemas.microsoft.com/office/drawing/2014/main" id="{F87AC64D-7847-4C13-BAD8-0600EB913ADC}"/>
               </a:ext>
             </a:extLst>
           </p:cNvPr>
@@ -4284,9 +6213,12 @@
           <a:lstStyle/>
           <a:p>
             <a:r>
-              <a:rPr lang="en-US" dirty="0"/>
-              <a:t>Requests Python Package</a:t>
-            </a:r>
+              <a:rPr lang="en-US" dirty="0">
+                <a:cs typeface="Calibri Light"/>
+              </a:rPr>
+              <a:t>Web-Technology: Scraping 'Easy' Example </a:t>
+            </a:r>
+            <a:endParaRPr lang="en-US" dirty="0"/>
           </a:p>
         </p:txBody>
       </p:sp>
@@ -4295,7 +6227,7 @@
           <p:cNvPr id="3" name="Content Placeholder 2">
             <a:extLst>
               <a:ext uri="{FF2B5EF4-FFF2-40B4-BE49-F238E27FC236}">
-                <a16:creationId xmlns:a16="http://schemas.microsoft.com/office/drawing/2014/main" id="{B8A5C19E-6E87-4B0E-862A-C77659B25197}"/>
+                <a16:creationId xmlns:a16="http://schemas.microsoft.com/office/drawing/2014/main" id="{F45F3650-9C85-4441-B653-85FA72A99387}"/>
               </a:ext>
             </a:extLst>
           </p:cNvPr>
@@ -4306,157 +6238,84 @@
             <p:ph idx="1"/>
           </p:nvPr>
         </p:nvSpPr>
+        <p:spPr/>
+        <p:txBody>
+          <a:bodyPr vert="horz" lIns="91440" tIns="45720" rIns="91440" bIns="45720" rtlCol="0" anchor="t">
+            <a:normAutofit/>
+          </a:bodyPr>
+          <a:lstStyle/>
+          <a:p>
+            <a:r>
+              <a:rPr lang="en-US" dirty="0">
+                <a:cs typeface="Calibri"/>
+              </a:rPr>
+              <a:t>Suppose webpage </a:t>
+            </a:r>
+            <a:r>
+              <a:rPr lang="en-US" dirty="0" err="1">
+                <a:cs typeface="Calibri"/>
+              </a:rPr>
+              <a:t>alread</a:t>
+            </a:r>
+            <a:r>
+              <a:rPr lang="en-US" dirty="0">
+                <a:cs typeface="Calibri"/>
+              </a:rPr>
+              <a:t> in 'table' format...</a:t>
+            </a:r>
+          </a:p>
+          <a:p>
+            <a:pPr lvl="1"/>
+            <a:r>
+              <a:rPr lang="en-US" dirty="0">
+                <a:cs typeface="Calibri"/>
+                <a:hlinkClick r:id="rId2"/>
+              </a:rPr>
+              <a:t>http://www.nationmaster.com/country-info/stats/Cost-of-living/Average-monthly-disposable-salary/After-tax</a:t>
+            </a:r>
+          </a:p>
+          <a:p>
+            <a:pPr lvl="1"/>
+            <a:endParaRPr lang="en-US" dirty="0">
+              <a:cs typeface="Calibri"/>
+            </a:endParaRPr>
+          </a:p>
+        </p:txBody>
+      </p:sp>
+      <p:pic>
+        <p:nvPicPr>
+          <p:cNvPr id="4" name="Picture 4" descr="A screenshot of a cell phone&#10;&#10;Description generated with very high confidence">
+            <a:extLst>
+              <a:ext uri="{FF2B5EF4-FFF2-40B4-BE49-F238E27FC236}">
+                <a16:creationId xmlns:a16="http://schemas.microsoft.com/office/drawing/2014/main" id="{554D745C-929F-454A-AD00-B2CD7ECFFE92}"/>
+              </a:ext>
+            </a:extLst>
+          </p:cNvPr>
+          <p:cNvPicPr>
+            <a:picLocks noChangeAspect="1"/>
+          </p:cNvPicPr>
+          <p:nvPr/>
+        </p:nvPicPr>
+        <p:blipFill>
+          <a:blip r:embed="rId3"/>
+          <a:stretch>
+            <a:fillRect/>
+          </a:stretch>
+        </p:blipFill>
         <p:spPr>
           <a:xfrm>
-            <a:off x="838200" y="2528047"/>
-            <a:ext cx="10515600" cy="3964828"/>
-          </a:xfrm>
-        </p:spPr>
-        <p:txBody>
-          <a:bodyPr>
-            <a:normAutofit/>
-          </a:bodyPr>
-          <a:lstStyle/>
-          <a:p>
-            <a:r>
-              <a:rPr lang="en-US" dirty="0"/>
-              <a:t>Pros</a:t>
-            </a:r>
-          </a:p>
-          <a:p>
-            <a:pPr lvl="1"/>
-            <a:r>
-              <a:rPr lang="en-US" dirty="0"/>
-              <a:t>Included in Anaconda Python distribution</a:t>
-            </a:r>
-          </a:p>
-          <a:p>
-            <a:pPr lvl="1"/>
-            <a:r>
-              <a:rPr lang="en-US" dirty="0"/>
-              <a:t>Allows for username and passwords or tokens</a:t>
-            </a:r>
-          </a:p>
-          <a:p>
-            <a:pPr lvl="1"/>
-            <a:r>
-              <a:rPr lang="en-US" dirty="0"/>
-              <a:t> Designed for simple data retrieval</a:t>
-            </a:r>
-          </a:p>
-          <a:p>
-            <a:r>
-              <a:rPr lang="en-US" dirty="0"/>
-              <a:t>Cons</a:t>
-            </a:r>
-          </a:p>
-          <a:p>
-            <a:pPr lvl="1"/>
-            <a:r>
-              <a:rPr lang="en-US" dirty="0"/>
-              <a:t>Doesn't return a </a:t>
-            </a:r>
-            <a:r>
-              <a:rPr lang="en-US" dirty="0" err="1"/>
-              <a:t>DataFrame</a:t>
-            </a:r>
-            <a:endParaRPr lang="en-US" dirty="0"/>
-          </a:p>
-          <a:p>
-            <a:pPr lvl="1"/>
-            <a:r>
-              <a:rPr lang="en-US" dirty="0"/>
-              <a:t>Better suited for JSON formatted </a:t>
-            </a:r>
-            <a:r>
-              <a:rPr lang="en-US" dirty="0" err="1"/>
-              <a:t>urls</a:t>
-            </a:r>
-            <a:endParaRPr lang="en-US" dirty="0"/>
-          </a:p>
-          <a:p>
-            <a:endParaRPr lang="en-US" dirty="0"/>
-          </a:p>
-        </p:txBody>
-      </p:sp>
-      <p:sp>
-        <p:nvSpPr>
-          <p:cNvPr id="4" name="TextBox 3">
-            <a:extLst>
-              <a:ext uri="{FF2B5EF4-FFF2-40B4-BE49-F238E27FC236}">
-                <a16:creationId xmlns:a16="http://schemas.microsoft.com/office/drawing/2014/main" id="{5DC67676-611A-4DE3-9F32-66D6A9E1C21F}"/>
-              </a:ext>
-            </a:extLst>
-          </p:cNvPr>
-          <p:cNvSpPr txBox="1"/>
-          <p:nvPr/>
-        </p:nvSpPr>
-        <p:spPr>
-          <a:xfrm>
-            <a:off x="0" y="1690688"/>
-            <a:ext cx="12192000" cy="523220"/>
+            <a:off x="1503870" y="3228662"/>
+            <a:ext cx="7085162" cy="3175506"/>
           </a:xfrm>
           <a:prstGeom prst="rect">
             <a:avLst/>
           </a:prstGeom>
-          <a:noFill/>
         </p:spPr>
-        <p:txBody>
-          <a:bodyPr wrap="square" rtlCol="0">
-            <a:spAutoFit/>
-          </a:bodyPr>
-          <a:lstStyle/>
-          <a:p>
-            <a:pPr algn="ctr"/>
-            <a:r>
-              <a:rPr lang="en-US" sz="2800" dirty="0">
-                <a:latin typeface="Lucida Console" panose="020B0609040504020204" pitchFamily="49" charset="0"/>
-              </a:rPr>
-              <a:t>r = </a:t>
-            </a:r>
-            <a:r>
-              <a:rPr lang="en-US" sz="2800" dirty="0" err="1">
-                <a:latin typeface="Lucida Console" panose="020B0609040504020204" pitchFamily="49" charset="0"/>
-              </a:rPr>
-              <a:t>requests.get</a:t>
-            </a:r>
-            <a:r>
-              <a:rPr lang="en-US" sz="2800" dirty="0">
-                <a:latin typeface="Lucida Console" panose="020B0609040504020204" pitchFamily="49" charset="0"/>
-              </a:rPr>
-              <a:t>(</a:t>
-            </a:r>
-            <a:r>
-              <a:rPr lang="en-US" sz="2800" dirty="0" err="1">
-                <a:latin typeface="Lucida Console" panose="020B0609040504020204" pitchFamily="49" charset="0"/>
-              </a:rPr>
-              <a:t>data_url</a:t>
-            </a:r>
-            <a:r>
-              <a:rPr lang="en-US" sz="2800" dirty="0">
-                <a:latin typeface="Lucida Console" panose="020B0609040504020204" pitchFamily="49" charset="0"/>
-              </a:rPr>
-              <a:t>, headers={'token’: </a:t>
-            </a:r>
-            <a:r>
-              <a:rPr lang="en-US" sz="2800" dirty="0" err="1">
-                <a:latin typeface="Lucida Console" panose="020B0609040504020204" pitchFamily="49" charset="0"/>
-              </a:rPr>
-              <a:t>api_key</a:t>
-            </a:r>
-            <a:r>
-              <a:rPr lang="en-US" sz="2800" dirty="0">
-                <a:latin typeface="Lucida Console" panose="020B0609040504020204" pitchFamily="49" charset="0"/>
-              </a:rPr>
-              <a:t>})</a:t>
-            </a:r>
-          </a:p>
-        </p:txBody>
-      </p:sp>
+      </p:pic>
     </p:spTree>
     <p:extLst>
       <p:ext uri="{BB962C8B-B14F-4D97-AF65-F5344CB8AC3E}">
-        <p14:creationId xmlns:p14="http://schemas.microsoft.com/office/powerpoint/2010/main" val="964416389"/>
+        <p14:creationId xmlns:p14="http://schemas.microsoft.com/office/powerpoint/2010/main" val="4027279288"/>
       </p:ext>
     </p:extLst>
   </p:cSld>
@@ -4488,7 +6347,7 @@
           <p:cNvPr id="2" name="Title 1">
             <a:extLst>
               <a:ext uri="{FF2B5EF4-FFF2-40B4-BE49-F238E27FC236}">
-                <a16:creationId xmlns:a16="http://schemas.microsoft.com/office/drawing/2014/main" id="{68DCDD46-C769-4F86-9CD3-E15B0F2C1F87}"/>
+                <a16:creationId xmlns:a16="http://schemas.microsoft.com/office/drawing/2014/main" id="{41E565C5-7FDF-4295-80A7-9E5741B61C36}"/>
               </a:ext>
             </a:extLst>
           </p:cNvPr>
@@ -4505,18 +6364,129 @@
           <a:lstStyle/>
           <a:p>
             <a:r>
-              <a:rPr lang="en-US" dirty="0"/>
-              <a:t>Requests Python Package</a:t>
-            </a:r>
+              <a:rPr lang="en-US" dirty="0">
+                <a:cs typeface="Calibri Light"/>
+              </a:rPr>
+              <a:t>Web-Technology: Scraping 'Easy' Example </a:t>
+            </a:r>
+            <a:endParaRPr lang="en-US" dirty="0"/>
+          </a:p>
+        </p:txBody>
+      </p:sp>
+      <p:sp>
+        <p:nvSpPr>
+          <p:cNvPr id="3" name="Content Placeholder 2">
+            <a:extLst>
+              <a:ext uri="{FF2B5EF4-FFF2-40B4-BE49-F238E27FC236}">
+                <a16:creationId xmlns:a16="http://schemas.microsoft.com/office/drawing/2014/main" id="{111CA1D3-AF5C-402B-8900-B354B090D6C1}"/>
+              </a:ext>
+            </a:extLst>
+          </p:cNvPr>
+          <p:cNvSpPr>
+            <a:spLocks noGrp="1"/>
+          </p:cNvSpPr>
+          <p:nvPr>
+            <p:ph idx="1"/>
+          </p:nvPr>
+        </p:nvSpPr>
+        <p:spPr>
+          <a:xfrm>
+            <a:off x="838200" y="1825625"/>
+            <a:ext cx="10515600" cy="4825790"/>
+          </a:xfrm>
+        </p:spPr>
+        <p:txBody>
+          <a:bodyPr vert="horz" lIns="91440" tIns="45720" rIns="91440" bIns="45720" rtlCol="0" anchor="t">
+            <a:normAutofit/>
+          </a:bodyPr>
+          <a:lstStyle/>
+          <a:p>
+            <a:pPr marL="0" indent="0">
+              <a:buNone/>
+            </a:pPr>
+            <a:r>
+              <a:rPr lang="en-US" b="1" dirty="0">
+                <a:latin typeface="Courier New"/>
+                <a:cs typeface="Courier New"/>
+              </a:rPr>
+              <a:t>&gt;&gt;&gt; </a:t>
+            </a:r>
+            <a:r>
+              <a:rPr lang="en-US" b="1" dirty="0" err="1">
+                <a:latin typeface="Courier New"/>
+                <a:cs typeface="Courier New"/>
+              </a:rPr>
+              <a:t>df</a:t>
+            </a:r>
+            <a:r>
+              <a:rPr lang="en-US" b="1" dirty="0">
+                <a:latin typeface="Courier New"/>
+                <a:cs typeface="Courier New"/>
+              </a:rPr>
+              <a:t> = Pandas </a:t>
+            </a:r>
+            <a:r>
+              <a:rPr lang="en-US" b="1" dirty="0" err="1">
+                <a:latin typeface="Courier New"/>
+                <a:cs typeface="Courier New"/>
+              </a:rPr>
+              <a:t>read_html</a:t>
+            </a:r>
+            <a:r>
+              <a:rPr lang="en-US" b="1" dirty="0">
+                <a:latin typeface="Courier New"/>
+                <a:cs typeface="Courier New"/>
+              </a:rPr>
+              <a:t>('</a:t>
+            </a:r>
+            <a:r>
+              <a:rPr lang="en-US" b="1" dirty="0" err="1">
+                <a:latin typeface="Courier New"/>
+                <a:cs typeface="Courier New"/>
+              </a:rPr>
+              <a:t>url</a:t>
+            </a:r>
+            <a:r>
+              <a:rPr lang="en-US" b="1" dirty="0">
+                <a:latin typeface="Courier New"/>
+                <a:cs typeface="Courier New"/>
+              </a:rPr>
+              <a:t>')</a:t>
+            </a:r>
+            <a:endParaRPr lang="en-US" dirty="0"/>
+          </a:p>
+          <a:p>
+            <a:pPr marL="0" indent="0">
+              <a:buNone/>
+            </a:pPr>
+            <a:endParaRPr lang="en-US" b="1" dirty="0">
+              <a:latin typeface="Courier New"/>
+              <a:cs typeface="Courier New"/>
+            </a:endParaRPr>
+          </a:p>
+          <a:p>
+            <a:pPr marL="0" indent="0">
+              <a:buNone/>
+            </a:pPr>
+            <a:endParaRPr lang="en-US" b="1" dirty="0">
+              <a:latin typeface="Courier New"/>
+              <a:cs typeface="Courier New"/>
+            </a:endParaRPr>
+          </a:p>
+          <a:p>
+            <a:endParaRPr lang="en-US" dirty="0">
+              <a:latin typeface="Courier New"/>
+              <a:cs typeface="Courier New"/>
+            </a:endParaRPr>
           </a:p>
         </p:txBody>
       </p:sp>
       <p:pic>
         <p:nvPicPr>
-          <p:cNvPr id="9" name="Picture 8">
-            <a:extLst>
-              <a:ext uri="{FF2B5EF4-FFF2-40B4-BE49-F238E27FC236}">
-                <a16:creationId xmlns:a16="http://schemas.microsoft.com/office/drawing/2014/main" id="{49FFA1EA-10A1-4A02-9BAE-EEBA7D497541}"/>
+          <p:cNvPr id="4" name="Picture 4" descr="A screenshot of a cell phone&#10;&#10;Description generated with very high confidence">
+            <a:extLst>
+              <a:ext uri="{FF2B5EF4-FFF2-40B4-BE49-F238E27FC236}">
+                <a16:creationId xmlns:a16="http://schemas.microsoft.com/office/drawing/2014/main" id="{0FEFA7CC-46A2-46EC-A959-1817A87BE408}"/>
               </a:ext>
             </a:extLst>
           </p:cNvPr>
@@ -4533,20 +6503,387 @@
         </p:blipFill>
         <p:spPr>
           <a:xfrm>
-            <a:off x="620767" y="1475389"/>
-            <a:ext cx="10172700" cy="2057400"/>
+            <a:off x="1101305" y="2481546"/>
+            <a:ext cx="9658709" cy="2800681"/>
           </a:xfrm>
           <a:prstGeom prst="rect">
             <a:avLst/>
           </a:prstGeom>
         </p:spPr>
       </p:pic>
+      <p:sp>
+        <p:nvSpPr>
+          <p:cNvPr id="6" name="TextBox 5">
+            <a:extLst>
+              <a:ext uri="{FF2B5EF4-FFF2-40B4-BE49-F238E27FC236}">
+                <a16:creationId xmlns:a16="http://schemas.microsoft.com/office/drawing/2014/main" id="{099E0B8D-6B0C-4FFB-8F30-0B56354AD751}"/>
+              </a:ext>
+            </a:extLst>
+          </p:cNvPr>
+          <p:cNvSpPr txBox="1"/>
+          <p:nvPr/>
+        </p:nvSpPr>
+        <p:spPr>
+          <a:xfrm>
+            <a:off x="4724400" y="3193211"/>
+            <a:ext cx="2743200" cy="457200"/>
+          </a:xfrm>
+          <a:prstGeom prst="rect">
+            <a:avLst/>
+          </a:prstGeom>
+        </p:spPr>
+        <p:txBody>
+          <a:bodyPr rot="0" spcFirstLastPara="0" vertOverflow="overflow" horzOverflow="overflow" vert="horz" wrap="square" lIns="91440" tIns="45720" rIns="91440" bIns="45720" numCol="1" spcCol="0" rtlCol="0" fromWordArt="0" anchor="t" anchorCtr="0" forceAA="0" compatLnSpc="1">
+            <a:prstTxWarp prst="textNoShape">
+              <a:avLst/>
+            </a:prstTxWarp>
+            <a:spAutoFit/>
+          </a:bodyPr>
+          <a:lstStyle/>
+          <a:p>
+            <a:pPr algn="ctr"/>
+            <a:r>
+              <a:rPr lang="en-US"/>
+              <a:t>Click to add text</a:t>
+            </a:r>
+          </a:p>
+        </p:txBody>
+      </p:sp>
+      <p:sp>
+        <p:nvSpPr>
+          <p:cNvPr id="7" name="TextBox 6">
+            <a:extLst>
+              <a:ext uri="{FF2B5EF4-FFF2-40B4-BE49-F238E27FC236}">
+                <a16:creationId xmlns:a16="http://schemas.microsoft.com/office/drawing/2014/main" id="{A6AB087E-A582-4C68-93BA-7376DC9836E3}"/>
+              </a:ext>
+            </a:extLst>
+          </p:cNvPr>
+          <p:cNvSpPr txBox="1"/>
+          <p:nvPr/>
+        </p:nvSpPr>
+        <p:spPr>
+          <a:xfrm>
+            <a:off x="1101305" y="5651739"/>
+            <a:ext cx="9658709" cy="830997"/>
+          </a:xfrm>
+          <a:prstGeom prst="rect">
+            <a:avLst/>
+          </a:prstGeom>
+        </p:spPr>
+        <p:style>
+          <a:lnRef idx="2">
+            <a:schemeClr val="accent5"/>
+          </a:lnRef>
+          <a:fillRef idx="1">
+            <a:schemeClr val="lt1"/>
+          </a:fillRef>
+          <a:effectRef idx="0">
+            <a:schemeClr val="accent5"/>
+          </a:effectRef>
+          <a:fontRef idx="minor">
+            <a:schemeClr val="dk1"/>
+          </a:fontRef>
+        </p:style>
+        <p:txBody>
+          <a:bodyPr rot="0" spcFirstLastPara="0" vertOverflow="overflow" horzOverflow="overflow" vert="horz" wrap="square" lIns="91440" tIns="45720" rIns="91440" bIns="45720" numCol="1" spcCol="0" rtlCol="0" fromWordArt="0" anchor="t" anchorCtr="0" forceAA="0" compatLnSpc="1">
+            <a:prstTxWarp prst="textNoShape">
+              <a:avLst/>
+            </a:prstTxWarp>
+            <a:spAutoFit/>
+          </a:bodyPr>
+          <a:lstStyle/>
+          <a:p>
+            <a:pPr marL="285750" indent="-285750">
+              <a:buFont typeface="Arial"/>
+              <a:buChar char="•"/>
+            </a:pPr>
+            <a:r>
+              <a:rPr lang="en-US" sz="2400" dirty="0">
+                <a:cs typeface="Calibri"/>
+              </a:rPr>
+              <a:t>Nice!! </a:t>
+            </a:r>
+            <a:r>
+              <a:rPr lang="en-US" sz="2000" dirty="0">
+                <a:latin typeface="Courier New"/>
+                <a:cs typeface="Courier New"/>
+              </a:rPr>
+              <a:t>Pandas </a:t>
+            </a:r>
+            <a:r>
+              <a:rPr lang="en-US" sz="2000" dirty="0" err="1">
+                <a:latin typeface="Courier New"/>
+                <a:cs typeface="Courier New"/>
+              </a:rPr>
+              <a:t>read_html</a:t>
+            </a:r>
+            <a:r>
+              <a:rPr lang="en-US" sz="2000" dirty="0">
+                <a:latin typeface="Courier New"/>
+                <a:cs typeface="Courier New"/>
+              </a:rPr>
+              <a:t>()</a:t>
+            </a:r>
+            <a:r>
+              <a:rPr lang="en-US" sz="2400" dirty="0">
+                <a:cs typeface="Calibri"/>
+              </a:rPr>
+              <a:t>was 'smart'...we immediately got into a </a:t>
+            </a:r>
+            <a:r>
+              <a:rPr lang="en-US" sz="2400" dirty="0" err="1">
+                <a:cs typeface="Calibri"/>
+              </a:rPr>
+              <a:t>dataframe</a:t>
+            </a:r>
+            <a:r>
+              <a:rPr lang="en-US" sz="2400" dirty="0">
+                <a:cs typeface="Calibri"/>
+              </a:rPr>
+              <a:t> form. </a:t>
+            </a:r>
+            <a:endParaRPr lang="en-US" sz="2400" i="1" dirty="0">
+              <a:cs typeface="Calibri"/>
+            </a:endParaRPr>
+          </a:p>
+        </p:txBody>
+      </p:sp>
+    </p:spTree>
+    <p:extLst>
+      <p:ext uri="{BB962C8B-B14F-4D97-AF65-F5344CB8AC3E}">
+        <p14:creationId xmlns:p14="http://schemas.microsoft.com/office/powerpoint/2010/main" val="3803875101"/>
+      </p:ext>
+    </p:extLst>
+  </p:cSld>
+  <p:clrMapOvr>
+    <a:masterClrMapping/>
+  </p:clrMapOvr>
+</p:sld>
+</file>
+
+<file path=ppt/slides/slide9.xml><?xml version="1.0" encoding="utf-8"?>
+<p:sld xmlns:a="http://schemas.openxmlformats.org/drawingml/2006/main" xmlns:r="http://schemas.openxmlformats.org/officeDocument/2006/relationships" xmlns:p="http://schemas.openxmlformats.org/presentationml/2006/main">
+  <p:cSld>
+    <p:spTree>
+      <p:nvGrpSpPr>
+        <p:cNvPr id="1" name=""/>
+        <p:cNvGrpSpPr/>
+        <p:nvPr/>
+      </p:nvGrpSpPr>
+      <p:grpSpPr>
+        <a:xfrm>
+          <a:off x="0" y="0"/>
+          <a:ext cx="0" cy="0"/>
+          <a:chOff x="0" y="0"/>
+          <a:chExt cx="0" cy="0"/>
+        </a:xfrm>
+      </p:grpSpPr>
+      <p:sp>
+        <p:nvSpPr>
+          <p:cNvPr id="2" name="Title 1">
+            <a:extLst>
+              <a:ext uri="{FF2B5EF4-FFF2-40B4-BE49-F238E27FC236}">
+                <a16:creationId xmlns:a16="http://schemas.microsoft.com/office/drawing/2014/main" id="{CDA4D82C-C8C5-477C-A085-CA7CF7BD824E}"/>
+              </a:ext>
+            </a:extLst>
+          </p:cNvPr>
+          <p:cNvSpPr>
+            <a:spLocks noGrp="1"/>
+          </p:cNvSpPr>
+          <p:nvPr>
+            <p:ph type="title"/>
+          </p:nvPr>
+        </p:nvSpPr>
+        <p:spPr/>
+        <p:txBody>
+          <a:bodyPr/>
+          <a:lstStyle/>
+          <a:p>
+            <a:r>
+              <a:rPr lang="en-US" dirty="0">
+                <a:cs typeface="Calibri Light"/>
+              </a:rPr>
+              <a:t>Web-Technology: Scraping 'Hard' Example</a:t>
+            </a:r>
+            <a:endParaRPr lang="en-US" dirty="0"/>
+          </a:p>
+        </p:txBody>
+      </p:sp>
+      <p:sp>
+        <p:nvSpPr>
+          <p:cNvPr id="3" name="Content Placeholder 2">
+            <a:extLst>
+              <a:ext uri="{FF2B5EF4-FFF2-40B4-BE49-F238E27FC236}">
+                <a16:creationId xmlns:a16="http://schemas.microsoft.com/office/drawing/2014/main" id="{5887C4ED-735F-4EC3-A3A5-09CF39D62D5E}"/>
+              </a:ext>
+            </a:extLst>
+          </p:cNvPr>
+          <p:cNvSpPr>
+            <a:spLocks noGrp="1"/>
+          </p:cNvSpPr>
+          <p:nvPr>
+            <p:ph idx="1"/>
+          </p:nvPr>
+        </p:nvSpPr>
+        <p:spPr/>
+        <p:txBody>
+          <a:bodyPr vert="horz" lIns="91440" tIns="45720" rIns="91440" bIns="45720" rtlCol="0" anchor="t">
+            <a:normAutofit/>
+          </a:bodyPr>
+          <a:lstStyle/>
+          <a:p>
+            <a:r>
+              <a:rPr lang="en-US" dirty="0">
+                <a:cs typeface="Calibri"/>
+              </a:rPr>
+              <a:t>Former scenario easy, tabular data at the forefront</a:t>
+            </a:r>
+          </a:p>
+          <a:p>
+            <a:r>
+              <a:rPr lang="en-US" dirty="0">
+                <a:cs typeface="Calibri"/>
+              </a:rPr>
+              <a:t>But...</a:t>
+            </a:r>
+          </a:p>
+          <a:p>
+            <a:pPr lvl="1"/>
+            <a:r>
+              <a:rPr lang="en-US" dirty="0">
+                <a:cs typeface="Calibri"/>
+              </a:rPr>
+              <a:t>What if tabular data </a:t>
+            </a:r>
+            <a:r>
+              <a:rPr lang="en-US" i="1" dirty="0">
+                <a:cs typeface="Calibri"/>
+              </a:rPr>
+              <a:t>nested</a:t>
+            </a:r>
+            <a:r>
+              <a:rPr lang="en-US" dirty="0">
+                <a:cs typeface="Calibri"/>
+              </a:rPr>
+              <a:t> deep inside an HTML webpage's DOM structure?</a:t>
+            </a:r>
+          </a:p>
+          <a:p>
+            <a:pPr lvl="1"/>
+            <a:r>
+              <a:rPr lang="en-US" dirty="0">
+                <a:cs typeface="Calibri"/>
+              </a:rPr>
+              <a:t>Pandas no longer so useful...</a:t>
+            </a:r>
+          </a:p>
+          <a:p>
+            <a:r>
+              <a:rPr lang="en-US" dirty="0" err="1">
+                <a:latin typeface="Courier New"/>
+                <a:cs typeface="Courier New"/>
+              </a:rPr>
+              <a:t>Pd.read_html</a:t>
+            </a:r>
+            <a:r>
+              <a:rPr lang="en-US" dirty="0">
+                <a:latin typeface="Courier New"/>
+                <a:cs typeface="Courier New"/>
+              </a:rPr>
+              <a:t>('</a:t>
+            </a:r>
+            <a:r>
+              <a:rPr lang="en-US" dirty="0" err="1">
+                <a:latin typeface="Courier New"/>
+                <a:cs typeface="Courier New"/>
+              </a:rPr>
+              <a:t>url</a:t>
+            </a:r>
+            <a:r>
+              <a:rPr lang="en-US" dirty="0">
+                <a:latin typeface="Courier New"/>
+                <a:cs typeface="Courier New"/>
+              </a:rPr>
+              <a:t>')</a:t>
+            </a:r>
+            <a:r>
+              <a:rPr lang="en-US" dirty="0">
+                <a:latin typeface="Calibri"/>
+                <a:cs typeface="Calibri"/>
+              </a:rPr>
+              <a:t> is no longer so smart</a:t>
+            </a:r>
+          </a:p>
+          <a:p>
+            <a:pPr marL="0" indent="0">
+              <a:buNone/>
+            </a:pPr>
+            <a:endParaRPr lang="en-US" b="1" dirty="0">
+              <a:cs typeface="Calibri"/>
+            </a:endParaRPr>
+          </a:p>
+          <a:p>
+            <a:endParaRPr lang="en-US" dirty="0">
+              <a:cs typeface="Calibri"/>
+            </a:endParaRPr>
+          </a:p>
+          <a:p>
+            <a:pPr marL="0" indent="0">
+              <a:buNone/>
+            </a:pPr>
+            <a:endParaRPr lang="en-US" dirty="0">
+              <a:cs typeface="Calibri"/>
+            </a:endParaRPr>
+          </a:p>
+          <a:p>
+            <a:r>
+              <a:rPr lang="en-US" dirty="0">
+                <a:cs typeface="Calibri"/>
+              </a:rPr>
+              <a:t>Therefore, need more </a:t>
+            </a:r>
+            <a:r>
+              <a:rPr lang="en-US" i="1" dirty="0">
+                <a:cs typeface="Calibri"/>
+              </a:rPr>
+              <a:t>granular</a:t>
+            </a:r>
+            <a:r>
+              <a:rPr lang="en-US" dirty="0">
+                <a:cs typeface="Calibri"/>
+              </a:rPr>
+              <a:t> web-scraping methods</a:t>
+            </a:r>
+          </a:p>
+          <a:p>
+            <a:pPr marL="0" indent="0">
+              <a:buNone/>
+            </a:pPr>
+            <a:endParaRPr lang="en-US" dirty="0">
+              <a:cs typeface="Calibri"/>
+            </a:endParaRPr>
+          </a:p>
+          <a:p>
+            <a:pPr marL="457200" lvl="1" indent="0">
+              <a:buNone/>
+            </a:pPr>
+            <a:endParaRPr lang="en-US" dirty="0">
+              <a:cs typeface="Calibri"/>
+            </a:endParaRPr>
+          </a:p>
+          <a:p>
+            <a:endParaRPr lang="en-US" dirty="0">
+              <a:cs typeface="Calibri"/>
+            </a:endParaRPr>
+          </a:p>
+        </p:txBody>
+      </p:sp>
       <p:pic>
         <p:nvPicPr>
-          <p:cNvPr id="10" name="Picture 9">
-            <a:extLst>
-              <a:ext uri="{FF2B5EF4-FFF2-40B4-BE49-F238E27FC236}">
-                <a16:creationId xmlns:a16="http://schemas.microsoft.com/office/drawing/2014/main" id="{9B505260-7143-4F16-A396-7A6131CECDB4}"/>
+          <p:cNvPr id="4" name="Picture 4">
+            <a:extLst>
+              <a:ext uri="{FF2B5EF4-FFF2-40B4-BE49-F238E27FC236}">
+                <a16:creationId xmlns:a16="http://schemas.microsoft.com/office/drawing/2014/main" id="{DC0D2234-0252-4141-BBD7-A6E7A94B1D9C}"/>
               </a:ext>
             </a:extLst>
           </p:cNvPr>
@@ -4556,15 +6893,15 @@
           <p:nvPr/>
         </p:nvPicPr>
         <p:blipFill>
-          <a:blip r:embed="rId3"/>
+          <a:blip r:embed="rId2"/>
           <a:stretch>
             <a:fillRect/>
           </a:stretch>
         </p:blipFill>
         <p:spPr>
           <a:xfrm>
-            <a:off x="4783192" y="2632787"/>
-            <a:ext cx="6010275" cy="3486150"/>
+            <a:off x="8232472" y="3322553"/>
+            <a:ext cx="2124974" cy="2211346"/>
           </a:xfrm>
           <a:prstGeom prst="rect">
             <a:avLst/>
@@ -4574,7 +6911,7 @@
     </p:spTree>
     <p:extLst>
       <p:ext uri="{BB962C8B-B14F-4D97-AF65-F5344CB8AC3E}">
-        <p14:creationId xmlns:p14="http://schemas.microsoft.com/office/powerpoint/2010/main" val="4253956594"/>
+        <p14:creationId xmlns:p14="http://schemas.microsoft.com/office/powerpoint/2010/main" val="2090217696"/>
       </p:ext>
     </p:extLst>
   </p:cSld>

</xml_diff>

<commit_message>
reorder the pros/cons slides together, added conclusion slide
</commit_message>
<xml_diff>
--- a/doc/design/TechnologyReview.pptx
+++ b/doc/design/TechnologyReview.pptx
@@ -8,19 +8,20 @@
     <p:sldId id="488" r:id="rId2"/>
     <p:sldId id="489" r:id="rId3"/>
     <p:sldId id="491" r:id="rId4"/>
-    <p:sldId id="494" r:id="rId5"/>
-    <p:sldId id="493" r:id="rId6"/>
-    <p:sldId id="495" r:id="rId7"/>
-    <p:sldId id="497" r:id="rId8"/>
-    <p:sldId id="498" r:id="rId9"/>
-    <p:sldId id="499" r:id="rId10"/>
-    <p:sldId id="501" r:id="rId11"/>
-    <p:sldId id="503" r:id="rId12"/>
-    <p:sldId id="504" r:id="rId13"/>
-    <p:sldId id="500" r:id="rId14"/>
-    <p:sldId id="505" r:id="rId15"/>
+    <p:sldId id="497" r:id="rId5"/>
+    <p:sldId id="498" r:id="rId6"/>
+    <p:sldId id="499" r:id="rId7"/>
+    <p:sldId id="501" r:id="rId8"/>
+    <p:sldId id="503" r:id="rId9"/>
+    <p:sldId id="504" r:id="rId10"/>
+    <p:sldId id="500" r:id="rId11"/>
+    <p:sldId id="505" r:id="rId12"/>
+    <p:sldId id="494" r:id="rId13"/>
+    <p:sldId id="493" r:id="rId14"/>
+    <p:sldId id="495" r:id="rId15"/>
     <p:sldId id="492" r:id="rId16"/>
     <p:sldId id="496" r:id="rId17"/>
+    <p:sldId id="506" r:id="rId18"/>
   </p:sldIdLst>
   <p:sldSz cx="12192000" cy="6858000"/>
   <p:notesSz cx="6858000" cy="9144000"/>
@@ -3754,6 +3755,2458 @@
       </p:grpSpPr>
       <p:sp>
         <p:nvSpPr>
+          <p:cNvPr id="2" name="Title 1">
+            <a:extLst>
+              <a:ext uri="{FF2B5EF4-FFF2-40B4-BE49-F238E27FC236}">
+                <a16:creationId xmlns:a16="http://schemas.microsoft.com/office/drawing/2014/main" id="{EFF362B6-8BB8-4FE2-A1A8-E203F08CF15D}"/>
+              </a:ext>
+            </a:extLst>
+          </p:cNvPr>
+          <p:cNvSpPr>
+            <a:spLocks noGrp="1"/>
+          </p:cNvSpPr>
+          <p:nvPr>
+            <p:ph type="title"/>
+          </p:nvPr>
+        </p:nvSpPr>
+        <p:spPr/>
+        <p:txBody>
+          <a:bodyPr/>
+          <a:lstStyle/>
+          <a:p>
+            <a:r>
+              <a:rPr lang="en-US" dirty="0" err="1">
+                <a:cs typeface="Calibri Light"/>
+              </a:rPr>
+              <a:t>BeautifulSoup</a:t>
+            </a:r>
+            <a:r>
+              <a:rPr lang="en-US" dirty="0">
+                <a:cs typeface="Calibri Light"/>
+              </a:rPr>
+              <a:t> + Requests </a:t>
+            </a:r>
+            <a:endParaRPr lang="en-US" dirty="0" err="1"/>
+          </a:p>
+        </p:txBody>
+      </p:sp>
+      <p:sp>
+        <p:nvSpPr>
+          <p:cNvPr id="3" name="Content Placeholder 2">
+            <a:extLst>
+              <a:ext uri="{FF2B5EF4-FFF2-40B4-BE49-F238E27FC236}">
+                <a16:creationId xmlns:a16="http://schemas.microsoft.com/office/drawing/2014/main" id="{5B991963-6DFE-4282-9FC4-34A112F6AADF}"/>
+              </a:ext>
+            </a:extLst>
+          </p:cNvPr>
+          <p:cNvSpPr>
+            <a:spLocks noGrp="1"/>
+          </p:cNvSpPr>
+          <p:nvPr>
+            <p:ph idx="1"/>
+          </p:nvPr>
+        </p:nvSpPr>
+        <p:spPr>
+          <a:xfrm>
+            <a:off x="191219" y="1653097"/>
+            <a:ext cx="4937185" cy="3718734"/>
+          </a:xfrm>
+        </p:spPr>
+        <p:txBody>
+          <a:bodyPr vert="horz" lIns="91440" tIns="45720" rIns="91440" bIns="45720" rtlCol="0" anchor="t">
+            <a:normAutofit/>
+          </a:bodyPr>
+          <a:lstStyle/>
+          <a:p>
+            <a:r>
+              <a:rPr lang="en-US" sz="2000" dirty="0">
+                <a:cs typeface="Calibri"/>
+              </a:rPr>
+              <a:t>Way to circumvent: </a:t>
+            </a:r>
+          </a:p>
+          <a:p>
+            <a:pPr lvl="1"/>
+            <a:r>
+              <a:rPr lang="en-US" sz="2000" i="1" dirty="0" err="1">
+                <a:latin typeface="Courier New"/>
+                <a:cs typeface="Courier New"/>
+              </a:rPr>
+              <a:t>BeautifulSoup</a:t>
+            </a:r>
+            <a:r>
+              <a:rPr lang="en-US" sz="2000" i="1" dirty="0">
+                <a:latin typeface="Courier New"/>
+                <a:cs typeface="Courier New"/>
+              </a:rPr>
+              <a:t> + Requests </a:t>
+            </a:r>
+          </a:p>
+          <a:p>
+            <a:r>
+              <a:rPr lang="en-US" sz="2000" dirty="0">
+                <a:latin typeface="Calibri"/>
+                <a:cs typeface="Calibri"/>
+              </a:rPr>
+              <a:t>A happy medium between direct web-scraping tools and the ease and simplicity of </a:t>
+            </a:r>
+            <a:r>
+              <a:rPr lang="en-US" sz="2000" dirty="0">
+                <a:latin typeface="Courier New"/>
+                <a:cs typeface="Courier New"/>
+              </a:rPr>
+              <a:t>pandas</a:t>
+            </a:r>
+            <a:endParaRPr lang="en-US" sz="2000" dirty="0">
+              <a:latin typeface="Calibri"/>
+              <a:cs typeface="Calibri"/>
+            </a:endParaRPr>
+          </a:p>
+          <a:p>
+            <a:r>
+              <a:rPr lang="en-US" sz="2000" dirty="0">
+                <a:latin typeface="Calibri"/>
+                <a:cs typeface="Calibri"/>
+              </a:rPr>
+              <a:t>Can easily interface with </a:t>
+            </a:r>
+            <a:r>
+              <a:rPr lang="en-US" sz="2000" dirty="0">
+                <a:latin typeface="Courier New"/>
+                <a:cs typeface="Courier New"/>
+              </a:rPr>
+              <a:t>pandas</a:t>
+            </a:r>
+            <a:r>
+              <a:rPr lang="en-US" sz="2000" dirty="0">
+                <a:latin typeface="Calibri"/>
+                <a:cs typeface="Calibri"/>
+              </a:rPr>
+              <a:t> functions</a:t>
+            </a:r>
+            <a:endParaRPr lang="en-US" sz="2000" dirty="0">
+              <a:cs typeface="Calibri"/>
+            </a:endParaRPr>
+          </a:p>
+          <a:p>
+            <a:endParaRPr lang="en-US" sz="2000" dirty="0">
+              <a:latin typeface="Calibri"/>
+              <a:cs typeface="Calibri"/>
+            </a:endParaRPr>
+          </a:p>
+          <a:p>
+            <a:endParaRPr lang="en-US" sz="2000" dirty="0">
+              <a:latin typeface="Calibri"/>
+              <a:cs typeface="Calibri"/>
+            </a:endParaRPr>
+          </a:p>
+        </p:txBody>
+      </p:sp>
+      <p:pic>
+        <p:nvPicPr>
+          <p:cNvPr id="4" name="Picture 4" descr="A screenshot of a cell phone&#10;&#10;Description generated with very high confidence">
+            <a:extLst>
+              <a:ext uri="{FF2B5EF4-FFF2-40B4-BE49-F238E27FC236}">
+                <a16:creationId xmlns:a16="http://schemas.microsoft.com/office/drawing/2014/main" id="{91A894D3-3164-403C-A17A-714999645715}"/>
+              </a:ext>
+            </a:extLst>
+          </p:cNvPr>
+          <p:cNvPicPr>
+            <a:picLocks noChangeAspect="1"/>
+          </p:cNvPicPr>
+          <p:nvPr/>
+        </p:nvPicPr>
+        <p:blipFill>
+          <a:blip r:embed="rId2"/>
+          <a:stretch>
+            <a:fillRect/>
+          </a:stretch>
+        </p:blipFill>
+        <p:spPr>
+          <a:xfrm>
+            <a:off x="5141344" y="1571775"/>
+            <a:ext cx="6912633" cy="4807127"/>
+          </a:xfrm>
+          <a:prstGeom prst="rect">
+            <a:avLst/>
+          </a:prstGeom>
+        </p:spPr>
+      </p:pic>
+    </p:spTree>
+    <p:extLst>
+      <p:ext uri="{BB962C8B-B14F-4D97-AF65-F5344CB8AC3E}">
+        <p14:creationId xmlns:p14="http://schemas.microsoft.com/office/powerpoint/2010/main" val="2278662049"/>
+      </p:ext>
+    </p:extLst>
+  </p:cSld>
+  <p:clrMapOvr>
+    <a:masterClrMapping/>
+  </p:clrMapOvr>
+</p:sld>
+</file>
+
+<file path=ppt/slides/slide11.xml><?xml version="1.0" encoding="utf-8"?>
+<p:sld xmlns:a="http://schemas.openxmlformats.org/drawingml/2006/main" xmlns:r="http://schemas.openxmlformats.org/officeDocument/2006/relationships" xmlns:p="http://schemas.openxmlformats.org/presentationml/2006/main">
+  <p:cSld>
+    <p:spTree>
+      <p:nvGrpSpPr>
+        <p:cNvPr id="1" name=""/>
+        <p:cNvGrpSpPr/>
+        <p:nvPr/>
+      </p:nvGrpSpPr>
+      <p:grpSpPr>
+        <a:xfrm>
+          <a:off x="0" y="0"/>
+          <a:ext cx="0" cy="0"/>
+          <a:chOff x="0" y="0"/>
+          <a:chExt cx="0" cy="0"/>
+        </a:xfrm>
+      </p:grpSpPr>
+      <p:sp>
+        <p:nvSpPr>
+          <p:cNvPr id="2" name="Title 1">
+            <a:extLst>
+              <a:ext uri="{FF2B5EF4-FFF2-40B4-BE49-F238E27FC236}">
+                <a16:creationId xmlns:a16="http://schemas.microsoft.com/office/drawing/2014/main" id="{425F10A8-F4A3-4B27-AF9B-683371A95C32}"/>
+              </a:ext>
+            </a:extLst>
+          </p:cNvPr>
+          <p:cNvSpPr>
+            <a:spLocks noGrp="1"/>
+          </p:cNvSpPr>
+          <p:nvPr>
+            <p:ph type="title"/>
+          </p:nvPr>
+        </p:nvSpPr>
+        <p:spPr/>
+        <p:txBody>
+          <a:bodyPr/>
+          <a:lstStyle/>
+          <a:p>
+            <a:r>
+              <a:rPr lang="en-US" dirty="0">
+                <a:cs typeface="Calibri Light"/>
+              </a:rPr>
+              <a:t>An example workflow...</a:t>
+            </a:r>
+            <a:endParaRPr lang="en-US" dirty="0"/>
+          </a:p>
+        </p:txBody>
+      </p:sp>
+      <p:sp>
+        <p:nvSpPr>
+          <p:cNvPr id="3" name="Content Placeholder 2">
+            <a:extLst>
+              <a:ext uri="{FF2B5EF4-FFF2-40B4-BE49-F238E27FC236}">
+                <a16:creationId xmlns:a16="http://schemas.microsoft.com/office/drawing/2014/main" id="{689E6637-D705-43A0-B34B-8FF23FC1E3CC}"/>
+              </a:ext>
+            </a:extLst>
+          </p:cNvPr>
+          <p:cNvSpPr>
+            <a:spLocks noGrp="1"/>
+          </p:cNvSpPr>
+          <p:nvPr>
+            <p:ph idx="1"/>
+          </p:nvPr>
+        </p:nvSpPr>
+        <p:spPr/>
+        <p:txBody>
+          <a:bodyPr vert="horz" lIns="91440" tIns="45720" rIns="91440" bIns="45720" rtlCol="0" anchor="t">
+            <a:normAutofit lnSpcReduction="10000"/>
+          </a:bodyPr>
+          <a:lstStyle/>
+          <a:p>
+            <a:r>
+              <a:rPr lang="en-US" sz="3600" dirty="0">
+                <a:cs typeface="Calibri"/>
+              </a:rPr>
+              <a:t>Requests</a:t>
+            </a:r>
+            <a:endParaRPr lang="en-US" dirty="0"/>
+          </a:p>
+          <a:p>
+            <a:pPr lvl="1"/>
+            <a:r>
+              <a:rPr lang="en-US" dirty="0">
+                <a:cs typeface="Calibri"/>
+              </a:rPr>
+              <a:t>Interface with web</a:t>
+            </a:r>
+          </a:p>
+          <a:p>
+            <a:endParaRPr lang="en-US" dirty="0">
+              <a:cs typeface="Calibri"/>
+            </a:endParaRPr>
+          </a:p>
+          <a:p>
+            <a:endParaRPr lang="en-US" dirty="0">
+              <a:cs typeface="Calibri"/>
+            </a:endParaRPr>
+          </a:p>
+          <a:p>
+            <a:endParaRPr lang="en-US" dirty="0">
+              <a:cs typeface="Calibri"/>
+            </a:endParaRPr>
+          </a:p>
+          <a:p>
+            <a:endParaRPr lang="en-US" dirty="0">
+              <a:cs typeface="Calibri"/>
+            </a:endParaRPr>
+          </a:p>
+          <a:p>
+            <a:endParaRPr lang="en-US" dirty="0">
+              <a:cs typeface="Calibri"/>
+            </a:endParaRPr>
+          </a:p>
+          <a:p>
+            <a:r>
+              <a:rPr lang="en-US" sz="3600" dirty="0">
+                <a:cs typeface="Calibri"/>
+              </a:rPr>
+              <a:t>Beautiful Soup </a:t>
+            </a:r>
+          </a:p>
+          <a:p>
+            <a:pPr lvl="1"/>
+            <a:r>
+              <a:rPr lang="en-US" dirty="0">
+                <a:cs typeface="Calibri"/>
+              </a:rPr>
+              <a:t>Parse web page</a:t>
+            </a:r>
+          </a:p>
+        </p:txBody>
+      </p:sp>
+      <p:cxnSp>
+        <p:nvCxnSpPr>
+          <p:cNvPr id="4" name="Straight Arrow Connector 3">
+            <a:extLst>
+              <a:ext uri="{FF2B5EF4-FFF2-40B4-BE49-F238E27FC236}">
+                <a16:creationId xmlns:a16="http://schemas.microsoft.com/office/drawing/2014/main" id="{AC738B7D-1574-4285-9C47-7D02AD88EF95}"/>
+              </a:ext>
+            </a:extLst>
+          </p:cNvPr>
+          <p:cNvCxnSpPr/>
+          <p:nvPr/>
+        </p:nvCxnSpPr>
+        <p:spPr>
+          <a:xfrm>
+            <a:off x="4229817" y="2490158"/>
+            <a:ext cx="2524664" cy="1086928"/>
+          </a:xfrm>
+          <a:prstGeom prst="straightConnector1">
+            <a:avLst/>
+          </a:prstGeom>
+          <a:ln w="57150">
+            <a:tailEnd type="triangle"/>
+          </a:ln>
+        </p:spPr>
+        <p:style>
+          <a:lnRef idx="3">
+            <a:schemeClr val="dk1"/>
+          </a:lnRef>
+          <a:fillRef idx="0">
+            <a:schemeClr val="dk1"/>
+          </a:fillRef>
+          <a:effectRef idx="2">
+            <a:schemeClr val="dk1"/>
+          </a:effectRef>
+          <a:fontRef idx="minor">
+            <a:schemeClr val="tx1"/>
+          </a:fontRef>
+        </p:style>
+      </p:cxnSp>
+      <p:cxnSp>
+        <p:nvCxnSpPr>
+          <p:cNvPr id="5" name="Straight Arrow Connector 4">
+            <a:extLst>
+              <a:ext uri="{FF2B5EF4-FFF2-40B4-BE49-F238E27FC236}">
+                <a16:creationId xmlns:a16="http://schemas.microsoft.com/office/drawing/2014/main" id="{D7E634FF-6627-4819-92AC-91195D17F09F}"/>
+              </a:ext>
+            </a:extLst>
+          </p:cNvPr>
+          <p:cNvCxnSpPr>
+            <a:cxnSpLocks/>
+          </p:cNvCxnSpPr>
+          <p:nvPr/>
+        </p:nvCxnSpPr>
+        <p:spPr>
+          <a:xfrm flipV="1">
+            <a:off x="4129176" y="3821500"/>
+            <a:ext cx="2682814" cy="1270958"/>
+          </a:xfrm>
+          <a:prstGeom prst="straightConnector1">
+            <a:avLst/>
+          </a:prstGeom>
+          <a:ln w="57150">
+            <a:tailEnd type="triangle"/>
+          </a:ln>
+        </p:spPr>
+        <p:style>
+          <a:lnRef idx="3">
+            <a:schemeClr val="dk1"/>
+          </a:lnRef>
+          <a:fillRef idx="0">
+            <a:schemeClr val="dk1"/>
+          </a:fillRef>
+          <a:effectRef idx="2">
+            <a:schemeClr val="dk1"/>
+          </a:effectRef>
+          <a:fontRef idx="minor">
+            <a:schemeClr val="tx1"/>
+          </a:fontRef>
+        </p:style>
+      </p:cxnSp>
+      <p:sp>
+        <p:nvSpPr>
+          <p:cNvPr id="6" name="TextBox 5">
+            <a:extLst>
+              <a:ext uri="{FF2B5EF4-FFF2-40B4-BE49-F238E27FC236}">
+                <a16:creationId xmlns:a16="http://schemas.microsoft.com/office/drawing/2014/main" id="{BF647E89-9319-4BD3-BEC5-B86CF275FF0C}"/>
+              </a:ext>
+            </a:extLst>
+          </p:cNvPr>
+          <p:cNvSpPr txBox="1"/>
+          <p:nvPr/>
+        </p:nvSpPr>
+        <p:spPr>
+          <a:xfrm>
+            <a:off x="7059283" y="3358551"/>
+            <a:ext cx="1811549" cy="584775"/>
+          </a:xfrm>
+          <a:prstGeom prst="rect">
+            <a:avLst/>
+          </a:prstGeom>
+        </p:spPr>
+        <p:txBody>
+          <a:bodyPr rot="0" spcFirstLastPara="0" vertOverflow="overflow" horzOverflow="overflow" vert="horz" wrap="square" lIns="91440" tIns="45720" rIns="91440" bIns="45720" numCol="1" spcCol="0" rtlCol="0" fromWordArt="0" anchor="t" anchorCtr="0" forceAA="0" compatLnSpc="1">
+            <a:prstTxWarp prst="textNoShape">
+              <a:avLst/>
+            </a:prstTxWarp>
+            <a:spAutoFit/>
+          </a:bodyPr>
+          <a:lstStyle/>
+          <a:p>
+            <a:pPr>
+              <a:buChar char="•"/>
+            </a:pPr>
+            <a:r>
+              <a:rPr lang="en-US" sz="3200" dirty="0">
+                <a:cs typeface="Arial"/>
+              </a:rPr>
+              <a:t>Pandas  ​</a:t>
+            </a:r>
+            <a:endParaRPr lang="en-US" sz="3200" dirty="0">
+              <a:cs typeface="Calibri"/>
+            </a:endParaRPr>
+          </a:p>
+        </p:txBody>
+      </p:sp>
+    </p:spTree>
+    <p:extLst>
+      <p:ext uri="{BB962C8B-B14F-4D97-AF65-F5344CB8AC3E}">
+        <p14:creationId xmlns:p14="http://schemas.microsoft.com/office/powerpoint/2010/main" val="2520028208"/>
+      </p:ext>
+    </p:extLst>
+  </p:cSld>
+  <p:clrMapOvr>
+    <a:masterClrMapping/>
+  </p:clrMapOvr>
+</p:sld>
+</file>
+
+<file path=ppt/slides/slide12.xml><?xml version="1.0" encoding="utf-8"?>
+<p:sld xmlns:a="http://schemas.openxmlformats.org/drawingml/2006/main" xmlns:r="http://schemas.openxmlformats.org/officeDocument/2006/relationships" xmlns:p="http://schemas.openxmlformats.org/presentationml/2006/main">
+  <p:cSld>
+    <p:spTree>
+      <p:nvGrpSpPr>
+        <p:cNvPr id="1" name=""/>
+        <p:cNvGrpSpPr/>
+        <p:nvPr/>
+      </p:nvGrpSpPr>
+      <p:grpSpPr>
+        <a:xfrm>
+          <a:off x="0" y="0"/>
+          <a:ext cx="0" cy="0"/>
+          <a:chOff x="0" y="0"/>
+          <a:chExt cx="0" cy="0"/>
+        </a:xfrm>
+      </p:grpSpPr>
+      <p:sp>
+        <p:nvSpPr>
+          <p:cNvPr id="2" name="Title 1">
+            <a:extLst>
+              <a:ext uri="{FF2B5EF4-FFF2-40B4-BE49-F238E27FC236}">
+                <a16:creationId xmlns:a16="http://schemas.microsoft.com/office/drawing/2014/main" id="{68DCDD46-C769-4F86-9CD3-E15B0F2C1F87}"/>
+              </a:ext>
+            </a:extLst>
+          </p:cNvPr>
+          <p:cNvSpPr>
+            <a:spLocks noGrp="1"/>
+          </p:cNvSpPr>
+          <p:nvPr>
+            <p:ph type="title"/>
+          </p:nvPr>
+        </p:nvSpPr>
+        <p:spPr/>
+        <p:txBody>
+          <a:bodyPr/>
+          <a:lstStyle/>
+          <a:p>
+            <a:r>
+              <a:rPr lang="en-US" dirty="0"/>
+              <a:t>curl BASH command</a:t>
+            </a:r>
+          </a:p>
+        </p:txBody>
+      </p:sp>
+      <p:sp>
+        <p:nvSpPr>
+          <p:cNvPr id="3" name="Content Placeholder 2">
+            <a:extLst>
+              <a:ext uri="{FF2B5EF4-FFF2-40B4-BE49-F238E27FC236}">
+                <a16:creationId xmlns:a16="http://schemas.microsoft.com/office/drawing/2014/main" id="{B8A5C19E-6E87-4B0E-862A-C77659B25197}"/>
+              </a:ext>
+            </a:extLst>
+          </p:cNvPr>
+          <p:cNvSpPr>
+            <a:spLocks noGrp="1"/>
+          </p:cNvSpPr>
+          <p:nvPr>
+            <p:ph idx="1"/>
+          </p:nvPr>
+        </p:nvSpPr>
+        <p:spPr>
+          <a:xfrm>
+            <a:off x="838200" y="2528047"/>
+            <a:ext cx="10515600" cy="3964828"/>
+          </a:xfrm>
+        </p:spPr>
+        <p:txBody>
+          <a:bodyPr>
+            <a:normAutofit/>
+          </a:bodyPr>
+          <a:lstStyle/>
+          <a:p>
+            <a:r>
+              <a:rPr lang="en-US" dirty="0"/>
+              <a:t>Pros</a:t>
+            </a:r>
+          </a:p>
+          <a:p>
+            <a:pPr lvl="1"/>
+            <a:r>
+              <a:rPr lang="en-US" dirty="0"/>
+              <a:t>Readily available on Linux systems without installation</a:t>
+            </a:r>
+          </a:p>
+          <a:p>
+            <a:r>
+              <a:rPr lang="en-US" dirty="0"/>
+              <a:t>Cons</a:t>
+            </a:r>
+          </a:p>
+          <a:p>
+            <a:pPr lvl="1"/>
+            <a:r>
+              <a:rPr lang="en-US" dirty="0"/>
+              <a:t>*nix specific</a:t>
+            </a:r>
+          </a:p>
+          <a:p>
+            <a:pPr lvl="1"/>
+            <a:r>
+              <a:rPr lang="en-US" dirty="0"/>
+              <a:t>Requires calling system commands from Python</a:t>
+            </a:r>
+          </a:p>
+        </p:txBody>
+      </p:sp>
+      <p:sp>
+        <p:nvSpPr>
+          <p:cNvPr id="4" name="TextBox 3">
+            <a:extLst>
+              <a:ext uri="{FF2B5EF4-FFF2-40B4-BE49-F238E27FC236}">
+                <a16:creationId xmlns:a16="http://schemas.microsoft.com/office/drawing/2014/main" id="{5DC67676-611A-4DE3-9F32-66D6A9E1C21F}"/>
+              </a:ext>
+            </a:extLst>
+          </p:cNvPr>
+          <p:cNvSpPr txBox="1"/>
+          <p:nvPr/>
+        </p:nvSpPr>
+        <p:spPr>
+          <a:xfrm>
+            <a:off x="0" y="1690688"/>
+            <a:ext cx="12192000" cy="523220"/>
+          </a:xfrm>
+          <a:prstGeom prst="rect">
+            <a:avLst/>
+          </a:prstGeom>
+          <a:noFill/>
+        </p:spPr>
+        <p:txBody>
+          <a:bodyPr wrap="square" rtlCol="0">
+            <a:spAutoFit/>
+          </a:bodyPr>
+          <a:lstStyle/>
+          <a:p>
+            <a:pPr algn="ctr"/>
+            <a:r>
+              <a:rPr lang="en-US" sz="2800" dirty="0">
+                <a:latin typeface="Lucida Console" panose="020B0609040504020204" pitchFamily="49" charset="0"/>
+              </a:rPr>
+              <a:t>curl "https://www.dataurlgoeshere.com"</a:t>
+            </a:r>
+          </a:p>
+        </p:txBody>
+      </p:sp>
+    </p:spTree>
+    <p:extLst>
+      <p:ext uri="{BB962C8B-B14F-4D97-AF65-F5344CB8AC3E}">
+        <p14:creationId xmlns:p14="http://schemas.microsoft.com/office/powerpoint/2010/main" val="4141432659"/>
+      </p:ext>
+    </p:extLst>
+  </p:cSld>
+  <p:clrMapOvr>
+    <a:masterClrMapping/>
+  </p:clrMapOvr>
+</p:sld>
+</file>
+
+<file path=ppt/slides/slide13.xml><?xml version="1.0" encoding="utf-8"?>
+<p:sld xmlns:a="http://schemas.openxmlformats.org/drawingml/2006/main" xmlns:r="http://schemas.openxmlformats.org/officeDocument/2006/relationships" xmlns:p="http://schemas.openxmlformats.org/presentationml/2006/main">
+  <p:cSld>
+    <p:spTree>
+      <p:nvGrpSpPr>
+        <p:cNvPr id="1" name=""/>
+        <p:cNvGrpSpPr/>
+        <p:nvPr/>
+      </p:nvGrpSpPr>
+      <p:grpSpPr>
+        <a:xfrm>
+          <a:off x="0" y="0"/>
+          <a:ext cx="0" cy="0"/>
+          <a:chOff x="0" y="0"/>
+          <a:chExt cx="0" cy="0"/>
+        </a:xfrm>
+      </p:grpSpPr>
+      <p:sp>
+        <p:nvSpPr>
+          <p:cNvPr id="2" name="Title 1">
+            <a:extLst>
+              <a:ext uri="{FF2B5EF4-FFF2-40B4-BE49-F238E27FC236}">
+                <a16:creationId xmlns:a16="http://schemas.microsoft.com/office/drawing/2014/main" id="{68DCDD46-C769-4F86-9CD3-E15B0F2C1F87}"/>
+              </a:ext>
+            </a:extLst>
+          </p:cNvPr>
+          <p:cNvSpPr>
+            <a:spLocks noGrp="1"/>
+          </p:cNvSpPr>
+          <p:nvPr>
+            <p:ph type="title"/>
+          </p:nvPr>
+        </p:nvSpPr>
+        <p:spPr/>
+        <p:txBody>
+          <a:bodyPr/>
+          <a:lstStyle/>
+          <a:p>
+            <a:r>
+              <a:rPr lang="en-US" dirty="0"/>
+              <a:t>Pandas Python Package</a:t>
+            </a:r>
+          </a:p>
+        </p:txBody>
+      </p:sp>
+      <p:sp>
+        <p:nvSpPr>
+          <p:cNvPr id="3" name="Content Placeholder 2">
+            <a:extLst>
+              <a:ext uri="{FF2B5EF4-FFF2-40B4-BE49-F238E27FC236}">
+                <a16:creationId xmlns:a16="http://schemas.microsoft.com/office/drawing/2014/main" id="{B8A5C19E-6E87-4B0E-862A-C77659B25197}"/>
+              </a:ext>
+            </a:extLst>
+          </p:cNvPr>
+          <p:cNvSpPr>
+            <a:spLocks noGrp="1"/>
+          </p:cNvSpPr>
+          <p:nvPr>
+            <p:ph idx="1"/>
+          </p:nvPr>
+        </p:nvSpPr>
+        <p:spPr>
+          <a:xfrm>
+            <a:off x="838200" y="2528047"/>
+            <a:ext cx="10515600" cy="3964828"/>
+          </a:xfrm>
+        </p:spPr>
+        <p:txBody>
+          <a:bodyPr>
+            <a:normAutofit/>
+          </a:bodyPr>
+          <a:lstStyle/>
+          <a:p>
+            <a:r>
+              <a:rPr lang="en-US" dirty="0"/>
+              <a:t>Pros</a:t>
+            </a:r>
+          </a:p>
+          <a:p>
+            <a:pPr lvl="1"/>
+            <a:r>
+              <a:rPr lang="en-US" dirty="0"/>
+              <a:t>Included in Anaconda Python distribution</a:t>
+            </a:r>
+          </a:p>
+          <a:p>
+            <a:pPr lvl="1"/>
+            <a:r>
+              <a:rPr lang="en-US" dirty="0"/>
+              <a:t>Can read CSV or JSON formatted data</a:t>
+            </a:r>
+          </a:p>
+          <a:p>
+            <a:pPr lvl="1"/>
+            <a:r>
+              <a:rPr lang="en-US" dirty="0"/>
+              <a:t>Can read straight from URL</a:t>
+            </a:r>
+          </a:p>
+          <a:p>
+            <a:pPr lvl="1"/>
+            <a:r>
+              <a:rPr lang="en-US" dirty="0"/>
+              <a:t> Returns Pandas </a:t>
+            </a:r>
+            <a:r>
+              <a:rPr lang="en-US" dirty="0" err="1"/>
+              <a:t>DataFrame</a:t>
+            </a:r>
+            <a:endParaRPr lang="en-US" dirty="0"/>
+          </a:p>
+          <a:p>
+            <a:pPr lvl="1"/>
+            <a:r>
+              <a:rPr lang="en-US" dirty="0"/>
+              <a:t>Option to easily skip header lines in the file</a:t>
+            </a:r>
+          </a:p>
+          <a:p>
+            <a:r>
+              <a:rPr lang="en-US" dirty="0"/>
+              <a:t>Cons</a:t>
+            </a:r>
+          </a:p>
+          <a:p>
+            <a:pPr lvl="1"/>
+            <a:r>
+              <a:rPr lang="en-US" dirty="0"/>
+              <a:t>Doesn't allow metadata in the header for URL calls</a:t>
+            </a:r>
+          </a:p>
+          <a:p>
+            <a:pPr lvl="1"/>
+            <a:r>
+              <a:rPr lang="en-US" dirty="0"/>
+              <a:t>Not viable for retrieving data deep inside an HTML DOM tree</a:t>
+            </a:r>
+          </a:p>
+        </p:txBody>
+      </p:sp>
+      <p:sp>
+        <p:nvSpPr>
+          <p:cNvPr id="4" name="TextBox 3">
+            <a:extLst>
+              <a:ext uri="{FF2B5EF4-FFF2-40B4-BE49-F238E27FC236}">
+                <a16:creationId xmlns:a16="http://schemas.microsoft.com/office/drawing/2014/main" id="{5DC67676-611A-4DE3-9F32-66D6A9E1C21F}"/>
+              </a:ext>
+            </a:extLst>
+          </p:cNvPr>
+          <p:cNvSpPr txBox="1"/>
+          <p:nvPr/>
+        </p:nvSpPr>
+        <p:spPr>
+          <a:xfrm>
+            <a:off x="0" y="1690688"/>
+            <a:ext cx="12192000" cy="523220"/>
+          </a:xfrm>
+          <a:prstGeom prst="rect">
+            <a:avLst/>
+          </a:prstGeom>
+          <a:noFill/>
+        </p:spPr>
+        <p:txBody>
+          <a:bodyPr wrap="square" rtlCol="0">
+            <a:spAutoFit/>
+          </a:bodyPr>
+          <a:lstStyle/>
+          <a:p>
+            <a:pPr algn="ctr"/>
+            <a:r>
+              <a:rPr lang="en-US" sz="2800" dirty="0">
+                <a:latin typeface="Lucida Console" panose="020B0609040504020204" pitchFamily="49" charset="0"/>
+              </a:rPr>
+              <a:t>df = </a:t>
+            </a:r>
+            <a:r>
+              <a:rPr lang="en-US" sz="2800" dirty="0" err="1">
+                <a:latin typeface="Lucida Console" panose="020B0609040504020204" pitchFamily="49" charset="0"/>
+              </a:rPr>
+              <a:t>pandas.read_csv</a:t>
+            </a:r>
+            <a:r>
+              <a:rPr lang="en-US" sz="2800" dirty="0">
+                <a:latin typeface="Lucida Console" panose="020B0609040504020204" pitchFamily="49" charset="0"/>
+              </a:rPr>
+              <a:t>(</a:t>
+            </a:r>
+            <a:r>
+              <a:rPr lang="en-US" sz="2800" dirty="0" err="1">
+                <a:latin typeface="Lucida Console" panose="020B0609040504020204" pitchFamily="49" charset="0"/>
+              </a:rPr>
+              <a:t>data_url</a:t>
+            </a:r>
+            <a:r>
+              <a:rPr lang="en-US" sz="2800" dirty="0">
+                <a:latin typeface="Lucida Console" panose="020B0609040504020204" pitchFamily="49" charset="0"/>
+              </a:rPr>
+              <a:t>, </a:t>
+            </a:r>
+            <a:r>
+              <a:rPr lang="en-US" sz="2800" dirty="0" err="1">
+                <a:latin typeface="Lucida Console" panose="020B0609040504020204" pitchFamily="49" charset="0"/>
+              </a:rPr>
+              <a:t>skiprows</a:t>
+            </a:r>
+            <a:r>
+              <a:rPr lang="en-US" sz="2800" dirty="0">
+                <a:latin typeface="Lucida Console" panose="020B0609040504020204" pitchFamily="49" charset="0"/>
+              </a:rPr>
+              <a:t>=</a:t>
+            </a:r>
+            <a:r>
+              <a:rPr lang="en-US" sz="2800" dirty="0" err="1">
+                <a:latin typeface="Lucida Console" panose="020B0609040504020204" pitchFamily="49" charset="0"/>
+              </a:rPr>
+              <a:t>header_skip</a:t>
+            </a:r>
+            <a:r>
+              <a:rPr lang="en-US" sz="2800" dirty="0">
+                <a:latin typeface="Lucida Console" panose="020B0609040504020204" pitchFamily="49" charset="0"/>
+              </a:rPr>
+              <a:t>)</a:t>
+            </a:r>
+          </a:p>
+        </p:txBody>
+      </p:sp>
+    </p:spTree>
+    <p:extLst>
+      <p:ext uri="{BB962C8B-B14F-4D97-AF65-F5344CB8AC3E}">
+        <p14:creationId xmlns:p14="http://schemas.microsoft.com/office/powerpoint/2010/main" val="1158583168"/>
+      </p:ext>
+    </p:extLst>
+  </p:cSld>
+  <p:clrMapOvr>
+    <a:masterClrMapping/>
+  </p:clrMapOvr>
+</p:sld>
+</file>
+
+<file path=ppt/slides/slide14.xml><?xml version="1.0" encoding="utf-8"?>
+<p:sld xmlns:a="http://schemas.openxmlformats.org/drawingml/2006/main" xmlns:r="http://schemas.openxmlformats.org/officeDocument/2006/relationships" xmlns:p="http://schemas.openxmlformats.org/presentationml/2006/main">
+  <p:cSld>
+    <p:spTree>
+      <p:nvGrpSpPr>
+        <p:cNvPr id="1" name=""/>
+        <p:cNvGrpSpPr/>
+        <p:nvPr/>
+      </p:nvGrpSpPr>
+      <p:grpSpPr>
+        <a:xfrm>
+          <a:off x="0" y="0"/>
+          <a:ext cx="0" cy="0"/>
+          <a:chOff x="0" y="0"/>
+          <a:chExt cx="0" cy="0"/>
+        </a:xfrm>
+      </p:grpSpPr>
+      <p:sp>
+        <p:nvSpPr>
+          <p:cNvPr id="2" name="Title 1">
+            <a:extLst>
+              <a:ext uri="{FF2B5EF4-FFF2-40B4-BE49-F238E27FC236}">
+                <a16:creationId xmlns:a16="http://schemas.microsoft.com/office/drawing/2014/main" id="{8DDD8859-4345-4FA3-950E-121451DC6904}"/>
+              </a:ext>
+            </a:extLst>
+          </p:cNvPr>
+          <p:cNvSpPr>
+            <a:spLocks noGrp="1"/>
+          </p:cNvSpPr>
+          <p:nvPr>
+            <p:ph type="title"/>
+          </p:nvPr>
+        </p:nvSpPr>
+        <p:spPr/>
+        <p:txBody>
+          <a:bodyPr/>
+          <a:lstStyle/>
+          <a:p>
+            <a:r>
+              <a:rPr lang="en-US" dirty="0"/>
+              <a:t>Pandas Python Package</a:t>
+            </a:r>
+          </a:p>
+        </p:txBody>
+      </p:sp>
+      <p:pic>
+        <p:nvPicPr>
+          <p:cNvPr id="4" name="Picture 3">
+            <a:hlinkClick r:id="rId2"/>
+            <a:extLst>
+              <a:ext uri="{FF2B5EF4-FFF2-40B4-BE49-F238E27FC236}">
+                <a16:creationId xmlns:a16="http://schemas.microsoft.com/office/drawing/2014/main" id="{5D6162A3-7152-4302-A40B-32A9B1ED7189}"/>
+              </a:ext>
+            </a:extLst>
+          </p:cNvPr>
+          <p:cNvPicPr>
+            <a:picLocks noChangeAspect="1"/>
+          </p:cNvPicPr>
+          <p:nvPr/>
+        </p:nvPicPr>
+        <p:blipFill>
+          <a:blip r:embed="rId3"/>
+          <a:stretch>
+            <a:fillRect/>
+          </a:stretch>
+        </p:blipFill>
+        <p:spPr>
+          <a:xfrm>
+            <a:off x="591778" y="1778648"/>
+            <a:ext cx="7414985" cy="4398315"/>
+          </a:xfrm>
+          <a:prstGeom prst="rect">
+            <a:avLst/>
+          </a:prstGeom>
+        </p:spPr>
+      </p:pic>
+      <p:pic>
+        <p:nvPicPr>
+          <p:cNvPr id="5" name="Picture 4">
+            <a:extLst>
+              <a:ext uri="{FF2B5EF4-FFF2-40B4-BE49-F238E27FC236}">
+                <a16:creationId xmlns:a16="http://schemas.microsoft.com/office/drawing/2014/main" id="{05D7F514-6688-4C77-A6F7-4A6208A5D6E5}"/>
+              </a:ext>
+            </a:extLst>
+          </p:cNvPr>
+          <p:cNvPicPr>
+            <a:picLocks noChangeAspect="1"/>
+          </p:cNvPicPr>
+          <p:nvPr/>
+        </p:nvPicPr>
+        <p:blipFill rotWithShape="1">
+          <a:blip r:embed="rId4"/>
+          <a:srcRect b="9678"/>
+          <a:stretch/>
+        </p:blipFill>
+        <p:spPr>
+          <a:xfrm>
+            <a:off x="6409106" y="2248852"/>
+            <a:ext cx="5337113" cy="4244023"/>
+          </a:xfrm>
+          <a:prstGeom prst="rect">
+            <a:avLst/>
+          </a:prstGeom>
+        </p:spPr>
+      </p:pic>
+    </p:spTree>
+    <p:extLst>
+      <p:ext uri="{BB962C8B-B14F-4D97-AF65-F5344CB8AC3E}">
+        <p14:creationId xmlns:p14="http://schemas.microsoft.com/office/powerpoint/2010/main" val="1104122376"/>
+      </p:ext>
+    </p:extLst>
+  </p:cSld>
+  <p:clrMapOvr>
+    <a:masterClrMapping/>
+  </p:clrMapOvr>
+</p:sld>
+</file>
+
+<file path=ppt/slides/slide15.xml><?xml version="1.0" encoding="utf-8"?>
+<p:sld xmlns:a="http://schemas.openxmlformats.org/drawingml/2006/main" xmlns:r="http://schemas.openxmlformats.org/officeDocument/2006/relationships" xmlns:p="http://schemas.openxmlformats.org/presentationml/2006/main">
+  <p:cSld>
+    <p:spTree>
+      <p:nvGrpSpPr>
+        <p:cNvPr id="1" name=""/>
+        <p:cNvGrpSpPr/>
+        <p:nvPr/>
+      </p:nvGrpSpPr>
+      <p:grpSpPr>
+        <a:xfrm>
+          <a:off x="0" y="0"/>
+          <a:ext cx="0" cy="0"/>
+          <a:chOff x="0" y="0"/>
+          <a:chExt cx="0" cy="0"/>
+        </a:xfrm>
+      </p:grpSpPr>
+      <p:sp>
+        <p:nvSpPr>
+          <p:cNvPr id="2" name="Title 1">
+            <a:extLst>
+              <a:ext uri="{FF2B5EF4-FFF2-40B4-BE49-F238E27FC236}">
+                <a16:creationId xmlns:a16="http://schemas.microsoft.com/office/drawing/2014/main" id="{68DCDD46-C769-4F86-9CD3-E15B0F2C1F87}"/>
+              </a:ext>
+            </a:extLst>
+          </p:cNvPr>
+          <p:cNvSpPr>
+            <a:spLocks noGrp="1"/>
+          </p:cNvSpPr>
+          <p:nvPr>
+            <p:ph type="title"/>
+          </p:nvPr>
+        </p:nvSpPr>
+        <p:spPr/>
+        <p:txBody>
+          <a:bodyPr/>
+          <a:lstStyle/>
+          <a:p>
+            <a:r>
+              <a:rPr lang="en-US" dirty="0"/>
+              <a:t>Requests Python Package</a:t>
+            </a:r>
+          </a:p>
+        </p:txBody>
+      </p:sp>
+      <p:sp>
+        <p:nvSpPr>
+          <p:cNvPr id="3" name="Content Placeholder 2">
+            <a:extLst>
+              <a:ext uri="{FF2B5EF4-FFF2-40B4-BE49-F238E27FC236}">
+                <a16:creationId xmlns:a16="http://schemas.microsoft.com/office/drawing/2014/main" id="{B8A5C19E-6E87-4B0E-862A-C77659B25197}"/>
+              </a:ext>
+            </a:extLst>
+          </p:cNvPr>
+          <p:cNvSpPr>
+            <a:spLocks noGrp="1"/>
+          </p:cNvSpPr>
+          <p:nvPr>
+            <p:ph idx="1"/>
+          </p:nvPr>
+        </p:nvSpPr>
+        <p:spPr>
+          <a:xfrm>
+            <a:off x="838200" y="2528047"/>
+            <a:ext cx="10515600" cy="3964828"/>
+          </a:xfrm>
+        </p:spPr>
+        <p:txBody>
+          <a:bodyPr>
+            <a:normAutofit/>
+          </a:bodyPr>
+          <a:lstStyle/>
+          <a:p>
+            <a:r>
+              <a:rPr lang="en-US" dirty="0"/>
+              <a:t>Pros</a:t>
+            </a:r>
+          </a:p>
+          <a:p>
+            <a:pPr lvl="1"/>
+            <a:r>
+              <a:rPr lang="en-US" dirty="0"/>
+              <a:t>Included in Anaconda Python distribution</a:t>
+            </a:r>
+          </a:p>
+          <a:p>
+            <a:pPr lvl="1"/>
+            <a:r>
+              <a:rPr lang="en-US" dirty="0"/>
+              <a:t>Allows for username and passwords or tokens</a:t>
+            </a:r>
+          </a:p>
+          <a:p>
+            <a:pPr lvl="1"/>
+            <a:r>
+              <a:rPr lang="en-US" dirty="0"/>
+              <a:t> Designed for simple data retrieval</a:t>
+            </a:r>
+          </a:p>
+          <a:p>
+            <a:r>
+              <a:rPr lang="en-US" dirty="0"/>
+              <a:t>Cons</a:t>
+            </a:r>
+          </a:p>
+          <a:p>
+            <a:pPr lvl="1"/>
+            <a:r>
+              <a:rPr lang="en-US" dirty="0"/>
+              <a:t>Doesn't return a </a:t>
+            </a:r>
+            <a:r>
+              <a:rPr lang="en-US" dirty="0" err="1"/>
+              <a:t>DataFrame</a:t>
+            </a:r>
+            <a:endParaRPr lang="en-US" dirty="0"/>
+          </a:p>
+          <a:p>
+            <a:pPr lvl="1"/>
+            <a:r>
+              <a:rPr lang="en-US" dirty="0"/>
+              <a:t>Better suited for JSON formatted </a:t>
+            </a:r>
+            <a:r>
+              <a:rPr lang="en-US" dirty="0" err="1"/>
+              <a:t>urls</a:t>
+            </a:r>
+            <a:endParaRPr lang="en-US" dirty="0"/>
+          </a:p>
+          <a:p>
+            <a:endParaRPr lang="en-US" dirty="0"/>
+          </a:p>
+        </p:txBody>
+      </p:sp>
+      <p:sp>
+        <p:nvSpPr>
+          <p:cNvPr id="4" name="TextBox 3">
+            <a:extLst>
+              <a:ext uri="{FF2B5EF4-FFF2-40B4-BE49-F238E27FC236}">
+                <a16:creationId xmlns:a16="http://schemas.microsoft.com/office/drawing/2014/main" id="{5DC67676-611A-4DE3-9F32-66D6A9E1C21F}"/>
+              </a:ext>
+            </a:extLst>
+          </p:cNvPr>
+          <p:cNvSpPr txBox="1"/>
+          <p:nvPr/>
+        </p:nvSpPr>
+        <p:spPr>
+          <a:xfrm>
+            <a:off x="0" y="1690688"/>
+            <a:ext cx="12192000" cy="523220"/>
+          </a:xfrm>
+          <a:prstGeom prst="rect">
+            <a:avLst/>
+          </a:prstGeom>
+          <a:noFill/>
+        </p:spPr>
+        <p:txBody>
+          <a:bodyPr wrap="square" rtlCol="0">
+            <a:spAutoFit/>
+          </a:bodyPr>
+          <a:lstStyle/>
+          <a:p>
+            <a:pPr algn="ctr"/>
+            <a:r>
+              <a:rPr lang="en-US" sz="2800" dirty="0">
+                <a:latin typeface="Lucida Console" panose="020B0609040504020204" pitchFamily="49" charset="0"/>
+              </a:rPr>
+              <a:t>r = </a:t>
+            </a:r>
+            <a:r>
+              <a:rPr lang="en-US" sz="2800" dirty="0" err="1">
+                <a:latin typeface="Lucida Console" panose="020B0609040504020204" pitchFamily="49" charset="0"/>
+              </a:rPr>
+              <a:t>requests.get</a:t>
+            </a:r>
+            <a:r>
+              <a:rPr lang="en-US" sz="2800" dirty="0">
+                <a:latin typeface="Lucida Console" panose="020B0609040504020204" pitchFamily="49" charset="0"/>
+              </a:rPr>
+              <a:t>(</a:t>
+            </a:r>
+            <a:r>
+              <a:rPr lang="en-US" sz="2800" dirty="0" err="1">
+                <a:latin typeface="Lucida Console" panose="020B0609040504020204" pitchFamily="49" charset="0"/>
+              </a:rPr>
+              <a:t>data_url</a:t>
+            </a:r>
+            <a:r>
+              <a:rPr lang="en-US" sz="2800" dirty="0">
+                <a:latin typeface="Lucida Console" panose="020B0609040504020204" pitchFamily="49" charset="0"/>
+              </a:rPr>
+              <a:t>, headers={'token’: </a:t>
+            </a:r>
+            <a:r>
+              <a:rPr lang="en-US" sz="2800" dirty="0" err="1">
+                <a:latin typeface="Lucida Console" panose="020B0609040504020204" pitchFamily="49" charset="0"/>
+              </a:rPr>
+              <a:t>api_key</a:t>
+            </a:r>
+            <a:r>
+              <a:rPr lang="en-US" sz="2800" dirty="0">
+                <a:latin typeface="Lucida Console" panose="020B0609040504020204" pitchFamily="49" charset="0"/>
+              </a:rPr>
+              <a:t>})</a:t>
+            </a:r>
+          </a:p>
+        </p:txBody>
+      </p:sp>
+    </p:spTree>
+    <p:extLst>
+      <p:ext uri="{BB962C8B-B14F-4D97-AF65-F5344CB8AC3E}">
+        <p14:creationId xmlns:p14="http://schemas.microsoft.com/office/powerpoint/2010/main" val="964416389"/>
+      </p:ext>
+    </p:extLst>
+  </p:cSld>
+  <p:clrMapOvr>
+    <a:masterClrMapping/>
+  </p:clrMapOvr>
+</p:sld>
+</file>
+
+<file path=ppt/slides/slide16.xml><?xml version="1.0" encoding="utf-8"?>
+<p:sld xmlns:a="http://schemas.openxmlformats.org/drawingml/2006/main" xmlns:r="http://schemas.openxmlformats.org/officeDocument/2006/relationships" xmlns:p="http://schemas.openxmlformats.org/presentationml/2006/main">
+  <p:cSld>
+    <p:spTree>
+      <p:nvGrpSpPr>
+        <p:cNvPr id="1" name=""/>
+        <p:cNvGrpSpPr/>
+        <p:nvPr/>
+      </p:nvGrpSpPr>
+      <p:grpSpPr>
+        <a:xfrm>
+          <a:off x="0" y="0"/>
+          <a:ext cx="0" cy="0"/>
+          <a:chOff x="0" y="0"/>
+          <a:chExt cx="0" cy="0"/>
+        </a:xfrm>
+      </p:grpSpPr>
+      <p:sp>
+        <p:nvSpPr>
+          <p:cNvPr id="2" name="Title 1">
+            <a:extLst>
+              <a:ext uri="{FF2B5EF4-FFF2-40B4-BE49-F238E27FC236}">
+                <a16:creationId xmlns:a16="http://schemas.microsoft.com/office/drawing/2014/main" id="{68DCDD46-C769-4F86-9CD3-E15B0F2C1F87}"/>
+              </a:ext>
+            </a:extLst>
+          </p:cNvPr>
+          <p:cNvSpPr>
+            <a:spLocks noGrp="1"/>
+          </p:cNvSpPr>
+          <p:nvPr>
+            <p:ph type="title"/>
+          </p:nvPr>
+        </p:nvSpPr>
+        <p:spPr/>
+        <p:txBody>
+          <a:bodyPr/>
+          <a:lstStyle/>
+          <a:p>
+            <a:r>
+              <a:rPr lang="en-US" dirty="0"/>
+              <a:t>Requests Python Package</a:t>
+            </a:r>
+          </a:p>
+        </p:txBody>
+      </p:sp>
+      <p:pic>
+        <p:nvPicPr>
+          <p:cNvPr id="9" name="Picture 8">
+            <a:extLst>
+              <a:ext uri="{FF2B5EF4-FFF2-40B4-BE49-F238E27FC236}">
+                <a16:creationId xmlns:a16="http://schemas.microsoft.com/office/drawing/2014/main" id="{49FFA1EA-10A1-4A02-9BAE-EEBA7D497541}"/>
+              </a:ext>
+            </a:extLst>
+          </p:cNvPr>
+          <p:cNvPicPr>
+            <a:picLocks noChangeAspect="1"/>
+          </p:cNvPicPr>
+          <p:nvPr/>
+        </p:nvPicPr>
+        <p:blipFill>
+          <a:blip r:embed="rId2"/>
+          <a:stretch>
+            <a:fillRect/>
+          </a:stretch>
+        </p:blipFill>
+        <p:spPr>
+          <a:xfrm>
+            <a:off x="620767" y="1475389"/>
+            <a:ext cx="10172700" cy="2057400"/>
+          </a:xfrm>
+          <a:prstGeom prst="rect">
+            <a:avLst/>
+          </a:prstGeom>
+        </p:spPr>
+      </p:pic>
+      <p:pic>
+        <p:nvPicPr>
+          <p:cNvPr id="10" name="Picture 9">
+            <a:extLst>
+              <a:ext uri="{FF2B5EF4-FFF2-40B4-BE49-F238E27FC236}">
+                <a16:creationId xmlns:a16="http://schemas.microsoft.com/office/drawing/2014/main" id="{9B505260-7143-4F16-A396-7A6131CECDB4}"/>
+              </a:ext>
+            </a:extLst>
+          </p:cNvPr>
+          <p:cNvPicPr>
+            <a:picLocks noChangeAspect="1"/>
+          </p:cNvPicPr>
+          <p:nvPr/>
+        </p:nvPicPr>
+        <p:blipFill>
+          <a:blip r:embed="rId3"/>
+          <a:stretch>
+            <a:fillRect/>
+          </a:stretch>
+        </p:blipFill>
+        <p:spPr>
+          <a:xfrm>
+            <a:off x="4783192" y="2632787"/>
+            <a:ext cx="6010275" cy="3486150"/>
+          </a:xfrm>
+          <a:prstGeom prst="rect">
+            <a:avLst/>
+          </a:prstGeom>
+        </p:spPr>
+      </p:pic>
+    </p:spTree>
+    <p:extLst>
+      <p:ext uri="{BB962C8B-B14F-4D97-AF65-F5344CB8AC3E}">
+        <p14:creationId xmlns:p14="http://schemas.microsoft.com/office/powerpoint/2010/main" val="4253956594"/>
+      </p:ext>
+    </p:extLst>
+  </p:cSld>
+  <p:clrMapOvr>
+    <a:masterClrMapping/>
+  </p:clrMapOvr>
+</p:sld>
+</file>
+
+<file path=ppt/slides/slide17.xml><?xml version="1.0" encoding="utf-8"?>
+<p:sld xmlns:a="http://schemas.openxmlformats.org/drawingml/2006/main" xmlns:r="http://schemas.openxmlformats.org/officeDocument/2006/relationships" xmlns:p="http://schemas.openxmlformats.org/presentationml/2006/main">
+  <p:cSld>
+    <p:spTree>
+      <p:nvGrpSpPr>
+        <p:cNvPr id="1" name=""/>
+        <p:cNvGrpSpPr/>
+        <p:nvPr/>
+      </p:nvGrpSpPr>
+      <p:grpSpPr>
+        <a:xfrm>
+          <a:off x="0" y="0"/>
+          <a:ext cx="0" cy="0"/>
+          <a:chOff x="0" y="0"/>
+          <a:chExt cx="0" cy="0"/>
+        </a:xfrm>
+      </p:grpSpPr>
+      <p:sp>
+        <p:nvSpPr>
+          <p:cNvPr id="2" name="Title 1">
+            <a:extLst>
+              <a:ext uri="{FF2B5EF4-FFF2-40B4-BE49-F238E27FC236}">
+                <a16:creationId xmlns:a16="http://schemas.microsoft.com/office/drawing/2014/main" id="{F7F61A3F-2CC6-4309-AAA1-01BE4E454803}"/>
+              </a:ext>
+            </a:extLst>
+          </p:cNvPr>
+          <p:cNvSpPr>
+            <a:spLocks noGrp="1"/>
+          </p:cNvSpPr>
+          <p:nvPr>
+            <p:ph type="title"/>
+          </p:nvPr>
+        </p:nvSpPr>
+        <p:spPr/>
+        <p:txBody>
+          <a:bodyPr/>
+          <a:lstStyle/>
+          <a:p>
+            <a:r>
+              <a:rPr lang="en-US" dirty="0"/>
+              <a:t>Final Answer…</a:t>
+            </a:r>
+          </a:p>
+        </p:txBody>
+      </p:sp>
+      <p:sp>
+        <p:nvSpPr>
+          <p:cNvPr id="3" name="Content Placeholder 2">
+            <a:extLst>
+              <a:ext uri="{FF2B5EF4-FFF2-40B4-BE49-F238E27FC236}">
+                <a16:creationId xmlns:a16="http://schemas.microsoft.com/office/drawing/2014/main" id="{AE2D0B3F-8BB3-41B7-BBEE-6740CF97F8E4}"/>
+              </a:ext>
+            </a:extLst>
+          </p:cNvPr>
+          <p:cNvSpPr>
+            <a:spLocks noGrp="1"/>
+          </p:cNvSpPr>
+          <p:nvPr>
+            <p:ph idx="1"/>
+          </p:nvPr>
+        </p:nvSpPr>
+        <p:spPr/>
+        <p:txBody>
+          <a:bodyPr/>
+          <a:lstStyle/>
+          <a:p>
+            <a:r>
+              <a:rPr lang="en-US" dirty="0"/>
+              <a:t>Use </a:t>
+            </a:r>
+            <a:r>
+              <a:rPr lang="en-US" dirty="0" err="1"/>
+              <a:t>pandas.read_csv</a:t>
+            </a:r>
+            <a:r>
+              <a:rPr lang="en-US" dirty="0"/>
+              <a:t> or </a:t>
+            </a:r>
+            <a:r>
+              <a:rPr lang="en-US" dirty="0" err="1"/>
+              <a:t>pandas.read_html</a:t>
+            </a:r>
+            <a:r>
+              <a:rPr lang="en-US" dirty="0"/>
+              <a:t> if applicable</a:t>
+            </a:r>
+          </a:p>
+          <a:p>
+            <a:r>
+              <a:rPr lang="en-US" dirty="0"/>
+              <a:t>Use requests + Beautiful Soup if needed</a:t>
+            </a:r>
+          </a:p>
+          <a:p>
+            <a:endParaRPr lang="en-US" dirty="0"/>
+          </a:p>
+          <a:p>
+            <a:r>
+              <a:rPr lang="en-US" dirty="0"/>
+              <a:t>Other options were considers </a:t>
+            </a:r>
+          </a:p>
+          <a:p>
+            <a:pPr lvl="1"/>
+            <a:r>
+              <a:rPr lang="en-US" dirty="0"/>
+              <a:t>Significantly more complex</a:t>
+            </a:r>
+          </a:p>
+          <a:p>
+            <a:pPr lvl="1"/>
+            <a:r>
+              <a:rPr lang="en-US" dirty="0"/>
+              <a:t>Designed for client or </a:t>
+            </a:r>
+            <a:r>
+              <a:rPr lang="en-US"/>
+              <a:t>server role</a:t>
+            </a:r>
+            <a:endParaRPr lang="en-US" dirty="0"/>
+          </a:p>
+        </p:txBody>
+      </p:sp>
+    </p:spTree>
+    <p:extLst>
+      <p:ext uri="{BB962C8B-B14F-4D97-AF65-F5344CB8AC3E}">
+        <p14:creationId xmlns:p14="http://schemas.microsoft.com/office/powerpoint/2010/main" val="115523264"/>
+      </p:ext>
+    </p:extLst>
+  </p:cSld>
+  <p:clrMapOvr>
+    <a:masterClrMapping/>
+  </p:clrMapOvr>
+</p:sld>
+</file>
+
+<file path=ppt/slides/slide2.xml><?xml version="1.0" encoding="utf-8"?>
+<p:sld xmlns:a="http://schemas.openxmlformats.org/drawingml/2006/main" xmlns:r="http://schemas.openxmlformats.org/officeDocument/2006/relationships" xmlns:p="http://schemas.openxmlformats.org/presentationml/2006/main">
+  <p:cSld>
+    <p:spTree>
+      <p:nvGrpSpPr>
+        <p:cNvPr id="1" name=""/>
+        <p:cNvGrpSpPr/>
+        <p:nvPr/>
+      </p:nvGrpSpPr>
+      <p:grpSpPr>
+        <a:xfrm>
+          <a:off x="0" y="0"/>
+          <a:ext cx="0" cy="0"/>
+          <a:chOff x="0" y="0"/>
+          <a:chExt cx="0" cy="0"/>
+        </a:xfrm>
+      </p:grpSpPr>
+      <p:sp>
+        <p:nvSpPr>
+          <p:cNvPr id="2" name="Title 1">
+            <a:extLst>
+              <a:ext uri="{FF2B5EF4-FFF2-40B4-BE49-F238E27FC236}">
+                <a16:creationId xmlns:a16="http://schemas.microsoft.com/office/drawing/2014/main" id="{C692A937-B488-4D1F-9E2A-2F1C0BB7BBE7}"/>
+              </a:ext>
+            </a:extLst>
+          </p:cNvPr>
+          <p:cNvSpPr>
+            <a:spLocks noGrp="1"/>
+          </p:cNvSpPr>
+          <p:nvPr>
+            <p:ph type="title"/>
+          </p:nvPr>
+        </p:nvSpPr>
+        <p:spPr/>
+        <p:txBody>
+          <a:bodyPr/>
+          <a:lstStyle/>
+          <a:p>
+            <a:r>
+              <a:rPr lang="en-US" dirty="0"/>
+              <a:t>Sally the Scientist, Activist</a:t>
+            </a:r>
+          </a:p>
+        </p:txBody>
+      </p:sp>
+      <p:sp>
+        <p:nvSpPr>
+          <p:cNvPr id="3" name="Content Placeholder 2">
+            <a:extLst>
+              <a:ext uri="{FF2B5EF4-FFF2-40B4-BE49-F238E27FC236}">
+                <a16:creationId xmlns:a16="http://schemas.microsoft.com/office/drawing/2014/main" id="{7EBC08F2-3F96-4262-94D2-3303B28469CE}"/>
+              </a:ext>
+            </a:extLst>
+          </p:cNvPr>
+          <p:cNvSpPr>
+            <a:spLocks noGrp="1"/>
+          </p:cNvSpPr>
+          <p:nvPr>
+            <p:ph idx="1"/>
+          </p:nvPr>
+        </p:nvSpPr>
+        <p:spPr/>
+        <p:txBody>
+          <a:bodyPr/>
+          <a:lstStyle/>
+          <a:p>
+            <a:r>
+              <a:rPr lang="en-US" dirty="0"/>
+              <a:t>Concerned about climate change</a:t>
+            </a:r>
+          </a:p>
+          <a:p>
+            <a:r>
+              <a:rPr lang="en-US" dirty="0"/>
+              <a:t>Self exploration</a:t>
+            </a:r>
+          </a:p>
+          <a:p>
+            <a:r>
+              <a:rPr lang="en-US" dirty="0"/>
+              <a:t>Novice with computer languages</a:t>
+            </a:r>
+          </a:p>
+          <a:p>
+            <a:r>
+              <a:rPr lang="en-US" dirty="0"/>
+              <a:t>Novice with web service technology</a:t>
+            </a:r>
+          </a:p>
+          <a:p>
+            <a:r>
+              <a:rPr lang="en-US" dirty="0"/>
+              <a:t>OS agnostic</a:t>
+            </a:r>
+          </a:p>
+        </p:txBody>
+      </p:sp>
+    </p:spTree>
+    <p:extLst>
+      <p:ext uri="{BB962C8B-B14F-4D97-AF65-F5344CB8AC3E}">
+        <p14:creationId xmlns:p14="http://schemas.microsoft.com/office/powerpoint/2010/main" val="2411416320"/>
+      </p:ext>
+    </p:extLst>
+  </p:cSld>
+  <p:clrMapOvr>
+    <a:masterClrMapping/>
+  </p:clrMapOvr>
+</p:sld>
+</file>
+
+<file path=ppt/slides/slide3.xml><?xml version="1.0" encoding="utf-8"?>
+<p:sld xmlns:a="http://schemas.openxmlformats.org/drawingml/2006/main" xmlns:r="http://schemas.openxmlformats.org/officeDocument/2006/relationships" xmlns:p="http://schemas.openxmlformats.org/presentationml/2006/main">
+  <p:cSld>
+    <p:spTree>
+      <p:nvGrpSpPr>
+        <p:cNvPr id="1" name=""/>
+        <p:cNvGrpSpPr/>
+        <p:nvPr/>
+      </p:nvGrpSpPr>
+      <p:grpSpPr>
+        <a:xfrm>
+          <a:off x="0" y="0"/>
+          <a:ext cx="0" cy="0"/>
+          <a:chOff x="0" y="0"/>
+          <a:chExt cx="0" cy="0"/>
+        </a:xfrm>
+      </p:grpSpPr>
+      <p:sp>
+        <p:nvSpPr>
+          <p:cNvPr id="2" name="Title 1">
+            <a:extLst>
+              <a:ext uri="{FF2B5EF4-FFF2-40B4-BE49-F238E27FC236}">
+                <a16:creationId xmlns:a16="http://schemas.microsoft.com/office/drawing/2014/main" id="{FC86FC9C-A590-4DBB-8DFE-9BA74E9659BF}"/>
+              </a:ext>
+            </a:extLst>
+          </p:cNvPr>
+          <p:cNvSpPr>
+            <a:spLocks noGrp="1"/>
+          </p:cNvSpPr>
+          <p:nvPr>
+            <p:ph type="title"/>
+          </p:nvPr>
+        </p:nvSpPr>
+        <p:spPr/>
+        <p:txBody>
+          <a:bodyPr/>
+          <a:lstStyle/>
+          <a:p>
+            <a:r>
+              <a:rPr lang="en-US" dirty="0"/>
+              <a:t>Web service technologies</a:t>
+            </a:r>
+          </a:p>
+        </p:txBody>
+      </p:sp>
+      <p:sp>
+        <p:nvSpPr>
+          <p:cNvPr id="3" name="Content Placeholder 2">
+            <a:extLst>
+              <a:ext uri="{FF2B5EF4-FFF2-40B4-BE49-F238E27FC236}">
+                <a16:creationId xmlns:a16="http://schemas.microsoft.com/office/drawing/2014/main" id="{0124E71F-E38A-449E-8C98-C9863DD8B494}"/>
+              </a:ext>
+            </a:extLst>
+          </p:cNvPr>
+          <p:cNvSpPr>
+            <a:spLocks noGrp="1"/>
+          </p:cNvSpPr>
+          <p:nvPr>
+            <p:ph idx="1"/>
+          </p:nvPr>
+        </p:nvSpPr>
+        <p:spPr/>
+        <p:txBody>
+          <a:bodyPr/>
+          <a:lstStyle/>
+          <a:p>
+            <a:r>
+              <a:rPr lang="en-US" dirty="0"/>
+              <a:t>Need: access and import climate change data from various agencies into a useful form inside an analysis platform, </a:t>
+            </a:r>
+            <a:r>
+              <a:rPr lang="en-US" dirty="0" err="1"/>
+              <a:t>Jupyter</a:t>
+            </a:r>
+            <a:r>
+              <a:rPr lang="en-US" dirty="0"/>
+              <a:t> notebook</a:t>
+            </a:r>
+          </a:p>
+          <a:p>
+            <a:endParaRPr lang="en-US" dirty="0"/>
+          </a:p>
+          <a:p>
+            <a:r>
+              <a:rPr lang="en-US" dirty="0"/>
+              <a:t>Requirements</a:t>
+            </a:r>
+          </a:p>
+          <a:p>
+            <a:pPr lvl="1"/>
+            <a:r>
+              <a:rPr lang="en-US" dirty="0"/>
+              <a:t>Minimal install requirements</a:t>
+            </a:r>
+          </a:p>
+          <a:p>
+            <a:pPr lvl="1"/>
+            <a:r>
+              <a:rPr lang="en-US" dirty="0"/>
+              <a:t>Available on all major OSes</a:t>
+            </a:r>
+          </a:p>
+          <a:p>
+            <a:pPr lvl="1"/>
+            <a:r>
+              <a:rPr lang="en-US" dirty="0"/>
+              <a:t>Simple command/functional interface</a:t>
+            </a:r>
+          </a:p>
+          <a:p>
+            <a:pPr lvl="1"/>
+            <a:r>
+              <a:rPr lang="en-US" dirty="0"/>
+              <a:t>Able to interface with desired data sources</a:t>
+            </a:r>
+          </a:p>
+          <a:p>
+            <a:endParaRPr lang="en-US" dirty="0"/>
+          </a:p>
+          <a:p>
+            <a:endParaRPr lang="en-US" dirty="0"/>
+          </a:p>
+          <a:p>
+            <a:endParaRPr lang="en-US" dirty="0"/>
+          </a:p>
+        </p:txBody>
+      </p:sp>
+    </p:spTree>
+    <p:extLst>
+      <p:ext uri="{BB962C8B-B14F-4D97-AF65-F5344CB8AC3E}">
+        <p14:creationId xmlns:p14="http://schemas.microsoft.com/office/powerpoint/2010/main" val="2038867840"/>
+      </p:ext>
+    </p:extLst>
+  </p:cSld>
+  <p:clrMapOvr>
+    <a:masterClrMapping/>
+  </p:clrMapOvr>
+</p:sld>
+</file>
+
+<file path=ppt/slides/slide4.xml><?xml version="1.0" encoding="utf-8"?>
+<p:sld xmlns:a="http://schemas.openxmlformats.org/drawingml/2006/main" xmlns:r="http://schemas.openxmlformats.org/officeDocument/2006/relationships" xmlns:p="http://schemas.openxmlformats.org/presentationml/2006/main">
+  <p:cSld>
+    <p:spTree>
+      <p:nvGrpSpPr>
+        <p:cNvPr id="1" name=""/>
+        <p:cNvGrpSpPr/>
+        <p:nvPr/>
+      </p:nvGrpSpPr>
+      <p:grpSpPr>
+        <a:xfrm>
+          <a:off x="0" y="0"/>
+          <a:ext cx="0" cy="0"/>
+          <a:chOff x="0" y="0"/>
+          <a:chExt cx="0" cy="0"/>
+        </a:xfrm>
+      </p:grpSpPr>
+      <p:sp>
+        <p:nvSpPr>
+          <p:cNvPr id="2" name="Title 1">
+            <a:extLst>
+              <a:ext uri="{FF2B5EF4-FFF2-40B4-BE49-F238E27FC236}">
+                <a16:creationId xmlns:a16="http://schemas.microsoft.com/office/drawing/2014/main" id="{F87AC64D-7847-4C13-BAD8-0600EB913ADC}"/>
+              </a:ext>
+            </a:extLst>
+          </p:cNvPr>
+          <p:cNvSpPr>
+            <a:spLocks noGrp="1"/>
+          </p:cNvSpPr>
+          <p:nvPr>
+            <p:ph type="title"/>
+          </p:nvPr>
+        </p:nvSpPr>
+        <p:spPr/>
+        <p:txBody>
+          <a:bodyPr/>
+          <a:lstStyle/>
+          <a:p>
+            <a:r>
+              <a:rPr lang="en-US" dirty="0">
+                <a:cs typeface="Calibri Light"/>
+              </a:rPr>
+              <a:t>Web-Technology: Scraping 'Easy' Example </a:t>
+            </a:r>
+            <a:endParaRPr lang="en-US" dirty="0"/>
+          </a:p>
+        </p:txBody>
+      </p:sp>
+      <p:sp>
+        <p:nvSpPr>
+          <p:cNvPr id="3" name="Content Placeholder 2">
+            <a:extLst>
+              <a:ext uri="{FF2B5EF4-FFF2-40B4-BE49-F238E27FC236}">
+                <a16:creationId xmlns:a16="http://schemas.microsoft.com/office/drawing/2014/main" id="{F45F3650-9C85-4441-B653-85FA72A99387}"/>
+              </a:ext>
+            </a:extLst>
+          </p:cNvPr>
+          <p:cNvSpPr>
+            <a:spLocks noGrp="1"/>
+          </p:cNvSpPr>
+          <p:nvPr>
+            <p:ph idx="1"/>
+          </p:nvPr>
+        </p:nvSpPr>
+        <p:spPr/>
+        <p:txBody>
+          <a:bodyPr vert="horz" lIns="91440" tIns="45720" rIns="91440" bIns="45720" rtlCol="0" anchor="t">
+            <a:normAutofit/>
+          </a:bodyPr>
+          <a:lstStyle/>
+          <a:p>
+            <a:r>
+              <a:rPr lang="en-US" dirty="0">
+                <a:cs typeface="Calibri"/>
+              </a:rPr>
+              <a:t>Suppose webpage </a:t>
+            </a:r>
+            <a:r>
+              <a:rPr lang="en-US" dirty="0" err="1">
+                <a:cs typeface="Calibri"/>
+              </a:rPr>
+              <a:t>alread</a:t>
+            </a:r>
+            <a:r>
+              <a:rPr lang="en-US" dirty="0">
+                <a:cs typeface="Calibri"/>
+              </a:rPr>
+              <a:t> in 'table' format...</a:t>
+            </a:r>
+          </a:p>
+          <a:p>
+            <a:pPr lvl="1"/>
+            <a:r>
+              <a:rPr lang="en-US" dirty="0">
+                <a:cs typeface="Calibri"/>
+                <a:hlinkClick r:id="rId2"/>
+              </a:rPr>
+              <a:t>http://www.nationmaster.com/country-info/stats/Cost-of-living/Average-monthly-disposable-salary/After-tax</a:t>
+            </a:r>
+          </a:p>
+          <a:p>
+            <a:pPr lvl="1"/>
+            <a:endParaRPr lang="en-US" dirty="0">
+              <a:cs typeface="Calibri"/>
+            </a:endParaRPr>
+          </a:p>
+        </p:txBody>
+      </p:sp>
+      <p:pic>
+        <p:nvPicPr>
+          <p:cNvPr id="4" name="Picture 4" descr="A screenshot of a cell phone&#10;&#10;Description generated with very high confidence">
+            <a:extLst>
+              <a:ext uri="{FF2B5EF4-FFF2-40B4-BE49-F238E27FC236}">
+                <a16:creationId xmlns:a16="http://schemas.microsoft.com/office/drawing/2014/main" id="{554D745C-929F-454A-AD00-B2CD7ECFFE92}"/>
+              </a:ext>
+            </a:extLst>
+          </p:cNvPr>
+          <p:cNvPicPr>
+            <a:picLocks noChangeAspect="1"/>
+          </p:cNvPicPr>
+          <p:nvPr/>
+        </p:nvPicPr>
+        <p:blipFill>
+          <a:blip r:embed="rId3"/>
+          <a:stretch>
+            <a:fillRect/>
+          </a:stretch>
+        </p:blipFill>
+        <p:spPr>
+          <a:xfrm>
+            <a:off x="1503870" y="3228662"/>
+            <a:ext cx="7085162" cy="3175506"/>
+          </a:xfrm>
+          <a:prstGeom prst="rect">
+            <a:avLst/>
+          </a:prstGeom>
+        </p:spPr>
+      </p:pic>
+    </p:spTree>
+    <p:extLst>
+      <p:ext uri="{BB962C8B-B14F-4D97-AF65-F5344CB8AC3E}">
+        <p14:creationId xmlns:p14="http://schemas.microsoft.com/office/powerpoint/2010/main" val="4027279288"/>
+      </p:ext>
+    </p:extLst>
+  </p:cSld>
+  <p:clrMapOvr>
+    <a:masterClrMapping/>
+  </p:clrMapOvr>
+</p:sld>
+</file>
+
+<file path=ppt/slides/slide5.xml><?xml version="1.0" encoding="utf-8"?>
+<p:sld xmlns:a="http://schemas.openxmlformats.org/drawingml/2006/main" xmlns:r="http://schemas.openxmlformats.org/officeDocument/2006/relationships" xmlns:p="http://schemas.openxmlformats.org/presentationml/2006/main">
+  <p:cSld>
+    <p:spTree>
+      <p:nvGrpSpPr>
+        <p:cNvPr id="1" name=""/>
+        <p:cNvGrpSpPr/>
+        <p:nvPr/>
+      </p:nvGrpSpPr>
+      <p:grpSpPr>
+        <a:xfrm>
+          <a:off x="0" y="0"/>
+          <a:ext cx="0" cy="0"/>
+          <a:chOff x="0" y="0"/>
+          <a:chExt cx="0" cy="0"/>
+        </a:xfrm>
+      </p:grpSpPr>
+      <p:sp>
+        <p:nvSpPr>
+          <p:cNvPr id="2" name="Title 1">
+            <a:extLst>
+              <a:ext uri="{FF2B5EF4-FFF2-40B4-BE49-F238E27FC236}">
+                <a16:creationId xmlns:a16="http://schemas.microsoft.com/office/drawing/2014/main" id="{41E565C5-7FDF-4295-80A7-9E5741B61C36}"/>
+              </a:ext>
+            </a:extLst>
+          </p:cNvPr>
+          <p:cNvSpPr>
+            <a:spLocks noGrp="1"/>
+          </p:cNvSpPr>
+          <p:nvPr>
+            <p:ph type="title"/>
+          </p:nvPr>
+        </p:nvSpPr>
+        <p:spPr/>
+        <p:txBody>
+          <a:bodyPr/>
+          <a:lstStyle/>
+          <a:p>
+            <a:r>
+              <a:rPr lang="en-US" dirty="0">
+                <a:cs typeface="Calibri Light"/>
+              </a:rPr>
+              <a:t>Web-Technology: Scraping 'Easy' Example </a:t>
+            </a:r>
+            <a:endParaRPr lang="en-US" dirty="0"/>
+          </a:p>
+        </p:txBody>
+      </p:sp>
+      <p:sp>
+        <p:nvSpPr>
+          <p:cNvPr id="3" name="Content Placeholder 2">
+            <a:extLst>
+              <a:ext uri="{FF2B5EF4-FFF2-40B4-BE49-F238E27FC236}">
+                <a16:creationId xmlns:a16="http://schemas.microsoft.com/office/drawing/2014/main" id="{111CA1D3-AF5C-402B-8900-B354B090D6C1}"/>
+              </a:ext>
+            </a:extLst>
+          </p:cNvPr>
+          <p:cNvSpPr>
+            <a:spLocks noGrp="1"/>
+          </p:cNvSpPr>
+          <p:nvPr>
+            <p:ph idx="1"/>
+          </p:nvPr>
+        </p:nvSpPr>
+        <p:spPr>
+          <a:xfrm>
+            <a:off x="838200" y="1825625"/>
+            <a:ext cx="10515600" cy="4825790"/>
+          </a:xfrm>
+        </p:spPr>
+        <p:txBody>
+          <a:bodyPr vert="horz" lIns="91440" tIns="45720" rIns="91440" bIns="45720" rtlCol="0" anchor="t">
+            <a:normAutofit/>
+          </a:bodyPr>
+          <a:lstStyle/>
+          <a:p>
+            <a:pPr marL="0" indent="0">
+              <a:buNone/>
+            </a:pPr>
+            <a:r>
+              <a:rPr lang="en-US" b="1" dirty="0">
+                <a:latin typeface="Courier New"/>
+                <a:cs typeface="Courier New"/>
+              </a:rPr>
+              <a:t>&gt;&gt;&gt; df = </a:t>
+            </a:r>
+            <a:r>
+              <a:rPr lang="en-US" b="1" dirty="0" err="1">
+                <a:latin typeface="Courier New"/>
+                <a:cs typeface="Courier New"/>
+              </a:rPr>
+              <a:t>Pandas.read_html</a:t>
+            </a:r>
+            <a:r>
+              <a:rPr lang="en-US" b="1" dirty="0">
+                <a:latin typeface="Courier New"/>
+                <a:cs typeface="Courier New"/>
+              </a:rPr>
+              <a:t>('</a:t>
+            </a:r>
+            <a:r>
+              <a:rPr lang="en-US" b="1" dirty="0" err="1">
+                <a:latin typeface="Courier New"/>
+                <a:cs typeface="Courier New"/>
+              </a:rPr>
+              <a:t>url</a:t>
+            </a:r>
+            <a:r>
+              <a:rPr lang="en-US" b="1" dirty="0">
+                <a:latin typeface="Courier New"/>
+                <a:cs typeface="Courier New"/>
+              </a:rPr>
+              <a:t>')</a:t>
+            </a:r>
+            <a:endParaRPr lang="en-US" dirty="0"/>
+          </a:p>
+          <a:p>
+            <a:pPr marL="0" indent="0">
+              <a:buNone/>
+            </a:pPr>
+            <a:endParaRPr lang="en-US" b="1" dirty="0">
+              <a:latin typeface="Courier New"/>
+              <a:cs typeface="Courier New"/>
+            </a:endParaRPr>
+          </a:p>
+          <a:p>
+            <a:pPr marL="0" indent="0">
+              <a:buNone/>
+            </a:pPr>
+            <a:endParaRPr lang="en-US" b="1" dirty="0">
+              <a:latin typeface="Courier New"/>
+              <a:cs typeface="Courier New"/>
+            </a:endParaRPr>
+          </a:p>
+          <a:p>
+            <a:endParaRPr lang="en-US" dirty="0">
+              <a:latin typeface="Courier New"/>
+              <a:cs typeface="Courier New"/>
+            </a:endParaRPr>
+          </a:p>
+        </p:txBody>
+      </p:sp>
+      <p:pic>
+        <p:nvPicPr>
+          <p:cNvPr id="4" name="Picture 4" descr="A screenshot of a cell phone&#10;&#10;Description generated with very high confidence">
+            <a:extLst>
+              <a:ext uri="{FF2B5EF4-FFF2-40B4-BE49-F238E27FC236}">
+                <a16:creationId xmlns:a16="http://schemas.microsoft.com/office/drawing/2014/main" id="{0FEFA7CC-46A2-46EC-A959-1817A87BE408}"/>
+              </a:ext>
+            </a:extLst>
+          </p:cNvPr>
+          <p:cNvPicPr>
+            <a:picLocks noChangeAspect="1"/>
+          </p:cNvPicPr>
+          <p:nvPr/>
+        </p:nvPicPr>
+        <p:blipFill>
+          <a:blip r:embed="rId2"/>
+          <a:stretch>
+            <a:fillRect/>
+          </a:stretch>
+        </p:blipFill>
+        <p:spPr>
+          <a:xfrm>
+            <a:off x="1101305" y="2481546"/>
+            <a:ext cx="9658709" cy="2800681"/>
+          </a:xfrm>
+          <a:prstGeom prst="rect">
+            <a:avLst/>
+          </a:prstGeom>
+        </p:spPr>
+      </p:pic>
+      <p:sp>
+        <p:nvSpPr>
+          <p:cNvPr id="6" name="TextBox 5">
+            <a:extLst>
+              <a:ext uri="{FF2B5EF4-FFF2-40B4-BE49-F238E27FC236}">
+                <a16:creationId xmlns:a16="http://schemas.microsoft.com/office/drawing/2014/main" id="{099E0B8D-6B0C-4FFB-8F30-0B56354AD751}"/>
+              </a:ext>
+            </a:extLst>
+          </p:cNvPr>
+          <p:cNvSpPr txBox="1"/>
+          <p:nvPr/>
+        </p:nvSpPr>
+        <p:spPr>
+          <a:xfrm>
+            <a:off x="4724400" y="3193211"/>
+            <a:ext cx="2743200" cy="457200"/>
+          </a:xfrm>
+          <a:prstGeom prst="rect">
+            <a:avLst/>
+          </a:prstGeom>
+        </p:spPr>
+        <p:txBody>
+          <a:bodyPr rot="0" spcFirstLastPara="0" vertOverflow="overflow" horzOverflow="overflow" vert="horz" wrap="square" lIns="91440" tIns="45720" rIns="91440" bIns="45720" numCol="1" spcCol="0" rtlCol="0" fromWordArt="0" anchor="t" anchorCtr="0" forceAA="0" compatLnSpc="1">
+            <a:prstTxWarp prst="textNoShape">
+              <a:avLst/>
+            </a:prstTxWarp>
+            <a:spAutoFit/>
+          </a:bodyPr>
+          <a:lstStyle/>
+          <a:p>
+            <a:pPr algn="ctr"/>
+            <a:r>
+              <a:rPr lang="en-US"/>
+              <a:t>Click to add text</a:t>
+            </a:r>
+          </a:p>
+        </p:txBody>
+      </p:sp>
+      <p:sp>
+        <p:nvSpPr>
+          <p:cNvPr id="7" name="TextBox 6">
+            <a:extLst>
+              <a:ext uri="{FF2B5EF4-FFF2-40B4-BE49-F238E27FC236}">
+                <a16:creationId xmlns:a16="http://schemas.microsoft.com/office/drawing/2014/main" id="{A6AB087E-A582-4C68-93BA-7376DC9836E3}"/>
+              </a:ext>
+            </a:extLst>
+          </p:cNvPr>
+          <p:cNvSpPr txBox="1"/>
+          <p:nvPr/>
+        </p:nvSpPr>
+        <p:spPr>
+          <a:xfrm>
+            <a:off x="1101305" y="5651739"/>
+            <a:ext cx="9658709" cy="830997"/>
+          </a:xfrm>
+          <a:prstGeom prst="rect">
+            <a:avLst/>
+          </a:prstGeom>
+        </p:spPr>
+        <p:style>
+          <a:lnRef idx="2">
+            <a:schemeClr val="accent5"/>
+          </a:lnRef>
+          <a:fillRef idx="1">
+            <a:schemeClr val="lt1"/>
+          </a:fillRef>
+          <a:effectRef idx="0">
+            <a:schemeClr val="accent5"/>
+          </a:effectRef>
+          <a:fontRef idx="minor">
+            <a:schemeClr val="dk1"/>
+          </a:fontRef>
+        </p:style>
+        <p:txBody>
+          <a:bodyPr rot="0" spcFirstLastPara="0" vertOverflow="overflow" horzOverflow="overflow" vert="horz" wrap="square" lIns="91440" tIns="45720" rIns="91440" bIns="45720" numCol="1" spcCol="0" rtlCol="0" fromWordArt="0" anchor="t" anchorCtr="0" forceAA="0" compatLnSpc="1">
+            <a:prstTxWarp prst="textNoShape">
+              <a:avLst/>
+            </a:prstTxWarp>
+            <a:spAutoFit/>
+          </a:bodyPr>
+          <a:lstStyle/>
+          <a:p>
+            <a:pPr marL="285750" indent="-285750">
+              <a:buFont typeface="Arial"/>
+              <a:buChar char="•"/>
+            </a:pPr>
+            <a:r>
+              <a:rPr lang="en-US" sz="2400" dirty="0">
+                <a:cs typeface="Calibri"/>
+              </a:rPr>
+              <a:t>Nice!! </a:t>
+            </a:r>
+            <a:r>
+              <a:rPr lang="en-US" sz="2000" dirty="0">
+                <a:latin typeface="Courier New"/>
+                <a:cs typeface="Courier New"/>
+              </a:rPr>
+              <a:t>Pandas </a:t>
+            </a:r>
+            <a:r>
+              <a:rPr lang="en-US" sz="2000" dirty="0" err="1">
+                <a:latin typeface="Courier New"/>
+                <a:cs typeface="Courier New"/>
+              </a:rPr>
+              <a:t>read_html</a:t>
+            </a:r>
+            <a:r>
+              <a:rPr lang="en-US" sz="2000" dirty="0">
+                <a:latin typeface="Courier New"/>
+                <a:cs typeface="Courier New"/>
+              </a:rPr>
+              <a:t>()</a:t>
+            </a:r>
+            <a:r>
+              <a:rPr lang="en-US" sz="2400" dirty="0">
+                <a:cs typeface="Calibri"/>
+              </a:rPr>
+              <a:t>was 'smart'...we immediately got into a </a:t>
+            </a:r>
+            <a:r>
+              <a:rPr lang="en-US" sz="2400" dirty="0" err="1">
+                <a:cs typeface="Calibri"/>
+              </a:rPr>
+              <a:t>dataframe</a:t>
+            </a:r>
+            <a:r>
+              <a:rPr lang="en-US" sz="2400" dirty="0">
+                <a:cs typeface="Calibri"/>
+              </a:rPr>
+              <a:t> form. </a:t>
+            </a:r>
+            <a:endParaRPr lang="en-US" sz="2400" i="1" dirty="0">
+              <a:cs typeface="Calibri"/>
+            </a:endParaRPr>
+          </a:p>
+        </p:txBody>
+      </p:sp>
+    </p:spTree>
+    <p:extLst>
+      <p:ext uri="{BB962C8B-B14F-4D97-AF65-F5344CB8AC3E}">
+        <p14:creationId xmlns:p14="http://schemas.microsoft.com/office/powerpoint/2010/main" val="3803875101"/>
+      </p:ext>
+    </p:extLst>
+  </p:cSld>
+  <p:clrMapOvr>
+    <a:masterClrMapping/>
+  </p:clrMapOvr>
+</p:sld>
+</file>
+
+<file path=ppt/slides/slide6.xml><?xml version="1.0" encoding="utf-8"?>
+<p:sld xmlns:a="http://schemas.openxmlformats.org/drawingml/2006/main" xmlns:r="http://schemas.openxmlformats.org/officeDocument/2006/relationships" xmlns:p="http://schemas.openxmlformats.org/presentationml/2006/main">
+  <p:cSld>
+    <p:spTree>
+      <p:nvGrpSpPr>
+        <p:cNvPr id="1" name=""/>
+        <p:cNvGrpSpPr/>
+        <p:nvPr/>
+      </p:nvGrpSpPr>
+      <p:grpSpPr>
+        <a:xfrm>
+          <a:off x="0" y="0"/>
+          <a:ext cx="0" cy="0"/>
+          <a:chOff x="0" y="0"/>
+          <a:chExt cx="0" cy="0"/>
+        </a:xfrm>
+      </p:grpSpPr>
+      <p:sp>
+        <p:nvSpPr>
+          <p:cNvPr id="2" name="Title 1">
+            <a:extLst>
+              <a:ext uri="{FF2B5EF4-FFF2-40B4-BE49-F238E27FC236}">
+                <a16:creationId xmlns:a16="http://schemas.microsoft.com/office/drawing/2014/main" id="{CDA4D82C-C8C5-477C-A085-CA7CF7BD824E}"/>
+              </a:ext>
+            </a:extLst>
+          </p:cNvPr>
+          <p:cNvSpPr>
+            <a:spLocks noGrp="1"/>
+          </p:cNvSpPr>
+          <p:nvPr>
+            <p:ph type="title"/>
+          </p:nvPr>
+        </p:nvSpPr>
+        <p:spPr/>
+        <p:txBody>
+          <a:bodyPr/>
+          <a:lstStyle/>
+          <a:p>
+            <a:r>
+              <a:rPr lang="en-US" dirty="0">
+                <a:cs typeface="Calibri Light"/>
+              </a:rPr>
+              <a:t>Web-Technology: Scraping 'Hard' Example</a:t>
+            </a:r>
+            <a:endParaRPr lang="en-US" dirty="0"/>
+          </a:p>
+        </p:txBody>
+      </p:sp>
+      <p:sp>
+        <p:nvSpPr>
+          <p:cNvPr id="3" name="Content Placeholder 2">
+            <a:extLst>
+              <a:ext uri="{FF2B5EF4-FFF2-40B4-BE49-F238E27FC236}">
+                <a16:creationId xmlns:a16="http://schemas.microsoft.com/office/drawing/2014/main" id="{5887C4ED-735F-4EC3-A3A5-09CF39D62D5E}"/>
+              </a:ext>
+            </a:extLst>
+          </p:cNvPr>
+          <p:cNvSpPr>
+            <a:spLocks noGrp="1"/>
+          </p:cNvSpPr>
+          <p:nvPr>
+            <p:ph idx="1"/>
+          </p:nvPr>
+        </p:nvSpPr>
+        <p:spPr/>
+        <p:txBody>
+          <a:bodyPr vert="horz" lIns="91440" tIns="45720" rIns="91440" bIns="45720" rtlCol="0" anchor="t">
+            <a:normAutofit/>
+          </a:bodyPr>
+          <a:lstStyle/>
+          <a:p>
+            <a:r>
+              <a:rPr lang="en-US" dirty="0">
+                <a:cs typeface="Calibri"/>
+              </a:rPr>
+              <a:t>Former scenario easy, tabular data at the forefront</a:t>
+            </a:r>
+          </a:p>
+          <a:p>
+            <a:r>
+              <a:rPr lang="en-US" dirty="0">
+                <a:cs typeface="Calibri"/>
+              </a:rPr>
+              <a:t>But...</a:t>
+            </a:r>
+          </a:p>
+          <a:p>
+            <a:pPr lvl="1"/>
+            <a:r>
+              <a:rPr lang="en-US" dirty="0">
+                <a:cs typeface="Calibri"/>
+              </a:rPr>
+              <a:t>What if tabular data </a:t>
+            </a:r>
+            <a:r>
+              <a:rPr lang="en-US" i="1" dirty="0">
+                <a:cs typeface="Calibri"/>
+              </a:rPr>
+              <a:t>nested</a:t>
+            </a:r>
+            <a:r>
+              <a:rPr lang="en-US" dirty="0">
+                <a:cs typeface="Calibri"/>
+              </a:rPr>
+              <a:t> deep inside an HTML webpage's DOM structure?</a:t>
+            </a:r>
+          </a:p>
+          <a:p>
+            <a:pPr lvl="1"/>
+            <a:r>
+              <a:rPr lang="en-US" dirty="0">
+                <a:cs typeface="Calibri"/>
+              </a:rPr>
+              <a:t>Pandas no longer so useful...</a:t>
+            </a:r>
+          </a:p>
+          <a:p>
+            <a:r>
+              <a:rPr lang="en-US" dirty="0" err="1">
+                <a:latin typeface="Courier New"/>
+                <a:cs typeface="Courier New"/>
+              </a:rPr>
+              <a:t>Pd.read_html</a:t>
+            </a:r>
+            <a:r>
+              <a:rPr lang="en-US" dirty="0">
+                <a:latin typeface="Courier New"/>
+                <a:cs typeface="Courier New"/>
+              </a:rPr>
+              <a:t>('</a:t>
+            </a:r>
+            <a:r>
+              <a:rPr lang="en-US" dirty="0" err="1">
+                <a:latin typeface="Courier New"/>
+                <a:cs typeface="Courier New"/>
+              </a:rPr>
+              <a:t>url</a:t>
+            </a:r>
+            <a:r>
+              <a:rPr lang="en-US" dirty="0">
+                <a:latin typeface="Courier New"/>
+                <a:cs typeface="Courier New"/>
+              </a:rPr>
+              <a:t>')</a:t>
+            </a:r>
+            <a:r>
+              <a:rPr lang="en-US" dirty="0">
+                <a:latin typeface="Calibri"/>
+                <a:cs typeface="Calibri"/>
+              </a:rPr>
+              <a:t> is no longer so smart</a:t>
+            </a:r>
+          </a:p>
+          <a:p>
+            <a:pPr marL="0" indent="0">
+              <a:buNone/>
+            </a:pPr>
+            <a:endParaRPr lang="en-US" b="1" dirty="0">
+              <a:cs typeface="Calibri"/>
+            </a:endParaRPr>
+          </a:p>
+          <a:p>
+            <a:endParaRPr lang="en-US" dirty="0">
+              <a:cs typeface="Calibri"/>
+            </a:endParaRPr>
+          </a:p>
+          <a:p>
+            <a:pPr marL="0" indent="0">
+              <a:buNone/>
+            </a:pPr>
+            <a:endParaRPr lang="en-US" dirty="0">
+              <a:cs typeface="Calibri"/>
+            </a:endParaRPr>
+          </a:p>
+          <a:p>
+            <a:r>
+              <a:rPr lang="en-US" dirty="0">
+                <a:cs typeface="Calibri"/>
+              </a:rPr>
+              <a:t>Therefore, need more </a:t>
+            </a:r>
+            <a:r>
+              <a:rPr lang="en-US" i="1" dirty="0">
+                <a:cs typeface="Calibri"/>
+              </a:rPr>
+              <a:t>granular</a:t>
+            </a:r>
+            <a:r>
+              <a:rPr lang="en-US" dirty="0">
+                <a:cs typeface="Calibri"/>
+              </a:rPr>
+              <a:t> web-scraping methods</a:t>
+            </a:r>
+          </a:p>
+          <a:p>
+            <a:pPr marL="0" indent="0">
+              <a:buNone/>
+            </a:pPr>
+            <a:endParaRPr lang="en-US" dirty="0">
+              <a:cs typeface="Calibri"/>
+            </a:endParaRPr>
+          </a:p>
+          <a:p>
+            <a:pPr marL="457200" lvl="1" indent="0">
+              <a:buNone/>
+            </a:pPr>
+            <a:endParaRPr lang="en-US" dirty="0">
+              <a:cs typeface="Calibri"/>
+            </a:endParaRPr>
+          </a:p>
+          <a:p>
+            <a:endParaRPr lang="en-US" dirty="0">
+              <a:cs typeface="Calibri"/>
+            </a:endParaRPr>
+          </a:p>
+        </p:txBody>
+      </p:sp>
+      <p:pic>
+        <p:nvPicPr>
+          <p:cNvPr id="4" name="Picture 4">
+            <a:extLst>
+              <a:ext uri="{FF2B5EF4-FFF2-40B4-BE49-F238E27FC236}">
+                <a16:creationId xmlns:a16="http://schemas.microsoft.com/office/drawing/2014/main" id="{DC0D2234-0252-4141-BBD7-A6E7A94B1D9C}"/>
+              </a:ext>
+            </a:extLst>
+          </p:cNvPr>
+          <p:cNvPicPr>
+            <a:picLocks noChangeAspect="1"/>
+          </p:cNvPicPr>
+          <p:nvPr/>
+        </p:nvPicPr>
+        <p:blipFill>
+          <a:blip r:embed="rId2"/>
+          <a:stretch>
+            <a:fillRect/>
+          </a:stretch>
+        </p:blipFill>
+        <p:spPr>
+          <a:xfrm>
+            <a:off x="8232472" y="3322553"/>
+            <a:ext cx="2124974" cy="2211346"/>
+          </a:xfrm>
+          <a:prstGeom prst="rect">
+            <a:avLst/>
+          </a:prstGeom>
+        </p:spPr>
+      </p:pic>
+    </p:spTree>
+    <p:extLst>
+      <p:ext uri="{BB962C8B-B14F-4D97-AF65-F5344CB8AC3E}">
+        <p14:creationId xmlns:p14="http://schemas.microsoft.com/office/powerpoint/2010/main" val="2090217696"/>
+      </p:ext>
+    </p:extLst>
+  </p:cSld>
+  <p:clrMapOvr>
+    <a:masterClrMapping/>
+  </p:clrMapOvr>
+</p:sld>
+</file>
+
+<file path=ppt/slides/slide7.xml><?xml version="1.0" encoding="utf-8"?>
+<p:sld xmlns:a="http://schemas.openxmlformats.org/drawingml/2006/main" xmlns:r="http://schemas.openxmlformats.org/officeDocument/2006/relationships" xmlns:p="http://schemas.openxmlformats.org/presentationml/2006/main">
+  <p:cSld>
+    <p:spTree>
+      <p:nvGrpSpPr>
+        <p:cNvPr id="1" name=""/>
+        <p:cNvGrpSpPr/>
+        <p:nvPr/>
+      </p:nvGrpSpPr>
+      <p:grpSpPr>
+        <a:xfrm>
+          <a:off x="0" y="0"/>
+          <a:ext cx="0" cy="0"/>
+          <a:chOff x="0" y="0"/>
+          <a:chExt cx="0" cy="0"/>
+        </a:xfrm>
+      </p:grpSpPr>
+      <p:sp>
+        <p:nvSpPr>
           <p:cNvPr id="10" name="Rectangle: Rounded Corners 9">
             <a:extLst>
               <a:ext uri="{FF2B5EF4-FFF2-40B4-BE49-F238E27FC236}">
@@ -3858,7 +6311,7 @@
               <a:rPr lang="en-US" b="1" dirty="0">
                 <a:cs typeface="Calibri"/>
               </a:rPr>
-              <a:t>Example) </a:t>
+              <a:t>Example </a:t>
             </a:r>
             <a:r>
               <a:rPr lang="en-US" b="1" dirty="0">
@@ -3972,7 +6425,7 @@
 </p:sld>
 </file>
 
-<file path=ppt/slides/slide11.xml><?xml version="1.0" encoding="utf-8"?>
+<file path=ppt/slides/slide8.xml><?xml version="1.0" encoding="utf-8"?>
 <p:sld xmlns:a="http://schemas.openxmlformats.org/drawingml/2006/main" xmlns:r="http://schemas.openxmlformats.org/officeDocument/2006/relationships" xmlns:p="http://schemas.openxmlformats.org/presentationml/2006/main">
   <p:cSld>
     <p:spTree>
@@ -4208,7 +6661,7 @@
 </p:sld>
 </file>
 
-<file path=ppt/slides/slide12.xml><?xml version="1.0" encoding="utf-8"?>
+<file path=ppt/slides/slide9.xml><?xml version="1.0" encoding="utf-8"?>
 <p:sld xmlns:a="http://schemas.openxmlformats.org/drawingml/2006/main" xmlns:r="http://schemas.openxmlformats.org/officeDocument/2006/relationships" xmlns:p="http://schemas.openxmlformats.org/presentationml/2006/main">
   <p:cSld>
     <p:spTree>
@@ -4588,2336 +7041,6 @@
       <p:bldP spid="10" grpId="0"/>
     </p:bldLst>
   </p:timing>
-</p:sld>
-</file>
-
-<file path=ppt/slides/slide13.xml><?xml version="1.0" encoding="utf-8"?>
-<p:sld xmlns:a="http://schemas.openxmlformats.org/drawingml/2006/main" xmlns:r="http://schemas.openxmlformats.org/officeDocument/2006/relationships" xmlns:p="http://schemas.openxmlformats.org/presentationml/2006/main">
-  <p:cSld>
-    <p:spTree>
-      <p:nvGrpSpPr>
-        <p:cNvPr id="1" name=""/>
-        <p:cNvGrpSpPr/>
-        <p:nvPr/>
-      </p:nvGrpSpPr>
-      <p:grpSpPr>
-        <a:xfrm>
-          <a:off x="0" y="0"/>
-          <a:ext cx="0" cy="0"/>
-          <a:chOff x="0" y="0"/>
-          <a:chExt cx="0" cy="0"/>
-        </a:xfrm>
-      </p:grpSpPr>
-      <p:sp>
-        <p:nvSpPr>
-          <p:cNvPr id="2" name="Title 1">
-            <a:extLst>
-              <a:ext uri="{FF2B5EF4-FFF2-40B4-BE49-F238E27FC236}">
-                <a16:creationId xmlns:a16="http://schemas.microsoft.com/office/drawing/2014/main" id="{EFF362B6-8BB8-4FE2-A1A8-E203F08CF15D}"/>
-              </a:ext>
-            </a:extLst>
-          </p:cNvPr>
-          <p:cNvSpPr>
-            <a:spLocks noGrp="1"/>
-          </p:cNvSpPr>
-          <p:nvPr>
-            <p:ph type="title"/>
-          </p:nvPr>
-        </p:nvSpPr>
-        <p:spPr/>
-        <p:txBody>
-          <a:bodyPr/>
-          <a:lstStyle/>
-          <a:p>
-            <a:r>
-              <a:rPr lang="en-US" dirty="0" err="1">
-                <a:cs typeface="Calibri Light"/>
-              </a:rPr>
-              <a:t>BeautifulSoup</a:t>
-            </a:r>
-            <a:r>
-              <a:rPr lang="en-US" dirty="0">
-                <a:cs typeface="Calibri Light"/>
-              </a:rPr>
-              <a:t> + Requests </a:t>
-            </a:r>
-            <a:endParaRPr lang="en-US" dirty="0" err="1"/>
-          </a:p>
-        </p:txBody>
-      </p:sp>
-      <p:sp>
-        <p:nvSpPr>
-          <p:cNvPr id="3" name="Content Placeholder 2">
-            <a:extLst>
-              <a:ext uri="{FF2B5EF4-FFF2-40B4-BE49-F238E27FC236}">
-                <a16:creationId xmlns:a16="http://schemas.microsoft.com/office/drawing/2014/main" id="{5B991963-6DFE-4282-9FC4-34A112F6AADF}"/>
-              </a:ext>
-            </a:extLst>
-          </p:cNvPr>
-          <p:cNvSpPr>
-            <a:spLocks noGrp="1"/>
-          </p:cNvSpPr>
-          <p:nvPr>
-            <p:ph idx="1"/>
-          </p:nvPr>
-        </p:nvSpPr>
-        <p:spPr>
-          <a:xfrm>
-            <a:off x="191219" y="1653097"/>
-            <a:ext cx="4937185" cy="3718734"/>
-          </a:xfrm>
-        </p:spPr>
-        <p:txBody>
-          <a:bodyPr vert="horz" lIns="91440" tIns="45720" rIns="91440" bIns="45720" rtlCol="0" anchor="t">
-            <a:normAutofit/>
-          </a:bodyPr>
-          <a:lstStyle/>
-          <a:p>
-            <a:r>
-              <a:rPr lang="en-US" sz="2000" dirty="0">
-                <a:cs typeface="Calibri"/>
-              </a:rPr>
-              <a:t>Way to circumvent: </a:t>
-            </a:r>
-          </a:p>
-          <a:p>
-            <a:pPr lvl="1"/>
-            <a:r>
-              <a:rPr lang="en-US" sz="2000" i="1" dirty="0" err="1">
-                <a:latin typeface="Courier New"/>
-                <a:cs typeface="Courier New"/>
-              </a:rPr>
-              <a:t>BeautifulSoup</a:t>
-            </a:r>
-            <a:r>
-              <a:rPr lang="en-US" sz="2000" i="1" dirty="0">
-                <a:latin typeface="Courier New"/>
-                <a:cs typeface="Courier New"/>
-              </a:rPr>
-              <a:t> + Requests </a:t>
-            </a:r>
-          </a:p>
-          <a:p>
-            <a:r>
-              <a:rPr lang="en-US" sz="2000" dirty="0">
-                <a:latin typeface="Calibri"/>
-                <a:cs typeface="Calibri"/>
-              </a:rPr>
-              <a:t>A happy medium between direct web-scraping tools and the ease and simplicity of </a:t>
-            </a:r>
-            <a:r>
-              <a:rPr lang="en-US" sz="2000" dirty="0">
-                <a:latin typeface="Courier New"/>
-                <a:cs typeface="Courier New"/>
-              </a:rPr>
-              <a:t>pandas</a:t>
-            </a:r>
-            <a:endParaRPr lang="en-US" sz="2000" dirty="0">
-              <a:latin typeface="Calibri"/>
-              <a:cs typeface="Calibri"/>
-            </a:endParaRPr>
-          </a:p>
-          <a:p>
-            <a:r>
-              <a:rPr lang="en-US" sz="2000" dirty="0">
-                <a:latin typeface="Calibri"/>
-                <a:cs typeface="Calibri"/>
-              </a:rPr>
-              <a:t>Can easily interface with </a:t>
-            </a:r>
-            <a:r>
-              <a:rPr lang="en-US" sz="2000" dirty="0">
-                <a:latin typeface="Courier New"/>
-                <a:cs typeface="Courier New"/>
-              </a:rPr>
-              <a:t>pandas</a:t>
-            </a:r>
-            <a:r>
-              <a:rPr lang="en-US" sz="2000" dirty="0">
-                <a:latin typeface="Calibri"/>
-                <a:cs typeface="Calibri"/>
-              </a:rPr>
-              <a:t> functions</a:t>
-            </a:r>
-            <a:endParaRPr lang="en-US" sz="2000" dirty="0">
-              <a:cs typeface="Calibri"/>
-            </a:endParaRPr>
-          </a:p>
-          <a:p>
-            <a:endParaRPr lang="en-US" sz="2000" dirty="0">
-              <a:latin typeface="Calibri"/>
-              <a:cs typeface="Calibri"/>
-            </a:endParaRPr>
-          </a:p>
-          <a:p>
-            <a:endParaRPr lang="en-US" sz="2000" dirty="0">
-              <a:latin typeface="Calibri"/>
-              <a:cs typeface="Calibri"/>
-            </a:endParaRPr>
-          </a:p>
-        </p:txBody>
-      </p:sp>
-      <p:pic>
-        <p:nvPicPr>
-          <p:cNvPr id="4" name="Picture 4" descr="A screenshot of a cell phone&#10;&#10;Description generated with very high confidence">
-            <a:extLst>
-              <a:ext uri="{FF2B5EF4-FFF2-40B4-BE49-F238E27FC236}">
-                <a16:creationId xmlns:a16="http://schemas.microsoft.com/office/drawing/2014/main" id="{91A894D3-3164-403C-A17A-714999645715}"/>
-              </a:ext>
-            </a:extLst>
-          </p:cNvPr>
-          <p:cNvPicPr>
-            <a:picLocks noChangeAspect="1"/>
-          </p:cNvPicPr>
-          <p:nvPr/>
-        </p:nvPicPr>
-        <p:blipFill>
-          <a:blip r:embed="rId2"/>
-          <a:stretch>
-            <a:fillRect/>
-          </a:stretch>
-        </p:blipFill>
-        <p:spPr>
-          <a:xfrm>
-            <a:off x="5141344" y="1571775"/>
-            <a:ext cx="6912633" cy="4807127"/>
-          </a:xfrm>
-          <a:prstGeom prst="rect">
-            <a:avLst/>
-          </a:prstGeom>
-        </p:spPr>
-      </p:pic>
-    </p:spTree>
-    <p:extLst>
-      <p:ext uri="{BB962C8B-B14F-4D97-AF65-F5344CB8AC3E}">
-        <p14:creationId xmlns:p14="http://schemas.microsoft.com/office/powerpoint/2010/main" val="2278662049"/>
-      </p:ext>
-    </p:extLst>
-  </p:cSld>
-  <p:clrMapOvr>
-    <a:masterClrMapping/>
-  </p:clrMapOvr>
-</p:sld>
-</file>
-
-<file path=ppt/slides/slide14.xml><?xml version="1.0" encoding="utf-8"?>
-<p:sld xmlns:a="http://schemas.openxmlformats.org/drawingml/2006/main" xmlns:r="http://schemas.openxmlformats.org/officeDocument/2006/relationships" xmlns:p="http://schemas.openxmlformats.org/presentationml/2006/main">
-  <p:cSld>
-    <p:spTree>
-      <p:nvGrpSpPr>
-        <p:cNvPr id="1" name=""/>
-        <p:cNvGrpSpPr/>
-        <p:nvPr/>
-      </p:nvGrpSpPr>
-      <p:grpSpPr>
-        <a:xfrm>
-          <a:off x="0" y="0"/>
-          <a:ext cx="0" cy="0"/>
-          <a:chOff x="0" y="0"/>
-          <a:chExt cx="0" cy="0"/>
-        </a:xfrm>
-      </p:grpSpPr>
-      <p:sp>
-        <p:nvSpPr>
-          <p:cNvPr id="2" name="Title 1">
-            <a:extLst>
-              <a:ext uri="{FF2B5EF4-FFF2-40B4-BE49-F238E27FC236}">
-                <a16:creationId xmlns:a16="http://schemas.microsoft.com/office/drawing/2014/main" id="{425F10A8-F4A3-4B27-AF9B-683371A95C32}"/>
-              </a:ext>
-            </a:extLst>
-          </p:cNvPr>
-          <p:cNvSpPr>
-            <a:spLocks noGrp="1"/>
-          </p:cNvSpPr>
-          <p:nvPr>
-            <p:ph type="title"/>
-          </p:nvPr>
-        </p:nvSpPr>
-        <p:spPr/>
-        <p:txBody>
-          <a:bodyPr/>
-          <a:lstStyle/>
-          <a:p>
-            <a:r>
-              <a:rPr lang="en-US" dirty="0">
-                <a:cs typeface="Calibri Light"/>
-              </a:rPr>
-              <a:t>An example workflow...</a:t>
-            </a:r>
-            <a:endParaRPr lang="en-US" dirty="0"/>
-          </a:p>
-        </p:txBody>
-      </p:sp>
-      <p:sp>
-        <p:nvSpPr>
-          <p:cNvPr id="3" name="Content Placeholder 2">
-            <a:extLst>
-              <a:ext uri="{FF2B5EF4-FFF2-40B4-BE49-F238E27FC236}">
-                <a16:creationId xmlns:a16="http://schemas.microsoft.com/office/drawing/2014/main" id="{689E6637-D705-43A0-B34B-8FF23FC1E3CC}"/>
-              </a:ext>
-            </a:extLst>
-          </p:cNvPr>
-          <p:cNvSpPr>
-            <a:spLocks noGrp="1"/>
-          </p:cNvSpPr>
-          <p:nvPr>
-            <p:ph idx="1"/>
-          </p:nvPr>
-        </p:nvSpPr>
-        <p:spPr/>
-        <p:txBody>
-          <a:bodyPr vert="horz" lIns="91440" tIns="45720" rIns="91440" bIns="45720" rtlCol="0" anchor="t">
-            <a:normAutofit lnSpcReduction="10000"/>
-          </a:bodyPr>
-          <a:lstStyle/>
-          <a:p>
-            <a:r>
-              <a:rPr lang="en-US" sz="3600" dirty="0">
-                <a:cs typeface="Calibri"/>
-              </a:rPr>
-              <a:t>Requests</a:t>
-            </a:r>
-            <a:endParaRPr lang="en-US" dirty="0"/>
-          </a:p>
-          <a:p>
-            <a:pPr lvl="1"/>
-            <a:r>
-              <a:rPr lang="en-US" dirty="0">
-                <a:cs typeface="Calibri"/>
-              </a:rPr>
-              <a:t>Interface with web</a:t>
-            </a:r>
-          </a:p>
-          <a:p>
-            <a:endParaRPr lang="en-US" dirty="0">
-              <a:cs typeface="Calibri"/>
-            </a:endParaRPr>
-          </a:p>
-          <a:p>
-            <a:endParaRPr lang="en-US" dirty="0">
-              <a:cs typeface="Calibri"/>
-            </a:endParaRPr>
-          </a:p>
-          <a:p>
-            <a:endParaRPr lang="en-US" dirty="0">
-              <a:cs typeface="Calibri"/>
-            </a:endParaRPr>
-          </a:p>
-          <a:p>
-            <a:endParaRPr lang="en-US" dirty="0">
-              <a:cs typeface="Calibri"/>
-            </a:endParaRPr>
-          </a:p>
-          <a:p>
-            <a:endParaRPr lang="en-US" dirty="0">
-              <a:cs typeface="Calibri"/>
-            </a:endParaRPr>
-          </a:p>
-          <a:p>
-            <a:r>
-              <a:rPr lang="en-US" sz="3600" dirty="0">
-                <a:cs typeface="Calibri"/>
-              </a:rPr>
-              <a:t>Beautiful Soup </a:t>
-            </a:r>
-          </a:p>
-          <a:p>
-            <a:pPr lvl="1"/>
-            <a:r>
-              <a:rPr lang="en-US" dirty="0">
-                <a:cs typeface="Calibri"/>
-              </a:rPr>
-              <a:t>Parse web page</a:t>
-            </a:r>
-          </a:p>
-        </p:txBody>
-      </p:sp>
-      <p:cxnSp>
-        <p:nvCxnSpPr>
-          <p:cNvPr id="4" name="Straight Arrow Connector 3">
-            <a:extLst>
-              <a:ext uri="{FF2B5EF4-FFF2-40B4-BE49-F238E27FC236}">
-                <a16:creationId xmlns:a16="http://schemas.microsoft.com/office/drawing/2014/main" id="{AC738B7D-1574-4285-9C47-7D02AD88EF95}"/>
-              </a:ext>
-            </a:extLst>
-          </p:cNvPr>
-          <p:cNvCxnSpPr/>
-          <p:nvPr/>
-        </p:nvCxnSpPr>
-        <p:spPr>
-          <a:xfrm>
-            <a:off x="4229817" y="2490158"/>
-            <a:ext cx="2524664" cy="1086928"/>
-          </a:xfrm>
-          <a:prstGeom prst="straightConnector1">
-            <a:avLst/>
-          </a:prstGeom>
-          <a:ln w="57150">
-            <a:tailEnd type="triangle"/>
-          </a:ln>
-        </p:spPr>
-        <p:style>
-          <a:lnRef idx="3">
-            <a:schemeClr val="dk1"/>
-          </a:lnRef>
-          <a:fillRef idx="0">
-            <a:schemeClr val="dk1"/>
-          </a:fillRef>
-          <a:effectRef idx="2">
-            <a:schemeClr val="dk1"/>
-          </a:effectRef>
-          <a:fontRef idx="minor">
-            <a:schemeClr val="tx1"/>
-          </a:fontRef>
-        </p:style>
-      </p:cxnSp>
-      <p:cxnSp>
-        <p:nvCxnSpPr>
-          <p:cNvPr id="5" name="Straight Arrow Connector 4">
-            <a:extLst>
-              <a:ext uri="{FF2B5EF4-FFF2-40B4-BE49-F238E27FC236}">
-                <a16:creationId xmlns:a16="http://schemas.microsoft.com/office/drawing/2014/main" id="{D7E634FF-6627-4819-92AC-91195D17F09F}"/>
-              </a:ext>
-            </a:extLst>
-          </p:cNvPr>
-          <p:cNvCxnSpPr>
-            <a:cxnSpLocks/>
-          </p:cNvCxnSpPr>
-          <p:nvPr/>
-        </p:nvCxnSpPr>
-        <p:spPr>
-          <a:xfrm flipV="1">
-            <a:off x="4129176" y="3821500"/>
-            <a:ext cx="2682814" cy="1270958"/>
-          </a:xfrm>
-          <a:prstGeom prst="straightConnector1">
-            <a:avLst/>
-          </a:prstGeom>
-          <a:ln w="57150">
-            <a:tailEnd type="triangle"/>
-          </a:ln>
-        </p:spPr>
-        <p:style>
-          <a:lnRef idx="3">
-            <a:schemeClr val="dk1"/>
-          </a:lnRef>
-          <a:fillRef idx="0">
-            <a:schemeClr val="dk1"/>
-          </a:fillRef>
-          <a:effectRef idx="2">
-            <a:schemeClr val="dk1"/>
-          </a:effectRef>
-          <a:fontRef idx="minor">
-            <a:schemeClr val="tx1"/>
-          </a:fontRef>
-        </p:style>
-      </p:cxnSp>
-      <p:sp>
-        <p:nvSpPr>
-          <p:cNvPr id="6" name="TextBox 5">
-            <a:extLst>
-              <a:ext uri="{FF2B5EF4-FFF2-40B4-BE49-F238E27FC236}">
-                <a16:creationId xmlns:a16="http://schemas.microsoft.com/office/drawing/2014/main" id="{BF647E89-9319-4BD3-BEC5-B86CF275FF0C}"/>
-              </a:ext>
-            </a:extLst>
-          </p:cNvPr>
-          <p:cNvSpPr txBox="1"/>
-          <p:nvPr/>
-        </p:nvSpPr>
-        <p:spPr>
-          <a:xfrm>
-            <a:off x="7059283" y="3358551"/>
-            <a:ext cx="1811549" cy="584775"/>
-          </a:xfrm>
-          <a:prstGeom prst="rect">
-            <a:avLst/>
-          </a:prstGeom>
-        </p:spPr>
-        <p:txBody>
-          <a:bodyPr rot="0" spcFirstLastPara="0" vertOverflow="overflow" horzOverflow="overflow" vert="horz" wrap="square" lIns="91440" tIns="45720" rIns="91440" bIns="45720" numCol="1" spcCol="0" rtlCol="0" fromWordArt="0" anchor="t" anchorCtr="0" forceAA="0" compatLnSpc="1">
-            <a:prstTxWarp prst="textNoShape">
-              <a:avLst/>
-            </a:prstTxWarp>
-            <a:spAutoFit/>
-          </a:bodyPr>
-          <a:lstStyle/>
-          <a:p>
-            <a:pPr>
-              <a:buChar char="•"/>
-            </a:pPr>
-            <a:r>
-              <a:rPr lang="en-US" sz="3200" dirty="0">
-                <a:cs typeface="Arial"/>
-              </a:rPr>
-              <a:t>Pandas  ​</a:t>
-            </a:r>
-            <a:endParaRPr lang="en-US" sz="3200" dirty="0">
-              <a:cs typeface="Calibri"/>
-            </a:endParaRPr>
-          </a:p>
-        </p:txBody>
-      </p:sp>
-    </p:spTree>
-    <p:extLst>
-      <p:ext uri="{BB962C8B-B14F-4D97-AF65-F5344CB8AC3E}">
-        <p14:creationId xmlns:p14="http://schemas.microsoft.com/office/powerpoint/2010/main" val="2520028208"/>
-      </p:ext>
-    </p:extLst>
-  </p:cSld>
-  <p:clrMapOvr>
-    <a:masterClrMapping/>
-  </p:clrMapOvr>
-</p:sld>
-</file>
-
-<file path=ppt/slides/slide15.xml><?xml version="1.0" encoding="utf-8"?>
-<p:sld xmlns:a="http://schemas.openxmlformats.org/drawingml/2006/main" xmlns:r="http://schemas.openxmlformats.org/officeDocument/2006/relationships" xmlns:p="http://schemas.openxmlformats.org/presentationml/2006/main">
-  <p:cSld>
-    <p:spTree>
-      <p:nvGrpSpPr>
-        <p:cNvPr id="1" name=""/>
-        <p:cNvGrpSpPr/>
-        <p:nvPr/>
-      </p:nvGrpSpPr>
-      <p:grpSpPr>
-        <a:xfrm>
-          <a:off x="0" y="0"/>
-          <a:ext cx="0" cy="0"/>
-          <a:chOff x="0" y="0"/>
-          <a:chExt cx="0" cy="0"/>
-        </a:xfrm>
-      </p:grpSpPr>
-      <p:sp>
-        <p:nvSpPr>
-          <p:cNvPr id="2" name="Title 1">
-            <a:extLst>
-              <a:ext uri="{FF2B5EF4-FFF2-40B4-BE49-F238E27FC236}">
-                <a16:creationId xmlns:a16="http://schemas.microsoft.com/office/drawing/2014/main" id="{68DCDD46-C769-4F86-9CD3-E15B0F2C1F87}"/>
-              </a:ext>
-            </a:extLst>
-          </p:cNvPr>
-          <p:cNvSpPr>
-            <a:spLocks noGrp="1"/>
-          </p:cNvSpPr>
-          <p:nvPr>
-            <p:ph type="title"/>
-          </p:nvPr>
-        </p:nvSpPr>
-        <p:spPr/>
-        <p:txBody>
-          <a:bodyPr/>
-          <a:lstStyle/>
-          <a:p>
-            <a:r>
-              <a:rPr lang="en-US" dirty="0"/>
-              <a:t>Requests Python Package</a:t>
-            </a:r>
-          </a:p>
-        </p:txBody>
-      </p:sp>
-      <p:sp>
-        <p:nvSpPr>
-          <p:cNvPr id="3" name="Content Placeholder 2">
-            <a:extLst>
-              <a:ext uri="{FF2B5EF4-FFF2-40B4-BE49-F238E27FC236}">
-                <a16:creationId xmlns:a16="http://schemas.microsoft.com/office/drawing/2014/main" id="{B8A5C19E-6E87-4B0E-862A-C77659B25197}"/>
-              </a:ext>
-            </a:extLst>
-          </p:cNvPr>
-          <p:cNvSpPr>
-            <a:spLocks noGrp="1"/>
-          </p:cNvSpPr>
-          <p:nvPr>
-            <p:ph idx="1"/>
-          </p:nvPr>
-        </p:nvSpPr>
-        <p:spPr>
-          <a:xfrm>
-            <a:off x="838200" y="2528047"/>
-            <a:ext cx="10515600" cy="3964828"/>
-          </a:xfrm>
-        </p:spPr>
-        <p:txBody>
-          <a:bodyPr>
-            <a:normAutofit/>
-          </a:bodyPr>
-          <a:lstStyle/>
-          <a:p>
-            <a:r>
-              <a:rPr lang="en-US" dirty="0"/>
-              <a:t>Pros</a:t>
-            </a:r>
-          </a:p>
-          <a:p>
-            <a:pPr lvl="1"/>
-            <a:r>
-              <a:rPr lang="en-US" dirty="0"/>
-              <a:t>Included in Anaconda Python distribution</a:t>
-            </a:r>
-          </a:p>
-          <a:p>
-            <a:pPr lvl="1"/>
-            <a:r>
-              <a:rPr lang="en-US" dirty="0"/>
-              <a:t>Allows for username and passwords or tokens</a:t>
-            </a:r>
-          </a:p>
-          <a:p>
-            <a:pPr lvl="1"/>
-            <a:r>
-              <a:rPr lang="en-US" dirty="0"/>
-              <a:t> Designed for simple data retrieval</a:t>
-            </a:r>
-          </a:p>
-          <a:p>
-            <a:r>
-              <a:rPr lang="en-US" dirty="0"/>
-              <a:t>Cons</a:t>
-            </a:r>
-          </a:p>
-          <a:p>
-            <a:pPr lvl="1"/>
-            <a:r>
-              <a:rPr lang="en-US" dirty="0"/>
-              <a:t>Doesn't return a </a:t>
-            </a:r>
-            <a:r>
-              <a:rPr lang="en-US" dirty="0" err="1"/>
-              <a:t>DataFrame</a:t>
-            </a:r>
-            <a:endParaRPr lang="en-US" dirty="0"/>
-          </a:p>
-          <a:p>
-            <a:pPr lvl="1"/>
-            <a:r>
-              <a:rPr lang="en-US" dirty="0"/>
-              <a:t>Better suited for JSON formatted </a:t>
-            </a:r>
-            <a:r>
-              <a:rPr lang="en-US" dirty="0" err="1"/>
-              <a:t>urls</a:t>
-            </a:r>
-            <a:endParaRPr lang="en-US" dirty="0"/>
-          </a:p>
-          <a:p>
-            <a:endParaRPr lang="en-US" dirty="0"/>
-          </a:p>
-        </p:txBody>
-      </p:sp>
-      <p:sp>
-        <p:nvSpPr>
-          <p:cNvPr id="4" name="TextBox 3">
-            <a:extLst>
-              <a:ext uri="{FF2B5EF4-FFF2-40B4-BE49-F238E27FC236}">
-                <a16:creationId xmlns:a16="http://schemas.microsoft.com/office/drawing/2014/main" id="{5DC67676-611A-4DE3-9F32-66D6A9E1C21F}"/>
-              </a:ext>
-            </a:extLst>
-          </p:cNvPr>
-          <p:cNvSpPr txBox="1"/>
-          <p:nvPr/>
-        </p:nvSpPr>
-        <p:spPr>
-          <a:xfrm>
-            <a:off x="0" y="1690688"/>
-            <a:ext cx="12192000" cy="523220"/>
-          </a:xfrm>
-          <a:prstGeom prst="rect">
-            <a:avLst/>
-          </a:prstGeom>
-          <a:noFill/>
-        </p:spPr>
-        <p:txBody>
-          <a:bodyPr wrap="square" rtlCol="0">
-            <a:spAutoFit/>
-          </a:bodyPr>
-          <a:lstStyle/>
-          <a:p>
-            <a:pPr algn="ctr"/>
-            <a:r>
-              <a:rPr lang="en-US" sz="2800" dirty="0">
-                <a:latin typeface="Lucida Console" panose="020B0609040504020204" pitchFamily="49" charset="0"/>
-              </a:rPr>
-              <a:t>r = </a:t>
-            </a:r>
-            <a:r>
-              <a:rPr lang="en-US" sz="2800" dirty="0" err="1">
-                <a:latin typeface="Lucida Console" panose="020B0609040504020204" pitchFamily="49" charset="0"/>
-              </a:rPr>
-              <a:t>requests.get</a:t>
-            </a:r>
-            <a:r>
-              <a:rPr lang="en-US" sz="2800" dirty="0">
-                <a:latin typeface="Lucida Console" panose="020B0609040504020204" pitchFamily="49" charset="0"/>
-              </a:rPr>
-              <a:t>(</a:t>
-            </a:r>
-            <a:r>
-              <a:rPr lang="en-US" sz="2800" dirty="0" err="1">
-                <a:latin typeface="Lucida Console" panose="020B0609040504020204" pitchFamily="49" charset="0"/>
-              </a:rPr>
-              <a:t>data_url</a:t>
-            </a:r>
-            <a:r>
-              <a:rPr lang="en-US" sz="2800" dirty="0">
-                <a:latin typeface="Lucida Console" panose="020B0609040504020204" pitchFamily="49" charset="0"/>
-              </a:rPr>
-              <a:t>, headers={'token’: </a:t>
-            </a:r>
-            <a:r>
-              <a:rPr lang="en-US" sz="2800" dirty="0" err="1">
-                <a:latin typeface="Lucida Console" panose="020B0609040504020204" pitchFamily="49" charset="0"/>
-              </a:rPr>
-              <a:t>api_key</a:t>
-            </a:r>
-            <a:r>
-              <a:rPr lang="en-US" sz="2800" dirty="0">
-                <a:latin typeface="Lucida Console" panose="020B0609040504020204" pitchFamily="49" charset="0"/>
-              </a:rPr>
-              <a:t>})</a:t>
-            </a:r>
-          </a:p>
-        </p:txBody>
-      </p:sp>
-    </p:spTree>
-    <p:extLst>
-      <p:ext uri="{BB962C8B-B14F-4D97-AF65-F5344CB8AC3E}">
-        <p14:creationId xmlns:p14="http://schemas.microsoft.com/office/powerpoint/2010/main" val="964416389"/>
-      </p:ext>
-    </p:extLst>
-  </p:cSld>
-  <p:clrMapOvr>
-    <a:masterClrMapping/>
-  </p:clrMapOvr>
-</p:sld>
-</file>
-
-<file path=ppt/slides/slide16.xml><?xml version="1.0" encoding="utf-8"?>
-<p:sld xmlns:a="http://schemas.openxmlformats.org/drawingml/2006/main" xmlns:r="http://schemas.openxmlformats.org/officeDocument/2006/relationships" xmlns:p="http://schemas.openxmlformats.org/presentationml/2006/main">
-  <p:cSld>
-    <p:spTree>
-      <p:nvGrpSpPr>
-        <p:cNvPr id="1" name=""/>
-        <p:cNvGrpSpPr/>
-        <p:nvPr/>
-      </p:nvGrpSpPr>
-      <p:grpSpPr>
-        <a:xfrm>
-          <a:off x="0" y="0"/>
-          <a:ext cx="0" cy="0"/>
-          <a:chOff x="0" y="0"/>
-          <a:chExt cx="0" cy="0"/>
-        </a:xfrm>
-      </p:grpSpPr>
-      <p:sp>
-        <p:nvSpPr>
-          <p:cNvPr id="2" name="Title 1">
-            <a:extLst>
-              <a:ext uri="{FF2B5EF4-FFF2-40B4-BE49-F238E27FC236}">
-                <a16:creationId xmlns:a16="http://schemas.microsoft.com/office/drawing/2014/main" id="{68DCDD46-C769-4F86-9CD3-E15B0F2C1F87}"/>
-              </a:ext>
-            </a:extLst>
-          </p:cNvPr>
-          <p:cNvSpPr>
-            <a:spLocks noGrp="1"/>
-          </p:cNvSpPr>
-          <p:nvPr>
-            <p:ph type="title"/>
-          </p:nvPr>
-        </p:nvSpPr>
-        <p:spPr/>
-        <p:txBody>
-          <a:bodyPr/>
-          <a:lstStyle/>
-          <a:p>
-            <a:r>
-              <a:rPr lang="en-US" dirty="0"/>
-              <a:t>Requests Python Package</a:t>
-            </a:r>
-          </a:p>
-        </p:txBody>
-      </p:sp>
-      <p:pic>
-        <p:nvPicPr>
-          <p:cNvPr id="9" name="Picture 8">
-            <a:extLst>
-              <a:ext uri="{FF2B5EF4-FFF2-40B4-BE49-F238E27FC236}">
-                <a16:creationId xmlns:a16="http://schemas.microsoft.com/office/drawing/2014/main" id="{49FFA1EA-10A1-4A02-9BAE-EEBA7D497541}"/>
-              </a:ext>
-            </a:extLst>
-          </p:cNvPr>
-          <p:cNvPicPr>
-            <a:picLocks noChangeAspect="1"/>
-          </p:cNvPicPr>
-          <p:nvPr/>
-        </p:nvPicPr>
-        <p:blipFill>
-          <a:blip r:embed="rId2"/>
-          <a:stretch>
-            <a:fillRect/>
-          </a:stretch>
-        </p:blipFill>
-        <p:spPr>
-          <a:xfrm>
-            <a:off x="620767" y="1475389"/>
-            <a:ext cx="10172700" cy="2057400"/>
-          </a:xfrm>
-          <a:prstGeom prst="rect">
-            <a:avLst/>
-          </a:prstGeom>
-        </p:spPr>
-      </p:pic>
-      <p:pic>
-        <p:nvPicPr>
-          <p:cNvPr id="10" name="Picture 9">
-            <a:extLst>
-              <a:ext uri="{FF2B5EF4-FFF2-40B4-BE49-F238E27FC236}">
-                <a16:creationId xmlns:a16="http://schemas.microsoft.com/office/drawing/2014/main" id="{9B505260-7143-4F16-A396-7A6131CECDB4}"/>
-              </a:ext>
-            </a:extLst>
-          </p:cNvPr>
-          <p:cNvPicPr>
-            <a:picLocks noChangeAspect="1"/>
-          </p:cNvPicPr>
-          <p:nvPr/>
-        </p:nvPicPr>
-        <p:blipFill>
-          <a:blip r:embed="rId3"/>
-          <a:stretch>
-            <a:fillRect/>
-          </a:stretch>
-        </p:blipFill>
-        <p:spPr>
-          <a:xfrm>
-            <a:off x="4783192" y="2632787"/>
-            <a:ext cx="6010275" cy="3486150"/>
-          </a:xfrm>
-          <a:prstGeom prst="rect">
-            <a:avLst/>
-          </a:prstGeom>
-        </p:spPr>
-      </p:pic>
-    </p:spTree>
-    <p:extLst>
-      <p:ext uri="{BB962C8B-B14F-4D97-AF65-F5344CB8AC3E}">
-        <p14:creationId xmlns:p14="http://schemas.microsoft.com/office/powerpoint/2010/main" val="4253956594"/>
-      </p:ext>
-    </p:extLst>
-  </p:cSld>
-  <p:clrMapOvr>
-    <a:masterClrMapping/>
-  </p:clrMapOvr>
-</p:sld>
-</file>
-
-<file path=ppt/slides/slide2.xml><?xml version="1.0" encoding="utf-8"?>
-<p:sld xmlns:a="http://schemas.openxmlformats.org/drawingml/2006/main" xmlns:r="http://schemas.openxmlformats.org/officeDocument/2006/relationships" xmlns:p="http://schemas.openxmlformats.org/presentationml/2006/main">
-  <p:cSld>
-    <p:spTree>
-      <p:nvGrpSpPr>
-        <p:cNvPr id="1" name=""/>
-        <p:cNvGrpSpPr/>
-        <p:nvPr/>
-      </p:nvGrpSpPr>
-      <p:grpSpPr>
-        <a:xfrm>
-          <a:off x="0" y="0"/>
-          <a:ext cx="0" cy="0"/>
-          <a:chOff x="0" y="0"/>
-          <a:chExt cx="0" cy="0"/>
-        </a:xfrm>
-      </p:grpSpPr>
-      <p:sp>
-        <p:nvSpPr>
-          <p:cNvPr id="2" name="Title 1">
-            <a:extLst>
-              <a:ext uri="{FF2B5EF4-FFF2-40B4-BE49-F238E27FC236}">
-                <a16:creationId xmlns:a16="http://schemas.microsoft.com/office/drawing/2014/main" id="{C692A937-B488-4D1F-9E2A-2F1C0BB7BBE7}"/>
-              </a:ext>
-            </a:extLst>
-          </p:cNvPr>
-          <p:cNvSpPr>
-            <a:spLocks noGrp="1"/>
-          </p:cNvSpPr>
-          <p:nvPr>
-            <p:ph type="title"/>
-          </p:nvPr>
-        </p:nvSpPr>
-        <p:spPr/>
-        <p:txBody>
-          <a:bodyPr/>
-          <a:lstStyle/>
-          <a:p>
-            <a:r>
-              <a:rPr lang="en-US" dirty="0"/>
-              <a:t>Sally the Scientist, Activist</a:t>
-            </a:r>
-          </a:p>
-        </p:txBody>
-      </p:sp>
-      <p:sp>
-        <p:nvSpPr>
-          <p:cNvPr id="3" name="Content Placeholder 2">
-            <a:extLst>
-              <a:ext uri="{FF2B5EF4-FFF2-40B4-BE49-F238E27FC236}">
-                <a16:creationId xmlns:a16="http://schemas.microsoft.com/office/drawing/2014/main" id="{7EBC08F2-3F96-4262-94D2-3303B28469CE}"/>
-              </a:ext>
-            </a:extLst>
-          </p:cNvPr>
-          <p:cNvSpPr>
-            <a:spLocks noGrp="1"/>
-          </p:cNvSpPr>
-          <p:nvPr>
-            <p:ph idx="1"/>
-          </p:nvPr>
-        </p:nvSpPr>
-        <p:spPr/>
-        <p:txBody>
-          <a:bodyPr/>
-          <a:lstStyle/>
-          <a:p>
-            <a:r>
-              <a:rPr lang="en-US" dirty="0"/>
-              <a:t>Concerned about climate change</a:t>
-            </a:r>
-          </a:p>
-          <a:p>
-            <a:r>
-              <a:rPr lang="en-US" dirty="0"/>
-              <a:t>Self exploration</a:t>
-            </a:r>
-          </a:p>
-          <a:p>
-            <a:r>
-              <a:rPr lang="en-US" dirty="0"/>
-              <a:t>Novice with computer languages</a:t>
-            </a:r>
-          </a:p>
-          <a:p>
-            <a:r>
-              <a:rPr lang="en-US" dirty="0"/>
-              <a:t>Novice with web service technology</a:t>
-            </a:r>
-          </a:p>
-          <a:p>
-            <a:r>
-              <a:rPr lang="en-US" dirty="0"/>
-              <a:t>OS agnostic</a:t>
-            </a:r>
-          </a:p>
-        </p:txBody>
-      </p:sp>
-    </p:spTree>
-    <p:extLst>
-      <p:ext uri="{BB962C8B-B14F-4D97-AF65-F5344CB8AC3E}">
-        <p14:creationId xmlns:p14="http://schemas.microsoft.com/office/powerpoint/2010/main" val="2411416320"/>
-      </p:ext>
-    </p:extLst>
-  </p:cSld>
-  <p:clrMapOvr>
-    <a:masterClrMapping/>
-  </p:clrMapOvr>
-</p:sld>
-</file>
-
-<file path=ppt/slides/slide3.xml><?xml version="1.0" encoding="utf-8"?>
-<p:sld xmlns:a="http://schemas.openxmlformats.org/drawingml/2006/main" xmlns:r="http://schemas.openxmlformats.org/officeDocument/2006/relationships" xmlns:p="http://schemas.openxmlformats.org/presentationml/2006/main">
-  <p:cSld>
-    <p:spTree>
-      <p:nvGrpSpPr>
-        <p:cNvPr id="1" name=""/>
-        <p:cNvGrpSpPr/>
-        <p:nvPr/>
-      </p:nvGrpSpPr>
-      <p:grpSpPr>
-        <a:xfrm>
-          <a:off x="0" y="0"/>
-          <a:ext cx="0" cy="0"/>
-          <a:chOff x="0" y="0"/>
-          <a:chExt cx="0" cy="0"/>
-        </a:xfrm>
-      </p:grpSpPr>
-      <p:sp>
-        <p:nvSpPr>
-          <p:cNvPr id="2" name="Title 1">
-            <a:extLst>
-              <a:ext uri="{FF2B5EF4-FFF2-40B4-BE49-F238E27FC236}">
-                <a16:creationId xmlns:a16="http://schemas.microsoft.com/office/drawing/2014/main" id="{FC86FC9C-A590-4DBB-8DFE-9BA74E9659BF}"/>
-              </a:ext>
-            </a:extLst>
-          </p:cNvPr>
-          <p:cNvSpPr>
-            <a:spLocks noGrp="1"/>
-          </p:cNvSpPr>
-          <p:nvPr>
-            <p:ph type="title"/>
-          </p:nvPr>
-        </p:nvSpPr>
-        <p:spPr/>
-        <p:txBody>
-          <a:bodyPr/>
-          <a:lstStyle/>
-          <a:p>
-            <a:r>
-              <a:rPr lang="en-US" dirty="0"/>
-              <a:t>Web service technologies</a:t>
-            </a:r>
-          </a:p>
-        </p:txBody>
-      </p:sp>
-      <p:sp>
-        <p:nvSpPr>
-          <p:cNvPr id="3" name="Content Placeholder 2">
-            <a:extLst>
-              <a:ext uri="{FF2B5EF4-FFF2-40B4-BE49-F238E27FC236}">
-                <a16:creationId xmlns:a16="http://schemas.microsoft.com/office/drawing/2014/main" id="{0124E71F-E38A-449E-8C98-C9863DD8B494}"/>
-              </a:ext>
-            </a:extLst>
-          </p:cNvPr>
-          <p:cNvSpPr>
-            <a:spLocks noGrp="1"/>
-          </p:cNvSpPr>
-          <p:nvPr>
-            <p:ph idx="1"/>
-          </p:nvPr>
-        </p:nvSpPr>
-        <p:spPr/>
-        <p:txBody>
-          <a:bodyPr/>
-          <a:lstStyle/>
-          <a:p>
-            <a:r>
-              <a:rPr lang="en-US" dirty="0"/>
-              <a:t>Need: access and import climate change data from various agencies into a useful form inside an analysis platform, </a:t>
-            </a:r>
-            <a:r>
-              <a:rPr lang="en-US" dirty="0" err="1"/>
-              <a:t>Jupyter</a:t>
-            </a:r>
-            <a:r>
-              <a:rPr lang="en-US" dirty="0"/>
-              <a:t> notebook</a:t>
-            </a:r>
-          </a:p>
-          <a:p>
-            <a:endParaRPr lang="en-US" dirty="0"/>
-          </a:p>
-          <a:p>
-            <a:r>
-              <a:rPr lang="en-US" dirty="0"/>
-              <a:t>Requirements</a:t>
-            </a:r>
-          </a:p>
-          <a:p>
-            <a:pPr lvl="1"/>
-            <a:r>
-              <a:rPr lang="en-US" dirty="0"/>
-              <a:t>Minimal install requirements</a:t>
-            </a:r>
-          </a:p>
-          <a:p>
-            <a:pPr lvl="1"/>
-            <a:r>
-              <a:rPr lang="en-US" dirty="0"/>
-              <a:t>Available on all major OSes</a:t>
-            </a:r>
-          </a:p>
-          <a:p>
-            <a:pPr lvl="1"/>
-            <a:r>
-              <a:rPr lang="en-US" dirty="0"/>
-              <a:t>Simple command/functional interface</a:t>
-            </a:r>
-          </a:p>
-          <a:p>
-            <a:pPr lvl="1"/>
-            <a:r>
-              <a:rPr lang="en-US" dirty="0"/>
-              <a:t>Able to interface with desired data sources</a:t>
-            </a:r>
-          </a:p>
-          <a:p>
-            <a:endParaRPr lang="en-US" dirty="0"/>
-          </a:p>
-          <a:p>
-            <a:endParaRPr lang="en-US" dirty="0"/>
-          </a:p>
-          <a:p>
-            <a:endParaRPr lang="en-US" dirty="0"/>
-          </a:p>
-        </p:txBody>
-      </p:sp>
-    </p:spTree>
-    <p:extLst>
-      <p:ext uri="{BB962C8B-B14F-4D97-AF65-F5344CB8AC3E}">
-        <p14:creationId xmlns:p14="http://schemas.microsoft.com/office/powerpoint/2010/main" val="2038867840"/>
-      </p:ext>
-    </p:extLst>
-  </p:cSld>
-  <p:clrMapOvr>
-    <a:masterClrMapping/>
-  </p:clrMapOvr>
-</p:sld>
-</file>
-
-<file path=ppt/slides/slide4.xml><?xml version="1.0" encoding="utf-8"?>
-<p:sld xmlns:a="http://schemas.openxmlformats.org/drawingml/2006/main" xmlns:r="http://schemas.openxmlformats.org/officeDocument/2006/relationships" xmlns:p="http://schemas.openxmlformats.org/presentationml/2006/main">
-  <p:cSld>
-    <p:spTree>
-      <p:nvGrpSpPr>
-        <p:cNvPr id="1" name=""/>
-        <p:cNvGrpSpPr/>
-        <p:nvPr/>
-      </p:nvGrpSpPr>
-      <p:grpSpPr>
-        <a:xfrm>
-          <a:off x="0" y="0"/>
-          <a:ext cx="0" cy="0"/>
-          <a:chOff x="0" y="0"/>
-          <a:chExt cx="0" cy="0"/>
-        </a:xfrm>
-      </p:grpSpPr>
-      <p:sp>
-        <p:nvSpPr>
-          <p:cNvPr id="2" name="Title 1">
-            <a:extLst>
-              <a:ext uri="{FF2B5EF4-FFF2-40B4-BE49-F238E27FC236}">
-                <a16:creationId xmlns:a16="http://schemas.microsoft.com/office/drawing/2014/main" id="{68DCDD46-C769-4F86-9CD3-E15B0F2C1F87}"/>
-              </a:ext>
-            </a:extLst>
-          </p:cNvPr>
-          <p:cNvSpPr>
-            <a:spLocks noGrp="1"/>
-          </p:cNvSpPr>
-          <p:nvPr>
-            <p:ph type="title"/>
-          </p:nvPr>
-        </p:nvSpPr>
-        <p:spPr/>
-        <p:txBody>
-          <a:bodyPr/>
-          <a:lstStyle/>
-          <a:p>
-            <a:r>
-              <a:rPr lang="en-US" dirty="0"/>
-              <a:t>curl BASH command</a:t>
-            </a:r>
-          </a:p>
-        </p:txBody>
-      </p:sp>
-      <p:sp>
-        <p:nvSpPr>
-          <p:cNvPr id="3" name="Content Placeholder 2">
-            <a:extLst>
-              <a:ext uri="{FF2B5EF4-FFF2-40B4-BE49-F238E27FC236}">
-                <a16:creationId xmlns:a16="http://schemas.microsoft.com/office/drawing/2014/main" id="{B8A5C19E-6E87-4B0E-862A-C77659B25197}"/>
-              </a:ext>
-            </a:extLst>
-          </p:cNvPr>
-          <p:cNvSpPr>
-            <a:spLocks noGrp="1"/>
-          </p:cNvSpPr>
-          <p:nvPr>
-            <p:ph idx="1"/>
-          </p:nvPr>
-        </p:nvSpPr>
-        <p:spPr>
-          <a:xfrm>
-            <a:off x="838200" y="2528047"/>
-            <a:ext cx="10515600" cy="3964828"/>
-          </a:xfrm>
-        </p:spPr>
-        <p:txBody>
-          <a:bodyPr>
-            <a:normAutofit/>
-          </a:bodyPr>
-          <a:lstStyle/>
-          <a:p>
-            <a:r>
-              <a:rPr lang="en-US" dirty="0"/>
-              <a:t>Pros</a:t>
-            </a:r>
-          </a:p>
-          <a:p>
-            <a:pPr lvl="1"/>
-            <a:r>
-              <a:rPr lang="en-US" dirty="0"/>
-              <a:t>Readily available on Linux systems without installation</a:t>
-            </a:r>
-          </a:p>
-          <a:p>
-            <a:r>
-              <a:rPr lang="en-US" dirty="0"/>
-              <a:t>Cons</a:t>
-            </a:r>
-          </a:p>
-          <a:p>
-            <a:pPr lvl="1"/>
-            <a:r>
-              <a:rPr lang="en-US" dirty="0"/>
-              <a:t>*nix specific</a:t>
-            </a:r>
-          </a:p>
-          <a:p>
-            <a:pPr lvl="1"/>
-            <a:r>
-              <a:rPr lang="en-US" dirty="0"/>
-              <a:t>Requires calling system commands from Python</a:t>
-            </a:r>
-          </a:p>
-        </p:txBody>
-      </p:sp>
-      <p:sp>
-        <p:nvSpPr>
-          <p:cNvPr id="4" name="TextBox 3">
-            <a:extLst>
-              <a:ext uri="{FF2B5EF4-FFF2-40B4-BE49-F238E27FC236}">
-                <a16:creationId xmlns:a16="http://schemas.microsoft.com/office/drawing/2014/main" id="{5DC67676-611A-4DE3-9F32-66D6A9E1C21F}"/>
-              </a:ext>
-            </a:extLst>
-          </p:cNvPr>
-          <p:cNvSpPr txBox="1"/>
-          <p:nvPr/>
-        </p:nvSpPr>
-        <p:spPr>
-          <a:xfrm>
-            <a:off x="0" y="1690688"/>
-            <a:ext cx="12192000" cy="523220"/>
-          </a:xfrm>
-          <a:prstGeom prst="rect">
-            <a:avLst/>
-          </a:prstGeom>
-          <a:noFill/>
-        </p:spPr>
-        <p:txBody>
-          <a:bodyPr wrap="square" rtlCol="0">
-            <a:spAutoFit/>
-          </a:bodyPr>
-          <a:lstStyle/>
-          <a:p>
-            <a:pPr algn="ctr"/>
-            <a:r>
-              <a:rPr lang="en-US" sz="2800" dirty="0">
-                <a:latin typeface="Lucida Console" panose="020B0609040504020204" pitchFamily="49" charset="0"/>
-              </a:rPr>
-              <a:t>curl "https://www.dataurlgoeshere.com"</a:t>
-            </a:r>
-          </a:p>
-        </p:txBody>
-      </p:sp>
-    </p:spTree>
-    <p:extLst>
-      <p:ext uri="{BB962C8B-B14F-4D97-AF65-F5344CB8AC3E}">
-        <p14:creationId xmlns:p14="http://schemas.microsoft.com/office/powerpoint/2010/main" val="523983299"/>
-      </p:ext>
-    </p:extLst>
-  </p:cSld>
-  <p:clrMapOvr>
-    <a:masterClrMapping/>
-  </p:clrMapOvr>
-</p:sld>
-</file>
-
-<file path=ppt/slides/slide5.xml><?xml version="1.0" encoding="utf-8"?>
-<p:sld xmlns:a="http://schemas.openxmlformats.org/drawingml/2006/main" xmlns:r="http://schemas.openxmlformats.org/officeDocument/2006/relationships" xmlns:p="http://schemas.openxmlformats.org/presentationml/2006/main">
-  <p:cSld>
-    <p:spTree>
-      <p:nvGrpSpPr>
-        <p:cNvPr id="1" name=""/>
-        <p:cNvGrpSpPr/>
-        <p:nvPr/>
-      </p:nvGrpSpPr>
-      <p:grpSpPr>
-        <a:xfrm>
-          <a:off x="0" y="0"/>
-          <a:ext cx="0" cy="0"/>
-          <a:chOff x="0" y="0"/>
-          <a:chExt cx="0" cy="0"/>
-        </a:xfrm>
-      </p:grpSpPr>
-      <p:sp>
-        <p:nvSpPr>
-          <p:cNvPr id="2" name="Title 1">
-            <a:extLst>
-              <a:ext uri="{FF2B5EF4-FFF2-40B4-BE49-F238E27FC236}">
-                <a16:creationId xmlns:a16="http://schemas.microsoft.com/office/drawing/2014/main" id="{68DCDD46-C769-4F86-9CD3-E15B0F2C1F87}"/>
-              </a:ext>
-            </a:extLst>
-          </p:cNvPr>
-          <p:cNvSpPr>
-            <a:spLocks noGrp="1"/>
-          </p:cNvSpPr>
-          <p:nvPr>
-            <p:ph type="title"/>
-          </p:nvPr>
-        </p:nvSpPr>
-        <p:spPr/>
-        <p:txBody>
-          <a:bodyPr/>
-          <a:lstStyle/>
-          <a:p>
-            <a:r>
-              <a:rPr lang="en-US" dirty="0"/>
-              <a:t>Pandas Python Package</a:t>
-            </a:r>
-          </a:p>
-        </p:txBody>
-      </p:sp>
-      <p:sp>
-        <p:nvSpPr>
-          <p:cNvPr id="3" name="Content Placeholder 2">
-            <a:extLst>
-              <a:ext uri="{FF2B5EF4-FFF2-40B4-BE49-F238E27FC236}">
-                <a16:creationId xmlns:a16="http://schemas.microsoft.com/office/drawing/2014/main" id="{B8A5C19E-6E87-4B0E-862A-C77659B25197}"/>
-              </a:ext>
-            </a:extLst>
-          </p:cNvPr>
-          <p:cNvSpPr>
-            <a:spLocks noGrp="1"/>
-          </p:cNvSpPr>
-          <p:nvPr>
-            <p:ph idx="1"/>
-          </p:nvPr>
-        </p:nvSpPr>
-        <p:spPr>
-          <a:xfrm>
-            <a:off x="838200" y="2528047"/>
-            <a:ext cx="10515600" cy="3964828"/>
-          </a:xfrm>
-        </p:spPr>
-        <p:txBody>
-          <a:bodyPr>
-            <a:normAutofit/>
-          </a:bodyPr>
-          <a:lstStyle/>
-          <a:p>
-            <a:r>
-              <a:rPr lang="en-US" dirty="0"/>
-              <a:t>Pros</a:t>
-            </a:r>
-          </a:p>
-          <a:p>
-            <a:pPr lvl="1"/>
-            <a:r>
-              <a:rPr lang="en-US" dirty="0"/>
-              <a:t>Included in Anaconda Python distribution</a:t>
-            </a:r>
-          </a:p>
-          <a:p>
-            <a:pPr lvl="1"/>
-            <a:r>
-              <a:rPr lang="en-US" dirty="0"/>
-              <a:t>Can read CSV or JSON formatted data</a:t>
-            </a:r>
-          </a:p>
-          <a:p>
-            <a:pPr lvl="1"/>
-            <a:r>
-              <a:rPr lang="en-US" dirty="0"/>
-              <a:t>Can read straight from URL</a:t>
-            </a:r>
-          </a:p>
-          <a:p>
-            <a:pPr lvl="1"/>
-            <a:r>
-              <a:rPr lang="en-US" dirty="0"/>
-              <a:t> Returns Pandas </a:t>
-            </a:r>
-            <a:r>
-              <a:rPr lang="en-US" dirty="0" err="1"/>
-              <a:t>DataFrame</a:t>
-            </a:r>
-            <a:endParaRPr lang="en-US" dirty="0"/>
-          </a:p>
-          <a:p>
-            <a:pPr lvl="1"/>
-            <a:r>
-              <a:rPr lang="en-US" dirty="0"/>
-              <a:t>Option to easily skip header lines in the file</a:t>
-            </a:r>
-          </a:p>
-          <a:p>
-            <a:r>
-              <a:rPr lang="en-US" dirty="0"/>
-              <a:t>Cons</a:t>
-            </a:r>
-          </a:p>
-          <a:p>
-            <a:pPr lvl="1"/>
-            <a:r>
-              <a:rPr lang="en-US" dirty="0"/>
-              <a:t>Doesn't allow metadata in the header for URL calls</a:t>
-            </a:r>
-          </a:p>
-          <a:p>
-            <a:pPr lvl="1"/>
-            <a:r>
-              <a:rPr lang="en-US" dirty="0"/>
-              <a:t>Not viable for retrieving data deep inside an HTML DOM tree</a:t>
-            </a:r>
-          </a:p>
-        </p:txBody>
-      </p:sp>
-      <p:sp>
-        <p:nvSpPr>
-          <p:cNvPr id="4" name="TextBox 3">
-            <a:extLst>
-              <a:ext uri="{FF2B5EF4-FFF2-40B4-BE49-F238E27FC236}">
-                <a16:creationId xmlns:a16="http://schemas.microsoft.com/office/drawing/2014/main" id="{5DC67676-611A-4DE3-9F32-66D6A9E1C21F}"/>
-              </a:ext>
-            </a:extLst>
-          </p:cNvPr>
-          <p:cNvSpPr txBox="1"/>
-          <p:nvPr/>
-        </p:nvSpPr>
-        <p:spPr>
-          <a:xfrm>
-            <a:off x="0" y="1690688"/>
-            <a:ext cx="12192000" cy="523220"/>
-          </a:xfrm>
-          <a:prstGeom prst="rect">
-            <a:avLst/>
-          </a:prstGeom>
-          <a:noFill/>
-        </p:spPr>
-        <p:txBody>
-          <a:bodyPr wrap="square" rtlCol="0">
-            <a:spAutoFit/>
-          </a:bodyPr>
-          <a:lstStyle/>
-          <a:p>
-            <a:pPr algn="ctr"/>
-            <a:r>
-              <a:rPr lang="en-US" sz="2800" dirty="0">
-                <a:latin typeface="Lucida Console" panose="020B0609040504020204" pitchFamily="49" charset="0"/>
-              </a:rPr>
-              <a:t>df = </a:t>
-            </a:r>
-            <a:r>
-              <a:rPr lang="en-US" sz="2800" dirty="0" err="1">
-                <a:latin typeface="Lucida Console" panose="020B0609040504020204" pitchFamily="49" charset="0"/>
-              </a:rPr>
-              <a:t>pandas.read_csv</a:t>
-            </a:r>
-            <a:r>
-              <a:rPr lang="en-US" sz="2800" dirty="0">
-                <a:latin typeface="Lucida Console" panose="020B0609040504020204" pitchFamily="49" charset="0"/>
-              </a:rPr>
-              <a:t>(</a:t>
-            </a:r>
-            <a:r>
-              <a:rPr lang="en-US" sz="2800" dirty="0" err="1">
-                <a:latin typeface="Lucida Console" panose="020B0609040504020204" pitchFamily="49" charset="0"/>
-              </a:rPr>
-              <a:t>data_url</a:t>
-            </a:r>
-            <a:r>
-              <a:rPr lang="en-US" sz="2800" dirty="0">
-                <a:latin typeface="Lucida Console" panose="020B0609040504020204" pitchFamily="49" charset="0"/>
-              </a:rPr>
-              <a:t>, </a:t>
-            </a:r>
-            <a:r>
-              <a:rPr lang="en-US" sz="2800" dirty="0" err="1">
-                <a:latin typeface="Lucida Console" panose="020B0609040504020204" pitchFamily="49" charset="0"/>
-              </a:rPr>
-              <a:t>skiprows</a:t>
-            </a:r>
-            <a:r>
-              <a:rPr lang="en-US" sz="2800" dirty="0">
-                <a:latin typeface="Lucida Console" panose="020B0609040504020204" pitchFamily="49" charset="0"/>
-              </a:rPr>
-              <a:t>=</a:t>
-            </a:r>
-            <a:r>
-              <a:rPr lang="en-US" sz="2800" dirty="0" err="1">
-                <a:latin typeface="Lucida Console" panose="020B0609040504020204" pitchFamily="49" charset="0"/>
-              </a:rPr>
-              <a:t>header_skip</a:t>
-            </a:r>
-            <a:r>
-              <a:rPr lang="en-US" sz="2800" dirty="0">
-                <a:latin typeface="Lucida Console" panose="020B0609040504020204" pitchFamily="49" charset="0"/>
-              </a:rPr>
-              <a:t>)</a:t>
-            </a:r>
-          </a:p>
-        </p:txBody>
-      </p:sp>
-    </p:spTree>
-    <p:extLst>
-      <p:ext uri="{BB962C8B-B14F-4D97-AF65-F5344CB8AC3E}">
-        <p14:creationId xmlns:p14="http://schemas.microsoft.com/office/powerpoint/2010/main" val="1597963714"/>
-      </p:ext>
-    </p:extLst>
-  </p:cSld>
-  <p:clrMapOvr>
-    <a:masterClrMapping/>
-  </p:clrMapOvr>
-</p:sld>
-</file>
-
-<file path=ppt/slides/slide6.xml><?xml version="1.0" encoding="utf-8"?>
-<p:sld xmlns:a="http://schemas.openxmlformats.org/drawingml/2006/main" xmlns:r="http://schemas.openxmlformats.org/officeDocument/2006/relationships" xmlns:p="http://schemas.openxmlformats.org/presentationml/2006/main">
-  <p:cSld>
-    <p:spTree>
-      <p:nvGrpSpPr>
-        <p:cNvPr id="1" name=""/>
-        <p:cNvGrpSpPr/>
-        <p:nvPr/>
-      </p:nvGrpSpPr>
-      <p:grpSpPr>
-        <a:xfrm>
-          <a:off x="0" y="0"/>
-          <a:ext cx="0" cy="0"/>
-          <a:chOff x="0" y="0"/>
-          <a:chExt cx="0" cy="0"/>
-        </a:xfrm>
-      </p:grpSpPr>
-      <p:sp>
-        <p:nvSpPr>
-          <p:cNvPr id="2" name="Title 1">
-            <a:extLst>
-              <a:ext uri="{FF2B5EF4-FFF2-40B4-BE49-F238E27FC236}">
-                <a16:creationId xmlns:a16="http://schemas.microsoft.com/office/drawing/2014/main" id="{8DDD8859-4345-4FA3-950E-121451DC6904}"/>
-              </a:ext>
-            </a:extLst>
-          </p:cNvPr>
-          <p:cNvSpPr>
-            <a:spLocks noGrp="1"/>
-          </p:cNvSpPr>
-          <p:nvPr>
-            <p:ph type="title"/>
-          </p:nvPr>
-        </p:nvSpPr>
-        <p:spPr/>
-        <p:txBody>
-          <a:bodyPr/>
-          <a:lstStyle/>
-          <a:p>
-            <a:r>
-              <a:rPr lang="en-US" dirty="0"/>
-              <a:t>Pandas Python Package</a:t>
-            </a:r>
-          </a:p>
-        </p:txBody>
-      </p:sp>
-      <p:pic>
-        <p:nvPicPr>
-          <p:cNvPr id="4" name="Picture 3">
-            <a:hlinkClick r:id="rId2"/>
-            <a:extLst>
-              <a:ext uri="{FF2B5EF4-FFF2-40B4-BE49-F238E27FC236}">
-                <a16:creationId xmlns:a16="http://schemas.microsoft.com/office/drawing/2014/main" id="{5D6162A3-7152-4302-A40B-32A9B1ED7189}"/>
-              </a:ext>
-            </a:extLst>
-          </p:cNvPr>
-          <p:cNvPicPr>
-            <a:picLocks noChangeAspect="1"/>
-          </p:cNvPicPr>
-          <p:nvPr/>
-        </p:nvPicPr>
-        <p:blipFill>
-          <a:blip r:embed="rId3"/>
-          <a:stretch>
-            <a:fillRect/>
-          </a:stretch>
-        </p:blipFill>
-        <p:spPr>
-          <a:xfrm>
-            <a:off x="591778" y="1778648"/>
-            <a:ext cx="7414985" cy="4398315"/>
-          </a:xfrm>
-          <a:prstGeom prst="rect">
-            <a:avLst/>
-          </a:prstGeom>
-        </p:spPr>
-      </p:pic>
-      <p:pic>
-        <p:nvPicPr>
-          <p:cNvPr id="5" name="Picture 4">
-            <a:extLst>
-              <a:ext uri="{FF2B5EF4-FFF2-40B4-BE49-F238E27FC236}">
-                <a16:creationId xmlns:a16="http://schemas.microsoft.com/office/drawing/2014/main" id="{05D7F514-6688-4C77-A6F7-4A6208A5D6E5}"/>
-              </a:ext>
-            </a:extLst>
-          </p:cNvPr>
-          <p:cNvPicPr>
-            <a:picLocks noChangeAspect="1"/>
-          </p:cNvPicPr>
-          <p:nvPr/>
-        </p:nvPicPr>
-        <p:blipFill rotWithShape="1">
-          <a:blip r:embed="rId4"/>
-          <a:srcRect b="9678"/>
-          <a:stretch/>
-        </p:blipFill>
-        <p:spPr>
-          <a:xfrm>
-            <a:off x="6409106" y="2248852"/>
-            <a:ext cx="5337113" cy="4244023"/>
-          </a:xfrm>
-          <a:prstGeom prst="rect">
-            <a:avLst/>
-          </a:prstGeom>
-        </p:spPr>
-      </p:pic>
-    </p:spTree>
-    <p:extLst>
-      <p:ext uri="{BB962C8B-B14F-4D97-AF65-F5344CB8AC3E}">
-        <p14:creationId xmlns:p14="http://schemas.microsoft.com/office/powerpoint/2010/main" val="1099840047"/>
-      </p:ext>
-    </p:extLst>
-  </p:cSld>
-  <p:clrMapOvr>
-    <a:masterClrMapping/>
-  </p:clrMapOvr>
-</p:sld>
-</file>
-
-<file path=ppt/slides/slide7.xml><?xml version="1.0" encoding="utf-8"?>
-<p:sld xmlns:a="http://schemas.openxmlformats.org/drawingml/2006/main" xmlns:r="http://schemas.openxmlformats.org/officeDocument/2006/relationships" xmlns:p="http://schemas.openxmlformats.org/presentationml/2006/main">
-  <p:cSld>
-    <p:spTree>
-      <p:nvGrpSpPr>
-        <p:cNvPr id="1" name=""/>
-        <p:cNvGrpSpPr/>
-        <p:nvPr/>
-      </p:nvGrpSpPr>
-      <p:grpSpPr>
-        <a:xfrm>
-          <a:off x="0" y="0"/>
-          <a:ext cx="0" cy="0"/>
-          <a:chOff x="0" y="0"/>
-          <a:chExt cx="0" cy="0"/>
-        </a:xfrm>
-      </p:grpSpPr>
-      <p:sp>
-        <p:nvSpPr>
-          <p:cNvPr id="2" name="Title 1">
-            <a:extLst>
-              <a:ext uri="{FF2B5EF4-FFF2-40B4-BE49-F238E27FC236}">
-                <a16:creationId xmlns:a16="http://schemas.microsoft.com/office/drawing/2014/main" id="{F87AC64D-7847-4C13-BAD8-0600EB913ADC}"/>
-              </a:ext>
-            </a:extLst>
-          </p:cNvPr>
-          <p:cNvSpPr>
-            <a:spLocks noGrp="1"/>
-          </p:cNvSpPr>
-          <p:nvPr>
-            <p:ph type="title"/>
-          </p:nvPr>
-        </p:nvSpPr>
-        <p:spPr/>
-        <p:txBody>
-          <a:bodyPr/>
-          <a:lstStyle/>
-          <a:p>
-            <a:r>
-              <a:rPr lang="en-US" dirty="0">
-                <a:cs typeface="Calibri Light"/>
-              </a:rPr>
-              <a:t>Web-Technology: Scraping 'Easy' Example </a:t>
-            </a:r>
-            <a:endParaRPr lang="en-US" dirty="0"/>
-          </a:p>
-        </p:txBody>
-      </p:sp>
-      <p:sp>
-        <p:nvSpPr>
-          <p:cNvPr id="3" name="Content Placeholder 2">
-            <a:extLst>
-              <a:ext uri="{FF2B5EF4-FFF2-40B4-BE49-F238E27FC236}">
-                <a16:creationId xmlns:a16="http://schemas.microsoft.com/office/drawing/2014/main" id="{F45F3650-9C85-4441-B653-85FA72A99387}"/>
-              </a:ext>
-            </a:extLst>
-          </p:cNvPr>
-          <p:cNvSpPr>
-            <a:spLocks noGrp="1"/>
-          </p:cNvSpPr>
-          <p:nvPr>
-            <p:ph idx="1"/>
-          </p:nvPr>
-        </p:nvSpPr>
-        <p:spPr/>
-        <p:txBody>
-          <a:bodyPr vert="horz" lIns="91440" tIns="45720" rIns="91440" bIns="45720" rtlCol="0" anchor="t">
-            <a:normAutofit/>
-          </a:bodyPr>
-          <a:lstStyle/>
-          <a:p>
-            <a:r>
-              <a:rPr lang="en-US" dirty="0">
-                <a:cs typeface="Calibri"/>
-              </a:rPr>
-              <a:t>Suppose webpage </a:t>
-            </a:r>
-            <a:r>
-              <a:rPr lang="en-US" dirty="0" err="1">
-                <a:cs typeface="Calibri"/>
-              </a:rPr>
-              <a:t>alread</a:t>
-            </a:r>
-            <a:r>
-              <a:rPr lang="en-US" dirty="0">
-                <a:cs typeface="Calibri"/>
-              </a:rPr>
-              <a:t> in 'table' format...</a:t>
-            </a:r>
-          </a:p>
-          <a:p>
-            <a:pPr lvl="1"/>
-            <a:r>
-              <a:rPr lang="en-US" dirty="0">
-                <a:cs typeface="Calibri"/>
-                <a:hlinkClick r:id="rId2"/>
-              </a:rPr>
-              <a:t>http://www.nationmaster.com/country-info/stats/Cost-of-living/Average-monthly-disposable-salary/After-tax</a:t>
-            </a:r>
-          </a:p>
-          <a:p>
-            <a:pPr lvl="1"/>
-            <a:endParaRPr lang="en-US" dirty="0">
-              <a:cs typeface="Calibri"/>
-            </a:endParaRPr>
-          </a:p>
-        </p:txBody>
-      </p:sp>
-      <p:pic>
-        <p:nvPicPr>
-          <p:cNvPr id="4" name="Picture 4" descr="A screenshot of a cell phone&#10;&#10;Description generated with very high confidence">
-            <a:extLst>
-              <a:ext uri="{FF2B5EF4-FFF2-40B4-BE49-F238E27FC236}">
-                <a16:creationId xmlns:a16="http://schemas.microsoft.com/office/drawing/2014/main" id="{554D745C-929F-454A-AD00-B2CD7ECFFE92}"/>
-              </a:ext>
-            </a:extLst>
-          </p:cNvPr>
-          <p:cNvPicPr>
-            <a:picLocks noChangeAspect="1"/>
-          </p:cNvPicPr>
-          <p:nvPr/>
-        </p:nvPicPr>
-        <p:blipFill>
-          <a:blip r:embed="rId3"/>
-          <a:stretch>
-            <a:fillRect/>
-          </a:stretch>
-        </p:blipFill>
-        <p:spPr>
-          <a:xfrm>
-            <a:off x="1503870" y="3228662"/>
-            <a:ext cx="7085162" cy="3175506"/>
-          </a:xfrm>
-          <a:prstGeom prst="rect">
-            <a:avLst/>
-          </a:prstGeom>
-        </p:spPr>
-      </p:pic>
-    </p:spTree>
-    <p:extLst>
-      <p:ext uri="{BB962C8B-B14F-4D97-AF65-F5344CB8AC3E}">
-        <p14:creationId xmlns:p14="http://schemas.microsoft.com/office/powerpoint/2010/main" val="4027279288"/>
-      </p:ext>
-    </p:extLst>
-  </p:cSld>
-  <p:clrMapOvr>
-    <a:masterClrMapping/>
-  </p:clrMapOvr>
-</p:sld>
-</file>
-
-<file path=ppt/slides/slide8.xml><?xml version="1.0" encoding="utf-8"?>
-<p:sld xmlns:a="http://schemas.openxmlformats.org/drawingml/2006/main" xmlns:r="http://schemas.openxmlformats.org/officeDocument/2006/relationships" xmlns:p="http://schemas.openxmlformats.org/presentationml/2006/main">
-  <p:cSld>
-    <p:spTree>
-      <p:nvGrpSpPr>
-        <p:cNvPr id="1" name=""/>
-        <p:cNvGrpSpPr/>
-        <p:nvPr/>
-      </p:nvGrpSpPr>
-      <p:grpSpPr>
-        <a:xfrm>
-          <a:off x="0" y="0"/>
-          <a:ext cx="0" cy="0"/>
-          <a:chOff x="0" y="0"/>
-          <a:chExt cx="0" cy="0"/>
-        </a:xfrm>
-      </p:grpSpPr>
-      <p:sp>
-        <p:nvSpPr>
-          <p:cNvPr id="2" name="Title 1">
-            <a:extLst>
-              <a:ext uri="{FF2B5EF4-FFF2-40B4-BE49-F238E27FC236}">
-                <a16:creationId xmlns:a16="http://schemas.microsoft.com/office/drawing/2014/main" id="{41E565C5-7FDF-4295-80A7-9E5741B61C36}"/>
-              </a:ext>
-            </a:extLst>
-          </p:cNvPr>
-          <p:cNvSpPr>
-            <a:spLocks noGrp="1"/>
-          </p:cNvSpPr>
-          <p:nvPr>
-            <p:ph type="title"/>
-          </p:nvPr>
-        </p:nvSpPr>
-        <p:spPr/>
-        <p:txBody>
-          <a:bodyPr/>
-          <a:lstStyle/>
-          <a:p>
-            <a:r>
-              <a:rPr lang="en-US" dirty="0">
-                <a:cs typeface="Calibri Light"/>
-              </a:rPr>
-              <a:t>Web-Technology: Scraping 'Easy' Example </a:t>
-            </a:r>
-            <a:endParaRPr lang="en-US" dirty="0"/>
-          </a:p>
-        </p:txBody>
-      </p:sp>
-      <p:sp>
-        <p:nvSpPr>
-          <p:cNvPr id="3" name="Content Placeholder 2">
-            <a:extLst>
-              <a:ext uri="{FF2B5EF4-FFF2-40B4-BE49-F238E27FC236}">
-                <a16:creationId xmlns:a16="http://schemas.microsoft.com/office/drawing/2014/main" id="{111CA1D3-AF5C-402B-8900-B354B090D6C1}"/>
-              </a:ext>
-            </a:extLst>
-          </p:cNvPr>
-          <p:cNvSpPr>
-            <a:spLocks noGrp="1"/>
-          </p:cNvSpPr>
-          <p:nvPr>
-            <p:ph idx="1"/>
-          </p:nvPr>
-        </p:nvSpPr>
-        <p:spPr>
-          <a:xfrm>
-            <a:off x="838200" y="1825625"/>
-            <a:ext cx="10515600" cy="4825790"/>
-          </a:xfrm>
-        </p:spPr>
-        <p:txBody>
-          <a:bodyPr vert="horz" lIns="91440" tIns="45720" rIns="91440" bIns="45720" rtlCol="0" anchor="t">
-            <a:normAutofit/>
-          </a:bodyPr>
-          <a:lstStyle/>
-          <a:p>
-            <a:pPr marL="0" indent="0">
-              <a:buNone/>
-            </a:pPr>
-            <a:r>
-              <a:rPr lang="en-US" b="1" dirty="0">
-                <a:latin typeface="Courier New"/>
-                <a:cs typeface="Courier New"/>
-              </a:rPr>
-              <a:t>&gt;&gt;&gt; </a:t>
-            </a:r>
-            <a:r>
-              <a:rPr lang="en-US" b="1" dirty="0" err="1">
-                <a:latin typeface="Courier New"/>
-                <a:cs typeface="Courier New"/>
-              </a:rPr>
-              <a:t>df</a:t>
-            </a:r>
-            <a:r>
-              <a:rPr lang="en-US" b="1" dirty="0">
-                <a:latin typeface="Courier New"/>
-                <a:cs typeface="Courier New"/>
-              </a:rPr>
-              <a:t> = Pandas </a:t>
-            </a:r>
-            <a:r>
-              <a:rPr lang="en-US" b="1" dirty="0" err="1">
-                <a:latin typeface="Courier New"/>
-                <a:cs typeface="Courier New"/>
-              </a:rPr>
-              <a:t>read_html</a:t>
-            </a:r>
-            <a:r>
-              <a:rPr lang="en-US" b="1" dirty="0">
-                <a:latin typeface="Courier New"/>
-                <a:cs typeface="Courier New"/>
-              </a:rPr>
-              <a:t>('</a:t>
-            </a:r>
-            <a:r>
-              <a:rPr lang="en-US" b="1" dirty="0" err="1">
-                <a:latin typeface="Courier New"/>
-                <a:cs typeface="Courier New"/>
-              </a:rPr>
-              <a:t>url</a:t>
-            </a:r>
-            <a:r>
-              <a:rPr lang="en-US" b="1" dirty="0">
-                <a:latin typeface="Courier New"/>
-                <a:cs typeface="Courier New"/>
-              </a:rPr>
-              <a:t>')</a:t>
-            </a:r>
-            <a:endParaRPr lang="en-US" dirty="0"/>
-          </a:p>
-          <a:p>
-            <a:pPr marL="0" indent="0">
-              <a:buNone/>
-            </a:pPr>
-            <a:endParaRPr lang="en-US" b="1" dirty="0">
-              <a:latin typeface="Courier New"/>
-              <a:cs typeface="Courier New"/>
-            </a:endParaRPr>
-          </a:p>
-          <a:p>
-            <a:pPr marL="0" indent="0">
-              <a:buNone/>
-            </a:pPr>
-            <a:endParaRPr lang="en-US" b="1" dirty="0">
-              <a:latin typeface="Courier New"/>
-              <a:cs typeface="Courier New"/>
-            </a:endParaRPr>
-          </a:p>
-          <a:p>
-            <a:endParaRPr lang="en-US" dirty="0">
-              <a:latin typeface="Courier New"/>
-              <a:cs typeface="Courier New"/>
-            </a:endParaRPr>
-          </a:p>
-        </p:txBody>
-      </p:sp>
-      <p:pic>
-        <p:nvPicPr>
-          <p:cNvPr id="4" name="Picture 4" descr="A screenshot of a cell phone&#10;&#10;Description generated with very high confidence">
-            <a:extLst>
-              <a:ext uri="{FF2B5EF4-FFF2-40B4-BE49-F238E27FC236}">
-                <a16:creationId xmlns:a16="http://schemas.microsoft.com/office/drawing/2014/main" id="{0FEFA7CC-46A2-46EC-A959-1817A87BE408}"/>
-              </a:ext>
-            </a:extLst>
-          </p:cNvPr>
-          <p:cNvPicPr>
-            <a:picLocks noChangeAspect="1"/>
-          </p:cNvPicPr>
-          <p:nvPr/>
-        </p:nvPicPr>
-        <p:blipFill>
-          <a:blip r:embed="rId2"/>
-          <a:stretch>
-            <a:fillRect/>
-          </a:stretch>
-        </p:blipFill>
-        <p:spPr>
-          <a:xfrm>
-            <a:off x="1101305" y="2481546"/>
-            <a:ext cx="9658709" cy="2800681"/>
-          </a:xfrm>
-          <a:prstGeom prst="rect">
-            <a:avLst/>
-          </a:prstGeom>
-        </p:spPr>
-      </p:pic>
-      <p:sp>
-        <p:nvSpPr>
-          <p:cNvPr id="6" name="TextBox 5">
-            <a:extLst>
-              <a:ext uri="{FF2B5EF4-FFF2-40B4-BE49-F238E27FC236}">
-                <a16:creationId xmlns:a16="http://schemas.microsoft.com/office/drawing/2014/main" id="{099E0B8D-6B0C-4FFB-8F30-0B56354AD751}"/>
-              </a:ext>
-            </a:extLst>
-          </p:cNvPr>
-          <p:cNvSpPr txBox="1"/>
-          <p:nvPr/>
-        </p:nvSpPr>
-        <p:spPr>
-          <a:xfrm>
-            <a:off x="4724400" y="3193211"/>
-            <a:ext cx="2743200" cy="457200"/>
-          </a:xfrm>
-          <a:prstGeom prst="rect">
-            <a:avLst/>
-          </a:prstGeom>
-        </p:spPr>
-        <p:txBody>
-          <a:bodyPr rot="0" spcFirstLastPara="0" vertOverflow="overflow" horzOverflow="overflow" vert="horz" wrap="square" lIns="91440" tIns="45720" rIns="91440" bIns="45720" numCol="1" spcCol="0" rtlCol="0" fromWordArt="0" anchor="t" anchorCtr="0" forceAA="0" compatLnSpc="1">
-            <a:prstTxWarp prst="textNoShape">
-              <a:avLst/>
-            </a:prstTxWarp>
-            <a:spAutoFit/>
-          </a:bodyPr>
-          <a:lstStyle/>
-          <a:p>
-            <a:pPr algn="ctr"/>
-            <a:r>
-              <a:rPr lang="en-US"/>
-              <a:t>Click to add text</a:t>
-            </a:r>
-          </a:p>
-        </p:txBody>
-      </p:sp>
-      <p:sp>
-        <p:nvSpPr>
-          <p:cNvPr id="7" name="TextBox 6">
-            <a:extLst>
-              <a:ext uri="{FF2B5EF4-FFF2-40B4-BE49-F238E27FC236}">
-                <a16:creationId xmlns:a16="http://schemas.microsoft.com/office/drawing/2014/main" id="{A6AB087E-A582-4C68-93BA-7376DC9836E3}"/>
-              </a:ext>
-            </a:extLst>
-          </p:cNvPr>
-          <p:cNvSpPr txBox="1"/>
-          <p:nvPr/>
-        </p:nvSpPr>
-        <p:spPr>
-          <a:xfrm>
-            <a:off x="1101305" y="5651739"/>
-            <a:ext cx="9658709" cy="830997"/>
-          </a:xfrm>
-          <a:prstGeom prst="rect">
-            <a:avLst/>
-          </a:prstGeom>
-        </p:spPr>
-        <p:style>
-          <a:lnRef idx="2">
-            <a:schemeClr val="accent5"/>
-          </a:lnRef>
-          <a:fillRef idx="1">
-            <a:schemeClr val="lt1"/>
-          </a:fillRef>
-          <a:effectRef idx="0">
-            <a:schemeClr val="accent5"/>
-          </a:effectRef>
-          <a:fontRef idx="minor">
-            <a:schemeClr val="dk1"/>
-          </a:fontRef>
-        </p:style>
-        <p:txBody>
-          <a:bodyPr rot="0" spcFirstLastPara="0" vertOverflow="overflow" horzOverflow="overflow" vert="horz" wrap="square" lIns="91440" tIns="45720" rIns="91440" bIns="45720" numCol="1" spcCol="0" rtlCol="0" fromWordArt="0" anchor="t" anchorCtr="0" forceAA="0" compatLnSpc="1">
-            <a:prstTxWarp prst="textNoShape">
-              <a:avLst/>
-            </a:prstTxWarp>
-            <a:spAutoFit/>
-          </a:bodyPr>
-          <a:lstStyle/>
-          <a:p>
-            <a:pPr marL="285750" indent="-285750">
-              <a:buFont typeface="Arial"/>
-              <a:buChar char="•"/>
-            </a:pPr>
-            <a:r>
-              <a:rPr lang="en-US" sz="2400" dirty="0">
-                <a:cs typeface="Calibri"/>
-              </a:rPr>
-              <a:t>Nice!! </a:t>
-            </a:r>
-            <a:r>
-              <a:rPr lang="en-US" sz="2000" dirty="0">
-                <a:latin typeface="Courier New"/>
-                <a:cs typeface="Courier New"/>
-              </a:rPr>
-              <a:t>Pandas </a:t>
-            </a:r>
-            <a:r>
-              <a:rPr lang="en-US" sz="2000" dirty="0" err="1">
-                <a:latin typeface="Courier New"/>
-                <a:cs typeface="Courier New"/>
-              </a:rPr>
-              <a:t>read_html</a:t>
-            </a:r>
-            <a:r>
-              <a:rPr lang="en-US" sz="2000" dirty="0">
-                <a:latin typeface="Courier New"/>
-                <a:cs typeface="Courier New"/>
-              </a:rPr>
-              <a:t>()</a:t>
-            </a:r>
-            <a:r>
-              <a:rPr lang="en-US" sz="2400" dirty="0">
-                <a:cs typeface="Calibri"/>
-              </a:rPr>
-              <a:t>was 'smart'...we immediately got into a </a:t>
-            </a:r>
-            <a:r>
-              <a:rPr lang="en-US" sz="2400" dirty="0" err="1">
-                <a:cs typeface="Calibri"/>
-              </a:rPr>
-              <a:t>dataframe</a:t>
-            </a:r>
-            <a:r>
-              <a:rPr lang="en-US" sz="2400" dirty="0">
-                <a:cs typeface="Calibri"/>
-              </a:rPr>
-              <a:t> form. </a:t>
-            </a:r>
-            <a:endParaRPr lang="en-US" sz="2400" i="1" dirty="0">
-              <a:cs typeface="Calibri"/>
-            </a:endParaRPr>
-          </a:p>
-        </p:txBody>
-      </p:sp>
-    </p:spTree>
-    <p:extLst>
-      <p:ext uri="{BB962C8B-B14F-4D97-AF65-F5344CB8AC3E}">
-        <p14:creationId xmlns:p14="http://schemas.microsoft.com/office/powerpoint/2010/main" val="3803875101"/>
-      </p:ext>
-    </p:extLst>
-  </p:cSld>
-  <p:clrMapOvr>
-    <a:masterClrMapping/>
-  </p:clrMapOvr>
-</p:sld>
-</file>
-
-<file path=ppt/slides/slide9.xml><?xml version="1.0" encoding="utf-8"?>
-<p:sld xmlns:a="http://schemas.openxmlformats.org/drawingml/2006/main" xmlns:r="http://schemas.openxmlformats.org/officeDocument/2006/relationships" xmlns:p="http://schemas.openxmlformats.org/presentationml/2006/main">
-  <p:cSld>
-    <p:spTree>
-      <p:nvGrpSpPr>
-        <p:cNvPr id="1" name=""/>
-        <p:cNvGrpSpPr/>
-        <p:nvPr/>
-      </p:nvGrpSpPr>
-      <p:grpSpPr>
-        <a:xfrm>
-          <a:off x="0" y="0"/>
-          <a:ext cx="0" cy="0"/>
-          <a:chOff x="0" y="0"/>
-          <a:chExt cx="0" cy="0"/>
-        </a:xfrm>
-      </p:grpSpPr>
-      <p:sp>
-        <p:nvSpPr>
-          <p:cNvPr id="2" name="Title 1">
-            <a:extLst>
-              <a:ext uri="{FF2B5EF4-FFF2-40B4-BE49-F238E27FC236}">
-                <a16:creationId xmlns:a16="http://schemas.microsoft.com/office/drawing/2014/main" id="{CDA4D82C-C8C5-477C-A085-CA7CF7BD824E}"/>
-              </a:ext>
-            </a:extLst>
-          </p:cNvPr>
-          <p:cNvSpPr>
-            <a:spLocks noGrp="1"/>
-          </p:cNvSpPr>
-          <p:nvPr>
-            <p:ph type="title"/>
-          </p:nvPr>
-        </p:nvSpPr>
-        <p:spPr/>
-        <p:txBody>
-          <a:bodyPr/>
-          <a:lstStyle/>
-          <a:p>
-            <a:r>
-              <a:rPr lang="en-US" dirty="0">
-                <a:cs typeface="Calibri Light"/>
-              </a:rPr>
-              <a:t>Web-Technology: Scraping 'Hard' Example</a:t>
-            </a:r>
-            <a:endParaRPr lang="en-US" dirty="0"/>
-          </a:p>
-        </p:txBody>
-      </p:sp>
-      <p:sp>
-        <p:nvSpPr>
-          <p:cNvPr id="3" name="Content Placeholder 2">
-            <a:extLst>
-              <a:ext uri="{FF2B5EF4-FFF2-40B4-BE49-F238E27FC236}">
-                <a16:creationId xmlns:a16="http://schemas.microsoft.com/office/drawing/2014/main" id="{5887C4ED-735F-4EC3-A3A5-09CF39D62D5E}"/>
-              </a:ext>
-            </a:extLst>
-          </p:cNvPr>
-          <p:cNvSpPr>
-            <a:spLocks noGrp="1"/>
-          </p:cNvSpPr>
-          <p:nvPr>
-            <p:ph idx="1"/>
-          </p:nvPr>
-        </p:nvSpPr>
-        <p:spPr/>
-        <p:txBody>
-          <a:bodyPr vert="horz" lIns="91440" tIns="45720" rIns="91440" bIns="45720" rtlCol="0" anchor="t">
-            <a:normAutofit/>
-          </a:bodyPr>
-          <a:lstStyle/>
-          <a:p>
-            <a:r>
-              <a:rPr lang="en-US" dirty="0">
-                <a:cs typeface="Calibri"/>
-              </a:rPr>
-              <a:t>Former scenario easy, tabular data at the forefront</a:t>
-            </a:r>
-          </a:p>
-          <a:p>
-            <a:r>
-              <a:rPr lang="en-US" dirty="0">
-                <a:cs typeface="Calibri"/>
-              </a:rPr>
-              <a:t>But...</a:t>
-            </a:r>
-          </a:p>
-          <a:p>
-            <a:pPr lvl="1"/>
-            <a:r>
-              <a:rPr lang="en-US" dirty="0">
-                <a:cs typeface="Calibri"/>
-              </a:rPr>
-              <a:t>What if tabular data </a:t>
-            </a:r>
-            <a:r>
-              <a:rPr lang="en-US" i="1" dirty="0">
-                <a:cs typeface="Calibri"/>
-              </a:rPr>
-              <a:t>nested</a:t>
-            </a:r>
-            <a:r>
-              <a:rPr lang="en-US" dirty="0">
-                <a:cs typeface="Calibri"/>
-              </a:rPr>
-              <a:t> deep inside an HTML webpage's DOM structure?</a:t>
-            </a:r>
-          </a:p>
-          <a:p>
-            <a:pPr lvl="1"/>
-            <a:r>
-              <a:rPr lang="en-US" dirty="0">
-                <a:cs typeface="Calibri"/>
-              </a:rPr>
-              <a:t>Pandas no longer so useful...</a:t>
-            </a:r>
-          </a:p>
-          <a:p>
-            <a:r>
-              <a:rPr lang="en-US" dirty="0" err="1">
-                <a:latin typeface="Courier New"/>
-                <a:cs typeface="Courier New"/>
-              </a:rPr>
-              <a:t>Pd.read_html</a:t>
-            </a:r>
-            <a:r>
-              <a:rPr lang="en-US" dirty="0">
-                <a:latin typeface="Courier New"/>
-                <a:cs typeface="Courier New"/>
-              </a:rPr>
-              <a:t>('</a:t>
-            </a:r>
-            <a:r>
-              <a:rPr lang="en-US" dirty="0" err="1">
-                <a:latin typeface="Courier New"/>
-                <a:cs typeface="Courier New"/>
-              </a:rPr>
-              <a:t>url</a:t>
-            </a:r>
-            <a:r>
-              <a:rPr lang="en-US" dirty="0">
-                <a:latin typeface="Courier New"/>
-                <a:cs typeface="Courier New"/>
-              </a:rPr>
-              <a:t>')</a:t>
-            </a:r>
-            <a:r>
-              <a:rPr lang="en-US" dirty="0">
-                <a:latin typeface="Calibri"/>
-                <a:cs typeface="Calibri"/>
-              </a:rPr>
-              <a:t> is no longer so smart</a:t>
-            </a:r>
-          </a:p>
-          <a:p>
-            <a:pPr marL="0" indent="0">
-              <a:buNone/>
-            </a:pPr>
-            <a:endParaRPr lang="en-US" b="1" dirty="0">
-              <a:cs typeface="Calibri"/>
-            </a:endParaRPr>
-          </a:p>
-          <a:p>
-            <a:endParaRPr lang="en-US" dirty="0">
-              <a:cs typeface="Calibri"/>
-            </a:endParaRPr>
-          </a:p>
-          <a:p>
-            <a:pPr marL="0" indent="0">
-              <a:buNone/>
-            </a:pPr>
-            <a:endParaRPr lang="en-US" dirty="0">
-              <a:cs typeface="Calibri"/>
-            </a:endParaRPr>
-          </a:p>
-          <a:p>
-            <a:r>
-              <a:rPr lang="en-US" dirty="0">
-                <a:cs typeface="Calibri"/>
-              </a:rPr>
-              <a:t>Therefore, need more </a:t>
-            </a:r>
-            <a:r>
-              <a:rPr lang="en-US" i="1" dirty="0">
-                <a:cs typeface="Calibri"/>
-              </a:rPr>
-              <a:t>granular</a:t>
-            </a:r>
-            <a:r>
-              <a:rPr lang="en-US" dirty="0">
-                <a:cs typeface="Calibri"/>
-              </a:rPr>
-              <a:t> web-scraping methods</a:t>
-            </a:r>
-          </a:p>
-          <a:p>
-            <a:pPr marL="0" indent="0">
-              <a:buNone/>
-            </a:pPr>
-            <a:endParaRPr lang="en-US" dirty="0">
-              <a:cs typeface="Calibri"/>
-            </a:endParaRPr>
-          </a:p>
-          <a:p>
-            <a:pPr marL="457200" lvl="1" indent="0">
-              <a:buNone/>
-            </a:pPr>
-            <a:endParaRPr lang="en-US" dirty="0">
-              <a:cs typeface="Calibri"/>
-            </a:endParaRPr>
-          </a:p>
-          <a:p>
-            <a:endParaRPr lang="en-US" dirty="0">
-              <a:cs typeface="Calibri"/>
-            </a:endParaRPr>
-          </a:p>
-        </p:txBody>
-      </p:sp>
-      <p:pic>
-        <p:nvPicPr>
-          <p:cNvPr id="4" name="Picture 4">
-            <a:extLst>
-              <a:ext uri="{FF2B5EF4-FFF2-40B4-BE49-F238E27FC236}">
-                <a16:creationId xmlns:a16="http://schemas.microsoft.com/office/drawing/2014/main" id="{DC0D2234-0252-4141-BBD7-A6E7A94B1D9C}"/>
-              </a:ext>
-            </a:extLst>
-          </p:cNvPr>
-          <p:cNvPicPr>
-            <a:picLocks noChangeAspect="1"/>
-          </p:cNvPicPr>
-          <p:nvPr/>
-        </p:nvPicPr>
-        <p:blipFill>
-          <a:blip r:embed="rId2"/>
-          <a:stretch>
-            <a:fillRect/>
-          </a:stretch>
-        </p:blipFill>
-        <p:spPr>
-          <a:xfrm>
-            <a:off x="8232472" y="3322553"/>
-            <a:ext cx="2124974" cy="2211346"/>
-          </a:xfrm>
-          <a:prstGeom prst="rect">
-            <a:avLst/>
-          </a:prstGeom>
-        </p:spPr>
-      </p:pic>
-    </p:spTree>
-    <p:extLst>
-      <p:ext uri="{BB962C8B-B14F-4D97-AF65-F5344CB8AC3E}">
-        <p14:creationId xmlns:p14="http://schemas.microsoft.com/office/powerpoint/2010/main" val="2090217696"/>
-      </p:ext>
-    </p:extLst>
-  </p:cSld>
-  <p:clrMapOvr>
-    <a:masterClrMapping/>
-  </p:clrMapOvr>
 </p:sld>
 </file>
 

</xml_diff>

<commit_message>
Added pros/cons page for BeautifulSoup
</commit_message>
<xml_diff>
--- a/doc/design/TechnologyReview.pptx
+++ b/doc/design/TechnologyReview.pptx
@@ -21,7 +21,8 @@
     <p:sldId id="495" r:id="rId15"/>
     <p:sldId id="492" r:id="rId16"/>
     <p:sldId id="496" r:id="rId17"/>
-    <p:sldId id="506" r:id="rId18"/>
+    <p:sldId id="507" r:id="rId18"/>
+    <p:sldId id="506" r:id="rId19"/>
   </p:sldIdLst>
   <p:sldSz cx="12192000" cy="6858000"/>
   <p:notesSz cx="6858000" cy="9144000"/>
@@ -139,253 +140,6 @@
 </p:presentation>
 </file>
 
-<file path=ppt/changesInfos/changesInfo1.xml><?xml version="1.0" encoding="utf-8"?>
-<pc:chgInfo xmlns:a="http://schemas.openxmlformats.org/drawingml/2006/main" xmlns:r="http://schemas.openxmlformats.org/officeDocument/2006/relationships" xmlns:ac="http://schemas.microsoft.com/office/drawing/2013/main/command" xmlns:pc="http://schemas.microsoft.com/office/powerpoint/2013/main/command">
-  <pc:docChgLst>
-    <pc:chgData name="rahul birmiwal" userId="330dd7170b4e395d" providerId="Windows Live" clId="Web-{62AA0489-86CB-4FB1-9030-22EA6906D837}"/>
-    <pc:docChg chg="addSld delSld modSld sldOrd">
-      <pc:chgData name="rahul birmiwal" userId="330dd7170b4e395d" providerId="Windows Live" clId="Web-{62AA0489-86CB-4FB1-9030-22EA6906D837}" dt="2018-05-06T23:37:03.634" v="309"/>
-      <pc:docMkLst>
-        <pc:docMk/>
-      </pc:docMkLst>
-      <pc:sldChg chg="ord">
-        <pc:chgData name="rahul birmiwal" userId="330dd7170b4e395d" providerId="Windows Live" clId="Web-{62AA0489-86CB-4FB1-9030-22EA6906D837}" dt="2018-05-06T23:34:13.554" v="188"/>
-        <pc:sldMkLst>
-          <pc:docMk/>
-          <pc:sldMk cId="1099840047" sldId="495"/>
-        </pc:sldMkLst>
-      </pc:sldChg>
-      <pc:sldChg chg="addSp modSp">
-        <pc:chgData name="rahul birmiwal" userId="330dd7170b4e395d" providerId="Windows Live" clId="Web-{62AA0489-86CB-4FB1-9030-22EA6906D837}" dt="2018-05-06T23:33:40.255" v="187"/>
-        <pc:sldMkLst>
-          <pc:docMk/>
-          <pc:sldMk cId="2278662049" sldId="500"/>
-        </pc:sldMkLst>
-        <pc:spChg chg="mod">
-          <ac:chgData name="rahul birmiwal" userId="330dd7170b4e395d" providerId="Windows Live" clId="Web-{62AA0489-86CB-4FB1-9030-22EA6906D837}" dt="2018-05-06T23:31:23.739" v="133"/>
-          <ac:spMkLst>
-            <pc:docMk/>
-            <pc:sldMk cId="2278662049" sldId="500"/>
-            <ac:spMk id="2" creationId="{EFF362B6-8BB8-4FE2-A1A8-E203F08CF15D}"/>
-          </ac:spMkLst>
-        </pc:spChg>
-        <pc:spChg chg="mod">
-          <ac:chgData name="rahul birmiwal" userId="330dd7170b4e395d" providerId="Windows Live" clId="Web-{62AA0489-86CB-4FB1-9030-22EA6906D837}" dt="2018-05-06T23:33:37.177" v="186"/>
-          <ac:spMkLst>
-            <pc:docMk/>
-            <pc:sldMk cId="2278662049" sldId="500"/>
-            <ac:spMk id="3" creationId="{5B991963-6DFE-4282-9FC4-34A112F6AADF}"/>
-          </ac:spMkLst>
-        </pc:spChg>
-        <pc:picChg chg="add mod">
-          <ac:chgData name="rahul birmiwal" userId="330dd7170b4e395d" providerId="Windows Live" clId="Web-{62AA0489-86CB-4FB1-9030-22EA6906D837}" dt="2018-05-06T23:33:40.255" v="187"/>
-          <ac:picMkLst>
-            <pc:docMk/>
-            <pc:sldMk cId="2278662049" sldId="500"/>
-            <ac:picMk id="4" creationId="{91A894D3-3164-403C-A17A-714999645715}"/>
-          </ac:picMkLst>
-        </pc:picChg>
-      </pc:sldChg>
-      <pc:sldChg chg="addSp delSp modSp">
-        <pc:chgData name="rahul birmiwal" userId="330dd7170b4e395d" providerId="Windows Live" clId="Web-{62AA0489-86CB-4FB1-9030-22EA6906D837}" dt="2018-05-06T23:27:06.612" v="50"/>
-        <pc:sldMkLst>
-          <pc:docMk/>
-          <pc:sldMk cId="353221772" sldId="501"/>
-        </pc:sldMkLst>
-        <pc:spChg chg="mod">
-          <ac:chgData name="rahul birmiwal" userId="330dd7170b4e395d" providerId="Windows Live" clId="Web-{62AA0489-86CB-4FB1-9030-22EA6906D837}" dt="2018-05-06T23:23:26.573" v="16"/>
-          <ac:spMkLst>
-            <pc:docMk/>
-            <pc:sldMk cId="353221772" sldId="501"/>
-            <ac:spMk id="3" creationId="{999871CB-E318-444F-B37F-B0091E440123}"/>
-          </ac:spMkLst>
-        </pc:spChg>
-        <pc:spChg chg="del mod">
-          <ac:chgData name="rahul birmiwal" userId="330dd7170b4e395d" providerId="Windows Live" clId="Web-{62AA0489-86CB-4FB1-9030-22EA6906D837}" dt="2018-05-06T23:25:23.534" v="30"/>
-          <ac:spMkLst>
-            <pc:docMk/>
-            <pc:sldMk cId="353221772" sldId="501"/>
-            <ac:spMk id="6" creationId="{B92215C6-DD28-4E04-BA10-5579BECE04CF}"/>
-          </ac:spMkLst>
-        </pc:spChg>
-        <pc:spChg chg="del mod">
-          <ac:chgData name="rahul birmiwal" userId="330dd7170b4e395d" providerId="Windows Live" clId="Web-{62AA0489-86CB-4FB1-9030-22EA6906D837}" dt="2018-05-06T23:25:26.189" v="32"/>
-          <ac:spMkLst>
-            <pc:docMk/>
-            <pc:sldMk cId="353221772" sldId="501"/>
-            <ac:spMk id="9" creationId="{F8494C6C-193C-4CA6-A73E-3BFBFAFB8125}"/>
-          </ac:spMkLst>
-        </pc:spChg>
-        <pc:spChg chg="add mod ord">
-          <ac:chgData name="rahul birmiwal" userId="330dd7170b4e395d" providerId="Windows Live" clId="Web-{62AA0489-86CB-4FB1-9030-22EA6906D837}" dt="2018-05-06T23:26:39.080" v="44"/>
-          <ac:spMkLst>
-            <pc:docMk/>
-            <pc:sldMk cId="353221772" sldId="501"/>
-            <ac:spMk id="10" creationId="{6A4FA7C0-EE1C-4EDF-BDDF-35AB981339F1}"/>
-          </ac:spMkLst>
-        </pc:spChg>
-        <pc:spChg chg="add del">
-          <ac:chgData name="rahul birmiwal" userId="330dd7170b4e395d" providerId="Windows Live" clId="Web-{62AA0489-86CB-4FB1-9030-22EA6906D837}" dt="2018-05-06T23:26:34.393" v="43"/>
-          <ac:spMkLst>
-            <pc:docMk/>
-            <pc:sldMk cId="353221772" sldId="501"/>
-            <ac:spMk id="11" creationId="{DC8C1C18-C817-4DD8-A67C-85C7037D8B3A}"/>
-          </ac:spMkLst>
-        </pc:spChg>
-        <pc:spChg chg="add mod">
-          <ac:chgData name="rahul birmiwal" userId="330dd7170b4e395d" providerId="Windows Live" clId="Web-{62AA0489-86CB-4FB1-9030-22EA6906D837}" dt="2018-05-06T23:27:06.612" v="50"/>
-          <ac:spMkLst>
-            <pc:docMk/>
-            <pc:sldMk cId="353221772" sldId="501"/>
-            <ac:spMk id="12" creationId="{20D29160-9D6F-489A-810A-53D886C0B2DD}"/>
-          </ac:spMkLst>
-        </pc:spChg>
-        <pc:picChg chg="del">
-          <ac:chgData name="rahul birmiwal" userId="330dd7170b4e395d" providerId="Windows Live" clId="Web-{62AA0489-86CB-4FB1-9030-22EA6906D837}" dt="2018-05-06T23:23:29.276" v="18"/>
-          <ac:picMkLst>
-            <pc:docMk/>
-            <pc:sldMk cId="353221772" sldId="501"/>
-            <ac:picMk id="4" creationId="{5E2589D3-BC46-4031-BDD8-148528E6FAD8}"/>
-          </ac:picMkLst>
-        </pc:picChg>
-        <pc:picChg chg="add mod">
-          <ac:chgData name="rahul birmiwal" userId="330dd7170b4e395d" providerId="Windows Live" clId="Web-{62AA0489-86CB-4FB1-9030-22EA6906D837}" dt="2018-05-06T23:25:29.236" v="33"/>
-          <ac:picMkLst>
-            <pc:docMk/>
-            <pc:sldMk cId="353221772" sldId="501"/>
-            <ac:picMk id="5" creationId="{AD4CFE10-5D5B-419B-99B8-F644907D0813}"/>
-          </ac:picMkLst>
-        </pc:picChg>
-        <pc:picChg chg="del mod">
-          <ac:chgData name="rahul birmiwal" userId="330dd7170b4e395d" providerId="Windows Live" clId="Web-{62AA0489-86CB-4FB1-9030-22EA6906D837}" dt="2018-05-06T23:25:24.595" v="31"/>
-          <ac:picMkLst>
-            <pc:docMk/>
-            <pc:sldMk cId="353221772" sldId="501"/>
-            <ac:picMk id="7" creationId="{D5B004D7-834B-49CD-8339-A7EE8ADCBA6B}"/>
-          </ac:picMkLst>
-        </pc:picChg>
-      </pc:sldChg>
-      <pc:sldChg chg="del">
-        <pc:chgData name="rahul birmiwal" userId="330dd7170b4e395d" providerId="Windows Live" clId="Web-{62AA0489-86CB-4FB1-9030-22EA6906D837}" dt="2018-05-06T23:29:03.910" v="71"/>
-        <pc:sldMkLst>
-          <pc:docMk/>
-          <pc:sldMk cId="1182540523" sldId="502"/>
-        </pc:sldMkLst>
-      </pc:sldChg>
-      <pc:sldChg chg="addSp delSp modSp add replId addAnim delAnim modAnim">
-        <pc:chgData name="rahul birmiwal" userId="330dd7170b4e395d" providerId="Windows Live" clId="Web-{62AA0489-86CB-4FB1-9030-22EA6906D837}" dt="2018-05-06T23:30:33.145" v="128"/>
-        <pc:sldMkLst>
-          <pc:docMk/>
-          <pc:sldMk cId="604071650" sldId="503"/>
-        </pc:sldMkLst>
-        <pc:spChg chg="mod">
-          <ac:chgData name="rahul birmiwal" userId="330dd7170b4e395d" providerId="Windows Live" clId="Web-{62AA0489-86CB-4FB1-9030-22EA6906D837}" dt="2018-05-06T23:27:34.878" v="58"/>
-          <ac:spMkLst>
-            <pc:docMk/>
-            <pc:sldMk cId="604071650" sldId="503"/>
-            <ac:spMk id="6" creationId="{B92215C6-DD28-4E04-BA10-5579BECE04CF}"/>
-          </ac:spMkLst>
-        </pc:spChg>
-        <pc:spChg chg="del mod">
-          <ac:chgData name="rahul birmiwal" userId="330dd7170b4e395d" providerId="Windows Live" clId="Web-{62AA0489-86CB-4FB1-9030-22EA6906D837}" dt="2018-05-06T23:28:18.769" v="70"/>
-          <ac:spMkLst>
-            <pc:docMk/>
-            <pc:sldMk cId="604071650" sldId="503"/>
-            <ac:spMk id="9" creationId="{F8494C6C-193C-4CA6-A73E-3BFBFAFB8125}"/>
-          </ac:spMkLst>
-        </pc:spChg>
-        <pc:spChg chg="add del mod">
-          <ac:chgData name="rahul birmiwal" userId="330dd7170b4e395d" providerId="Windows Live" clId="Web-{62AA0489-86CB-4FB1-9030-22EA6906D837}" dt="2018-05-06T23:30:33.145" v="128"/>
-          <ac:spMkLst>
-            <pc:docMk/>
-            <pc:sldMk cId="604071650" sldId="503"/>
-            <ac:spMk id="10" creationId="{8BCAEBE7-6977-43B1-8754-142F1E3832E6}"/>
-          </ac:spMkLst>
-        </pc:spChg>
-        <pc:picChg chg="add mod">
-          <ac:chgData name="rahul birmiwal" userId="330dd7170b4e395d" providerId="Windows Live" clId="Web-{62AA0489-86CB-4FB1-9030-22EA6906D837}" dt="2018-05-06T23:28:14.722" v="66"/>
-          <ac:picMkLst>
-            <pc:docMk/>
-            <pc:sldMk cId="604071650" sldId="503"/>
-            <ac:picMk id="4" creationId="{83D9E2FC-47DA-4549-BD67-154B8A87476C}"/>
-          </ac:picMkLst>
-        </pc:picChg>
-        <pc:picChg chg="del">
-          <ac:chgData name="rahul birmiwal" userId="330dd7170b4e395d" providerId="Windows Live" clId="Web-{62AA0489-86CB-4FB1-9030-22EA6906D837}" dt="2018-05-06T23:27:14.830" v="51"/>
-          <ac:picMkLst>
-            <pc:docMk/>
-            <pc:sldMk cId="604071650" sldId="503"/>
-            <ac:picMk id="5" creationId="{AD4CFE10-5D5B-419B-99B8-F644907D0813}"/>
-          </ac:picMkLst>
-        </pc:picChg>
-        <pc:picChg chg="del mod">
-          <ac:chgData name="rahul birmiwal" userId="330dd7170b4e395d" providerId="Windows Live" clId="Web-{62AA0489-86CB-4FB1-9030-22EA6906D837}" dt="2018-05-06T23:27:28.268" v="55"/>
-          <ac:picMkLst>
-            <pc:docMk/>
-            <pc:sldMk cId="604071650" sldId="503"/>
-            <ac:picMk id="7" creationId="{D5B004D7-834B-49CD-8339-A7EE8ADCBA6B}"/>
-          </ac:picMkLst>
-        </pc:picChg>
-      </pc:sldChg>
-      <pc:sldChg chg="add replId">
-        <pc:chgData name="rahul birmiwal" userId="330dd7170b4e395d" providerId="Windows Live" clId="Web-{62AA0489-86CB-4FB1-9030-22EA6906D837}" dt="2018-05-06T23:30:24.816" v="124"/>
-        <pc:sldMkLst>
-          <pc:docMk/>
-          <pc:sldMk cId="1208907245" sldId="504"/>
-        </pc:sldMkLst>
-      </pc:sldChg>
-      <pc:sldChg chg="addSp modSp new">
-        <pc:chgData name="rahul birmiwal" userId="330dd7170b4e395d" providerId="Windows Live" clId="Web-{62AA0489-86CB-4FB1-9030-22EA6906D837}" dt="2018-05-06T23:37:03.634" v="308"/>
-        <pc:sldMkLst>
-          <pc:docMk/>
-          <pc:sldMk cId="2520028208" sldId="505"/>
-        </pc:sldMkLst>
-        <pc:spChg chg="mod">
-          <ac:chgData name="rahul birmiwal" userId="330dd7170b4e395d" providerId="Windows Live" clId="Web-{62AA0489-86CB-4FB1-9030-22EA6906D837}" dt="2018-05-06T23:36:52.682" v="293"/>
-          <ac:spMkLst>
-            <pc:docMk/>
-            <pc:sldMk cId="2520028208" sldId="505"/>
-            <ac:spMk id="2" creationId="{425F10A8-F4A3-4B27-AF9B-683371A95C32}"/>
-          </ac:spMkLst>
-        </pc:spChg>
-        <pc:spChg chg="mod">
-          <ac:chgData name="rahul birmiwal" userId="330dd7170b4e395d" providerId="Windows Live" clId="Web-{62AA0489-86CB-4FB1-9030-22EA6906D837}" dt="2018-05-06T23:37:03.634" v="308"/>
-          <ac:spMkLst>
-            <pc:docMk/>
-            <pc:sldMk cId="2520028208" sldId="505"/>
-            <ac:spMk id="3" creationId="{689E6637-D705-43A0-B34B-8FF23FC1E3CC}"/>
-          </ac:spMkLst>
-        </pc:spChg>
-        <pc:spChg chg="add mod">
-          <ac:chgData name="rahul birmiwal" userId="330dd7170b4e395d" providerId="Windows Live" clId="Web-{62AA0489-86CB-4FB1-9030-22EA6906D837}" dt="2018-05-06T23:36:39.744" v="280"/>
-          <ac:spMkLst>
-            <pc:docMk/>
-            <pc:sldMk cId="2520028208" sldId="505"/>
-            <ac:spMk id="6" creationId="{BF647E89-9319-4BD3-BEC5-B86CF275FF0C}"/>
-          </ac:spMkLst>
-        </pc:spChg>
-        <pc:cxnChg chg="add mod">
-          <ac:chgData name="rahul birmiwal" userId="330dd7170b4e395d" providerId="Windows Live" clId="Web-{62AA0489-86CB-4FB1-9030-22EA6906D837}" dt="2018-05-06T23:36:05.681" v="257"/>
-          <ac:cxnSpMkLst>
-            <pc:docMk/>
-            <pc:sldMk cId="2520028208" sldId="505"/>
-            <ac:cxnSpMk id="4" creationId="{AC738B7D-1574-4285-9C47-7D02AD88EF95}"/>
-          </ac:cxnSpMkLst>
-        </pc:cxnChg>
-        <pc:cxnChg chg="add mod">
-          <ac:chgData name="rahul birmiwal" userId="330dd7170b4e395d" providerId="Windows Live" clId="Web-{62AA0489-86CB-4FB1-9030-22EA6906D837}" dt="2018-05-06T23:36:12.056" v="260"/>
-          <ac:cxnSpMkLst>
-            <pc:docMk/>
-            <pc:sldMk cId="2520028208" sldId="505"/>
-            <ac:cxnSpMk id="5" creationId="{D7E634FF-6627-4819-92AC-91195D17F09F}"/>
-          </ac:cxnSpMkLst>
-        </pc:cxnChg>
-      </pc:sldChg>
-    </pc:docChg>
-  </pc:docChgLst>
-</pc:chgInfo>
-</file>
-
 <file path=ppt/slideLayouts/slideLayout1.xml><?xml version="1.0" encoding="utf-8"?>
 <p:sldLayout xmlns:a="http://schemas.openxmlformats.org/drawingml/2006/main" xmlns:r="http://schemas.openxmlformats.org/officeDocument/2006/relationships" xmlns:p="http://schemas.openxmlformats.org/presentationml/2006/main" type="title" preserve="1">
   <p:cSld name="Title Slide">
@@ -533,7 +287,7 @@
           <a:p>
             <a:fld id="{556866E9-FFCC-4B83-8F1F-43649AB9B126}" type="datetimeFigureOut">
               <a:rPr lang="en-US" smtClean="0"/>
-              <a:t>5/6/2018</a:t>
+              <a:t>5/7/2018</a:t>
             </a:fld>
             <a:endParaRPr lang="en-US"/>
           </a:p>
@@ -731,7 +485,7 @@
           <a:p>
             <a:fld id="{556866E9-FFCC-4B83-8F1F-43649AB9B126}" type="datetimeFigureOut">
               <a:rPr lang="en-US" smtClean="0"/>
-              <a:t>5/6/2018</a:t>
+              <a:t>5/7/2018</a:t>
             </a:fld>
             <a:endParaRPr lang="en-US"/>
           </a:p>
@@ -939,7 +693,7 @@
           <a:p>
             <a:fld id="{556866E9-FFCC-4B83-8F1F-43649AB9B126}" type="datetimeFigureOut">
               <a:rPr lang="en-US" smtClean="0"/>
-              <a:t>5/6/2018</a:t>
+              <a:t>5/7/2018</a:t>
             </a:fld>
             <a:endParaRPr lang="en-US"/>
           </a:p>
@@ -1137,7 +891,7 @@
           <a:p>
             <a:fld id="{556866E9-FFCC-4B83-8F1F-43649AB9B126}" type="datetimeFigureOut">
               <a:rPr lang="en-US" smtClean="0"/>
-              <a:t>5/6/2018</a:t>
+              <a:t>5/7/2018</a:t>
             </a:fld>
             <a:endParaRPr lang="en-US"/>
           </a:p>
@@ -1412,7 +1166,7 @@
           <a:p>
             <a:fld id="{556866E9-FFCC-4B83-8F1F-43649AB9B126}" type="datetimeFigureOut">
               <a:rPr lang="en-US" smtClean="0"/>
-              <a:t>5/6/2018</a:t>
+              <a:t>5/7/2018</a:t>
             </a:fld>
             <a:endParaRPr lang="en-US"/>
           </a:p>
@@ -1677,7 +1431,7 @@
           <a:p>
             <a:fld id="{556866E9-FFCC-4B83-8F1F-43649AB9B126}" type="datetimeFigureOut">
               <a:rPr lang="en-US" smtClean="0"/>
-              <a:t>5/6/2018</a:t>
+              <a:t>5/7/2018</a:t>
             </a:fld>
             <a:endParaRPr lang="en-US"/>
           </a:p>
@@ -2089,7 +1843,7 @@
           <a:p>
             <a:fld id="{556866E9-FFCC-4B83-8F1F-43649AB9B126}" type="datetimeFigureOut">
               <a:rPr lang="en-US" smtClean="0"/>
-              <a:t>5/6/2018</a:t>
+              <a:t>5/7/2018</a:t>
             </a:fld>
             <a:endParaRPr lang="en-US"/>
           </a:p>
@@ -2230,7 +1984,7 @@
           <a:p>
             <a:fld id="{556866E9-FFCC-4B83-8F1F-43649AB9B126}" type="datetimeFigureOut">
               <a:rPr lang="en-US" smtClean="0"/>
-              <a:t>5/6/2018</a:t>
+              <a:t>5/7/2018</a:t>
             </a:fld>
             <a:endParaRPr lang="en-US"/>
           </a:p>
@@ -2343,7 +2097,7 @@
           <a:p>
             <a:fld id="{556866E9-FFCC-4B83-8F1F-43649AB9B126}" type="datetimeFigureOut">
               <a:rPr lang="en-US" smtClean="0"/>
-              <a:t>5/6/2018</a:t>
+              <a:t>5/7/2018</a:t>
             </a:fld>
             <a:endParaRPr lang="en-US"/>
           </a:p>
@@ -2654,7 +2408,7 @@
           <a:p>
             <a:fld id="{556866E9-FFCC-4B83-8F1F-43649AB9B126}" type="datetimeFigureOut">
               <a:rPr lang="en-US" smtClean="0"/>
-              <a:t>5/6/2018</a:t>
+              <a:t>5/7/2018</a:t>
             </a:fld>
             <a:endParaRPr lang="en-US"/>
           </a:p>
@@ -2942,7 +2696,7 @@
           <a:p>
             <a:fld id="{556866E9-FFCC-4B83-8F1F-43649AB9B126}" type="datetimeFigureOut">
               <a:rPr lang="en-US" smtClean="0"/>
-              <a:t>5/6/2018</a:t>
+              <a:t>5/7/2018</a:t>
             </a:fld>
             <a:endParaRPr lang="en-US"/>
           </a:p>
@@ -3183,7 +2937,7 @@
           <a:p>
             <a:fld id="{556866E9-FFCC-4B83-8F1F-43649AB9B126}" type="datetimeFigureOut">
               <a:rPr lang="en-US" smtClean="0"/>
-              <a:t>5/6/2018</a:t>
+              <a:t>5/7/2018</a:t>
             </a:fld>
             <a:endParaRPr lang="en-US"/>
           </a:p>
@@ -5070,6 +4824,323 @@
 </file>
 
 <file path=ppt/slides/slide17.xml><?xml version="1.0" encoding="utf-8"?>
+<p:sld xmlns:a="http://schemas.openxmlformats.org/drawingml/2006/main" xmlns:r="http://schemas.openxmlformats.org/officeDocument/2006/relationships" xmlns:p="http://schemas.openxmlformats.org/presentationml/2006/main">
+  <p:cSld>
+    <p:spTree>
+      <p:nvGrpSpPr>
+        <p:cNvPr id="1" name=""/>
+        <p:cNvGrpSpPr/>
+        <p:nvPr/>
+      </p:nvGrpSpPr>
+      <p:grpSpPr>
+        <a:xfrm>
+          <a:off x="0" y="0"/>
+          <a:ext cx="0" cy="0"/>
+          <a:chOff x="0" y="0"/>
+          <a:chExt cx="0" cy="0"/>
+        </a:xfrm>
+      </p:grpSpPr>
+      <p:sp>
+        <p:nvSpPr>
+          <p:cNvPr id="2" name="Title 1">
+            <a:extLst>
+              <a:ext uri="{FF2B5EF4-FFF2-40B4-BE49-F238E27FC236}">
+                <a16:creationId xmlns:a16="http://schemas.microsoft.com/office/drawing/2014/main" id="{68DCDD46-C769-4F86-9CD3-E15B0F2C1F87}"/>
+              </a:ext>
+            </a:extLst>
+          </p:cNvPr>
+          <p:cNvSpPr>
+            <a:spLocks noGrp="1"/>
+          </p:cNvSpPr>
+          <p:nvPr>
+            <p:ph type="title"/>
+          </p:nvPr>
+        </p:nvSpPr>
+        <p:spPr/>
+        <p:txBody>
+          <a:bodyPr/>
+          <a:lstStyle/>
+          <a:p>
+            <a:r>
+              <a:rPr lang="en-US" dirty="0" err="1"/>
+              <a:t>BeautifulSoup</a:t>
+            </a:r>
+            <a:r>
+              <a:rPr lang="en-US" dirty="0"/>
+              <a:t> (bs4) Python Package</a:t>
+            </a:r>
+          </a:p>
+        </p:txBody>
+      </p:sp>
+      <p:sp>
+        <p:nvSpPr>
+          <p:cNvPr id="3" name="Content Placeholder 2">
+            <a:extLst>
+              <a:ext uri="{FF2B5EF4-FFF2-40B4-BE49-F238E27FC236}">
+                <a16:creationId xmlns:a16="http://schemas.microsoft.com/office/drawing/2014/main" id="{B8A5C19E-6E87-4B0E-862A-C77659B25197}"/>
+              </a:ext>
+            </a:extLst>
+          </p:cNvPr>
+          <p:cNvSpPr>
+            <a:spLocks noGrp="1"/>
+          </p:cNvSpPr>
+          <p:nvPr>
+            <p:ph idx="1"/>
+          </p:nvPr>
+        </p:nvSpPr>
+        <p:spPr>
+          <a:xfrm>
+            <a:off x="838200" y="2528047"/>
+            <a:ext cx="10515600" cy="3964828"/>
+          </a:xfrm>
+        </p:spPr>
+        <p:txBody>
+          <a:bodyPr vert="horz" lIns="91440" tIns="45720" rIns="91440" bIns="45720" rtlCol="0" anchor="t">
+            <a:normAutofit lnSpcReduction="10000"/>
+          </a:bodyPr>
+          <a:lstStyle/>
+          <a:p>
+            <a:r>
+              <a:rPr lang="en-US" dirty="0"/>
+              <a:t>Pros</a:t>
+            </a:r>
+          </a:p>
+          <a:p>
+            <a:pPr lvl="1"/>
+            <a:r>
+              <a:rPr lang="en-US" dirty="0"/>
+              <a:t>Included in Anaconda Python distribution</a:t>
+            </a:r>
+            <a:r>
+              <a:rPr lang="en-US" dirty="0">
+                <a:cs typeface="Calibri"/>
+              </a:rPr>
+              <a:t> (bs4)</a:t>
+            </a:r>
+          </a:p>
+          <a:p>
+            <a:pPr lvl="1"/>
+            <a:r>
+              <a:rPr lang="en-US" dirty="0"/>
+              <a:t>Simple and elegant; allows for granular control of web-parsing </a:t>
+            </a:r>
+            <a:endParaRPr lang="en-US" dirty="0">
+              <a:cs typeface="Calibri"/>
+            </a:endParaRPr>
+          </a:p>
+          <a:p>
+            <a:pPr lvl="2"/>
+            <a:r>
+              <a:rPr lang="en-US" dirty="0">
+                <a:latin typeface="Lucida Console"/>
+                <a:cs typeface="Calibri"/>
+              </a:rPr>
+              <a:t>Find('tag', name='blah' ) function </a:t>
+            </a:r>
+            <a:endParaRPr lang="en-US" dirty="0">
+              <a:cs typeface="Calibri"/>
+            </a:endParaRPr>
+          </a:p>
+          <a:p>
+            <a:pPr lvl="1"/>
+            <a:r>
+              <a:rPr lang="en-US" dirty="0">
+                <a:latin typeface="Calibri"/>
+                <a:cs typeface="Calibri"/>
+              </a:rPr>
+              <a:t>Can navigate up, down and within a level of HTML tree easily</a:t>
+            </a:r>
+          </a:p>
+          <a:p>
+            <a:pPr lvl="2"/>
+            <a:r>
+              <a:rPr lang="en-US" dirty="0" err="1">
+                <a:latin typeface="Lucida Console"/>
+                <a:cs typeface="Calibri"/>
+              </a:rPr>
+              <a:t>Find_parent</a:t>
+            </a:r>
+            <a:r>
+              <a:rPr lang="en-US" dirty="0">
+                <a:latin typeface="Lucida Console"/>
+                <a:cs typeface="Calibri"/>
+              </a:rPr>
+              <a:t>()</a:t>
+            </a:r>
+            <a:endParaRPr lang="en-US" dirty="0">
+              <a:latin typeface="Calibri"/>
+              <a:cs typeface="Calibri"/>
+            </a:endParaRPr>
+          </a:p>
+          <a:p>
+            <a:pPr lvl="2"/>
+            <a:r>
+              <a:rPr lang="en-US" dirty="0" err="1">
+                <a:latin typeface="Lucida Console"/>
+              </a:rPr>
+              <a:t>Find_next_sibling</a:t>
+            </a:r>
+            <a:r>
+              <a:rPr lang="en-US" dirty="0">
+                <a:latin typeface="Lucida Console"/>
+              </a:rPr>
+              <a:t>()</a:t>
+            </a:r>
+          </a:p>
+          <a:p>
+            <a:pPr lvl="2"/>
+            <a:endParaRPr lang="en-US" dirty="0">
+              <a:latin typeface="Lucida Console"/>
+            </a:endParaRPr>
+          </a:p>
+          <a:p>
+            <a:r>
+              <a:rPr lang="en-US" dirty="0"/>
+              <a:t>Cons</a:t>
+            </a:r>
+          </a:p>
+          <a:p>
+            <a:pPr lvl="1"/>
+            <a:r>
+              <a:rPr lang="en-US" dirty="0"/>
+              <a:t>Doesn't return a </a:t>
+            </a:r>
+            <a:r>
+              <a:rPr lang="en-US" dirty="0" err="1"/>
+              <a:t>DataFrame</a:t>
+            </a:r>
+            <a:endParaRPr lang="en-US" dirty="0"/>
+          </a:p>
+          <a:p>
+            <a:pPr lvl="1"/>
+            <a:r>
+              <a:rPr lang="en-US" dirty="0"/>
+              <a:t>Better suited for more complex web</a:t>
+            </a:r>
+            <a:r>
+              <a:rPr lang="en-US" dirty="0">
+                <a:cs typeface="Calibri"/>
+              </a:rPr>
+              <a:t> pages </a:t>
+            </a:r>
+          </a:p>
+          <a:p>
+            <a:endParaRPr lang="en-US" dirty="0"/>
+          </a:p>
+        </p:txBody>
+      </p:sp>
+      <p:sp>
+        <p:nvSpPr>
+          <p:cNvPr id="4" name="TextBox 3">
+            <a:extLst>
+              <a:ext uri="{FF2B5EF4-FFF2-40B4-BE49-F238E27FC236}">
+                <a16:creationId xmlns:a16="http://schemas.microsoft.com/office/drawing/2014/main" id="{5DC67676-611A-4DE3-9F32-66D6A9E1C21F}"/>
+              </a:ext>
+            </a:extLst>
+          </p:cNvPr>
+          <p:cNvSpPr txBox="1"/>
+          <p:nvPr/>
+        </p:nvSpPr>
+        <p:spPr>
+          <a:xfrm>
+            <a:off x="0" y="1690688"/>
+            <a:ext cx="12192000" cy="400110"/>
+          </a:xfrm>
+          <a:prstGeom prst="rect">
+            <a:avLst/>
+          </a:prstGeom>
+          <a:noFill/>
+        </p:spPr>
+        <p:txBody>
+          <a:bodyPr wrap="square" rtlCol="0" anchor="t">
+            <a:spAutoFit/>
+          </a:bodyPr>
+          <a:lstStyle/>
+          <a:p>
+            <a:pPr algn="ctr"/>
+            <a:r>
+              <a:rPr lang="en-US" sz="2000" dirty="0">
+                <a:latin typeface="Lucida Console" panose="020B0609040504020204" pitchFamily="49" charset="0"/>
+              </a:rPr>
+              <a:t>soup = </a:t>
+            </a:r>
+            <a:r>
+              <a:rPr lang="en-US" sz="2000" dirty="0" err="1">
+                <a:latin typeface="Lucida Console" panose="020B0609040504020204" pitchFamily="49" charset="0"/>
+              </a:rPr>
+              <a:t>BeautifulSoup</a:t>
+            </a:r>
+            <a:r>
+              <a:rPr lang="en-US" sz="2000" dirty="0">
+                <a:latin typeface="Lucida Console" panose="020B0609040504020204" pitchFamily="49" charset="0"/>
+              </a:rPr>
+              <a:t>(</a:t>
+            </a:r>
+            <a:r>
+              <a:rPr lang="en-US" sz="2000" dirty="0" err="1">
+                <a:latin typeface="Lucida Console" panose="020B0609040504020204" pitchFamily="49" charset="0"/>
+              </a:rPr>
+              <a:t>requests.get</a:t>
+            </a:r>
+            <a:r>
+              <a:rPr lang="en-US" sz="2000" dirty="0">
+                <a:latin typeface="Lucida Console" panose="020B0609040504020204" pitchFamily="49" charset="0"/>
+              </a:rPr>
+              <a:t>(</a:t>
+            </a:r>
+            <a:r>
+              <a:rPr lang="en-US" sz="2000" dirty="0" err="1">
+                <a:latin typeface="Lucida Console" panose="020B0609040504020204" pitchFamily="49" charset="0"/>
+              </a:rPr>
+              <a:t>url</a:t>
+            </a:r>
+            <a:r>
+              <a:rPr lang="en-US" sz="2000" dirty="0">
+                <a:latin typeface="Lucida Console" panose="020B0609040504020204" pitchFamily="49" charset="0"/>
+              </a:rPr>
+              <a:t>).content, parser='</a:t>
+            </a:r>
+            <a:r>
+              <a:rPr lang="en-US" sz="2000" dirty="0" err="1">
+                <a:latin typeface="Lucida Console" panose="020B0609040504020204" pitchFamily="49" charset="0"/>
+              </a:rPr>
+              <a:t>lxml</a:t>
+            </a:r>
+            <a:r>
+              <a:rPr lang="en-US" sz="2000" dirty="0">
+                <a:latin typeface="Lucida Console" panose="020B0609040504020204" pitchFamily="49" charset="0"/>
+              </a:rPr>
+              <a:t>' or '</a:t>
+            </a:r>
+            <a:r>
+              <a:rPr lang="en-US" sz="2000" dirty="0" err="1">
+                <a:latin typeface="Lucida Console" panose="020B0609040504020204" pitchFamily="49" charset="0"/>
+              </a:rPr>
+              <a:t>lxml</a:t>
+            </a:r>
+            <a:r>
+              <a:rPr lang="en-US" sz="2000" dirty="0">
+                <a:latin typeface="Lucida Console" panose="020B0609040504020204" pitchFamily="49" charset="0"/>
+              </a:rPr>
+              <a:t>')</a:t>
+            </a:r>
+          </a:p>
+        </p:txBody>
+      </p:sp>
+    </p:spTree>
+    <p:extLst>
+      <p:ext uri="{BB962C8B-B14F-4D97-AF65-F5344CB8AC3E}">
+        <p14:creationId xmlns:p14="http://schemas.microsoft.com/office/powerpoint/2010/main" val="3779007658"/>
+      </p:ext>
+    </p:extLst>
+  </p:cSld>
+  <p:clrMapOvr>
+    <a:masterClrMapping/>
+  </p:clrMapOvr>
+</p:sld>
+</file>
+
+<file path=ppt/slides/slide18.xml><?xml version="1.0" encoding="utf-8"?>
 <p:sld xmlns:a="http://schemas.openxmlformats.org/drawingml/2006/main" xmlns:r="http://schemas.openxmlformats.org/officeDocument/2006/relationships" xmlns:p="http://schemas.openxmlformats.org/presentationml/2006/main">
   <p:cSld>
     <p:spTree>

</xml_diff>

<commit_message>
minor edits to presentation, should be done now
</commit_message>
<xml_diff>
--- a/doc/design/TechnologyReview.pptx
+++ b/doc/design/TechnologyReview.pptx
@@ -12,17 +12,16 @@
     <p:sldId id="498" r:id="rId6"/>
     <p:sldId id="499" r:id="rId7"/>
     <p:sldId id="501" r:id="rId8"/>
-    <p:sldId id="503" r:id="rId9"/>
-    <p:sldId id="504" r:id="rId10"/>
-    <p:sldId id="500" r:id="rId11"/>
-    <p:sldId id="505" r:id="rId12"/>
-    <p:sldId id="494" r:id="rId13"/>
-    <p:sldId id="493" r:id="rId14"/>
-    <p:sldId id="495" r:id="rId15"/>
-    <p:sldId id="492" r:id="rId16"/>
-    <p:sldId id="496" r:id="rId17"/>
-    <p:sldId id="507" r:id="rId18"/>
-    <p:sldId id="506" r:id="rId19"/>
+    <p:sldId id="504" r:id="rId9"/>
+    <p:sldId id="500" r:id="rId10"/>
+    <p:sldId id="505" r:id="rId11"/>
+    <p:sldId id="494" r:id="rId12"/>
+    <p:sldId id="493" r:id="rId13"/>
+    <p:sldId id="495" r:id="rId14"/>
+    <p:sldId id="492" r:id="rId15"/>
+    <p:sldId id="496" r:id="rId16"/>
+    <p:sldId id="507" r:id="rId17"/>
+    <p:sldId id="506" r:id="rId18"/>
   </p:sldIdLst>
   <p:sldSz cx="12192000" cy="6858000"/>
   <p:notesSz cx="6858000" cy="9144000"/>
@@ -3477,6 +3476,84 @@
           </a:p>
         </p:txBody>
       </p:sp>
+      <p:pic>
+        <p:nvPicPr>
+          <p:cNvPr id="10" name="Graphic 9" descr="Plant">
+            <a:extLst>
+              <a:ext uri="{FF2B5EF4-FFF2-40B4-BE49-F238E27FC236}">
+                <a16:creationId xmlns:a16="http://schemas.microsoft.com/office/drawing/2014/main" id="{CAB2D419-677D-4319-B7DD-EFC804BF2F2B}"/>
+              </a:ext>
+            </a:extLst>
+          </p:cNvPr>
+          <p:cNvPicPr>
+            <a:picLocks noChangeAspect="1"/>
+          </p:cNvPicPr>
+          <p:nvPr/>
+        </p:nvPicPr>
+        <p:blipFill>
+          <a:blip r:embed="rId2">
+            <a:extLst>
+              <a:ext uri="{28A0092B-C50C-407E-A947-70E740481C1C}">
+                <a14:useLocalDpi xmlns:a14="http://schemas.microsoft.com/office/drawing/2010/main" val="0"/>
+              </a:ext>
+              <a:ext uri="{96DAC541-7B7A-43D3-8B79-37D633B846F1}">
+                <asvg:svgBlip xmlns:asvg="http://schemas.microsoft.com/office/drawing/2016/SVG/main" r:embed="rId3"/>
+              </a:ext>
+            </a:extLst>
+          </a:blip>
+          <a:stretch>
+            <a:fillRect/>
+          </a:stretch>
+        </p:blipFill>
+        <p:spPr>
+          <a:xfrm>
+            <a:off x="9180896" y="2843092"/>
+            <a:ext cx="1440757" cy="1440757"/>
+          </a:xfrm>
+          <a:prstGeom prst="rect">
+            <a:avLst/>
+          </a:prstGeom>
+        </p:spPr>
+      </p:pic>
+      <p:pic>
+        <p:nvPicPr>
+          <p:cNvPr id="12" name="Graphic 11" descr="Earth Globe Americas">
+            <a:extLst>
+              <a:ext uri="{FF2B5EF4-FFF2-40B4-BE49-F238E27FC236}">
+                <a16:creationId xmlns:a16="http://schemas.microsoft.com/office/drawing/2014/main" id="{F64A2D7C-A43C-47C0-8D9E-C1EE8932C6E1}"/>
+              </a:ext>
+            </a:extLst>
+          </p:cNvPr>
+          <p:cNvPicPr>
+            <a:picLocks noChangeAspect="1"/>
+          </p:cNvPicPr>
+          <p:nvPr/>
+        </p:nvPicPr>
+        <p:blipFill>
+          <a:blip r:embed="rId4">
+            <a:extLst>
+              <a:ext uri="{28A0092B-C50C-407E-A947-70E740481C1C}">
+                <a14:useLocalDpi xmlns:a14="http://schemas.microsoft.com/office/drawing/2010/main" val="0"/>
+              </a:ext>
+              <a:ext uri="{96DAC541-7B7A-43D3-8B79-37D633B846F1}">
+                <asvg:svgBlip xmlns:asvg="http://schemas.microsoft.com/office/drawing/2016/SVG/main" r:embed="rId5"/>
+              </a:ext>
+            </a:extLst>
+          </a:blip>
+          <a:stretch>
+            <a:fillRect/>
+          </a:stretch>
+        </p:blipFill>
+        <p:spPr>
+          <a:xfrm>
+            <a:off x="8628102" y="3765176"/>
+            <a:ext cx="2706432" cy="2706432"/>
+          </a:xfrm>
+          <a:prstGeom prst="rect">
+            <a:avLst/>
+          </a:prstGeom>
+        </p:spPr>
+      </p:pic>
     </p:spTree>
     <p:extLst>
       <p:ext uri="{BB962C8B-B14F-4D97-AF65-F5344CB8AC3E}">
@@ -3512,7 +3589,7 @@
           <p:cNvPr id="2" name="Title 1">
             <a:extLst>
               <a:ext uri="{FF2B5EF4-FFF2-40B4-BE49-F238E27FC236}">
-                <a16:creationId xmlns:a16="http://schemas.microsoft.com/office/drawing/2014/main" id="{EFF362B6-8BB8-4FE2-A1A8-E203F08CF15D}"/>
+                <a16:creationId xmlns:a16="http://schemas.microsoft.com/office/drawing/2014/main" id="{425F10A8-F4A3-4B27-AF9B-683371A95C32}"/>
               </a:ext>
             </a:extLst>
           </p:cNvPr>
@@ -3528,19 +3605,13 @@
           <a:bodyPr/>
           <a:lstStyle/>
           <a:p>
-            <a:r>
-              <a:rPr lang="en-US" dirty="0" err="1">
-                <a:cs typeface="Calibri Light"/>
-              </a:rPr>
-              <a:t>BeautifulSoup</a:t>
-            </a:r>
             <a:r>
               <a:rPr lang="en-US" dirty="0">
                 <a:cs typeface="Calibri Light"/>
               </a:rPr>
-              <a:t> + Requests </a:t>
-            </a:r>
-            <a:endParaRPr lang="en-US" dirty="0" err="1"/>
+              <a:t>An example workflow...</a:t>
+            </a:r>
+            <a:endParaRPr lang="en-US" dirty="0"/>
           </a:p>
         </p:txBody>
       </p:sp>
@@ -3549,7 +3620,7 @@
           <p:cNvPr id="3" name="Content Placeholder 2">
             <a:extLst>
               <a:ext uri="{FF2B5EF4-FFF2-40B4-BE49-F238E27FC236}">
-                <a16:creationId xmlns:a16="http://schemas.microsoft.com/office/drawing/2014/main" id="{5B991963-6DFE-4282-9FC4-34A112F6AADF}"/>
+                <a16:creationId xmlns:a16="http://schemas.microsoft.com/office/drawing/2014/main" id="{689E6637-D705-43A0-B34B-8FF23FC1E3CC}"/>
               </a:ext>
             </a:extLst>
           </p:cNvPr>
@@ -3560,12 +3631,7 @@
             <p:ph idx="1"/>
           </p:nvPr>
         </p:nvSpPr>
-        <p:spPr>
-          <a:xfrm>
-            <a:off x="191219" y="1653097"/>
-            <a:ext cx="4937185" cy="3718734"/>
-          </a:xfrm>
-        </p:spPr>
+        <p:spPr/>
         <p:txBody>
           <a:bodyPr vert="horz" lIns="91440" tIns="45720" rIns="91440" bIns="45720" rtlCol="0" anchor="t">
             <a:normAutofit/>
@@ -3573,123 +3639,100 @@
           <a:lstStyle/>
           <a:p>
             <a:r>
-              <a:rPr lang="en-US" sz="2000" dirty="0">
+              <a:rPr lang="en-US" sz="3200" dirty="0">
                 <a:cs typeface="Calibri"/>
               </a:rPr>
-              <a:t>Way to circumvent: </a:t>
-            </a:r>
+              <a:t>Requests</a:t>
+            </a:r>
+            <a:endParaRPr lang="en-US" dirty="0"/>
           </a:p>
           <a:p>
             <a:pPr lvl="1"/>
             <a:r>
-              <a:rPr lang="en-US" sz="2000" i="1" dirty="0" err="1">
-                <a:latin typeface="Courier New"/>
-                <a:cs typeface="Courier New"/>
-              </a:rPr>
-              <a:t>BeautifulSoup</a:t>
-            </a:r>
-            <a:r>
-              <a:rPr lang="en-US" sz="2000" i="1" dirty="0">
-                <a:latin typeface="Courier New"/>
-                <a:cs typeface="Courier New"/>
-              </a:rPr>
-              <a:t> + Requests </a:t>
-            </a:r>
-          </a:p>
-          <a:p>
-            <a:r>
-              <a:rPr lang="en-US" sz="2000" dirty="0">
-                <a:latin typeface="Calibri"/>
+              <a:rPr lang="en-US" dirty="0">
                 <a:cs typeface="Calibri"/>
               </a:rPr>
-              <a:t>A happy medium between direct web-scraping tools and the ease and simplicity of </a:t>
-            </a:r>
-            <a:r>
-              <a:rPr lang="en-US" sz="2000" dirty="0">
-                <a:latin typeface="Courier New"/>
-                <a:cs typeface="Courier New"/>
-              </a:rPr>
-              <a:t>pandas</a:t>
-            </a:r>
-            <a:endParaRPr lang="en-US" sz="2000" dirty="0">
-              <a:latin typeface="Calibri"/>
+              <a:t>Interface with web</a:t>
+            </a:r>
+          </a:p>
+          <a:p>
+            <a:endParaRPr lang="en-US" dirty="0">
               <a:cs typeface="Calibri"/>
             </a:endParaRPr>
           </a:p>
           <a:p>
             <a:r>
-              <a:rPr lang="en-US" sz="2000" dirty="0">
-                <a:latin typeface="Calibri"/>
+              <a:rPr lang="en-US" sz="3200" dirty="0">
                 <a:cs typeface="Calibri"/>
               </a:rPr>
-              <a:t>Can easily interface with </a:t>
-            </a:r>
-            <a:r>
-              <a:rPr lang="en-US" sz="2000" dirty="0">
-                <a:latin typeface="Courier New"/>
-                <a:cs typeface="Courier New"/>
-              </a:rPr>
-              <a:t>pandas</a:t>
-            </a:r>
-            <a:r>
-              <a:rPr lang="en-US" sz="2000" dirty="0">
-                <a:latin typeface="Calibri"/>
+              <a:t>Beautiful</a:t>
+            </a:r>
+            <a:r>
+              <a:rPr lang="en-US" sz="3600" dirty="0">
                 <a:cs typeface="Calibri"/>
               </a:rPr>
-              <a:t> functions</a:t>
-            </a:r>
-            <a:endParaRPr lang="en-US" sz="2000" dirty="0">
+              <a:t> </a:t>
+            </a:r>
+            <a:r>
+              <a:rPr lang="en-US" sz="3200" dirty="0">
+                <a:cs typeface="Calibri"/>
+              </a:rPr>
+              <a:t>Soup</a:t>
+            </a:r>
+            <a:r>
+              <a:rPr lang="en-US" sz="3600" dirty="0">
+                <a:cs typeface="Calibri"/>
+              </a:rPr>
+              <a:t> </a:t>
+            </a:r>
+          </a:p>
+          <a:p>
+            <a:pPr lvl="1"/>
+            <a:r>
+              <a:rPr lang="en-US" dirty="0">
+                <a:cs typeface="Calibri"/>
+              </a:rPr>
+              <a:t>Parse web page</a:t>
+            </a:r>
+          </a:p>
+          <a:p>
+            <a:pPr lvl="1"/>
+            <a:endParaRPr lang="en-US" dirty="0">
               <a:cs typeface="Calibri"/>
             </a:endParaRPr>
           </a:p>
           <a:p>
-            <a:endParaRPr lang="en-US" sz="2000" dirty="0">
-              <a:latin typeface="Calibri"/>
+            <a:r>
+              <a:rPr lang="en-US" sz="3200" dirty="0">
+                <a:cs typeface="Calibri"/>
+              </a:rPr>
+              <a:t>Pandas</a:t>
+            </a:r>
+            <a:endParaRPr lang="en-US" dirty="0">
               <a:cs typeface="Calibri"/>
             </a:endParaRPr>
           </a:p>
           <a:p>
-            <a:endParaRPr lang="en-US" sz="2000" dirty="0">
-              <a:latin typeface="Calibri"/>
-              <a:cs typeface="Calibri"/>
-            </a:endParaRPr>
-          </a:p>
-        </p:txBody>
-      </p:sp>
-      <p:pic>
-        <p:nvPicPr>
-          <p:cNvPr id="4" name="Picture 4" descr="A screenshot of a cell phone&#10;&#10;Description generated with very high confidence">
-            <a:extLst>
-              <a:ext uri="{FF2B5EF4-FFF2-40B4-BE49-F238E27FC236}">
-                <a16:creationId xmlns:a16="http://schemas.microsoft.com/office/drawing/2014/main" id="{91A894D3-3164-403C-A17A-714999645715}"/>
-              </a:ext>
-            </a:extLst>
-          </p:cNvPr>
-          <p:cNvPicPr>
-            <a:picLocks noChangeAspect="1"/>
-          </p:cNvPicPr>
-          <p:nvPr/>
-        </p:nvPicPr>
-        <p:blipFill>
-          <a:blip r:embed="rId2"/>
-          <a:stretch>
-            <a:fillRect/>
-          </a:stretch>
-        </p:blipFill>
-        <p:spPr>
-          <a:xfrm>
-            <a:off x="5141344" y="1571775"/>
-            <a:ext cx="6912633" cy="4807127"/>
-          </a:xfrm>
-          <a:prstGeom prst="rect">
-            <a:avLst/>
-          </a:prstGeom>
-        </p:spPr>
-      </p:pic>
+            <a:pPr lvl="1"/>
+            <a:r>
+              <a:rPr lang="en-US" dirty="0" err="1">
+                <a:cs typeface="Calibri"/>
+              </a:rPr>
+              <a:t>Dataframe</a:t>
+            </a:r>
+            <a:r>
+              <a:rPr lang="en-US" dirty="0">
+                <a:cs typeface="Calibri"/>
+              </a:rPr>
+              <a:t> for data storage</a:t>
+            </a:r>
+          </a:p>
+        </p:txBody>
+      </p:sp>
     </p:spTree>
     <p:extLst>
       <p:ext uri="{BB962C8B-B14F-4D97-AF65-F5344CB8AC3E}">
-        <p14:creationId xmlns:p14="http://schemas.microsoft.com/office/powerpoint/2010/main" val="2278662049"/>
+        <p14:creationId xmlns:p14="http://schemas.microsoft.com/office/powerpoint/2010/main" val="2520028208"/>
       </p:ext>
     </p:extLst>
   </p:cSld>
@@ -3721,7 +3764,7 @@
           <p:cNvPr id="2" name="Title 1">
             <a:extLst>
               <a:ext uri="{FF2B5EF4-FFF2-40B4-BE49-F238E27FC236}">
-                <a16:creationId xmlns:a16="http://schemas.microsoft.com/office/drawing/2014/main" id="{425F10A8-F4A3-4B27-AF9B-683371A95C32}"/>
+                <a16:creationId xmlns:a16="http://schemas.microsoft.com/office/drawing/2014/main" id="{68DCDD46-C769-4F86-9CD3-E15B0F2C1F87}"/>
               </a:ext>
             </a:extLst>
           </p:cNvPr>
@@ -3738,12 +3781,9 @@
           <a:lstStyle/>
           <a:p>
             <a:r>
-              <a:rPr lang="en-US" dirty="0">
-                <a:cs typeface="Calibri Light"/>
-              </a:rPr>
-              <a:t>An example workflow...</a:t>
-            </a:r>
-            <a:endParaRPr lang="en-US" dirty="0"/>
+              <a:rPr lang="en-US" dirty="0"/>
+              <a:t>curl BASH command</a:t>
+            </a:r>
           </a:p>
         </p:txBody>
       </p:sp>
@@ -3752,7 +3792,7 @@
           <p:cNvPr id="3" name="Content Placeholder 2">
             <a:extLst>
               <a:ext uri="{FF2B5EF4-FFF2-40B4-BE49-F238E27FC236}">
-                <a16:creationId xmlns:a16="http://schemas.microsoft.com/office/drawing/2014/main" id="{689E6637-D705-43A0-B34B-8FF23FC1E3CC}"/>
+                <a16:creationId xmlns:a16="http://schemas.microsoft.com/office/drawing/2014/main" id="{B8A5C19E-6E87-4B0E-862A-C77659B25197}"/>
               </a:ext>
             </a:extLst>
           </p:cNvPr>
@@ -3763,160 +3803,58 @@
             <p:ph idx="1"/>
           </p:nvPr>
         </p:nvSpPr>
-        <p:spPr/>
-        <p:txBody>
-          <a:bodyPr vert="horz" lIns="91440" tIns="45720" rIns="91440" bIns="45720" rtlCol="0" anchor="t">
-            <a:normAutofit lnSpcReduction="10000"/>
-          </a:bodyPr>
-          <a:lstStyle/>
-          <a:p>
-            <a:r>
-              <a:rPr lang="en-US" sz="3600" dirty="0">
-                <a:cs typeface="Calibri"/>
-              </a:rPr>
-              <a:t>Requests</a:t>
-            </a:r>
-            <a:endParaRPr lang="en-US" dirty="0"/>
-          </a:p>
-          <a:p>
-            <a:pPr lvl="1"/>
-            <a:r>
-              <a:rPr lang="en-US" dirty="0">
-                <a:cs typeface="Calibri"/>
-              </a:rPr>
-              <a:t>Interface with web</a:t>
-            </a:r>
-          </a:p>
-          <a:p>
-            <a:endParaRPr lang="en-US" dirty="0">
-              <a:cs typeface="Calibri"/>
-            </a:endParaRPr>
-          </a:p>
-          <a:p>
-            <a:endParaRPr lang="en-US" dirty="0">
-              <a:cs typeface="Calibri"/>
-            </a:endParaRPr>
-          </a:p>
-          <a:p>
-            <a:endParaRPr lang="en-US" dirty="0">
-              <a:cs typeface="Calibri"/>
-            </a:endParaRPr>
-          </a:p>
-          <a:p>
-            <a:endParaRPr lang="en-US" dirty="0">
-              <a:cs typeface="Calibri"/>
-            </a:endParaRPr>
-          </a:p>
-          <a:p>
-            <a:endParaRPr lang="en-US" dirty="0">
-              <a:cs typeface="Calibri"/>
-            </a:endParaRPr>
-          </a:p>
-          <a:p>
-            <a:r>
-              <a:rPr lang="en-US" sz="3600" dirty="0">
-                <a:cs typeface="Calibri"/>
-              </a:rPr>
-              <a:t>Beautiful Soup </a:t>
-            </a:r>
-          </a:p>
-          <a:p>
-            <a:pPr lvl="1"/>
-            <a:r>
-              <a:rPr lang="en-US" dirty="0">
-                <a:cs typeface="Calibri"/>
-              </a:rPr>
-              <a:t>Parse web page</a:t>
-            </a:r>
-          </a:p>
-        </p:txBody>
-      </p:sp>
-      <p:cxnSp>
-        <p:nvCxnSpPr>
-          <p:cNvPr id="4" name="Straight Arrow Connector 3">
-            <a:extLst>
-              <a:ext uri="{FF2B5EF4-FFF2-40B4-BE49-F238E27FC236}">
-                <a16:creationId xmlns:a16="http://schemas.microsoft.com/office/drawing/2014/main" id="{AC738B7D-1574-4285-9C47-7D02AD88EF95}"/>
-              </a:ext>
-            </a:extLst>
-          </p:cNvPr>
-          <p:cNvCxnSpPr/>
-          <p:nvPr/>
-        </p:nvCxnSpPr>
         <p:spPr>
           <a:xfrm>
-            <a:off x="4229817" y="2490158"/>
-            <a:ext cx="2524664" cy="1086928"/>
+            <a:off x="838200" y="2528047"/>
+            <a:ext cx="10515600" cy="3964828"/>
           </a:xfrm>
-          <a:prstGeom prst="straightConnector1">
-            <a:avLst/>
-          </a:prstGeom>
-          <a:ln w="57150">
-            <a:tailEnd type="triangle"/>
-          </a:ln>
         </p:spPr>
-        <p:style>
-          <a:lnRef idx="3">
-            <a:schemeClr val="dk1"/>
-          </a:lnRef>
-          <a:fillRef idx="0">
-            <a:schemeClr val="dk1"/>
-          </a:fillRef>
-          <a:effectRef idx="2">
-            <a:schemeClr val="dk1"/>
-          </a:effectRef>
-          <a:fontRef idx="minor">
-            <a:schemeClr val="tx1"/>
-          </a:fontRef>
-        </p:style>
-      </p:cxnSp>
-      <p:cxnSp>
-        <p:nvCxnSpPr>
-          <p:cNvPr id="5" name="Straight Arrow Connector 4">
-            <a:extLst>
-              <a:ext uri="{FF2B5EF4-FFF2-40B4-BE49-F238E27FC236}">
-                <a16:creationId xmlns:a16="http://schemas.microsoft.com/office/drawing/2014/main" id="{D7E634FF-6627-4819-92AC-91195D17F09F}"/>
-              </a:ext>
-            </a:extLst>
-          </p:cNvPr>
-          <p:cNvCxnSpPr>
-            <a:cxnSpLocks/>
-          </p:cNvCxnSpPr>
-          <p:nvPr/>
-        </p:nvCxnSpPr>
-        <p:spPr>
-          <a:xfrm flipV="1">
-            <a:off x="4129176" y="3821500"/>
-            <a:ext cx="2682814" cy="1270958"/>
-          </a:xfrm>
-          <a:prstGeom prst="straightConnector1">
-            <a:avLst/>
-          </a:prstGeom>
-          <a:ln w="57150">
-            <a:tailEnd type="triangle"/>
-          </a:ln>
-        </p:spPr>
-        <p:style>
-          <a:lnRef idx="3">
-            <a:schemeClr val="dk1"/>
-          </a:lnRef>
-          <a:fillRef idx="0">
-            <a:schemeClr val="dk1"/>
-          </a:fillRef>
-          <a:effectRef idx="2">
-            <a:schemeClr val="dk1"/>
-          </a:effectRef>
-          <a:fontRef idx="minor">
-            <a:schemeClr val="tx1"/>
-          </a:fontRef>
-        </p:style>
-      </p:cxnSp>
-      <p:sp>
-        <p:nvSpPr>
-          <p:cNvPr id="6" name="TextBox 5">
-            <a:extLst>
-              <a:ext uri="{FF2B5EF4-FFF2-40B4-BE49-F238E27FC236}">
-                <a16:creationId xmlns:a16="http://schemas.microsoft.com/office/drawing/2014/main" id="{BF647E89-9319-4BD3-BEC5-B86CF275FF0C}"/>
+        <p:txBody>
+          <a:bodyPr>
+            <a:normAutofit/>
+          </a:bodyPr>
+          <a:lstStyle/>
+          <a:p>
+            <a:r>
+              <a:rPr lang="en-US" dirty="0"/>
+              <a:t>Pros</a:t>
+            </a:r>
+          </a:p>
+          <a:p>
+            <a:pPr lvl="1"/>
+            <a:r>
+              <a:rPr lang="en-US" dirty="0"/>
+              <a:t>Readily available on Linux systems without installation</a:t>
+            </a:r>
+          </a:p>
+          <a:p>
+            <a:r>
+              <a:rPr lang="en-US" dirty="0"/>
+              <a:t>Cons</a:t>
+            </a:r>
+          </a:p>
+          <a:p>
+            <a:pPr lvl="1"/>
+            <a:r>
+              <a:rPr lang="en-US" dirty="0"/>
+              <a:t>*nix specific</a:t>
+            </a:r>
+          </a:p>
+          <a:p>
+            <a:pPr lvl="1"/>
+            <a:r>
+              <a:rPr lang="en-US" dirty="0"/>
+              <a:t>Requires calling system commands from Python</a:t>
+            </a:r>
+          </a:p>
+        </p:txBody>
+      </p:sp>
+      <p:sp>
+        <p:nvSpPr>
+          <p:cNvPr id="4" name="TextBox 3">
+            <a:extLst>
+              <a:ext uri="{FF2B5EF4-FFF2-40B4-BE49-F238E27FC236}">
+                <a16:creationId xmlns:a16="http://schemas.microsoft.com/office/drawing/2014/main" id="{5DC67676-611A-4DE3-9F32-66D6A9E1C21F}"/>
               </a:ext>
             </a:extLst>
           </p:cNvPr>
@@ -3925,41 +3863,34 @@
         </p:nvSpPr>
         <p:spPr>
           <a:xfrm>
-            <a:off x="7059283" y="3358551"/>
-            <a:ext cx="1811549" cy="584775"/>
+            <a:off x="0" y="1690688"/>
+            <a:ext cx="12192000" cy="523220"/>
           </a:xfrm>
           <a:prstGeom prst="rect">
             <a:avLst/>
           </a:prstGeom>
+          <a:noFill/>
         </p:spPr>
         <p:txBody>
-          <a:bodyPr rot="0" spcFirstLastPara="0" vertOverflow="overflow" horzOverflow="overflow" vert="horz" wrap="square" lIns="91440" tIns="45720" rIns="91440" bIns="45720" numCol="1" spcCol="0" rtlCol="0" fromWordArt="0" anchor="t" anchorCtr="0" forceAA="0" compatLnSpc="1">
-            <a:prstTxWarp prst="textNoShape">
-              <a:avLst/>
-            </a:prstTxWarp>
+          <a:bodyPr wrap="square" rtlCol="0">
             <a:spAutoFit/>
           </a:bodyPr>
           <a:lstStyle/>
           <a:p>
-            <a:pPr>
-              <a:buChar char="•"/>
-            </a:pPr>
-            <a:r>
-              <a:rPr lang="en-US" sz="3200" dirty="0">
-                <a:cs typeface="Arial"/>
-              </a:rPr>
-              <a:t>Pandas  ​</a:t>
-            </a:r>
-            <a:endParaRPr lang="en-US" sz="3200" dirty="0">
-              <a:cs typeface="Calibri"/>
-            </a:endParaRPr>
+            <a:pPr algn="ctr"/>
+            <a:r>
+              <a:rPr lang="en-US" sz="2800" dirty="0">
+                <a:latin typeface="Lucida Console" panose="020B0609040504020204" pitchFamily="49" charset="0"/>
+              </a:rPr>
+              <a:t>curl "https://www.dataurlgoeshere.com"</a:t>
+            </a:r>
           </a:p>
         </p:txBody>
       </p:sp>
     </p:spTree>
     <p:extLst>
       <p:ext uri="{BB962C8B-B14F-4D97-AF65-F5344CB8AC3E}">
-        <p14:creationId xmlns:p14="http://schemas.microsoft.com/office/powerpoint/2010/main" val="2520028208"/>
+        <p14:creationId xmlns:p14="http://schemas.microsoft.com/office/powerpoint/2010/main" val="4141432659"/>
       </p:ext>
     </p:extLst>
   </p:cSld>
@@ -4009,164 +3940,6 @@
           <a:p>
             <a:r>
               <a:rPr lang="en-US" dirty="0"/>
-              <a:t>curl BASH command</a:t>
-            </a:r>
-          </a:p>
-        </p:txBody>
-      </p:sp>
-      <p:sp>
-        <p:nvSpPr>
-          <p:cNvPr id="3" name="Content Placeholder 2">
-            <a:extLst>
-              <a:ext uri="{FF2B5EF4-FFF2-40B4-BE49-F238E27FC236}">
-                <a16:creationId xmlns:a16="http://schemas.microsoft.com/office/drawing/2014/main" id="{B8A5C19E-6E87-4B0E-862A-C77659B25197}"/>
-              </a:ext>
-            </a:extLst>
-          </p:cNvPr>
-          <p:cNvSpPr>
-            <a:spLocks noGrp="1"/>
-          </p:cNvSpPr>
-          <p:nvPr>
-            <p:ph idx="1"/>
-          </p:nvPr>
-        </p:nvSpPr>
-        <p:spPr>
-          <a:xfrm>
-            <a:off x="838200" y="2528047"/>
-            <a:ext cx="10515600" cy="3964828"/>
-          </a:xfrm>
-        </p:spPr>
-        <p:txBody>
-          <a:bodyPr>
-            <a:normAutofit/>
-          </a:bodyPr>
-          <a:lstStyle/>
-          <a:p>
-            <a:r>
-              <a:rPr lang="en-US" dirty="0"/>
-              <a:t>Pros</a:t>
-            </a:r>
-          </a:p>
-          <a:p>
-            <a:pPr lvl="1"/>
-            <a:r>
-              <a:rPr lang="en-US" dirty="0"/>
-              <a:t>Readily available on Linux systems without installation</a:t>
-            </a:r>
-          </a:p>
-          <a:p>
-            <a:r>
-              <a:rPr lang="en-US" dirty="0"/>
-              <a:t>Cons</a:t>
-            </a:r>
-          </a:p>
-          <a:p>
-            <a:pPr lvl="1"/>
-            <a:r>
-              <a:rPr lang="en-US" dirty="0"/>
-              <a:t>*nix specific</a:t>
-            </a:r>
-          </a:p>
-          <a:p>
-            <a:pPr lvl="1"/>
-            <a:r>
-              <a:rPr lang="en-US" dirty="0"/>
-              <a:t>Requires calling system commands from Python</a:t>
-            </a:r>
-          </a:p>
-        </p:txBody>
-      </p:sp>
-      <p:sp>
-        <p:nvSpPr>
-          <p:cNvPr id="4" name="TextBox 3">
-            <a:extLst>
-              <a:ext uri="{FF2B5EF4-FFF2-40B4-BE49-F238E27FC236}">
-                <a16:creationId xmlns:a16="http://schemas.microsoft.com/office/drawing/2014/main" id="{5DC67676-611A-4DE3-9F32-66D6A9E1C21F}"/>
-              </a:ext>
-            </a:extLst>
-          </p:cNvPr>
-          <p:cNvSpPr txBox="1"/>
-          <p:nvPr/>
-        </p:nvSpPr>
-        <p:spPr>
-          <a:xfrm>
-            <a:off x="0" y="1690688"/>
-            <a:ext cx="12192000" cy="523220"/>
-          </a:xfrm>
-          <a:prstGeom prst="rect">
-            <a:avLst/>
-          </a:prstGeom>
-          <a:noFill/>
-        </p:spPr>
-        <p:txBody>
-          <a:bodyPr wrap="square" rtlCol="0">
-            <a:spAutoFit/>
-          </a:bodyPr>
-          <a:lstStyle/>
-          <a:p>
-            <a:pPr algn="ctr"/>
-            <a:r>
-              <a:rPr lang="en-US" sz="2800" dirty="0">
-                <a:latin typeface="Lucida Console" panose="020B0609040504020204" pitchFamily="49" charset="0"/>
-              </a:rPr>
-              <a:t>curl "https://www.dataurlgoeshere.com"</a:t>
-            </a:r>
-          </a:p>
-        </p:txBody>
-      </p:sp>
-    </p:spTree>
-    <p:extLst>
-      <p:ext uri="{BB962C8B-B14F-4D97-AF65-F5344CB8AC3E}">
-        <p14:creationId xmlns:p14="http://schemas.microsoft.com/office/powerpoint/2010/main" val="4141432659"/>
-      </p:ext>
-    </p:extLst>
-  </p:cSld>
-  <p:clrMapOvr>
-    <a:masterClrMapping/>
-  </p:clrMapOvr>
-</p:sld>
-</file>
-
-<file path=ppt/slides/slide13.xml><?xml version="1.0" encoding="utf-8"?>
-<p:sld xmlns:a="http://schemas.openxmlformats.org/drawingml/2006/main" xmlns:r="http://schemas.openxmlformats.org/officeDocument/2006/relationships" xmlns:p="http://schemas.openxmlformats.org/presentationml/2006/main">
-  <p:cSld>
-    <p:spTree>
-      <p:nvGrpSpPr>
-        <p:cNvPr id="1" name=""/>
-        <p:cNvGrpSpPr/>
-        <p:nvPr/>
-      </p:nvGrpSpPr>
-      <p:grpSpPr>
-        <a:xfrm>
-          <a:off x="0" y="0"/>
-          <a:ext cx="0" cy="0"/>
-          <a:chOff x="0" y="0"/>
-          <a:chExt cx="0" cy="0"/>
-        </a:xfrm>
-      </p:grpSpPr>
-      <p:sp>
-        <p:nvSpPr>
-          <p:cNvPr id="2" name="Title 1">
-            <a:extLst>
-              <a:ext uri="{FF2B5EF4-FFF2-40B4-BE49-F238E27FC236}">
-                <a16:creationId xmlns:a16="http://schemas.microsoft.com/office/drawing/2014/main" id="{68DCDD46-C769-4F86-9CD3-E15B0F2C1F87}"/>
-              </a:ext>
-            </a:extLst>
-          </p:cNvPr>
-          <p:cNvSpPr>
-            <a:spLocks noGrp="1"/>
-          </p:cNvSpPr>
-          <p:nvPr>
-            <p:ph type="title"/>
-          </p:nvPr>
-        </p:nvSpPr>
-        <p:spPr/>
-        <p:txBody>
-          <a:bodyPr/>
-          <a:lstStyle/>
-          <a:p>
-            <a:r>
-              <a:rPr lang="en-US" dirty="0"/>
               <a:t>Pandas Python Package</a:t>
             </a:r>
           </a:p>
@@ -4366,7 +4139,7 @@
 </p:sld>
 </file>
 
-<file path=ppt/slides/slide14.xml><?xml version="1.0" encoding="utf-8"?>
+<file path=ppt/slides/slide13.xml><?xml version="1.0" encoding="utf-8"?>
 <p:sld xmlns:a="http://schemas.openxmlformats.org/drawingml/2006/main" xmlns:r="http://schemas.openxmlformats.org/officeDocument/2006/relationships" xmlns:p="http://schemas.openxmlformats.org/presentationml/2006/main">
   <p:cSld>
     <p:spTree>
@@ -4484,7 +4257,7 @@
 </p:sld>
 </file>
 
-<file path=ppt/slides/slide15.xml><?xml version="1.0" encoding="utf-8"?>
+<file path=ppt/slides/slide14.xml><?xml version="1.0" encoding="utf-8"?>
 <p:sld xmlns:a="http://schemas.openxmlformats.org/drawingml/2006/main" xmlns:r="http://schemas.openxmlformats.org/officeDocument/2006/relationships" xmlns:p="http://schemas.openxmlformats.org/presentationml/2006/main">
   <p:cSld>
     <p:spTree>
@@ -4705,7 +4478,7 @@
 </p:sld>
 </file>
 
-<file path=ppt/slides/slide16.xml><?xml version="1.0" encoding="utf-8"?>
+<file path=ppt/slides/slide15.xml><?xml version="1.0" encoding="utf-8"?>
 <p:sld xmlns:a="http://schemas.openxmlformats.org/drawingml/2006/main" xmlns:r="http://schemas.openxmlformats.org/officeDocument/2006/relationships" xmlns:p="http://schemas.openxmlformats.org/presentationml/2006/main">
   <p:cSld>
     <p:spTree>
@@ -4823,6 +4596,315 @@
 </p:sld>
 </file>
 
+<file path=ppt/slides/slide16.xml><?xml version="1.0" encoding="utf-8"?>
+<p:sld xmlns:a="http://schemas.openxmlformats.org/drawingml/2006/main" xmlns:r="http://schemas.openxmlformats.org/officeDocument/2006/relationships" xmlns:p="http://schemas.openxmlformats.org/presentationml/2006/main">
+  <p:cSld>
+    <p:spTree>
+      <p:nvGrpSpPr>
+        <p:cNvPr id="1" name=""/>
+        <p:cNvGrpSpPr/>
+        <p:nvPr/>
+      </p:nvGrpSpPr>
+      <p:grpSpPr>
+        <a:xfrm>
+          <a:off x="0" y="0"/>
+          <a:ext cx="0" cy="0"/>
+          <a:chOff x="0" y="0"/>
+          <a:chExt cx="0" cy="0"/>
+        </a:xfrm>
+      </p:grpSpPr>
+      <p:sp>
+        <p:nvSpPr>
+          <p:cNvPr id="2" name="Title 1">
+            <a:extLst>
+              <a:ext uri="{FF2B5EF4-FFF2-40B4-BE49-F238E27FC236}">
+                <a16:creationId xmlns:a16="http://schemas.microsoft.com/office/drawing/2014/main" id="{68DCDD46-C769-4F86-9CD3-E15B0F2C1F87}"/>
+              </a:ext>
+            </a:extLst>
+          </p:cNvPr>
+          <p:cNvSpPr>
+            <a:spLocks noGrp="1"/>
+          </p:cNvSpPr>
+          <p:nvPr>
+            <p:ph type="title"/>
+          </p:nvPr>
+        </p:nvSpPr>
+        <p:spPr/>
+        <p:txBody>
+          <a:bodyPr/>
+          <a:lstStyle/>
+          <a:p>
+            <a:r>
+              <a:rPr lang="en-US" dirty="0" err="1"/>
+              <a:t>BeautifulSoup</a:t>
+            </a:r>
+            <a:r>
+              <a:rPr lang="en-US" dirty="0"/>
+              <a:t> Python Package</a:t>
+            </a:r>
+          </a:p>
+        </p:txBody>
+      </p:sp>
+      <p:sp>
+        <p:nvSpPr>
+          <p:cNvPr id="3" name="Content Placeholder 2">
+            <a:extLst>
+              <a:ext uri="{FF2B5EF4-FFF2-40B4-BE49-F238E27FC236}">
+                <a16:creationId xmlns:a16="http://schemas.microsoft.com/office/drawing/2014/main" id="{B8A5C19E-6E87-4B0E-862A-C77659B25197}"/>
+              </a:ext>
+            </a:extLst>
+          </p:cNvPr>
+          <p:cNvSpPr>
+            <a:spLocks noGrp="1"/>
+          </p:cNvSpPr>
+          <p:nvPr>
+            <p:ph idx="1"/>
+          </p:nvPr>
+        </p:nvSpPr>
+        <p:spPr>
+          <a:xfrm>
+            <a:off x="838200" y="2528047"/>
+            <a:ext cx="10515600" cy="3964828"/>
+          </a:xfrm>
+        </p:spPr>
+        <p:txBody>
+          <a:bodyPr vert="horz" lIns="91440" tIns="45720" rIns="91440" bIns="45720" rtlCol="0" anchor="t">
+            <a:normAutofit fontScale="92500" lnSpcReduction="20000"/>
+          </a:bodyPr>
+          <a:lstStyle/>
+          <a:p>
+            <a:r>
+              <a:rPr lang="en-US" sz="3000" dirty="0"/>
+              <a:t>Pros</a:t>
+            </a:r>
+          </a:p>
+          <a:p>
+            <a:pPr lvl="1"/>
+            <a:r>
+              <a:rPr lang="en-US" sz="2600" dirty="0"/>
+              <a:t>Included in Anaconda Python distribution</a:t>
+            </a:r>
+            <a:endParaRPr lang="en-US" sz="2600" dirty="0">
+              <a:cs typeface="Calibri"/>
+            </a:endParaRPr>
+          </a:p>
+          <a:p>
+            <a:pPr lvl="1"/>
+            <a:r>
+              <a:rPr lang="en-US" sz="2600" dirty="0"/>
+              <a:t>Simple and elegant; allows for granular control of web-parsing </a:t>
+            </a:r>
+            <a:endParaRPr lang="en-US" sz="2600" dirty="0">
+              <a:cs typeface="Calibri"/>
+            </a:endParaRPr>
+          </a:p>
+          <a:p>
+            <a:pPr lvl="2"/>
+            <a:r>
+              <a:rPr lang="en-US" sz="2200" dirty="0">
+                <a:latin typeface="Lucida Console"/>
+                <a:cs typeface="Calibri"/>
+              </a:rPr>
+              <a:t>Find('tag', name='blah')</a:t>
+            </a:r>
+            <a:endParaRPr lang="en-US" sz="2200" dirty="0">
+              <a:cs typeface="Calibri"/>
+            </a:endParaRPr>
+          </a:p>
+          <a:p>
+            <a:pPr lvl="1"/>
+            <a:r>
+              <a:rPr lang="en-US" sz="2600" dirty="0">
+                <a:latin typeface="Calibri"/>
+                <a:cs typeface="Calibri"/>
+              </a:rPr>
+              <a:t>Can navigate up, down and within a level of HTML tree easily</a:t>
+            </a:r>
+          </a:p>
+          <a:p>
+            <a:pPr lvl="2"/>
+            <a:r>
+              <a:rPr lang="en-US" sz="2200" dirty="0" err="1">
+                <a:latin typeface="Lucida Console"/>
+                <a:cs typeface="Calibri"/>
+              </a:rPr>
+              <a:t>Find_parent</a:t>
+            </a:r>
+            <a:r>
+              <a:rPr lang="en-US" sz="2200" dirty="0">
+                <a:latin typeface="Lucida Console"/>
+                <a:cs typeface="Calibri"/>
+              </a:rPr>
+              <a:t>()</a:t>
+            </a:r>
+            <a:endParaRPr lang="en-US" sz="2200" dirty="0">
+              <a:latin typeface="Calibri"/>
+              <a:cs typeface="Calibri"/>
+            </a:endParaRPr>
+          </a:p>
+          <a:p>
+            <a:pPr lvl="2"/>
+            <a:r>
+              <a:rPr lang="en-US" sz="2200" dirty="0" err="1">
+                <a:latin typeface="Lucida Console"/>
+              </a:rPr>
+              <a:t>Find_next_sibling</a:t>
+            </a:r>
+            <a:r>
+              <a:rPr lang="en-US" sz="2200" dirty="0">
+                <a:latin typeface="Lucida Console"/>
+              </a:rPr>
+              <a:t>()</a:t>
+            </a:r>
+          </a:p>
+          <a:p>
+            <a:pPr lvl="1"/>
+            <a:r>
+              <a:rPr lang="en-US" sz="2600" dirty="0"/>
+              <a:t>Better integration with Pandas than requests</a:t>
+            </a:r>
+          </a:p>
+          <a:p>
+            <a:pPr lvl="2"/>
+            <a:endParaRPr lang="en-US" sz="2200" dirty="0">
+              <a:latin typeface="Lucida Console"/>
+            </a:endParaRPr>
+          </a:p>
+          <a:p>
+            <a:r>
+              <a:rPr lang="en-US" sz="3000" dirty="0"/>
+              <a:t>Cons</a:t>
+            </a:r>
+          </a:p>
+          <a:p>
+            <a:pPr lvl="1"/>
+            <a:r>
+              <a:rPr lang="en-US" sz="2600" dirty="0"/>
+              <a:t>Doesn't return a </a:t>
+            </a:r>
+            <a:r>
+              <a:rPr lang="en-US" sz="2600" dirty="0" err="1"/>
+              <a:t>DataFrame</a:t>
+            </a:r>
+            <a:endParaRPr lang="en-US" sz="2600" dirty="0"/>
+          </a:p>
+          <a:p>
+            <a:pPr lvl="1"/>
+            <a:r>
+              <a:rPr lang="en-US" sz="2600" dirty="0"/>
+              <a:t>Better suited for more complex web</a:t>
+            </a:r>
+            <a:r>
+              <a:rPr lang="en-US" sz="2600" dirty="0">
+                <a:cs typeface="Calibri"/>
+              </a:rPr>
+              <a:t> pages </a:t>
+            </a:r>
+          </a:p>
+          <a:p>
+            <a:endParaRPr lang="en-US" dirty="0"/>
+          </a:p>
+        </p:txBody>
+      </p:sp>
+      <p:sp>
+        <p:nvSpPr>
+          <p:cNvPr id="4" name="TextBox 3">
+            <a:extLst>
+              <a:ext uri="{FF2B5EF4-FFF2-40B4-BE49-F238E27FC236}">
+                <a16:creationId xmlns:a16="http://schemas.microsoft.com/office/drawing/2014/main" id="{5DC67676-611A-4DE3-9F32-66D6A9E1C21F}"/>
+              </a:ext>
+            </a:extLst>
+          </p:cNvPr>
+          <p:cNvSpPr txBox="1"/>
+          <p:nvPr/>
+        </p:nvSpPr>
+        <p:spPr>
+          <a:xfrm>
+            <a:off x="0" y="1690688"/>
+            <a:ext cx="12192000" cy="461665"/>
+          </a:xfrm>
+          <a:prstGeom prst="rect">
+            <a:avLst/>
+          </a:prstGeom>
+          <a:noFill/>
+        </p:spPr>
+        <p:txBody>
+          <a:bodyPr wrap="square" rtlCol="0" anchor="t">
+            <a:spAutoFit/>
+          </a:bodyPr>
+          <a:lstStyle/>
+          <a:p>
+            <a:pPr algn="ctr"/>
+            <a:r>
+              <a:rPr lang="en-US" sz="2400" dirty="0">
+                <a:latin typeface="Lucida Console" panose="020B0609040504020204" pitchFamily="49" charset="0"/>
+              </a:rPr>
+              <a:t>soup = </a:t>
+            </a:r>
+            <a:r>
+              <a:rPr lang="en-US" sz="2400" dirty="0" err="1">
+                <a:latin typeface="Lucida Console" panose="020B0609040504020204" pitchFamily="49" charset="0"/>
+              </a:rPr>
+              <a:t>BeautifulSoup</a:t>
+            </a:r>
+            <a:r>
+              <a:rPr lang="en-US" sz="2400" dirty="0">
+                <a:latin typeface="Lucida Console" panose="020B0609040504020204" pitchFamily="49" charset="0"/>
+              </a:rPr>
+              <a:t>(</a:t>
+            </a:r>
+            <a:r>
+              <a:rPr lang="en-US" sz="2400" dirty="0" err="1">
+                <a:latin typeface="Lucida Console" panose="020B0609040504020204" pitchFamily="49" charset="0"/>
+              </a:rPr>
+              <a:t>requests.get</a:t>
+            </a:r>
+            <a:r>
+              <a:rPr lang="en-US" sz="2400" dirty="0">
+                <a:latin typeface="Lucida Console" panose="020B0609040504020204" pitchFamily="49" charset="0"/>
+              </a:rPr>
+              <a:t>(</a:t>
+            </a:r>
+            <a:r>
+              <a:rPr lang="en-US" sz="2400" dirty="0" err="1">
+                <a:latin typeface="Lucida Console" panose="020B0609040504020204" pitchFamily="49" charset="0"/>
+              </a:rPr>
+              <a:t>url</a:t>
+            </a:r>
+            <a:r>
+              <a:rPr lang="en-US" sz="2400" dirty="0">
+                <a:latin typeface="Lucida Console" panose="020B0609040504020204" pitchFamily="49" charset="0"/>
+              </a:rPr>
+              <a:t>).content, parser='</a:t>
+            </a:r>
+            <a:r>
+              <a:rPr lang="en-US" sz="2400" dirty="0" err="1">
+                <a:latin typeface="Lucida Console" panose="020B0609040504020204" pitchFamily="49" charset="0"/>
+              </a:rPr>
+              <a:t>lxml</a:t>
+            </a:r>
+            <a:r>
+              <a:rPr lang="en-US" sz="2400" dirty="0">
+                <a:latin typeface="Lucida Console" panose="020B0609040504020204" pitchFamily="49" charset="0"/>
+              </a:rPr>
+              <a:t>')</a:t>
+            </a:r>
+          </a:p>
+        </p:txBody>
+      </p:sp>
+    </p:spTree>
+    <p:extLst>
+      <p:ext uri="{BB962C8B-B14F-4D97-AF65-F5344CB8AC3E}">
+        <p14:creationId xmlns:p14="http://schemas.microsoft.com/office/powerpoint/2010/main" val="3779007658"/>
+      </p:ext>
+    </p:extLst>
+  </p:cSld>
+  <p:clrMapOvr>
+    <a:masterClrMapping/>
+  </p:clrMapOvr>
+</p:sld>
+</file>
+
 <file path=ppt/slides/slide17.xml><?xml version="1.0" encoding="utf-8"?>
 <p:sld xmlns:a="http://schemas.openxmlformats.org/drawingml/2006/main" xmlns:r="http://schemas.openxmlformats.org/officeDocument/2006/relationships" xmlns:p="http://schemas.openxmlformats.org/presentationml/2006/main">
   <p:cSld>
@@ -4845,323 +4927,6 @@
           <p:cNvPr id="2" name="Title 1">
             <a:extLst>
               <a:ext uri="{FF2B5EF4-FFF2-40B4-BE49-F238E27FC236}">
-                <a16:creationId xmlns:a16="http://schemas.microsoft.com/office/drawing/2014/main" id="{68DCDD46-C769-4F86-9CD3-E15B0F2C1F87}"/>
-              </a:ext>
-            </a:extLst>
-          </p:cNvPr>
-          <p:cNvSpPr>
-            <a:spLocks noGrp="1"/>
-          </p:cNvSpPr>
-          <p:nvPr>
-            <p:ph type="title"/>
-          </p:nvPr>
-        </p:nvSpPr>
-        <p:spPr/>
-        <p:txBody>
-          <a:bodyPr/>
-          <a:lstStyle/>
-          <a:p>
-            <a:r>
-              <a:rPr lang="en-US" dirty="0" err="1"/>
-              <a:t>BeautifulSoup</a:t>
-            </a:r>
-            <a:r>
-              <a:rPr lang="en-US" dirty="0"/>
-              <a:t> (bs4) Python Package</a:t>
-            </a:r>
-          </a:p>
-        </p:txBody>
-      </p:sp>
-      <p:sp>
-        <p:nvSpPr>
-          <p:cNvPr id="3" name="Content Placeholder 2">
-            <a:extLst>
-              <a:ext uri="{FF2B5EF4-FFF2-40B4-BE49-F238E27FC236}">
-                <a16:creationId xmlns:a16="http://schemas.microsoft.com/office/drawing/2014/main" id="{B8A5C19E-6E87-4B0E-862A-C77659B25197}"/>
-              </a:ext>
-            </a:extLst>
-          </p:cNvPr>
-          <p:cNvSpPr>
-            <a:spLocks noGrp="1"/>
-          </p:cNvSpPr>
-          <p:nvPr>
-            <p:ph idx="1"/>
-          </p:nvPr>
-        </p:nvSpPr>
-        <p:spPr>
-          <a:xfrm>
-            <a:off x="838200" y="2528047"/>
-            <a:ext cx="10515600" cy="3964828"/>
-          </a:xfrm>
-        </p:spPr>
-        <p:txBody>
-          <a:bodyPr vert="horz" lIns="91440" tIns="45720" rIns="91440" bIns="45720" rtlCol="0" anchor="t">
-            <a:normAutofit lnSpcReduction="10000"/>
-          </a:bodyPr>
-          <a:lstStyle/>
-          <a:p>
-            <a:r>
-              <a:rPr lang="en-US" dirty="0"/>
-              <a:t>Pros</a:t>
-            </a:r>
-          </a:p>
-          <a:p>
-            <a:pPr lvl="1"/>
-            <a:r>
-              <a:rPr lang="en-US" dirty="0"/>
-              <a:t>Included in Anaconda Python distribution</a:t>
-            </a:r>
-            <a:r>
-              <a:rPr lang="en-US" dirty="0">
-                <a:cs typeface="Calibri"/>
-              </a:rPr>
-              <a:t> (bs4)</a:t>
-            </a:r>
-          </a:p>
-          <a:p>
-            <a:pPr lvl="1"/>
-            <a:r>
-              <a:rPr lang="en-US" dirty="0"/>
-              <a:t>Simple and elegant; allows for granular control of web-parsing </a:t>
-            </a:r>
-            <a:endParaRPr lang="en-US" dirty="0">
-              <a:cs typeface="Calibri"/>
-            </a:endParaRPr>
-          </a:p>
-          <a:p>
-            <a:pPr lvl="2"/>
-            <a:r>
-              <a:rPr lang="en-US" dirty="0">
-                <a:latin typeface="Lucida Console"/>
-                <a:cs typeface="Calibri"/>
-              </a:rPr>
-              <a:t>Find('tag', name='blah' ) function </a:t>
-            </a:r>
-            <a:endParaRPr lang="en-US" dirty="0">
-              <a:cs typeface="Calibri"/>
-            </a:endParaRPr>
-          </a:p>
-          <a:p>
-            <a:pPr lvl="1"/>
-            <a:r>
-              <a:rPr lang="en-US" dirty="0">
-                <a:latin typeface="Calibri"/>
-                <a:cs typeface="Calibri"/>
-              </a:rPr>
-              <a:t>Can navigate up, down and within a level of HTML tree easily</a:t>
-            </a:r>
-          </a:p>
-          <a:p>
-            <a:pPr lvl="2"/>
-            <a:r>
-              <a:rPr lang="en-US" dirty="0" err="1">
-                <a:latin typeface="Lucida Console"/>
-                <a:cs typeface="Calibri"/>
-              </a:rPr>
-              <a:t>Find_parent</a:t>
-            </a:r>
-            <a:r>
-              <a:rPr lang="en-US" dirty="0">
-                <a:latin typeface="Lucida Console"/>
-                <a:cs typeface="Calibri"/>
-              </a:rPr>
-              <a:t>()</a:t>
-            </a:r>
-            <a:endParaRPr lang="en-US" dirty="0">
-              <a:latin typeface="Calibri"/>
-              <a:cs typeface="Calibri"/>
-            </a:endParaRPr>
-          </a:p>
-          <a:p>
-            <a:pPr lvl="2"/>
-            <a:r>
-              <a:rPr lang="en-US" dirty="0" err="1">
-                <a:latin typeface="Lucida Console"/>
-              </a:rPr>
-              <a:t>Find_next_sibling</a:t>
-            </a:r>
-            <a:r>
-              <a:rPr lang="en-US" dirty="0">
-                <a:latin typeface="Lucida Console"/>
-              </a:rPr>
-              <a:t>()</a:t>
-            </a:r>
-          </a:p>
-          <a:p>
-            <a:pPr lvl="2"/>
-            <a:endParaRPr lang="en-US" dirty="0">
-              <a:latin typeface="Lucida Console"/>
-            </a:endParaRPr>
-          </a:p>
-          <a:p>
-            <a:r>
-              <a:rPr lang="en-US" dirty="0"/>
-              <a:t>Cons</a:t>
-            </a:r>
-          </a:p>
-          <a:p>
-            <a:pPr lvl="1"/>
-            <a:r>
-              <a:rPr lang="en-US" dirty="0"/>
-              <a:t>Doesn't return a </a:t>
-            </a:r>
-            <a:r>
-              <a:rPr lang="en-US" dirty="0" err="1"/>
-              <a:t>DataFrame</a:t>
-            </a:r>
-            <a:endParaRPr lang="en-US" dirty="0"/>
-          </a:p>
-          <a:p>
-            <a:pPr lvl="1"/>
-            <a:r>
-              <a:rPr lang="en-US" dirty="0"/>
-              <a:t>Better suited for more complex web</a:t>
-            </a:r>
-            <a:r>
-              <a:rPr lang="en-US" dirty="0">
-                <a:cs typeface="Calibri"/>
-              </a:rPr>
-              <a:t> pages </a:t>
-            </a:r>
-          </a:p>
-          <a:p>
-            <a:endParaRPr lang="en-US" dirty="0"/>
-          </a:p>
-        </p:txBody>
-      </p:sp>
-      <p:sp>
-        <p:nvSpPr>
-          <p:cNvPr id="4" name="TextBox 3">
-            <a:extLst>
-              <a:ext uri="{FF2B5EF4-FFF2-40B4-BE49-F238E27FC236}">
-                <a16:creationId xmlns:a16="http://schemas.microsoft.com/office/drawing/2014/main" id="{5DC67676-611A-4DE3-9F32-66D6A9E1C21F}"/>
-              </a:ext>
-            </a:extLst>
-          </p:cNvPr>
-          <p:cNvSpPr txBox="1"/>
-          <p:nvPr/>
-        </p:nvSpPr>
-        <p:spPr>
-          <a:xfrm>
-            <a:off x="0" y="1690688"/>
-            <a:ext cx="12192000" cy="400110"/>
-          </a:xfrm>
-          <a:prstGeom prst="rect">
-            <a:avLst/>
-          </a:prstGeom>
-          <a:noFill/>
-        </p:spPr>
-        <p:txBody>
-          <a:bodyPr wrap="square" rtlCol="0" anchor="t">
-            <a:spAutoFit/>
-          </a:bodyPr>
-          <a:lstStyle/>
-          <a:p>
-            <a:pPr algn="ctr"/>
-            <a:r>
-              <a:rPr lang="en-US" sz="2000" dirty="0">
-                <a:latin typeface="Lucida Console" panose="020B0609040504020204" pitchFamily="49" charset="0"/>
-              </a:rPr>
-              <a:t>soup = </a:t>
-            </a:r>
-            <a:r>
-              <a:rPr lang="en-US" sz="2000" dirty="0" err="1">
-                <a:latin typeface="Lucida Console" panose="020B0609040504020204" pitchFamily="49" charset="0"/>
-              </a:rPr>
-              <a:t>BeautifulSoup</a:t>
-            </a:r>
-            <a:r>
-              <a:rPr lang="en-US" sz="2000" dirty="0">
-                <a:latin typeface="Lucida Console" panose="020B0609040504020204" pitchFamily="49" charset="0"/>
-              </a:rPr>
-              <a:t>(</a:t>
-            </a:r>
-            <a:r>
-              <a:rPr lang="en-US" sz="2000" dirty="0" err="1">
-                <a:latin typeface="Lucida Console" panose="020B0609040504020204" pitchFamily="49" charset="0"/>
-              </a:rPr>
-              <a:t>requests.get</a:t>
-            </a:r>
-            <a:r>
-              <a:rPr lang="en-US" sz="2000" dirty="0">
-                <a:latin typeface="Lucida Console" panose="020B0609040504020204" pitchFamily="49" charset="0"/>
-              </a:rPr>
-              <a:t>(</a:t>
-            </a:r>
-            <a:r>
-              <a:rPr lang="en-US" sz="2000" dirty="0" err="1">
-                <a:latin typeface="Lucida Console" panose="020B0609040504020204" pitchFamily="49" charset="0"/>
-              </a:rPr>
-              <a:t>url</a:t>
-            </a:r>
-            <a:r>
-              <a:rPr lang="en-US" sz="2000" dirty="0">
-                <a:latin typeface="Lucida Console" panose="020B0609040504020204" pitchFamily="49" charset="0"/>
-              </a:rPr>
-              <a:t>).content, parser='</a:t>
-            </a:r>
-            <a:r>
-              <a:rPr lang="en-US" sz="2000" dirty="0" err="1">
-                <a:latin typeface="Lucida Console" panose="020B0609040504020204" pitchFamily="49" charset="0"/>
-              </a:rPr>
-              <a:t>lxml</a:t>
-            </a:r>
-            <a:r>
-              <a:rPr lang="en-US" sz="2000" dirty="0">
-                <a:latin typeface="Lucida Console" panose="020B0609040504020204" pitchFamily="49" charset="0"/>
-              </a:rPr>
-              <a:t>' or '</a:t>
-            </a:r>
-            <a:r>
-              <a:rPr lang="en-US" sz="2000" dirty="0" err="1">
-                <a:latin typeface="Lucida Console" panose="020B0609040504020204" pitchFamily="49" charset="0"/>
-              </a:rPr>
-              <a:t>lxml</a:t>
-            </a:r>
-            <a:r>
-              <a:rPr lang="en-US" sz="2000" dirty="0">
-                <a:latin typeface="Lucida Console" panose="020B0609040504020204" pitchFamily="49" charset="0"/>
-              </a:rPr>
-              <a:t>')</a:t>
-            </a:r>
-          </a:p>
-        </p:txBody>
-      </p:sp>
-    </p:spTree>
-    <p:extLst>
-      <p:ext uri="{BB962C8B-B14F-4D97-AF65-F5344CB8AC3E}">
-        <p14:creationId xmlns:p14="http://schemas.microsoft.com/office/powerpoint/2010/main" val="3779007658"/>
-      </p:ext>
-    </p:extLst>
-  </p:cSld>
-  <p:clrMapOvr>
-    <a:masterClrMapping/>
-  </p:clrMapOvr>
-</p:sld>
-</file>
-
-<file path=ppt/slides/slide18.xml><?xml version="1.0" encoding="utf-8"?>
-<p:sld xmlns:a="http://schemas.openxmlformats.org/drawingml/2006/main" xmlns:r="http://schemas.openxmlformats.org/officeDocument/2006/relationships" xmlns:p="http://schemas.openxmlformats.org/presentationml/2006/main">
-  <p:cSld>
-    <p:spTree>
-      <p:nvGrpSpPr>
-        <p:cNvPr id="1" name=""/>
-        <p:cNvGrpSpPr/>
-        <p:nvPr/>
-      </p:nvGrpSpPr>
-      <p:grpSpPr>
-        <a:xfrm>
-          <a:off x="0" y="0"/>
-          <a:ext cx="0" cy="0"/>
-          <a:chOff x="0" y="0"/>
-          <a:chExt cx="0" cy="0"/>
-        </a:xfrm>
-      </p:grpSpPr>
-      <p:sp>
-        <p:nvSpPr>
-          <p:cNvPr id="2" name="Title 1">
-            <a:extLst>
-              <a:ext uri="{FF2B5EF4-FFF2-40B4-BE49-F238E27FC236}">
                 <a16:creationId xmlns:a16="http://schemas.microsoft.com/office/drawing/2014/main" id="{F7F61A3F-2CC6-4309-AAA1-01BE4E454803}"/>
               </a:ext>
             </a:extLst>
@@ -5253,13 +5018,15 @@
             <a:pPr lvl="1"/>
             <a:r>
               <a:rPr lang="en-US" dirty="0"/>
-              <a:t>Designed for client or </a:t>
-            </a:r>
-            <a:r>
-              <a:rPr lang="en-US"/>
-              <a:t>server role</a:t>
-            </a:r>
-            <a:endParaRPr lang="en-US" dirty="0"/>
+              <a:t>Designed for client and server roles</a:t>
+            </a:r>
+          </a:p>
+          <a:p>
+            <a:pPr lvl="1"/>
+            <a:r>
+              <a:rPr lang="en-US" dirty="0"/>
+              <a:t>Lower quality package</a:t>
+            </a:r>
           </a:p>
         </p:txBody>
       </p:sp>
@@ -5373,6 +5140,45 @@
           </a:p>
         </p:txBody>
       </p:sp>
+      <p:pic>
+        <p:nvPicPr>
+          <p:cNvPr id="4" name="Picture 3">
+            <a:extLst>
+              <a:ext uri="{FF2B5EF4-FFF2-40B4-BE49-F238E27FC236}">
+                <a16:creationId xmlns:a16="http://schemas.microsoft.com/office/drawing/2014/main" id="{2E9304AB-6B95-46F3-B4B3-F854E3240AA3}"/>
+              </a:ext>
+            </a:extLst>
+          </p:cNvPr>
+          <p:cNvPicPr>
+            <a:picLocks noChangeAspect="1"/>
+          </p:cNvPicPr>
+          <p:nvPr/>
+        </p:nvPicPr>
+        <p:blipFill>
+          <a:blip r:embed="rId2">
+            <a:extLst>
+              <a:ext uri="{28A0092B-C50C-407E-A947-70E740481C1C}">
+                <a14:useLocalDpi xmlns:a14="http://schemas.microsoft.com/office/drawing/2010/main" val="0"/>
+              </a:ext>
+              <a:ext uri="{837473B0-CC2E-450A-ABE3-18F120FF3D39}">
+                <a1611:picAttrSrcUrl xmlns:a1611="http://schemas.microsoft.com/office/drawing/2016/11/main" r:id="rId3"/>
+              </a:ext>
+            </a:extLst>
+          </a:blip>
+          <a:stretch>
+            <a:fillRect/>
+          </a:stretch>
+        </p:blipFill>
+        <p:spPr>
+          <a:xfrm>
+            <a:off x="7760554" y="1571625"/>
+            <a:ext cx="2971800" cy="3714750"/>
+          </a:xfrm>
+          <a:prstGeom prst="rect">
+            <a:avLst/>
+          </a:prstGeom>
+        </p:spPr>
+      </p:pic>
     </p:spTree>
     <p:extLst>
       <p:ext uri="{BB962C8B-B14F-4D97-AF65-F5344CB8AC3E}">
@@ -5942,18 +5748,11 @@
               <a:t>Nice!! </a:t>
             </a:r>
             <a:r>
-              <a:rPr lang="en-US" sz="2000" dirty="0">
-                <a:latin typeface="Courier New"/>
-                <a:cs typeface="Courier New"/>
-              </a:rPr>
-              <a:t>Pandas </a:t>
-            </a:r>
-            <a:r>
               <a:rPr lang="en-US" sz="2000" dirty="0" err="1">
                 <a:latin typeface="Courier New"/>
                 <a:cs typeface="Courier New"/>
               </a:rPr>
-              <a:t>read_html</a:t>
+              <a:t>Pandas.read_html</a:t>
             </a:r>
             <a:r>
               <a:rPr lang="en-US" sz="2000" dirty="0">
@@ -6066,7 +5865,7 @@
         <p:spPr/>
         <p:txBody>
           <a:bodyPr vert="horz" lIns="91440" tIns="45720" rIns="91440" bIns="45720" rtlCol="0" anchor="t">
-            <a:normAutofit/>
+            <a:normAutofit lnSpcReduction="10000"/>
           </a:bodyPr>
           <a:lstStyle/>
           <a:p>
@@ -6104,6 +5903,15 @@
                 <a:cs typeface="Calibri"/>
               </a:rPr>
               <a:t> deep inside an HTML webpage's DOM structure?</a:t>
+            </a:r>
+          </a:p>
+          <a:p>
+            <a:pPr lvl="1"/>
+            <a:r>
+              <a:rPr lang="en-US" dirty="0">
+                <a:cs typeface="Calibri"/>
+              </a:rPr>
+              <a:t>Or you need to submit a token with your request?</a:t>
             </a:r>
           </a:p>
           <a:p>
@@ -6121,7 +5929,7 @@
                 <a:latin typeface="Courier New"/>
                 <a:cs typeface="Courier New"/>
               </a:rPr>
-              <a:t>Pd.read_html</a:t>
+              <a:t>Pandas.read_html</a:t>
             </a:r>
             <a:r>
               <a:rPr lang="en-US" dirty="0">
@@ -6238,7 +6046,7 @@
         </p:blipFill>
         <p:spPr>
           <a:xfrm>
-            <a:off x="8232472" y="3322553"/>
+            <a:off x="8924035" y="3483918"/>
             <a:ext cx="2124974" cy="2211346"/>
           </a:xfrm>
           <a:prstGeom prst="rect">
@@ -6497,242 +6305,6 @@
 </file>
 
 <file path=ppt/slides/slide8.xml><?xml version="1.0" encoding="utf-8"?>
-<p:sld xmlns:a="http://schemas.openxmlformats.org/drawingml/2006/main" xmlns:r="http://schemas.openxmlformats.org/officeDocument/2006/relationships" xmlns:p="http://schemas.openxmlformats.org/presentationml/2006/main">
-  <p:cSld>
-    <p:spTree>
-      <p:nvGrpSpPr>
-        <p:cNvPr id="1" name=""/>
-        <p:cNvGrpSpPr/>
-        <p:nvPr/>
-      </p:nvGrpSpPr>
-      <p:grpSpPr>
-        <a:xfrm>
-          <a:off x="0" y="0"/>
-          <a:ext cx="0" cy="0"/>
-          <a:chOff x="0" y="0"/>
-          <a:chExt cx="0" cy="0"/>
-        </a:xfrm>
-      </p:grpSpPr>
-      <p:sp>
-        <p:nvSpPr>
-          <p:cNvPr id="2" name="Title 1">
-            <a:extLst>
-              <a:ext uri="{FF2B5EF4-FFF2-40B4-BE49-F238E27FC236}">
-                <a16:creationId xmlns:a16="http://schemas.microsoft.com/office/drawing/2014/main" id="{4A11E19A-E3BB-4355-BAC0-B64507DF19AE}"/>
-              </a:ext>
-            </a:extLst>
-          </p:cNvPr>
-          <p:cNvSpPr>
-            <a:spLocks noGrp="1"/>
-          </p:cNvSpPr>
-          <p:nvPr>
-            <p:ph type="title"/>
-          </p:nvPr>
-        </p:nvSpPr>
-        <p:spPr/>
-        <p:txBody>
-          <a:bodyPr/>
-          <a:lstStyle/>
-          <a:p>
-            <a:r>
-              <a:rPr lang="en-US" dirty="0">
-                <a:cs typeface="Calibri Light"/>
-              </a:rPr>
-              <a:t>Web-Technology: Scraping 'Hard' Example</a:t>
-            </a:r>
-          </a:p>
-        </p:txBody>
-      </p:sp>
-      <p:sp>
-        <p:nvSpPr>
-          <p:cNvPr id="3" name="Content Placeholder 2">
-            <a:extLst>
-              <a:ext uri="{FF2B5EF4-FFF2-40B4-BE49-F238E27FC236}">
-                <a16:creationId xmlns:a16="http://schemas.microsoft.com/office/drawing/2014/main" id="{999871CB-E318-444F-B37F-B0091E440123}"/>
-              </a:ext>
-            </a:extLst>
-          </p:cNvPr>
-          <p:cNvSpPr>
-            <a:spLocks noGrp="1"/>
-          </p:cNvSpPr>
-          <p:nvPr>
-            <p:ph idx="1"/>
-          </p:nvPr>
-        </p:nvSpPr>
-        <p:spPr/>
-        <p:txBody>
-          <a:bodyPr vert="horz" lIns="91440" tIns="45720" rIns="91440" bIns="45720" rtlCol="0" anchor="t">
-            <a:normAutofit/>
-          </a:bodyPr>
-          <a:lstStyle/>
-          <a:p>
-            <a:r>
-              <a:rPr lang="en-US" b="1" dirty="0">
-                <a:cs typeface="Calibri"/>
-              </a:rPr>
-              <a:t>Example) </a:t>
-            </a:r>
-            <a:r>
-              <a:rPr lang="en-US" b="1" dirty="0">
-                <a:cs typeface="Calibri"/>
-                <a:hlinkClick r:id="rId2"/>
-              </a:rPr>
-              <a:t>http://www.marketwatch.com</a:t>
-            </a:r>
-          </a:p>
-          <a:p>
-            <a:endParaRPr lang="en-US" b="1" dirty="0">
-              <a:cs typeface="Calibri"/>
-            </a:endParaRPr>
-          </a:p>
-          <a:p>
-            <a:endParaRPr lang="en-US" b="1" dirty="0">
-              <a:cs typeface="Calibri"/>
-            </a:endParaRPr>
-          </a:p>
-        </p:txBody>
-      </p:sp>
-      <p:sp>
-        <p:nvSpPr>
-          <p:cNvPr id="6" name="TextBox 5">
-            <a:extLst>
-              <a:ext uri="{FF2B5EF4-FFF2-40B4-BE49-F238E27FC236}">
-                <a16:creationId xmlns:a16="http://schemas.microsoft.com/office/drawing/2014/main" id="{B92215C6-DD28-4E04-BA10-5579BECE04CF}"/>
-              </a:ext>
-            </a:extLst>
-          </p:cNvPr>
-          <p:cNvSpPr txBox="1"/>
-          <p:nvPr/>
-        </p:nvSpPr>
-        <p:spPr>
-          <a:xfrm>
-            <a:off x="842514" y="2517477"/>
-            <a:ext cx="9673085" cy="1107996"/>
-          </a:xfrm>
-          <a:prstGeom prst="rect">
-            <a:avLst/>
-          </a:prstGeom>
-        </p:spPr>
-        <p:txBody>
-          <a:bodyPr rot="0" spcFirstLastPara="0" vertOverflow="overflow" horzOverflow="overflow" vert="horz" wrap="square" lIns="91440" tIns="45720" rIns="91440" bIns="45720" numCol="1" spcCol="0" rtlCol="0" fromWordArt="0" anchor="t" anchorCtr="0" forceAA="0" compatLnSpc="1">
-            <a:prstTxWarp prst="textNoShape">
-              <a:avLst/>
-            </a:prstTxWarp>
-            <a:spAutoFit/>
-          </a:bodyPr>
-          <a:lstStyle/>
-          <a:p>
-            <a:r>
-              <a:rPr lang="en-US" sz="2400" dirty="0">
-                <a:latin typeface="Courier New"/>
-                <a:cs typeface="Courier New"/>
-              </a:rPr>
-              <a:t>&gt;&gt;&gt; </a:t>
-            </a:r>
-            <a:r>
-              <a:rPr lang="en-US" sz="2400" dirty="0" err="1">
-                <a:latin typeface="Courier New"/>
-                <a:cs typeface="Courier New"/>
-              </a:rPr>
-              <a:t>df</a:t>
-            </a:r>
-            <a:r>
-              <a:rPr lang="en-US" sz="2400" dirty="0">
-                <a:latin typeface="Courier New"/>
-                <a:cs typeface="Courier New"/>
-              </a:rPr>
-              <a:t> = </a:t>
-            </a:r>
-            <a:r>
-              <a:rPr lang="en-US" sz="2400" dirty="0" err="1">
-                <a:latin typeface="Courier New"/>
-                <a:cs typeface="Courier New"/>
-              </a:rPr>
-              <a:t>pd.read_html</a:t>
-            </a:r>
-            <a:r>
-              <a:rPr lang="en-US" sz="2400" dirty="0">
-                <a:latin typeface="Courier New"/>
-                <a:cs typeface="Courier New"/>
-              </a:rPr>
-              <a:t>('http://www.marketwatch.com')</a:t>
-            </a:r>
-            <a:endParaRPr lang="en-US" sz="2400" dirty="0">
-              <a:cs typeface="Calibri"/>
-            </a:endParaRPr>
-          </a:p>
-          <a:p>
-            <a:r>
-              <a:rPr lang="en-US" sz="2400" dirty="0">
-                <a:latin typeface="Courier New"/>
-                <a:cs typeface="Courier New"/>
-              </a:rPr>
-              <a:t>&gt;&gt;&gt; </a:t>
-            </a:r>
-            <a:r>
-              <a:rPr lang="en-US" sz="2400" dirty="0" err="1">
-                <a:latin typeface="Courier New"/>
-                <a:cs typeface="Courier New"/>
-              </a:rPr>
-              <a:t>df</a:t>
-            </a:r>
-            <a:endParaRPr lang="en-US" sz="2400" dirty="0">
-              <a:latin typeface="Courier New"/>
-              <a:cs typeface="Courier New"/>
-            </a:endParaRPr>
-          </a:p>
-          <a:p>
-            <a:endParaRPr lang="en-US" dirty="0">
-              <a:latin typeface="Courier New"/>
-              <a:cs typeface="Courier New"/>
-            </a:endParaRPr>
-          </a:p>
-        </p:txBody>
-      </p:sp>
-      <p:pic>
-        <p:nvPicPr>
-          <p:cNvPr id="4" name="Picture 7" descr="A screenshot of a cell phone&#10;&#10;Description generated with very high confidence">
-            <a:extLst>
-              <a:ext uri="{FF2B5EF4-FFF2-40B4-BE49-F238E27FC236}">
-                <a16:creationId xmlns:a16="http://schemas.microsoft.com/office/drawing/2014/main" id="{83D9E2FC-47DA-4549-BD67-154B8A87476C}"/>
-              </a:ext>
-            </a:extLst>
-          </p:cNvPr>
-          <p:cNvPicPr>
-            <a:picLocks noChangeAspect="1"/>
-          </p:cNvPicPr>
-          <p:nvPr/>
-        </p:nvPicPr>
-        <p:blipFill>
-          <a:blip r:embed="rId3"/>
-          <a:stretch>
-            <a:fillRect/>
-          </a:stretch>
-        </p:blipFill>
-        <p:spPr>
-          <a:xfrm>
-            <a:off x="2524665" y="3434702"/>
-            <a:ext cx="6596331" cy="3036597"/>
-          </a:xfrm>
-          <a:prstGeom prst="rect">
-            <a:avLst/>
-          </a:prstGeom>
-        </p:spPr>
-      </p:pic>
-    </p:spTree>
-    <p:extLst>
-      <p:ext uri="{BB962C8B-B14F-4D97-AF65-F5344CB8AC3E}">
-        <p14:creationId xmlns:p14="http://schemas.microsoft.com/office/powerpoint/2010/main" val="604071650"/>
-      </p:ext>
-    </p:extLst>
-  </p:cSld>
-  <p:clrMapOvr>
-    <a:masterClrMapping/>
-  </p:clrMapOvr>
-</p:sld>
-</file>
-
-<file path=ppt/slides/slide9.xml><?xml version="1.0" encoding="utf-8"?>
 <p:sld xmlns:a="http://schemas.openxmlformats.org/drawingml/2006/main" xmlns:r="http://schemas.openxmlformats.org/officeDocument/2006/relationships" xmlns:p="http://schemas.openxmlformats.org/presentationml/2006/main">
   <p:cSld>
     <p:spTree>
@@ -7112,6 +6684,215 @@
       <p:bldP spid="10" grpId="0"/>
     </p:bldLst>
   </p:timing>
+</p:sld>
+</file>
+
+<file path=ppt/slides/slide9.xml><?xml version="1.0" encoding="utf-8"?>
+<p:sld xmlns:a="http://schemas.openxmlformats.org/drawingml/2006/main" xmlns:r="http://schemas.openxmlformats.org/officeDocument/2006/relationships" xmlns:p="http://schemas.openxmlformats.org/presentationml/2006/main">
+  <p:cSld>
+    <p:spTree>
+      <p:nvGrpSpPr>
+        <p:cNvPr id="1" name=""/>
+        <p:cNvGrpSpPr/>
+        <p:nvPr/>
+      </p:nvGrpSpPr>
+      <p:grpSpPr>
+        <a:xfrm>
+          <a:off x="0" y="0"/>
+          <a:ext cx="0" cy="0"/>
+          <a:chOff x="0" y="0"/>
+          <a:chExt cx="0" cy="0"/>
+        </a:xfrm>
+      </p:grpSpPr>
+      <p:sp>
+        <p:nvSpPr>
+          <p:cNvPr id="2" name="Title 1">
+            <a:extLst>
+              <a:ext uri="{FF2B5EF4-FFF2-40B4-BE49-F238E27FC236}">
+                <a16:creationId xmlns:a16="http://schemas.microsoft.com/office/drawing/2014/main" id="{EFF362B6-8BB8-4FE2-A1A8-E203F08CF15D}"/>
+              </a:ext>
+            </a:extLst>
+          </p:cNvPr>
+          <p:cNvSpPr>
+            <a:spLocks noGrp="1"/>
+          </p:cNvSpPr>
+          <p:nvPr>
+            <p:ph type="title"/>
+          </p:nvPr>
+        </p:nvSpPr>
+        <p:spPr/>
+        <p:txBody>
+          <a:bodyPr/>
+          <a:lstStyle/>
+          <a:p>
+            <a:r>
+              <a:rPr lang="en-US" dirty="0" err="1">
+                <a:cs typeface="Calibri Light"/>
+              </a:rPr>
+              <a:t>BeautifulSoup</a:t>
+            </a:r>
+            <a:r>
+              <a:rPr lang="en-US" dirty="0">
+                <a:cs typeface="Calibri Light"/>
+              </a:rPr>
+              <a:t> + Requests </a:t>
+            </a:r>
+            <a:endParaRPr lang="en-US" dirty="0" err="1"/>
+          </a:p>
+        </p:txBody>
+      </p:sp>
+      <p:sp>
+        <p:nvSpPr>
+          <p:cNvPr id="3" name="Content Placeholder 2">
+            <a:extLst>
+              <a:ext uri="{FF2B5EF4-FFF2-40B4-BE49-F238E27FC236}">
+                <a16:creationId xmlns:a16="http://schemas.microsoft.com/office/drawing/2014/main" id="{5B991963-6DFE-4282-9FC4-34A112F6AADF}"/>
+              </a:ext>
+            </a:extLst>
+          </p:cNvPr>
+          <p:cNvSpPr>
+            <a:spLocks noGrp="1"/>
+          </p:cNvSpPr>
+          <p:nvPr>
+            <p:ph idx="1"/>
+          </p:nvPr>
+        </p:nvSpPr>
+        <p:spPr>
+          <a:xfrm>
+            <a:off x="191219" y="1653097"/>
+            <a:ext cx="4937185" cy="3718734"/>
+          </a:xfrm>
+        </p:spPr>
+        <p:txBody>
+          <a:bodyPr vert="horz" lIns="91440" tIns="45720" rIns="91440" bIns="45720" rtlCol="0" anchor="t">
+            <a:normAutofit/>
+          </a:bodyPr>
+          <a:lstStyle/>
+          <a:p>
+            <a:r>
+              <a:rPr lang="en-US" sz="2000" dirty="0">
+                <a:cs typeface="Calibri"/>
+              </a:rPr>
+              <a:t>Way to circumvent: </a:t>
+            </a:r>
+          </a:p>
+          <a:p>
+            <a:pPr lvl="1"/>
+            <a:r>
+              <a:rPr lang="en-US" sz="2000" i="1" dirty="0" err="1">
+                <a:latin typeface="Courier New"/>
+                <a:cs typeface="Courier New"/>
+              </a:rPr>
+              <a:t>BeautifulSoup</a:t>
+            </a:r>
+            <a:r>
+              <a:rPr lang="en-US" sz="2000" i="1" dirty="0">
+                <a:latin typeface="Courier New"/>
+                <a:cs typeface="Courier New"/>
+              </a:rPr>
+              <a:t> + Requests </a:t>
+            </a:r>
+          </a:p>
+          <a:p>
+            <a:r>
+              <a:rPr lang="en-US" sz="2000" dirty="0">
+                <a:latin typeface="Calibri"/>
+                <a:cs typeface="Calibri"/>
+              </a:rPr>
+              <a:t>A happy medium between direct web-scraping tools and the ease and simplicity of </a:t>
+            </a:r>
+            <a:r>
+              <a:rPr lang="en-US" sz="2000" dirty="0">
+                <a:latin typeface="Courier New"/>
+                <a:cs typeface="Courier New"/>
+              </a:rPr>
+              <a:t>pandas</a:t>
+            </a:r>
+            <a:endParaRPr lang="en-US" sz="2000" dirty="0">
+              <a:latin typeface="Calibri"/>
+              <a:cs typeface="Calibri"/>
+            </a:endParaRPr>
+          </a:p>
+          <a:p>
+            <a:r>
+              <a:rPr lang="en-US" sz="2000" dirty="0">
+                <a:latin typeface="Calibri"/>
+                <a:cs typeface="Calibri"/>
+              </a:rPr>
+              <a:t>Can easily interface with </a:t>
+            </a:r>
+            <a:r>
+              <a:rPr lang="en-US" sz="2000" dirty="0">
+                <a:latin typeface="Courier New"/>
+                <a:cs typeface="Courier New"/>
+              </a:rPr>
+              <a:t>pandas</a:t>
+            </a:r>
+            <a:r>
+              <a:rPr lang="en-US" sz="2000" dirty="0">
+                <a:latin typeface="Calibri"/>
+                <a:cs typeface="Calibri"/>
+              </a:rPr>
+              <a:t> functions</a:t>
+            </a:r>
+            <a:endParaRPr lang="en-US" sz="2000" dirty="0">
+              <a:cs typeface="Calibri"/>
+            </a:endParaRPr>
+          </a:p>
+          <a:p>
+            <a:endParaRPr lang="en-US" sz="2000" dirty="0">
+              <a:latin typeface="Calibri"/>
+              <a:cs typeface="Calibri"/>
+            </a:endParaRPr>
+          </a:p>
+          <a:p>
+            <a:endParaRPr lang="en-US" sz="2000" dirty="0">
+              <a:latin typeface="Calibri"/>
+              <a:cs typeface="Calibri"/>
+            </a:endParaRPr>
+          </a:p>
+        </p:txBody>
+      </p:sp>
+      <p:pic>
+        <p:nvPicPr>
+          <p:cNvPr id="4" name="Picture 4" descr="A screenshot of a cell phone&#10;&#10;Description generated with very high confidence">
+            <a:extLst>
+              <a:ext uri="{FF2B5EF4-FFF2-40B4-BE49-F238E27FC236}">
+                <a16:creationId xmlns:a16="http://schemas.microsoft.com/office/drawing/2014/main" id="{91A894D3-3164-403C-A17A-714999645715}"/>
+              </a:ext>
+            </a:extLst>
+          </p:cNvPr>
+          <p:cNvPicPr>
+            <a:picLocks noChangeAspect="1"/>
+          </p:cNvPicPr>
+          <p:nvPr/>
+        </p:nvPicPr>
+        <p:blipFill>
+          <a:blip r:embed="rId2"/>
+          <a:stretch>
+            <a:fillRect/>
+          </a:stretch>
+        </p:blipFill>
+        <p:spPr>
+          <a:xfrm>
+            <a:off x="5141344" y="1571775"/>
+            <a:ext cx="6912633" cy="4807127"/>
+          </a:xfrm>
+          <a:prstGeom prst="rect">
+            <a:avLst/>
+          </a:prstGeom>
+        </p:spPr>
+      </p:pic>
+    </p:spTree>
+    <p:extLst>
+      <p:ext uri="{BB962C8B-B14F-4D97-AF65-F5344CB8AC3E}">
+        <p14:creationId xmlns:p14="http://schemas.microsoft.com/office/powerpoint/2010/main" val="2278662049"/>
+      </p:ext>
+    </p:extLst>
+  </p:cSld>
+  <p:clrMapOvr>
+    <a:masterClrMapping/>
+  </p:clrMapOvr>
 </p:sld>
 </file>
 

</xml_diff>

<commit_message>
fixed minor typo in tech review presentation
</commit_message>
<xml_diff>
--- a/doc/design/TechnologyReview.pptx
+++ b/doc/design/TechnologyReview.pptx
@@ -5482,19 +5482,7 @@
               <a:rPr lang="en-US" dirty="0">
                 <a:cs typeface="Calibri"/>
               </a:rPr>
-              <a:t>Suppose webpage </a:t>
-            </a:r>
-            <a:r>
-              <a:rPr lang="en-US" dirty="0" err="1">
-                <a:cs typeface="Calibri"/>
-              </a:rPr>
-              <a:t>alread</a:t>
-            </a:r>
-            <a:r>
-              <a:rPr lang="en-US" dirty="0">
-                <a:cs typeface="Calibri"/>
-              </a:rPr>
-              <a:t> in 'table' format...</a:t>
+              <a:t>Suppose webpage already in 'table' format...</a:t>
             </a:r>
           </a:p>
           <a:p>
@@ -6453,7 +6441,7 @@
               <a:rPr lang="en-US" b="1" dirty="0">
                 <a:cs typeface="Calibri"/>
               </a:rPr>
-              <a:t>Example) </a:t>
+              <a:t>Example </a:t>
             </a:r>
             <a:r>
               <a:rPr lang="en-US" b="1" dirty="0">

</xml_diff>